<commit_message>
Update: completed GitHub Review
</commit_message>
<xml_diff>
--- a/Milestone 7/ENSE 470 Milestone 7.pptx
+++ b/Milestone 7/ENSE 470 Milestone 7.pptx
@@ -6,18 +6,20 @@
   </p:sldMasterIdLst>
   <p:sldIdLst>
     <p:sldId id="256" r:id="rId2"/>
-    <p:sldId id="257" r:id="rId3"/>
-    <p:sldId id="258" r:id="rId4"/>
-    <p:sldId id="259" r:id="rId5"/>
-    <p:sldId id="260" r:id="rId6"/>
-    <p:sldId id="261" r:id="rId7"/>
-    <p:sldId id="262" r:id="rId8"/>
-    <p:sldId id="263" r:id="rId9"/>
-    <p:sldId id="264" r:id="rId10"/>
-    <p:sldId id="265" r:id="rId11"/>
-    <p:sldId id="266" r:id="rId12"/>
-    <p:sldId id="267" r:id="rId13"/>
-    <p:sldId id="268" r:id="rId14"/>
+    <p:sldId id="258" r:id="rId3"/>
+    <p:sldId id="269" r:id="rId4"/>
+    <p:sldId id="270" r:id="rId5"/>
+    <p:sldId id="271" r:id="rId6"/>
+    <p:sldId id="259" r:id="rId7"/>
+    <p:sldId id="272" r:id="rId8"/>
+    <p:sldId id="261" r:id="rId9"/>
+    <p:sldId id="262" r:id="rId10"/>
+    <p:sldId id="263" r:id="rId11"/>
+    <p:sldId id="264" r:id="rId12"/>
+    <p:sldId id="265" r:id="rId13"/>
+    <p:sldId id="266" r:id="rId14"/>
+    <p:sldId id="267" r:id="rId15"/>
+    <p:sldId id="268" r:id="rId16"/>
   </p:sldIdLst>
   <p:sldSz cx="12192000" cy="6858000"/>
   <p:notesSz cx="6858000" cy="9144000"/>
@@ -116,6 +118,11 @@
       </a:defRPr>
     </a:lvl9pPr>
   </p:defaultTextStyle>
+  <p:extLst>
+    <p:ext uri="{EFAFB233-063F-42B5-8137-9DF3F51BA10A}">
+      <p15:sldGuideLst xmlns:p15="http://schemas.microsoft.com/office/powerpoint/2012/main"/>
+    </p:ext>
+  </p:extLst>
 </p:presentation>
 </file>
 
@@ -169,7 +176,7 @@
           <a:noFill/>
           <a:extLst>
             <a:ext uri="{909E8E84-426E-40dd-AFC4-6F175D3DCCD1}">
-              <a14:hiddenFill xmlns:a14="http://schemas.microsoft.com/office/drawing/2010/main" xmlns="">
+              <a14:hiddenFill xmlns="" xmlns:a14="http://schemas.microsoft.com/office/drawing/2010/main">
                 <a:solidFill>
                   <a:srgbClr val="FFFFFF"/>
                 </a:solidFill>
@@ -229,7 +236,7 @@
             </a:ln>
             <a:extLst>
               <a:ext uri="{91240B29-F687-4f45-9708-019B960494DF}">
-                <a14:hiddenLine xmlns:a14="http://schemas.microsoft.com/office/drawing/2010/main" xmlns="" w="9525">
+                <a14:hiddenLine xmlns="" xmlns:a14="http://schemas.microsoft.com/office/drawing/2010/main" w="9525">
                   <a:solidFill>
                     <a:srgbClr val="000000"/>
                   </a:solidFill>
@@ -319,7 +326,7 @@
             </a:ln>
             <a:extLst>
               <a:ext uri="{91240B29-F687-4f45-9708-019B960494DF}">
-                <a14:hiddenLine xmlns:a14="http://schemas.microsoft.com/office/drawing/2010/main" xmlns="" w="9525">
+                <a14:hiddenLine xmlns="" xmlns:a14="http://schemas.microsoft.com/office/drawing/2010/main" w="9525">
                   <a:solidFill>
                     <a:srgbClr val="000000"/>
                   </a:solidFill>
@@ -409,7 +416,7 @@
             </a:ln>
             <a:extLst>
               <a:ext uri="{91240B29-F687-4f45-9708-019B960494DF}">
-                <a14:hiddenLine xmlns:a14="http://schemas.microsoft.com/office/drawing/2010/main" xmlns="" w="9525">
+                <a14:hiddenLine xmlns="" xmlns:a14="http://schemas.microsoft.com/office/drawing/2010/main" w="9525">
                   <a:solidFill>
                     <a:srgbClr val="000000"/>
                   </a:solidFill>
@@ -443,7 +450,7 @@
             </a:ln>
             <a:extLst>
               <a:ext uri="{91240B29-F687-4f45-9708-019B960494DF}">
-                <a14:hiddenLine xmlns:a14="http://schemas.microsoft.com/office/drawing/2010/main" xmlns="" w="9525">
+                <a14:hiddenLine xmlns="" xmlns:a14="http://schemas.microsoft.com/office/drawing/2010/main" w="9525">
                   <a:solidFill>
                     <a:srgbClr val="000000"/>
                   </a:solidFill>
@@ -533,7 +540,7 @@
             </a:ln>
             <a:extLst>
               <a:ext uri="{91240B29-F687-4f45-9708-019B960494DF}">
-                <a14:hiddenLine xmlns:a14="http://schemas.microsoft.com/office/drawing/2010/main" xmlns="" w="9525">
+                <a14:hiddenLine xmlns="" xmlns:a14="http://schemas.microsoft.com/office/drawing/2010/main" w="9525">
                   <a:solidFill>
                     <a:srgbClr val="000000"/>
                   </a:solidFill>
@@ -595,7 +602,7 @@
             </a:ln>
             <a:extLst>
               <a:ext uri="{91240B29-F687-4f45-9708-019B960494DF}">
-                <a14:hiddenLine xmlns:a14="http://schemas.microsoft.com/office/drawing/2010/main" xmlns="" w="9525">
+                <a14:hiddenLine xmlns="" xmlns:a14="http://schemas.microsoft.com/office/drawing/2010/main" w="9525">
                   <a:solidFill>
                     <a:srgbClr val="000000"/>
                   </a:solidFill>
@@ -657,7 +664,7 @@
             </a:ln>
             <a:extLst>
               <a:ext uri="{91240B29-F687-4f45-9708-019B960494DF}">
-                <a14:hiddenLine xmlns:a14="http://schemas.microsoft.com/office/drawing/2010/main" xmlns="" w="9525">
+                <a14:hiddenLine xmlns="" xmlns:a14="http://schemas.microsoft.com/office/drawing/2010/main" w="9525">
                   <a:solidFill>
                     <a:srgbClr val="000000"/>
                   </a:solidFill>
@@ -747,7 +754,7 @@
             </a:ln>
             <a:extLst>
               <a:ext uri="{91240B29-F687-4f45-9708-019B960494DF}">
-                <a14:hiddenLine xmlns:a14="http://schemas.microsoft.com/office/drawing/2010/main" xmlns="" w="9525">
+                <a14:hiddenLine xmlns="" xmlns:a14="http://schemas.microsoft.com/office/drawing/2010/main" w="9525">
                   <a:solidFill>
                     <a:srgbClr val="000000"/>
                   </a:solidFill>
@@ -809,7 +816,7 @@
             </a:ln>
             <a:extLst>
               <a:ext uri="{91240B29-F687-4f45-9708-019B960494DF}">
-                <a14:hiddenLine xmlns:a14="http://schemas.microsoft.com/office/drawing/2010/main" xmlns="" w="9525">
+                <a14:hiddenLine xmlns="" xmlns:a14="http://schemas.microsoft.com/office/drawing/2010/main" w="9525">
                   <a:solidFill>
                     <a:srgbClr val="000000"/>
                   </a:solidFill>
@@ -871,7 +878,7 @@
             </a:ln>
             <a:extLst>
               <a:ext uri="{91240B29-F687-4f45-9708-019B960494DF}">
-                <a14:hiddenLine xmlns:a14="http://schemas.microsoft.com/office/drawing/2010/main" xmlns="" w="9525">
+                <a14:hiddenLine xmlns="" xmlns:a14="http://schemas.microsoft.com/office/drawing/2010/main" w="9525">
                   <a:solidFill>
                     <a:srgbClr val="000000"/>
                   </a:solidFill>
@@ -961,7 +968,7 @@
             </a:ln>
             <a:extLst>
               <a:ext uri="{91240B29-F687-4f45-9708-019B960494DF}">
-                <a14:hiddenLine xmlns:a14="http://schemas.microsoft.com/office/drawing/2010/main" xmlns="" w="9525">
+                <a14:hiddenLine xmlns="" xmlns:a14="http://schemas.microsoft.com/office/drawing/2010/main" w="9525">
                   <a:solidFill>
                     <a:srgbClr val="000000"/>
                   </a:solidFill>
@@ -1051,7 +1058,7 @@
             </a:ln>
             <a:extLst>
               <a:ext uri="{91240B29-F687-4f45-9708-019B960494DF}">
-                <a14:hiddenLine xmlns:a14="http://schemas.microsoft.com/office/drawing/2010/main" xmlns="" w="9525">
+                <a14:hiddenLine xmlns="" xmlns:a14="http://schemas.microsoft.com/office/drawing/2010/main" w="9525">
                   <a:solidFill>
                     <a:srgbClr val="000000"/>
                   </a:solidFill>
@@ -1113,7 +1120,7 @@
             </a:ln>
             <a:extLst>
               <a:ext uri="{91240B29-F687-4f45-9708-019B960494DF}">
-                <a14:hiddenLine xmlns:a14="http://schemas.microsoft.com/office/drawing/2010/main" xmlns="" w="9525">
+                <a14:hiddenLine xmlns="" xmlns:a14="http://schemas.microsoft.com/office/drawing/2010/main" w="9525">
                   <a:solidFill>
                     <a:srgbClr val="000000"/>
                   </a:solidFill>
@@ -1223,7 +1230,7 @@
             </a:ln>
             <a:extLst>
               <a:ext uri="{91240B29-F687-4f45-9708-019B960494DF}">
-                <a14:hiddenLine xmlns:a14="http://schemas.microsoft.com/office/drawing/2010/main" xmlns="" w="9525">
+                <a14:hiddenLine xmlns="" xmlns:a14="http://schemas.microsoft.com/office/drawing/2010/main" w="9525">
                   <a:solidFill>
                     <a:srgbClr val="000000"/>
                   </a:solidFill>
@@ -1285,7 +1292,7 @@
             </a:ln>
             <a:extLst>
               <a:ext uri="{91240B29-F687-4f45-9708-019B960494DF}">
-                <a14:hiddenLine xmlns:a14="http://schemas.microsoft.com/office/drawing/2010/main" xmlns="" w="9525">
+                <a14:hiddenLine xmlns="" xmlns:a14="http://schemas.microsoft.com/office/drawing/2010/main" w="9525">
                   <a:solidFill>
                     <a:srgbClr val="000000"/>
                   </a:solidFill>
@@ -1375,7 +1382,7 @@
             </a:ln>
             <a:extLst>
               <a:ext uri="{91240B29-F687-4f45-9708-019B960494DF}">
-                <a14:hiddenLine xmlns:a14="http://schemas.microsoft.com/office/drawing/2010/main" xmlns="" w="9525">
+                <a14:hiddenLine xmlns="" xmlns:a14="http://schemas.microsoft.com/office/drawing/2010/main" w="9525">
                   <a:solidFill>
                     <a:srgbClr val="000000"/>
                   </a:solidFill>
@@ -1465,7 +1472,7 @@
             </a:ln>
             <a:extLst>
               <a:ext uri="{91240B29-F687-4f45-9708-019B960494DF}">
-                <a14:hiddenLine xmlns:a14="http://schemas.microsoft.com/office/drawing/2010/main" xmlns="" w="9525">
+                <a14:hiddenLine xmlns="" xmlns:a14="http://schemas.microsoft.com/office/drawing/2010/main" w="9525">
                   <a:solidFill>
                     <a:srgbClr val="000000"/>
                   </a:solidFill>
@@ -1527,7 +1534,7 @@
             </a:ln>
             <a:extLst>
               <a:ext uri="{91240B29-F687-4f45-9708-019B960494DF}">
-                <a14:hiddenLine xmlns:a14="http://schemas.microsoft.com/office/drawing/2010/main" xmlns="" w="9525">
+                <a14:hiddenLine xmlns="" xmlns:a14="http://schemas.microsoft.com/office/drawing/2010/main" w="9525">
                   <a:solidFill>
                     <a:srgbClr val="000000"/>
                   </a:solidFill>
@@ -1617,7 +1624,7 @@
             </a:ln>
             <a:extLst>
               <a:ext uri="{91240B29-F687-4f45-9708-019B960494DF}">
-                <a14:hiddenLine xmlns:a14="http://schemas.microsoft.com/office/drawing/2010/main" xmlns="" w="9525">
+                <a14:hiddenLine xmlns="" xmlns:a14="http://schemas.microsoft.com/office/drawing/2010/main" w="9525">
                   <a:solidFill>
                     <a:srgbClr val="000000"/>
                   </a:solidFill>
@@ -1707,7 +1714,7 @@
             </a:ln>
             <a:extLst>
               <a:ext uri="{91240B29-F687-4f45-9708-019B960494DF}">
-                <a14:hiddenLine xmlns:a14="http://schemas.microsoft.com/office/drawing/2010/main" xmlns="" w="9525">
+                <a14:hiddenLine xmlns="" xmlns:a14="http://schemas.microsoft.com/office/drawing/2010/main" w="9525">
                   <a:solidFill>
                     <a:srgbClr val="000000"/>
                   </a:solidFill>
@@ -1763,7 +1770,7 @@
             </a:ln>
             <a:extLst>
               <a:ext uri="{91240B29-F687-4f45-9708-019B960494DF}">
-                <a14:hiddenLine xmlns:a14="http://schemas.microsoft.com/office/drawing/2010/main" xmlns="" w="9525">
+                <a14:hiddenLine xmlns="" xmlns:a14="http://schemas.microsoft.com/office/drawing/2010/main" w="9525">
                   <a:solidFill>
                     <a:srgbClr val="000000"/>
                   </a:solidFill>
@@ -1853,7 +1860,7 @@
             </a:ln>
             <a:extLst>
               <a:ext uri="{91240B29-F687-4f45-9708-019B960494DF}">
-                <a14:hiddenLine xmlns:a14="http://schemas.microsoft.com/office/drawing/2010/main" xmlns="" w="9525">
+                <a14:hiddenLine xmlns="" xmlns:a14="http://schemas.microsoft.com/office/drawing/2010/main" w="9525">
                   <a:solidFill>
                     <a:srgbClr val="000000"/>
                   </a:solidFill>
@@ -1909,7 +1916,7 @@
             </a:ln>
             <a:extLst>
               <a:ext uri="{91240B29-F687-4f45-9708-019B960494DF}">
-                <a14:hiddenLine xmlns:a14="http://schemas.microsoft.com/office/drawing/2010/main" xmlns="" w="9525">
+                <a14:hiddenLine xmlns="" xmlns:a14="http://schemas.microsoft.com/office/drawing/2010/main" w="9525">
                   <a:solidFill>
                     <a:srgbClr val="000000"/>
                   </a:solidFill>
@@ -1999,7 +2006,7 @@
             </a:ln>
             <a:extLst>
               <a:ext uri="{91240B29-F687-4f45-9708-019B960494DF}">
-                <a14:hiddenLine xmlns:a14="http://schemas.microsoft.com/office/drawing/2010/main" xmlns="" w="9525">
+                <a14:hiddenLine xmlns="" xmlns:a14="http://schemas.microsoft.com/office/drawing/2010/main" w="9525">
                   <a:solidFill>
                     <a:srgbClr val="000000"/>
                   </a:solidFill>
@@ -2067,7 +2074,7 @@
             </a:ln>
             <a:extLst>
               <a:ext uri="{91240B29-F687-4f45-9708-019B960494DF}">
-                <a14:hiddenLine xmlns:a14="http://schemas.microsoft.com/office/drawing/2010/main" xmlns="" w="9525">
+                <a14:hiddenLine xmlns="" xmlns:a14="http://schemas.microsoft.com/office/drawing/2010/main" w="9525">
                   <a:solidFill>
                     <a:srgbClr val="000000"/>
                   </a:solidFill>
@@ -2157,7 +2164,7 @@
             </a:ln>
             <a:extLst>
               <a:ext uri="{91240B29-F687-4f45-9708-019B960494DF}">
-                <a14:hiddenLine xmlns:a14="http://schemas.microsoft.com/office/drawing/2010/main" xmlns="" w="9525">
+                <a14:hiddenLine xmlns="" xmlns:a14="http://schemas.microsoft.com/office/drawing/2010/main" w="9525">
                   <a:solidFill>
                     <a:srgbClr val="000000"/>
                   </a:solidFill>
@@ -2225,7 +2232,7 @@
             </a:ln>
             <a:extLst>
               <a:ext uri="{91240B29-F687-4f45-9708-019B960494DF}">
-                <a14:hiddenLine xmlns:a14="http://schemas.microsoft.com/office/drawing/2010/main" xmlns="" w="9525">
+                <a14:hiddenLine xmlns="" xmlns:a14="http://schemas.microsoft.com/office/drawing/2010/main" w="9525">
                   <a:solidFill>
                     <a:srgbClr val="000000"/>
                   </a:solidFill>
@@ -2315,7 +2322,7 @@
             </a:ln>
             <a:extLst>
               <a:ext uri="{91240B29-F687-4f45-9708-019B960494DF}">
-                <a14:hiddenLine xmlns:a14="http://schemas.microsoft.com/office/drawing/2010/main" xmlns="" w="9525">
+                <a14:hiddenLine xmlns="" xmlns:a14="http://schemas.microsoft.com/office/drawing/2010/main" w="9525">
                   <a:solidFill>
                     <a:srgbClr val="000000"/>
                   </a:solidFill>
@@ -2349,7 +2356,7 @@
             </a:ln>
             <a:extLst>
               <a:ext uri="{91240B29-F687-4f45-9708-019B960494DF}">
-                <a14:hiddenLine xmlns:a14="http://schemas.microsoft.com/office/drawing/2010/main" xmlns="" w="9525">
+                <a14:hiddenLine xmlns="" xmlns:a14="http://schemas.microsoft.com/office/drawing/2010/main" w="9525">
                   <a:solidFill>
                     <a:srgbClr val="000000"/>
                   </a:solidFill>
@@ -2439,7 +2446,7 @@
             </a:ln>
             <a:extLst>
               <a:ext uri="{91240B29-F687-4f45-9708-019B960494DF}">
-                <a14:hiddenLine xmlns:a14="http://schemas.microsoft.com/office/drawing/2010/main" xmlns="" w="9525">
+                <a14:hiddenLine xmlns="" xmlns:a14="http://schemas.microsoft.com/office/drawing/2010/main" w="9525">
                   <a:solidFill>
                     <a:srgbClr val="000000"/>
                   </a:solidFill>
@@ -2501,7 +2508,7 @@
             </a:ln>
             <a:extLst>
               <a:ext uri="{91240B29-F687-4f45-9708-019B960494DF}">
-                <a14:hiddenLine xmlns:a14="http://schemas.microsoft.com/office/drawing/2010/main" xmlns="" w="9525">
+                <a14:hiddenLine xmlns="" xmlns:a14="http://schemas.microsoft.com/office/drawing/2010/main" w="9525">
                   <a:solidFill>
                     <a:srgbClr val="000000"/>
                   </a:solidFill>
@@ -2563,7 +2570,7 @@
             </a:ln>
             <a:extLst>
               <a:ext uri="{91240B29-F687-4f45-9708-019B960494DF}">
-                <a14:hiddenLine xmlns:a14="http://schemas.microsoft.com/office/drawing/2010/main" xmlns="" w="9525">
+                <a14:hiddenLine xmlns="" xmlns:a14="http://schemas.microsoft.com/office/drawing/2010/main" w="9525">
                   <a:solidFill>
                     <a:srgbClr val="000000"/>
                   </a:solidFill>
@@ -2653,7 +2660,7 @@
             </a:ln>
             <a:extLst>
               <a:ext uri="{91240B29-F687-4f45-9708-019B960494DF}">
-                <a14:hiddenLine xmlns:a14="http://schemas.microsoft.com/office/drawing/2010/main" xmlns="" w="9525">
+                <a14:hiddenLine xmlns="" xmlns:a14="http://schemas.microsoft.com/office/drawing/2010/main" w="9525">
                   <a:solidFill>
                     <a:srgbClr val="000000"/>
                   </a:solidFill>
@@ -2721,7 +2728,7 @@
             </a:ln>
             <a:extLst>
               <a:ext uri="{91240B29-F687-4f45-9708-019B960494DF}">
-                <a14:hiddenLine xmlns:a14="http://schemas.microsoft.com/office/drawing/2010/main" xmlns="" w="9525">
+                <a14:hiddenLine xmlns="" xmlns:a14="http://schemas.microsoft.com/office/drawing/2010/main" w="9525">
                   <a:solidFill>
                     <a:srgbClr val="000000"/>
                   </a:solidFill>
@@ -2783,7 +2790,7 @@
             </a:ln>
             <a:extLst>
               <a:ext uri="{91240B29-F687-4f45-9708-019B960494DF}">
-                <a14:hiddenLine xmlns:a14="http://schemas.microsoft.com/office/drawing/2010/main" xmlns="" w="9525">
+                <a14:hiddenLine xmlns="" xmlns:a14="http://schemas.microsoft.com/office/drawing/2010/main" w="9525">
                   <a:solidFill>
                     <a:srgbClr val="000000"/>
                   </a:solidFill>
@@ -2873,7 +2880,7 @@
             </a:ln>
             <a:extLst>
               <a:ext uri="{91240B29-F687-4f45-9708-019B960494DF}">
-                <a14:hiddenLine xmlns:a14="http://schemas.microsoft.com/office/drawing/2010/main" xmlns="" w="9525">
+                <a14:hiddenLine xmlns="" xmlns:a14="http://schemas.microsoft.com/office/drawing/2010/main" w="9525">
                   <a:solidFill>
                     <a:srgbClr val="000000"/>
                   </a:solidFill>
@@ -2935,7 +2942,7 @@
             </a:ln>
             <a:extLst>
               <a:ext uri="{91240B29-F687-4f45-9708-019B960494DF}">
-                <a14:hiddenLine xmlns:a14="http://schemas.microsoft.com/office/drawing/2010/main" xmlns="" w="9525">
+                <a14:hiddenLine xmlns="" xmlns:a14="http://schemas.microsoft.com/office/drawing/2010/main" w="9525">
                   <a:solidFill>
                     <a:srgbClr val="000000"/>
                   </a:solidFill>
@@ -3025,7 +3032,7 @@
             </a:ln>
             <a:extLst>
               <a:ext uri="{91240B29-F687-4f45-9708-019B960494DF}">
-                <a14:hiddenLine xmlns:a14="http://schemas.microsoft.com/office/drawing/2010/main" xmlns="" w="9525">
+                <a14:hiddenLine xmlns="" xmlns:a14="http://schemas.microsoft.com/office/drawing/2010/main" w="9525">
                   <a:solidFill>
                     <a:srgbClr val="000000"/>
                   </a:solidFill>
@@ -3087,7 +3094,7 @@
             </a:ln>
             <a:extLst>
               <a:ext uri="{91240B29-F687-4f45-9708-019B960494DF}">
-                <a14:hiddenLine xmlns:a14="http://schemas.microsoft.com/office/drawing/2010/main" xmlns="" w="9525">
+                <a14:hiddenLine xmlns="" xmlns:a14="http://schemas.microsoft.com/office/drawing/2010/main" w="9525">
                   <a:solidFill>
                     <a:srgbClr val="000000"/>
                   </a:solidFill>
@@ -3177,7 +3184,7 @@
             </a:ln>
             <a:extLst>
               <a:ext uri="{91240B29-F687-4f45-9708-019B960494DF}">
-                <a14:hiddenLine xmlns:a14="http://schemas.microsoft.com/office/drawing/2010/main" xmlns="" w="9525">
+                <a14:hiddenLine xmlns="" xmlns:a14="http://schemas.microsoft.com/office/drawing/2010/main" w="9525">
                   <a:solidFill>
                     <a:srgbClr val="000000"/>
                   </a:solidFill>
@@ -3211,7 +3218,7 @@
             </a:ln>
             <a:extLst>
               <a:ext uri="{91240B29-F687-4f45-9708-019B960494DF}">
-                <a14:hiddenLine xmlns:a14="http://schemas.microsoft.com/office/drawing/2010/main" xmlns="" w="9525">
+                <a14:hiddenLine xmlns="" xmlns:a14="http://schemas.microsoft.com/office/drawing/2010/main" w="9525">
                   <a:solidFill>
                     <a:srgbClr val="000000"/>
                   </a:solidFill>
@@ -3276,7 +3283,7 @@
             </a:ln>
             <a:extLst>
               <a:ext uri="{91240B29-F687-4f45-9708-019B960494DF}">
-                <a14:hiddenLine xmlns:a14="http://schemas.microsoft.com/office/drawing/2010/main" xmlns="" w="9525">
+                <a14:hiddenLine xmlns="" xmlns:a14="http://schemas.microsoft.com/office/drawing/2010/main" w="9525">
                   <a:solidFill>
                     <a:srgbClr val="000000"/>
                   </a:solidFill>
@@ -3366,7 +3373,7 @@
             </a:ln>
             <a:extLst>
               <a:ext uri="{91240B29-F687-4f45-9708-019B960494DF}">
-                <a14:hiddenLine xmlns:a14="http://schemas.microsoft.com/office/drawing/2010/main" xmlns="" w="9525">
+                <a14:hiddenLine xmlns="" xmlns:a14="http://schemas.microsoft.com/office/drawing/2010/main" w="9525">
                   <a:solidFill>
                     <a:srgbClr val="000000"/>
                   </a:solidFill>
@@ -3428,7 +3435,7 @@
             </a:ln>
             <a:extLst>
               <a:ext uri="{91240B29-F687-4f45-9708-019B960494DF}">
-                <a14:hiddenLine xmlns:a14="http://schemas.microsoft.com/office/drawing/2010/main" xmlns="" w="9525">
+                <a14:hiddenLine xmlns="" xmlns:a14="http://schemas.microsoft.com/office/drawing/2010/main" w="9525">
                   <a:solidFill>
                     <a:srgbClr val="000000"/>
                   </a:solidFill>
@@ -3518,7 +3525,7 @@
             </a:ln>
             <a:extLst>
               <a:ext uri="{91240B29-F687-4f45-9708-019B960494DF}">
-                <a14:hiddenLine xmlns:a14="http://schemas.microsoft.com/office/drawing/2010/main" xmlns="" w="9525">
+                <a14:hiddenLine xmlns="" xmlns:a14="http://schemas.microsoft.com/office/drawing/2010/main" w="9525">
                   <a:solidFill>
                     <a:srgbClr val="000000"/>
                   </a:solidFill>
@@ -3608,7 +3615,7 @@
             </a:ln>
             <a:extLst>
               <a:ext uri="{91240B29-F687-4f45-9708-019B960494DF}">
-                <a14:hiddenLine xmlns:a14="http://schemas.microsoft.com/office/drawing/2010/main" xmlns="" w="9525">
+                <a14:hiddenLine xmlns="" xmlns:a14="http://schemas.microsoft.com/office/drawing/2010/main" w="9525">
                   <a:solidFill>
                     <a:srgbClr val="000000"/>
                   </a:solidFill>
@@ -3673,7 +3680,7 @@
             </a:ln>
             <a:extLst>
               <a:ext uri="{91240B29-F687-4f45-9708-019B960494DF}">
-                <a14:hiddenLine xmlns:a14="http://schemas.microsoft.com/office/drawing/2010/main" xmlns="" w="9525">
+                <a14:hiddenLine xmlns="" xmlns:a14="http://schemas.microsoft.com/office/drawing/2010/main" w="9525">
                   <a:solidFill>
                     <a:srgbClr val="000000"/>
                   </a:solidFill>
@@ -3735,7 +3742,7 @@
             </a:ln>
             <a:extLst>
               <a:ext uri="{91240B29-F687-4f45-9708-019B960494DF}">
-                <a14:hiddenLine xmlns:a14="http://schemas.microsoft.com/office/drawing/2010/main" xmlns="" w="9525">
+                <a14:hiddenLine xmlns="" xmlns:a14="http://schemas.microsoft.com/office/drawing/2010/main" w="9525">
                   <a:solidFill>
                     <a:srgbClr val="000000"/>
                   </a:solidFill>
@@ -3825,7 +3832,7 @@
             </a:ln>
             <a:extLst>
               <a:ext uri="{91240B29-F687-4f45-9708-019B960494DF}">
-                <a14:hiddenLine xmlns:a14="http://schemas.microsoft.com/office/drawing/2010/main" xmlns="" w="9525">
+                <a14:hiddenLine xmlns="" xmlns:a14="http://schemas.microsoft.com/office/drawing/2010/main" w="9525">
                   <a:solidFill>
                     <a:srgbClr val="000000"/>
                   </a:solidFill>
@@ -3915,7 +3922,7 @@
             </a:ln>
             <a:extLst>
               <a:ext uri="{91240B29-F687-4f45-9708-019B960494DF}">
-                <a14:hiddenLine xmlns:a14="http://schemas.microsoft.com/office/drawing/2010/main" xmlns="" w="9525">
+                <a14:hiddenLine xmlns="" xmlns:a14="http://schemas.microsoft.com/office/drawing/2010/main" w="9525">
                   <a:solidFill>
                     <a:srgbClr val="000000"/>
                   </a:solidFill>
@@ -3977,7 +3984,7 @@
             </a:ln>
             <a:extLst>
               <a:ext uri="{91240B29-F687-4f45-9708-019B960494DF}">
-                <a14:hiddenLine xmlns:a14="http://schemas.microsoft.com/office/drawing/2010/main" xmlns="" w="9525">
+                <a14:hiddenLine xmlns="" xmlns:a14="http://schemas.microsoft.com/office/drawing/2010/main" w="9525">
                   <a:solidFill>
                     <a:srgbClr val="000000"/>
                   </a:solidFill>
@@ -4097,7 +4104,7 @@
             </a:ln>
             <a:extLst>
               <a:ext uri="{91240B29-F687-4f45-9708-019B960494DF}">
-                <a14:hiddenLine xmlns:a14="http://schemas.microsoft.com/office/drawing/2010/main" xmlns="" w="9525">
+                <a14:hiddenLine xmlns="" xmlns:a14="http://schemas.microsoft.com/office/drawing/2010/main" w="9525">
                   <a:solidFill>
                     <a:srgbClr val="000000"/>
                   </a:solidFill>
@@ -4165,7 +4172,7 @@
             </a:ln>
             <a:extLst>
               <a:ext uri="{91240B29-F687-4f45-9708-019B960494DF}">
-                <a14:hiddenLine xmlns:a14="http://schemas.microsoft.com/office/drawing/2010/main" xmlns="" w="9525">
+                <a14:hiddenLine xmlns="" xmlns:a14="http://schemas.microsoft.com/office/drawing/2010/main" w="9525">
                   <a:solidFill>
                     <a:srgbClr val="000000"/>
                   </a:solidFill>
@@ -4255,7 +4262,7 @@
             </a:ln>
             <a:extLst>
               <a:ext uri="{91240B29-F687-4f45-9708-019B960494DF}">
-                <a14:hiddenLine xmlns:a14="http://schemas.microsoft.com/office/drawing/2010/main" xmlns="" w="9525">
+                <a14:hiddenLine xmlns="" xmlns:a14="http://schemas.microsoft.com/office/drawing/2010/main" w="9525">
                   <a:solidFill>
                     <a:srgbClr val="000000"/>
                   </a:solidFill>
@@ -4395,7 +4402,7 @@
           <a:p>
             <a:fld id="{99FB56CE-62CC-47B4-A280-D33BC8BCBDFC}" type="datetimeFigureOut">
               <a:rPr lang="en-CA" smtClean="0"/>
-              <a:t>2018-04-04</a:t>
+              <a:t>2018-04-06</a:t>
             </a:fld>
             <a:endParaRPr lang="en-CA"/>
           </a:p>
@@ -4662,7 +4669,7 @@
           <a:p>
             <a:fld id="{99FB56CE-62CC-47B4-A280-D33BC8BCBDFC}" type="datetimeFigureOut">
               <a:rPr lang="en-CA" smtClean="0"/>
-              <a:t>2018-04-04</a:t>
+              <a:t>2018-04-06</a:t>
             </a:fld>
             <a:endParaRPr lang="en-CA"/>
           </a:p>
@@ -4858,7 +4865,7 @@
           <a:p>
             <a:fld id="{99FB56CE-62CC-47B4-A280-D33BC8BCBDFC}" type="datetimeFigureOut">
               <a:rPr lang="en-CA" smtClean="0"/>
-              <a:t>2018-04-04</a:t>
+              <a:t>2018-04-06</a:t>
             </a:fld>
             <a:endParaRPr lang="en-CA"/>
           </a:p>
@@ -5121,7 +5128,7 @@
           <a:p>
             <a:fld id="{99FB56CE-62CC-47B4-A280-D33BC8BCBDFC}" type="datetimeFigureOut">
               <a:rPr lang="en-CA" smtClean="0"/>
-              <a:t>2018-04-04</a:t>
+              <a:t>2018-04-06</a:t>
             </a:fld>
             <a:endParaRPr lang="en-CA"/>
           </a:p>
@@ -5555,7 +5562,7 @@
           <a:p>
             <a:fld id="{99FB56CE-62CC-47B4-A280-D33BC8BCBDFC}" type="datetimeFigureOut">
               <a:rPr lang="en-CA" smtClean="0"/>
-              <a:t>2018-04-04</a:t>
+              <a:t>2018-04-06</a:t>
             </a:fld>
             <a:endParaRPr lang="en-CA"/>
           </a:p>
@@ -6101,7 +6108,7 @@
           <a:p>
             <a:fld id="{99FB56CE-62CC-47B4-A280-D33BC8BCBDFC}" type="datetimeFigureOut">
               <a:rPr lang="en-CA" smtClean="0"/>
-              <a:t>2018-04-04</a:t>
+              <a:t>2018-04-06</a:t>
             </a:fld>
             <a:endParaRPr lang="en-CA"/>
           </a:p>
@@ -6821,7 +6828,7 @@
           <a:p>
             <a:fld id="{99FB56CE-62CC-47B4-A280-D33BC8BCBDFC}" type="datetimeFigureOut">
               <a:rPr lang="en-CA" smtClean="0"/>
-              <a:t>2018-04-04</a:t>
+              <a:t>2018-04-06</a:t>
             </a:fld>
             <a:endParaRPr lang="en-CA"/>
           </a:p>
@@ -6991,7 +6998,7 @@
           <a:p>
             <a:fld id="{99FB56CE-62CC-47B4-A280-D33BC8BCBDFC}" type="datetimeFigureOut">
               <a:rPr lang="en-CA" smtClean="0"/>
-              <a:t>2018-04-04</a:t>
+              <a:t>2018-04-06</a:t>
             </a:fld>
             <a:endParaRPr lang="en-CA"/>
           </a:p>
@@ -7171,7 +7178,7 @@
           <a:p>
             <a:fld id="{99FB56CE-62CC-47B4-A280-D33BC8BCBDFC}" type="datetimeFigureOut">
               <a:rPr lang="en-CA" smtClean="0"/>
-              <a:t>2018-04-04</a:t>
+              <a:t>2018-04-06</a:t>
             </a:fld>
             <a:endParaRPr lang="en-CA"/>
           </a:p>
@@ -7341,7 +7348,7 @@
           <a:p>
             <a:fld id="{99FB56CE-62CC-47B4-A280-D33BC8BCBDFC}" type="datetimeFigureOut">
               <a:rPr lang="en-CA" smtClean="0"/>
-              <a:t>2018-04-04</a:t>
+              <a:t>2018-04-06</a:t>
             </a:fld>
             <a:endParaRPr lang="en-CA"/>
           </a:p>
@@ -7591,7 +7598,7 @@
           <a:p>
             <a:fld id="{99FB56CE-62CC-47B4-A280-D33BC8BCBDFC}" type="datetimeFigureOut">
               <a:rPr lang="en-CA" smtClean="0"/>
-              <a:t>2018-04-04</a:t>
+              <a:t>2018-04-06</a:t>
             </a:fld>
             <a:endParaRPr lang="en-CA"/>
           </a:p>
@@ -7823,7 +7830,7 @@
           <a:p>
             <a:fld id="{99FB56CE-62CC-47B4-A280-D33BC8BCBDFC}" type="datetimeFigureOut">
               <a:rPr lang="en-CA" smtClean="0"/>
-              <a:t>2018-04-04</a:t>
+              <a:t>2018-04-06</a:t>
             </a:fld>
             <a:endParaRPr lang="en-CA"/>
           </a:p>
@@ -8204,7 +8211,7 @@
           <a:p>
             <a:fld id="{99FB56CE-62CC-47B4-A280-D33BC8BCBDFC}" type="datetimeFigureOut">
               <a:rPr lang="en-CA" smtClean="0"/>
-              <a:t>2018-04-04</a:t>
+              <a:t>2018-04-06</a:t>
             </a:fld>
             <a:endParaRPr lang="en-CA"/>
           </a:p>
@@ -8322,7 +8329,7 @@
           <a:p>
             <a:fld id="{99FB56CE-62CC-47B4-A280-D33BC8BCBDFC}" type="datetimeFigureOut">
               <a:rPr lang="en-CA" smtClean="0"/>
-              <a:t>2018-04-04</a:t>
+              <a:t>2018-04-06</a:t>
             </a:fld>
             <a:endParaRPr lang="en-CA"/>
           </a:p>
@@ -8417,7 +8424,7 @@
           <a:p>
             <a:fld id="{99FB56CE-62CC-47B4-A280-D33BC8BCBDFC}" type="datetimeFigureOut">
               <a:rPr lang="en-CA" smtClean="0"/>
-              <a:t>2018-04-04</a:t>
+              <a:t>2018-04-06</a:t>
             </a:fld>
             <a:endParaRPr lang="en-CA"/>
           </a:p>
@@ -8666,7 +8673,7 @@
           <a:p>
             <a:fld id="{99FB56CE-62CC-47B4-A280-D33BC8BCBDFC}" type="datetimeFigureOut">
               <a:rPr lang="en-CA" smtClean="0"/>
-              <a:t>2018-04-04</a:t>
+              <a:t>2018-04-06</a:t>
             </a:fld>
             <a:endParaRPr lang="en-CA"/>
           </a:p>
@@ -8946,7 +8953,7 @@
           <a:p>
             <a:fld id="{99FB56CE-62CC-47B4-A280-D33BC8BCBDFC}" type="datetimeFigureOut">
               <a:rPr lang="en-CA" smtClean="0"/>
-              <a:t>2018-04-04</a:t>
+              <a:t>2018-04-06</a:t>
             </a:fld>
             <a:endParaRPr lang="en-CA"/>
           </a:p>
@@ -9062,7 +9069,7 @@
           <a:noFill/>
           <a:extLst>
             <a:ext uri="{909E8E84-426E-40dd-AFC4-6F175D3DCCD1}">
-              <a14:hiddenFill xmlns:a14="http://schemas.microsoft.com/office/drawing/2010/main" xmlns="">
+              <a14:hiddenFill xmlns="" xmlns:a14="http://schemas.microsoft.com/office/drawing/2010/main">
                 <a:solidFill>
                   <a:srgbClr val="FFFFFF"/>
                 </a:solidFill>
@@ -9136,7 +9143,7 @@
               </a:ln>
               <a:extLst>
                 <a:ext uri="{91240B29-F687-4f45-9708-019B960494DF}">
-                  <a14:hiddenLine xmlns:a14="http://schemas.microsoft.com/office/drawing/2010/main" xmlns="" w="9525">
+                  <a14:hiddenLine xmlns="" xmlns:a14="http://schemas.microsoft.com/office/drawing/2010/main" w="9525">
                     <a:solidFill>
                       <a:srgbClr val="000000"/>
                     </a:solidFill>
@@ -9226,7 +9233,7 @@
               </a:ln>
               <a:extLst>
                 <a:ext uri="{91240B29-F687-4f45-9708-019B960494DF}">
-                  <a14:hiddenLine xmlns:a14="http://schemas.microsoft.com/office/drawing/2010/main" xmlns="" w="9525">
+                  <a14:hiddenLine xmlns="" xmlns:a14="http://schemas.microsoft.com/office/drawing/2010/main" w="9525">
                     <a:solidFill>
                       <a:srgbClr val="000000"/>
                     </a:solidFill>
@@ -9316,7 +9323,7 @@
               </a:ln>
               <a:extLst>
                 <a:ext uri="{91240B29-F687-4f45-9708-019B960494DF}">
-                  <a14:hiddenLine xmlns:a14="http://schemas.microsoft.com/office/drawing/2010/main" xmlns="" w="9525">
+                  <a14:hiddenLine xmlns="" xmlns:a14="http://schemas.microsoft.com/office/drawing/2010/main" w="9525">
                     <a:solidFill>
                       <a:srgbClr val="000000"/>
                     </a:solidFill>
@@ -9378,7 +9385,7 @@
               </a:ln>
               <a:extLst>
                 <a:ext uri="{91240B29-F687-4f45-9708-019B960494DF}">
-                  <a14:hiddenLine xmlns:a14="http://schemas.microsoft.com/office/drawing/2010/main" xmlns="" w="9525">
+                  <a14:hiddenLine xmlns="" xmlns:a14="http://schemas.microsoft.com/office/drawing/2010/main" w="9525">
                     <a:solidFill>
                       <a:srgbClr val="000000"/>
                     </a:solidFill>
@@ -9468,7 +9475,7 @@
               </a:ln>
               <a:extLst>
                 <a:ext uri="{91240B29-F687-4f45-9708-019B960494DF}">
-                  <a14:hiddenLine xmlns:a14="http://schemas.microsoft.com/office/drawing/2010/main" xmlns="" w="9525">
+                  <a14:hiddenLine xmlns="" xmlns:a14="http://schemas.microsoft.com/office/drawing/2010/main" w="9525">
                     <a:solidFill>
                       <a:srgbClr val="000000"/>
                     </a:solidFill>
@@ -9530,7 +9537,7 @@
               </a:ln>
               <a:extLst>
                 <a:ext uri="{91240B29-F687-4f45-9708-019B960494DF}">
-                  <a14:hiddenLine xmlns:a14="http://schemas.microsoft.com/office/drawing/2010/main" xmlns="" w="9525">
+                  <a14:hiddenLine xmlns="" xmlns:a14="http://schemas.microsoft.com/office/drawing/2010/main" w="9525">
                     <a:solidFill>
                       <a:srgbClr val="000000"/>
                     </a:solidFill>
@@ -9592,7 +9599,7 @@
               </a:ln>
               <a:extLst>
                 <a:ext uri="{91240B29-F687-4f45-9708-019B960494DF}">
-                  <a14:hiddenLine xmlns:a14="http://schemas.microsoft.com/office/drawing/2010/main" xmlns="" w="9525">
+                  <a14:hiddenLine xmlns="" xmlns:a14="http://schemas.microsoft.com/office/drawing/2010/main" w="9525">
                     <a:solidFill>
                       <a:srgbClr val="000000"/>
                     </a:solidFill>
@@ -9682,7 +9689,7 @@
               </a:ln>
               <a:extLst>
                 <a:ext uri="{91240B29-F687-4f45-9708-019B960494DF}">
-                  <a14:hiddenLine xmlns:a14="http://schemas.microsoft.com/office/drawing/2010/main" xmlns="" w="9525">
+                  <a14:hiddenLine xmlns="" xmlns:a14="http://schemas.microsoft.com/office/drawing/2010/main" w="9525">
                     <a:solidFill>
                       <a:srgbClr val="000000"/>
                     </a:solidFill>
@@ -9772,7 +9779,7 @@
               </a:ln>
               <a:extLst>
                 <a:ext uri="{91240B29-F687-4f45-9708-019B960494DF}">
-                  <a14:hiddenLine xmlns:a14="http://schemas.microsoft.com/office/drawing/2010/main" xmlns="" w="9525">
+                  <a14:hiddenLine xmlns="" xmlns:a14="http://schemas.microsoft.com/office/drawing/2010/main" w="9525">
                     <a:solidFill>
                       <a:srgbClr val="000000"/>
                     </a:solidFill>
@@ -9834,7 +9841,7 @@
               </a:ln>
               <a:extLst>
                 <a:ext uri="{91240B29-F687-4f45-9708-019B960494DF}">
-                  <a14:hiddenLine xmlns:a14="http://schemas.microsoft.com/office/drawing/2010/main" xmlns="" w="9525">
+                  <a14:hiddenLine xmlns="" xmlns:a14="http://schemas.microsoft.com/office/drawing/2010/main" w="9525">
                     <a:solidFill>
                       <a:srgbClr val="000000"/>
                     </a:solidFill>
@@ -9944,7 +9951,7 @@
               </a:ln>
               <a:extLst>
                 <a:ext uri="{91240B29-F687-4f45-9708-019B960494DF}">
-                  <a14:hiddenLine xmlns:a14="http://schemas.microsoft.com/office/drawing/2010/main" xmlns="" w="9525">
+                  <a14:hiddenLine xmlns="" xmlns:a14="http://schemas.microsoft.com/office/drawing/2010/main" w="9525">
                     <a:solidFill>
                       <a:srgbClr val="000000"/>
                     </a:solidFill>
@@ -10028,7 +10035,7 @@
               </a:ln>
               <a:extLst>
                 <a:ext uri="{91240B29-F687-4f45-9708-019B960494DF}">
-                  <a14:hiddenLine xmlns:a14="http://schemas.microsoft.com/office/drawing/2010/main" xmlns="" w="9525">
+                  <a14:hiddenLine xmlns="" xmlns:a14="http://schemas.microsoft.com/office/drawing/2010/main" w="9525">
                     <a:solidFill>
                       <a:srgbClr val="000000"/>
                     </a:solidFill>
@@ -10090,7 +10097,7 @@
               </a:ln>
               <a:extLst>
                 <a:ext uri="{91240B29-F687-4f45-9708-019B960494DF}">
-                  <a14:hiddenLine xmlns:a14="http://schemas.microsoft.com/office/drawing/2010/main" xmlns="" w="9525">
+                  <a14:hiddenLine xmlns="" xmlns:a14="http://schemas.microsoft.com/office/drawing/2010/main" w="9525">
                     <a:solidFill>
                       <a:srgbClr val="000000"/>
                     </a:solidFill>
@@ -10152,7 +10159,7 @@
               </a:ln>
               <a:extLst>
                 <a:ext uri="{91240B29-F687-4f45-9708-019B960494DF}">
-                  <a14:hiddenLine xmlns:a14="http://schemas.microsoft.com/office/drawing/2010/main" xmlns="" w="9525">
+                  <a14:hiddenLine xmlns="" xmlns:a14="http://schemas.microsoft.com/office/drawing/2010/main" w="9525">
                     <a:solidFill>
                       <a:srgbClr val="000000"/>
                     </a:solidFill>
@@ -10242,7 +10249,7 @@
               </a:ln>
               <a:extLst>
                 <a:ext uri="{91240B29-F687-4f45-9708-019B960494DF}">
-                  <a14:hiddenLine xmlns:a14="http://schemas.microsoft.com/office/drawing/2010/main" xmlns="" w="9525">
+                  <a14:hiddenLine xmlns="" xmlns:a14="http://schemas.microsoft.com/office/drawing/2010/main" w="9525">
                     <a:solidFill>
                       <a:srgbClr val="000000"/>
                     </a:solidFill>
@@ -10276,7 +10283,7 @@
               </a:ln>
               <a:extLst>
                 <a:ext uri="{91240B29-F687-4f45-9708-019B960494DF}">
-                  <a14:hiddenLine xmlns:a14="http://schemas.microsoft.com/office/drawing/2010/main" xmlns="" w="9525">
+                  <a14:hiddenLine xmlns="" xmlns:a14="http://schemas.microsoft.com/office/drawing/2010/main" w="9525">
                     <a:solidFill>
                       <a:srgbClr val="000000"/>
                     </a:solidFill>
@@ -10341,7 +10348,7 @@
               </a:ln>
               <a:extLst>
                 <a:ext uri="{91240B29-F687-4f45-9708-019B960494DF}">
-                  <a14:hiddenLine xmlns:a14="http://schemas.microsoft.com/office/drawing/2010/main" xmlns="" w="9525">
+                  <a14:hiddenLine xmlns="" xmlns:a14="http://schemas.microsoft.com/office/drawing/2010/main" w="9525">
                     <a:solidFill>
                       <a:srgbClr val="000000"/>
                     </a:solidFill>
@@ -10431,7 +10438,7 @@
               </a:ln>
               <a:extLst>
                 <a:ext uri="{91240B29-F687-4f45-9708-019B960494DF}">
-                  <a14:hiddenLine xmlns:a14="http://schemas.microsoft.com/office/drawing/2010/main" xmlns="" w="9525">
+                  <a14:hiddenLine xmlns="" xmlns:a14="http://schemas.microsoft.com/office/drawing/2010/main" w="9525">
                     <a:solidFill>
                       <a:srgbClr val="000000"/>
                     </a:solidFill>
@@ -10493,7 +10500,7 @@
               </a:ln>
               <a:extLst>
                 <a:ext uri="{91240B29-F687-4f45-9708-019B960494DF}">
-                  <a14:hiddenLine xmlns:a14="http://schemas.microsoft.com/office/drawing/2010/main" xmlns="" w="9525">
+                  <a14:hiddenLine xmlns="" xmlns:a14="http://schemas.microsoft.com/office/drawing/2010/main" w="9525">
                     <a:solidFill>
                       <a:srgbClr val="000000"/>
                     </a:solidFill>
@@ -10583,7 +10590,7 @@
               </a:ln>
               <a:extLst>
                 <a:ext uri="{91240B29-F687-4f45-9708-019B960494DF}">
-                  <a14:hiddenLine xmlns:a14="http://schemas.microsoft.com/office/drawing/2010/main" xmlns="" w="9525">
+                  <a14:hiddenLine xmlns="" xmlns:a14="http://schemas.microsoft.com/office/drawing/2010/main" w="9525">
                     <a:solidFill>
                       <a:srgbClr val="000000"/>
                     </a:solidFill>
@@ -10648,7 +10655,7 @@
               </a:ln>
               <a:extLst>
                 <a:ext uri="{91240B29-F687-4f45-9708-019B960494DF}">
-                  <a14:hiddenLine xmlns:a14="http://schemas.microsoft.com/office/drawing/2010/main" xmlns="" w="9525">
+                  <a14:hiddenLine xmlns="" xmlns:a14="http://schemas.microsoft.com/office/drawing/2010/main" w="9525">
                     <a:solidFill>
                       <a:srgbClr val="000000"/>
                     </a:solidFill>
@@ -10710,7 +10717,7 @@
               </a:ln>
               <a:extLst>
                 <a:ext uri="{91240B29-F687-4f45-9708-019B960494DF}">
-                  <a14:hiddenLine xmlns:a14="http://schemas.microsoft.com/office/drawing/2010/main" xmlns="" w="9525">
+                  <a14:hiddenLine xmlns="" xmlns:a14="http://schemas.microsoft.com/office/drawing/2010/main" w="9525">
                     <a:solidFill>
                       <a:srgbClr val="000000"/>
                     </a:solidFill>
@@ -10800,7 +10807,7 @@
               </a:ln>
               <a:extLst>
                 <a:ext uri="{91240B29-F687-4f45-9708-019B960494DF}">
-                  <a14:hiddenLine xmlns:a14="http://schemas.microsoft.com/office/drawing/2010/main" xmlns="" w="9525">
+                  <a14:hiddenLine xmlns="" xmlns:a14="http://schemas.microsoft.com/office/drawing/2010/main" w="9525">
                     <a:solidFill>
                       <a:srgbClr val="000000"/>
                     </a:solidFill>
@@ -10890,7 +10897,7 @@
               </a:ln>
               <a:extLst>
                 <a:ext uri="{91240B29-F687-4f45-9708-019B960494DF}">
-                  <a14:hiddenLine xmlns:a14="http://schemas.microsoft.com/office/drawing/2010/main" xmlns="" w="9525">
+                  <a14:hiddenLine xmlns="" xmlns:a14="http://schemas.microsoft.com/office/drawing/2010/main" w="9525">
                     <a:solidFill>
                       <a:srgbClr val="000000"/>
                     </a:solidFill>
@@ -10955,7 +10962,7 @@
               </a:ln>
               <a:extLst>
                 <a:ext uri="{91240B29-F687-4f45-9708-019B960494DF}">
-                  <a14:hiddenLine xmlns:a14="http://schemas.microsoft.com/office/drawing/2010/main" xmlns="" w="9525">
+                  <a14:hiddenLine xmlns="" xmlns:a14="http://schemas.microsoft.com/office/drawing/2010/main" w="9525">
                     <a:solidFill>
                       <a:srgbClr val="000000"/>
                     </a:solidFill>
@@ -11075,7 +11082,7 @@
               </a:ln>
               <a:extLst>
                 <a:ext uri="{91240B29-F687-4f45-9708-019B960494DF}">
-                  <a14:hiddenLine xmlns:a14="http://schemas.microsoft.com/office/drawing/2010/main" xmlns="" w="9525">
+                  <a14:hiddenLine xmlns="" xmlns:a14="http://schemas.microsoft.com/office/drawing/2010/main" w="9525">
                     <a:solidFill>
                       <a:srgbClr val="000000"/>
                     </a:solidFill>
@@ -11173,7 +11180,7 @@
               </a:ln>
               <a:extLst>
                 <a:ext uri="{91240B29-F687-4f45-9708-019B960494DF}">
-                  <a14:hiddenLine xmlns:a14="http://schemas.microsoft.com/office/drawing/2010/main" xmlns="" w="9525">
+                  <a14:hiddenLine xmlns="" xmlns:a14="http://schemas.microsoft.com/office/drawing/2010/main" w="9525">
                     <a:solidFill>
                       <a:srgbClr val="000000"/>
                     </a:solidFill>
@@ -11288,7 +11295,7 @@
               </a:ln>
               <a:extLst>
                 <a:ext uri="{91240B29-F687-4f45-9708-019B960494DF}">
-                  <a14:hiddenLine xmlns:a14="http://schemas.microsoft.com/office/drawing/2010/main" xmlns="" w="9525">
+                  <a14:hiddenLine xmlns="" xmlns:a14="http://schemas.microsoft.com/office/drawing/2010/main" w="9525">
                     <a:solidFill>
                       <a:srgbClr val="000000"/>
                     </a:solidFill>
@@ -11378,7 +11385,7 @@
               </a:ln>
               <a:extLst>
                 <a:ext uri="{91240B29-F687-4f45-9708-019B960494DF}">
-                  <a14:hiddenLine xmlns:a14="http://schemas.microsoft.com/office/drawing/2010/main" xmlns="" w="9525">
+                  <a14:hiddenLine xmlns="" xmlns:a14="http://schemas.microsoft.com/office/drawing/2010/main" w="9525">
                     <a:solidFill>
                       <a:srgbClr val="000000"/>
                     </a:solidFill>
@@ -11443,7 +11450,7 @@
               </a:ln>
               <a:extLst>
                 <a:ext uri="{91240B29-F687-4f45-9708-019B960494DF}">
-                  <a14:hiddenLine xmlns:a14="http://schemas.microsoft.com/office/drawing/2010/main" xmlns="" w="9525">
+                  <a14:hiddenLine xmlns="" xmlns:a14="http://schemas.microsoft.com/office/drawing/2010/main" w="9525">
                     <a:solidFill>
                       <a:srgbClr val="000000"/>
                     </a:solidFill>
@@ -11533,7 +11540,7 @@
               </a:ln>
               <a:extLst>
                 <a:ext uri="{91240B29-F687-4f45-9708-019B960494DF}">
-                  <a14:hiddenLine xmlns:a14="http://schemas.microsoft.com/office/drawing/2010/main" xmlns="" w="9525">
+                  <a14:hiddenLine xmlns="" xmlns:a14="http://schemas.microsoft.com/office/drawing/2010/main" w="9525">
                     <a:solidFill>
                       <a:srgbClr val="000000"/>
                     </a:solidFill>
@@ -11601,7 +11608,7 @@
               </a:ln>
               <a:extLst>
                 <a:ext uri="{91240B29-F687-4f45-9708-019B960494DF}">
-                  <a14:hiddenLine xmlns:a14="http://schemas.microsoft.com/office/drawing/2010/main" xmlns="" w="9525">
+                  <a14:hiddenLine xmlns="" xmlns:a14="http://schemas.microsoft.com/office/drawing/2010/main" w="9525">
                     <a:solidFill>
                       <a:srgbClr val="000000"/>
                     </a:solidFill>
@@ -11691,7 +11698,7 @@
               </a:ln>
               <a:extLst>
                 <a:ext uri="{91240B29-F687-4f45-9708-019B960494DF}">
-                  <a14:hiddenLine xmlns:a14="http://schemas.microsoft.com/office/drawing/2010/main" xmlns="" w="9525">
+                  <a14:hiddenLine xmlns="" xmlns:a14="http://schemas.microsoft.com/office/drawing/2010/main" w="9525">
                     <a:solidFill>
                       <a:srgbClr val="000000"/>
                     </a:solidFill>
@@ -11759,7 +11766,7 @@
               </a:ln>
               <a:extLst>
                 <a:ext uri="{91240B29-F687-4f45-9708-019B960494DF}">
-                  <a14:hiddenLine xmlns:a14="http://schemas.microsoft.com/office/drawing/2010/main" xmlns="" w="9525">
+                  <a14:hiddenLine xmlns="" xmlns:a14="http://schemas.microsoft.com/office/drawing/2010/main" w="9525">
                     <a:solidFill>
                       <a:srgbClr val="000000"/>
                     </a:solidFill>
@@ -11849,7 +11856,7 @@
               </a:ln>
               <a:extLst>
                 <a:ext uri="{91240B29-F687-4f45-9708-019B960494DF}">
-                  <a14:hiddenLine xmlns:a14="http://schemas.microsoft.com/office/drawing/2010/main" xmlns="" w="9525">
+                  <a14:hiddenLine xmlns="" xmlns:a14="http://schemas.microsoft.com/office/drawing/2010/main" w="9525">
                     <a:solidFill>
                       <a:srgbClr val="000000"/>
                     </a:solidFill>
@@ -11883,7 +11890,7 @@
               </a:ln>
               <a:extLst>
                 <a:ext uri="{91240B29-F687-4f45-9708-019B960494DF}">
-                  <a14:hiddenLine xmlns:a14="http://schemas.microsoft.com/office/drawing/2010/main" xmlns="" w="9525">
+                  <a14:hiddenLine xmlns="" xmlns:a14="http://schemas.microsoft.com/office/drawing/2010/main" w="9525">
                     <a:solidFill>
                       <a:srgbClr val="000000"/>
                     </a:solidFill>
@@ -12023,7 +12030,7 @@
           <a:p>
             <a:fld id="{99FB56CE-62CC-47B4-A280-D33BC8BCBDFC}" type="datetimeFigureOut">
               <a:rPr lang="en-CA" smtClean="0"/>
-              <a:t>2018-04-04</a:t>
+              <a:t>2018-04-06</a:t>
             </a:fld>
             <a:endParaRPr lang="en-CA"/>
           </a:p>
@@ -12577,6 +12584,210 @@
           <p:cNvPr id="2" name="Title 1">
             <a:extLst>
               <a:ext uri="{FF2B5EF4-FFF2-40B4-BE49-F238E27FC236}">
+                <a16:creationId xmlns:a16="http://schemas.microsoft.com/office/drawing/2014/main" id="{AD06EE58-4AF6-44A7-AA22-F8556EDA26A0}"/>
+              </a:ext>
+            </a:extLst>
+          </p:cNvPr>
+          <p:cNvSpPr>
+            <a:spLocks noGrp="1"/>
+          </p:cNvSpPr>
+          <p:nvPr>
+            <p:ph type="title"/>
+          </p:nvPr>
+        </p:nvSpPr>
+        <p:spPr/>
+        <p:txBody>
+          <a:bodyPr/>
+          <a:lstStyle/>
+          <a:p>
+            <a:r>
+              <a:rPr lang="en-US" altLang="en-US" dirty="0"/>
+              <a:t>Design pattern discussion (High-level focus)</a:t>
+            </a:r>
+            <a:endParaRPr lang="en-CA" dirty="0"/>
+          </a:p>
+        </p:txBody>
+      </p:sp>
+      <p:sp>
+        <p:nvSpPr>
+          <p:cNvPr id="3" name="Content Placeholder 2">
+            <a:extLst>
+              <a:ext uri="{FF2B5EF4-FFF2-40B4-BE49-F238E27FC236}">
+                <a16:creationId xmlns:a16="http://schemas.microsoft.com/office/drawing/2014/main" id="{448F4072-6D68-4CE4-B46A-A7709DB26F94}"/>
+              </a:ext>
+            </a:extLst>
+          </p:cNvPr>
+          <p:cNvSpPr>
+            <a:spLocks noGrp="1"/>
+          </p:cNvSpPr>
+          <p:nvPr>
+            <p:ph idx="1"/>
+          </p:nvPr>
+        </p:nvSpPr>
+        <p:spPr/>
+        <p:txBody>
+          <a:bodyPr/>
+          <a:lstStyle/>
+          <a:p>
+            <a:r>
+              <a:rPr lang="en-US" altLang="en-US" dirty="0"/>
+              <a:t>Comment on what design patterns the team used</a:t>
+            </a:r>
+          </a:p>
+          <a:p>
+            <a:pPr lvl="1"/>
+            <a:r>
+              <a:rPr lang="en-US" altLang="en-US" dirty="0"/>
+              <a:t>Provide samples where you are able</a:t>
+            </a:r>
+          </a:p>
+          <a:p>
+            <a:pPr lvl="2"/>
+            <a:r>
+              <a:rPr lang="en-US" altLang="en-US" dirty="0"/>
+              <a:t>Were they appropriate?</a:t>
+            </a:r>
+          </a:p>
+          <a:p>
+            <a:pPr lvl="2"/>
+            <a:r>
+              <a:rPr lang="en-US" altLang="en-US" dirty="0"/>
+              <a:t>Were there alternatives they could have also used?</a:t>
+            </a:r>
+          </a:p>
+          <a:p>
+            <a:r>
+              <a:rPr lang="en-US" altLang="en-US" dirty="0"/>
+              <a:t>If they didn’t use any Design Patterns, were there ones they could have tried?</a:t>
+            </a:r>
+          </a:p>
+          <a:p>
+            <a:pPr lvl="1"/>
+            <a:r>
+              <a:rPr lang="en-US" altLang="en-US" dirty="0"/>
+              <a:t>Provide samples/code snippets/areas of the code</a:t>
+            </a:r>
+          </a:p>
+          <a:p>
+            <a:endParaRPr lang="en-CA" dirty="0"/>
+          </a:p>
+        </p:txBody>
+      </p:sp>
+    </p:spTree>
+    <p:extLst>
+      <p:ext uri="{BB962C8B-B14F-4D97-AF65-F5344CB8AC3E}">
+        <p14:creationId xmlns:p14="http://schemas.microsoft.com/office/powerpoint/2010/main" val="1421288843"/>
+      </p:ext>
+    </p:extLst>
+  </p:cSld>
+  <p:clrMapOvr>
+    <a:masterClrMapping/>
+  </p:clrMapOvr>
+</p:sld>
+</file>
+
+<file path=ppt/slides/slide11.xml><?xml version="1.0" encoding="utf-8"?>
+<p:sld xmlns:a="http://schemas.openxmlformats.org/drawingml/2006/main" xmlns:r="http://schemas.openxmlformats.org/officeDocument/2006/relationships" xmlns:p="http://schemas.openxmlformats.org/presentationml/2006/main">
+  <p:cSld>
+    <p:spTree>
+      <p:nvGrpSpPr>
+        <p:cNvPr id="1" name=""/>
+        <p:cNvGrpSpPr/>
+        <p:nvPr/>
+      </p:nvGrpSpPr>
+      <p:grpSpPr>
+        <a:xfrm>
+          <a:off x="0" y="0"/>
+          <a:ext cx="0" cy="0"/>
+          <a:chOff x="0" y="0"/>
+          <a:chExt cx="0" cy="0"/>
+        </a:xfrm>
+      </p:grpSpPr>
+      <p:sp>
+        <p:nvSpPr>
+          <p:cNvPr id="2" name="Title 1">
+            <a:extLst>
+              <a:ext uri="{FF2B5EF4-FFF2-40B4-BE49-F238E27FC236}">
+                <a16:creationId xmlns:a16="http://schemas.microsoft.com/office/drawing/2014/main" id="{6C90E832-22A3-40B8-83FC-AB571942EC7C}"/>
+              </a:ext>
+            </a:extLst>
+          </p:cNvPr>
+          <p:cNvSpPr>
+            <a:spLocks noGrp="1"/>
+          </p:cNvSpPr>
+          <p:nvPr>
+            <p:ph type="title"/>
+          </p:nvPr>
+        </p:nvSpPr>
+        <p:spPr/>
+        <p:txBody>
+          <a:bodyPr/>
+          <a:lstStyle/>
+          <a:p>
+            <a:endParaRPr lang="en-CA"/>
+          </a:p>
+        </p:txBody>
+      </p:sp>
+      <p:sp>
+        <p:nvSpPr>
+          <p:cNvPr id="3" name="Content Placeholder 2">
+            <a:extLst>
+              <a:ext uri="{FF2B5EF4-FFF2-40B4-BE49-F238E27FC236}">
+                <a16:creationId xmlns:a16="http://schemas.microsoft.com/office/drawing/2014/main" id="{A6CC2F4B-AFFA-426E-A93E-05769A23E634}"/>
+              </a:ext>
+            </a:extLst>
+          </p:cNvPr>
+          <p:cNvSpPr>
+            <a:spLocks noGrp="1"/>
+          </p:cNvSpPr>
+          <p:nvPr>
+            <p:ph idx="1"/>
+          </p:nvPr>
+        </p:nvSpPr>
+        <p:spPr/>
+        <p:txBody>
+          <a:bodyPr/>
+          <a:lstStyle/>
+          <a:p>
+            <a:endParaRPr lang="en-CA"/>
+          </a:p>
+        </p:txBody>
+      </p:sp>
+    </p:spTree>
+    <p:extLst>
+      <p:ext uri="{BB962C8B-B14F-4D97-AF65-F5344CB8AC3E}">
+        <p14:creationId xmlns:p14="http://schemas.microsoft.com/office/powerpoint/2010/main" val="740593883"/>
+      </p:ext>
+    </p:extLst>
+  </p:cSld>
+  <p:clrMapOvr>
+    <a:masterClrMapping/>
+  </p:clrMapOvr>
+</p:sld>
+</file>
+
+<file path=ppt/slides/slide12.xml><?xml version="1.0" encoding="utf-8"?>
+<p:sld xmlns:a="http://schemas.openxmlformats.org/drawingml/2006/main" xmlns:r="http://schemas.openxmlformats.org/officeDocument/2006/relationships" xmlns:p="http://schemas.openxmlformats.org/presentationml/2006/main">
+  <p:cSld>
+    <p:spTree>
+      <p:nvGrpSpPr>
+        <p:cNvPr id="1" name=""/>
+        <p:cNvGrpSpPr/>
+        <p:nvPr/>
+      </p:nvGrpSpPr>
+      <p:grpSpPr>
+        <a:xfrm>
+          <a:off x="0" y="0"/>
+          <a:ext cx="0" cy="0"/>
+          <a:chOff x="0" y="0"/>
+          <a:chExt cx="0" cy="0"/>
+        </a:xfrm>
+      </p:grpSpPr>
+      <p:sp>
+        <p:nvSpPr>
+          <p:cNvPr id="2" name="Title 1">
+            <a:extLst>
+              <a:ext uri="{FF2B5EF4-FFF2-40B4-BE49-F238E27FC236}">
                 <a16:creationId xmlns:a16="http://schemas.microsoft.com/office/drawing/2014/main" id="{81755132-8168-4DD5-8374-56FE5DFD5024}"/>
               </a:ext>
             </a:extLst>
@@ -12646,7 +12857,7 @@
 </p:sld>
 </file>
 
-<file path=ppt/slides/slide11.xml><?xml version="1.0" encoding="utf-8"?>
+<file path=ppt/slides/slide13.xml><?xml version="1.0" encoding="utf-8"?>
 <p:sld xmlns:a="http://schemas.openxmlformats.org/drawingml/2006/main" xmlns:r="http://schemas.openxmlformats.org/officeDocument/2006/relationships" xmlns:p="http://schemas.openxmlformats.org/presentationml/2006/main">
   <p:cSld>
     <p:spTree>
@@ -12726,7 +12937,7 @@
 </p:sld>
 </file>
 
-<file path=ppt/slides/slide12.xml><?xml version="1.0" encoding="utf-8"?>
+<file path=ppt/slides/slide14.xml><?xml version="1.0" encoding="utf-8"?>
 <p:sld xmlns:a="http://schemas.openxmlformats.org/drawingml/2006/main" xmlns:r="http://schemas.openxmlformats.org/officeDocument/2006/relationships" xmlns:p="http://schemas.openxmlformats.org/presentationml/2006/main">
   <p:cSld>
     <p:spTree>
@@ -12882,7 +13093,7 @@
 </p:sld>
 </file>
 
-<file path=ppt/slides/slide13.xml><?xml version="1.0" encoding="utf-8"?>
+<file path=ppt/slides/slide15.xml><?xml version="1.0" encoding="utf-8"?>
 <p:sld xmlns:a="http://schemas.openxmlformats.org/drawingml/2006/main" xmlns:r="http://schemas.openxmlformats.org/officeDocument/2006/relationships" xmlns:p="http://schemas.openxmlformats.org/presentationml/2006/main">
   <p:cSld>
     <p:spTree>
@@ -12984,7 +13195,7 @@
           <p:cNvPr id="2" name="Title 1">
             <a:extLst>
               <a:ext uri="{FF2B5EF4-FFF2-40B4-BE49-F238E27FC236}">
-                <a16:creationId xmlns:a16="http://schemas.microsoft.com/office/drawing/2014/main" id="{BD6780C4-68EA-424B-9B98-396498F98913}"/>
+                <a16:creationId xmlns:a16="http://schemas.microsoft.com/office/drawing/2014/main" id="{1A0DC963-06BC-4685-A6F8-A937B2739CA6}"/>
               </a:ext>
             </a:extLst>
           </p:cNvPr>
@@ -13001,10 +13212,9 @@
           <a:lstStyle/>
           <a:p>
             <a:r>
-              <a:rPr lang="en-US" altLang="en-US" dirty="0"/>
-              <a:t>Introduction </a:t>
-            </a:r>
-            <a:endParaRPr lang="en-CA" dirty="0"/>
+              <a:rPr lang="en-CA" dirty="0"/>
+              <a:t>Introduction</a:t>
+            </a:r>
           </a:p>
         </p:txBody>
       </p:sp>
@@ -13013,7 +13223,7 @@
           <p:cNvPr id="3" name="Content Placeholder 2">
             <a:extLst>
               <a:ext uri="{FF2B5EF4-FFF2-40B4-BE49-F238E27FC236}">
-                <a16:creationId xmlns:a16="http://schemas.microsoft.com/office/drawing/2014/main" id="{BA2CF5F7-C294-4600-AB32-39228EFB9D25}"/>
+                <a16:creationId xmlns:a16="http://schemas.microsoft.com/office/drawing/2014/main" id="{A4F11B09-E766-4C11-9167-19DAFE29622A}"/>
               </a:ext>
             </a:extLst>
           </p:cNvPr>
@@ -13024,30 +13234,39 @@
             <p:ph idx="1"/>
           </p:nvPr>
         </p:nvSpPr>
-        <p:spPr/>
+        <p:spPr>
+          <a:xfrm>
+            <a:off x="1141413" y="2192780"/>
+            <a:ext cx="9905999" cy="1925564"/>
+          </a:xfrm>
+        </p:spPr>
         <p:txBody>
           <a:bodyPr/>
           <a:lstStyle/>
           <a:p>
-            <a:pPr>
-              <a:defRPr/>
+            <a:r>
+              <a:rPr lang="en-CA" dirty="0"/>
+              <a:t>We will be reviewing Team </a:t>
+            </a:r>
+            <a:r>
+              <a:rPr lang="en-CA" dirty="0" err="1"/>
+              <a:t>Covfefe’s</a:t>
+            </a:r>
+            <a:r>
+              <a:rPr lang="en-CA" dirty="0"/>
+              <a:t> application</a:t>
+            </a:r>
+          </a:p>
+          <a:p>
+            <a:r>
+              <a:rPr lang="en-CA" dirty="0"/>
+              <a:t>www2.cs.uregina.ca/~thoma26s/ense470/splashpage.php</a:t>
+            </a:r>
+          </a:p>
+          <a:p>
+            <a:pPr marL="0" indent="0">
+              <a:buNone/>
             </a:pPr>
-            <a:r>
-              <a:rPr lang="en-US" altLang="en-US" dirty="0"/>
-              <a:t>What team are you reviewing?</a:t>
-            </a:r>
-          </a:p>
-          <a:p>
-            <a:pPr>
-              <a:defRPr/>
-            </a:pPr>
-            <a:r>
-              <a:rPr lang="en-US" altLang="en-US" dirty="0"/>
-              <a:t>Provide a quick couple screenshots of their completed product</a:t>
-            </a:r>
-            <a:endParaRPr lang="en-CA" altLang="en-US" dirty="0"/>
-          </a:p>
-          <a:p>
             <a:endParaRPr lang="en-CA" dirty="0"/>
           </a:p>
         </p:txBody>
@@ -13055,7 +13274,7 @@
     </p:spTree>
     <p:extLst>
       <p:ext uri="{BB962C8B-B14F-4D97-AF65-F5344CB8AC3E}">
-        <p14:creationId xmlns:p14="http://schemas.microsoft.com/office/powerpoint/2010/main" val="3871537085"/>
+        <p14:creationId xmlns:p14="http://schemas.microsoft.com/office/powerpoint/2010/main" val="3613576441"/>
       </p:ext>
     </p:extLst>
   </p:cSld>
@@ -13087,7 +13306,105 @@
           <p:cNvPr id="2" name="Title 1">
             <a:extLst>
               <a:ext uri="{FF2B5EF4-FFF2-40B4-BE49-F238E27FC236}">
-                <a16:creationId xmlns:a16="http://schemas.microsoft.com/office/drawing/2014/main" id="{1A0DC963-06BC-4685-A6F8-A937B2739CA6}"/>
+                <a16:creationId xmlns:a16="http://schemas.microsoft.com/office/drawing/2014/main" id="{49243D46-5B7A-476A-90B9-7E4408E75C53}"/>
+              </a:ext>
+            </a:extLst>
+          </p:cNvPr>
+          <p:cNvSpPr>
+            <a:spLocks noGrp="1"/>
+          </p:cNvSpPr>
+          <p:nvPr>
+            <p:ph type="title"/>
+          </p:nvPr>
+        </p:nvSpPr>
+        <p:spPr>
+          <a:xfrm>
+            <a:off x="1141412" y="611429"/>
+            <a:ext cx="9905998" cy="1478570"/>
+          </a:xfrm>
+        </p:spPr>
+        <p:txBody>
+          <a:bodyPr/>
+          <a:lstStyle/>
+          <a:p>
+            <a:r>
+              <a:rPr lang="en-CA" dirty="0"/>
+              <a:t>User Perspective</a:t>
+            </a:r>
+          </a:p>
+        </p:txBody>
+      </p:sp>
+      <p:pic>
+        <p:nvPicPr>
+          <p:cNvPr id="4" name="Picture 3">
+            <a:extLst>
+              <a:ext uri="{FF2B5EF4-FFF2-40B4-BE49-F238E27FC236}">
+                <a16:creationId xmlns:a16="http://schemas.microsoft.com/office/drawing/2014/main" id="{B06600D3-8EFA-45BB-80BF-F7D990F1BBBD}"/>
+              </a:ext>
+            </a:extLst>
+          </p:cNvPr>
+          <p:cNvPicPr/>
+          <p:nvPr/>
+        </p:nvPicPr>
+        <p:blipFill rotWithShape="1">
+          <a:blip r:embed="rId2"/>
+          <a:srcRect t="11725" r="1323" b="49527"/>
+          <a:stretch/>
+        </p:blipFill>
+        <p:spPr bwMode="auto">
+          <a:xfrm>
+            <a:off x="1460053" y="2286001"/>
+            <a:ext cx="9268715" cy="2552884"/>
+          </a:xfrm>
+          <a:prstGeom prst="rect">
+            <a:avLst/>
+          </a:prstGeom>
+          <a:ln>
+            <a:noFill/>
+          </a:ln>
+          <a:extLst>
+            <a:ext uri="{53640926-AAD7-44D8-BBD7-CCE9431645EC}">
+              <a14:shadowObscured xmlns:a14="http://schemas.microsoft.com/office/drawing/2010/main"/>
+            </a:ext>
+          </a:extLst>
+        </p:spPr>
+      </p:pic>
+    </p:spTree>
+    <p:extLst>
+      <p:ext uri="{BB962C8B-B14F-4D97-AF65-F5344CB8AC3E}">
+        <p14:creationId xmlns:p14="http://schemas.microsoft.com/office/powerpoint/2010/main" val="2790333938"/>
+      </p:ext>
+    </p:extLst>
+  </p:cSld>
+  <p:clrMapOvr>
+    <a:masterClrMapping/>
+  </p:clrMapOvr>
+</p:sld>
+</file>
+
+<file path=ppt/slides/slide4.xml><?xml version="1.0" encoding="utf-8"?>
+<p:sld xmlns:a="http://schemas.openxmlformats.org/drawingml/2006/main" xmlns:r="http://schemas.openxmlformats.org/officeDocument/2006/relationships" xmlns:p="http://schemas.openxmlformats.org/presentationml/2006/main">
+  <p:cSld>
+    <p:spTree>
+      <p:nvGrpSpPr>
+        <p:cNvPr id="1" name=""/>
+        <p:cNvGrpSpPr/>
+        <p:nvPr/>
+      </p:nvGrpSpPr>
+      <p:grpSpPr>
+        <a:xfrm>
+          <a:off x="0" y="0"/>
+          <a:ext cx="0" cy="0"/>
+          <a:chOff x="0" y="0"/>
+          <a:chExt cx="0" cy="0"/>
+        </a:xfrm>
+      </p:grpSpPr>
+      <p:sp>
+        <p:nvSpPr>
+          <p:cNvPr id="2" name="Title 1">
+            <a:extLst>
+              <a:ext uri="{FF2B5EF4-FFF2-40B4-BE49-F238E27FC236}">
+                <a16:creationId xmlns:a16="http://schemas.microsoft.com/office/drawing/2014/main" id="{281848A3-6C73-46D2-AE2D-D6E6377A08CB}"/>
               </a:ext>
             </a:extLst>
           </p:cNvPr>
@@ -13103,39 +13420,52 @@
           <a:bodyPr/>
           <a:lstStyle/>
           <a:p>
-            <a:endParaRPr lang="en-CA"/>
+            <a:r>
+              <a:rPr lang="en-CA" dirty="0"/>
+              <a:t>Approvers Perspective</a:t>
+            </a:r>
           </a:p>
         </p:txBody>
       </p:sp>
-      <p:sp>
-        <p:nvSpPr>
-          <p:cNvPr id="3" name="Content Placeholder 2">
+      <p:pic>
+        <p:nvPicPr>
+          <p:cNvPr id="4" name="Picture 3">
             <a:extLst>
               <a:ext uri="{FF2B5EF4-FFF2-40B4-BE49-F238E27FC236}">
-                <a16:creationId xmlns:a16="http://schemas.microsoft.com/office/drawing/2014/main" id="{A4F11B09-E766-4C11-9167-19DAFE29622A}"/>
+                <a16:creationId xmlns:a16="http://schemas.microsoft.com/office/drawing/2014/main" id="{FE473416-A255-4ECD-A07F-1B54BA66DA1F}"/>
               </a:ext>
             </a:extLst>
           </p:cNvPr>
-          <p:cNvSpPr>
-            <a:spLocks noGrp="1"/>
-          </p:cNvSpPr>
-          <p:nvPr>
-            <p:ph idx="1"/>
-          </p:nvPr>
-        </p:nvSpPr>
-        <p:spPr/>
-        <p:txBody>
-          <a:bodyPr/>
-          <a:lstStyle/>
-          <a:p>
-            <a:endParaRPr lang="en-CA"/>
-          </a:p>
-        </p:txBody>
-      </p:sp>
+          <p:cNvPicPr/>
+          <p:nvPr/>
+        </p:nvPicPr>
+        <p:blipFill rotWithShape="1">
+          <a:blip r:embed="rId2"/>
+          <a:srcRect t="10983" r="1733" b="14964"/>
+          <a:stretch/>
+        </p:blipFill>
+        <p:spPr bwMode="auto">
+          <a:xfrm>
+            <a:off x="1813692" y="1919937"/>
+            <a:ext cx="8561439" cy="4076826"/>
+          </a:xfrm>
+          <a:prstGeom prst="rect">
+            <a:avLst/>
+          </a:prstGeom>
+          <a:ln>
+            <a:noFill/>
+          </a:ln>
+          <a:extLst>
+            <a:ext uri="{53640926-AAD7-44D8-BBD7-CCE9431645EC}">
+              <a14:shadowObscured xmlns:a14="http://schemas.microsoft.com/office/drawing/2010/main"/>
+            </a:ext>
+          </a:extLst>
+        </p:spPr>
+      </p:pic>
     </p:spTree>
     <p:extLst>
       <p:ext uri="{BB962C8B-B14F-4D97-AF65-F5344CB8AC3E}">
-        <p14:creationId xmlns:p14="http://schemas.microsoft.com/office/powerpoint/2010/main" val="3613576441"/>
+        <p14:creationId xmlns:p14="http://schemas.microsoft.com/office/powerpoint/2010/main" val="4028273793"/>
       </p:ext>
     </p:extLst>
   </p:cSld>
@@ -13145,7 +13475,100 @@
 </p:sld>
 </file>
 
-<file path=ppt/slides/slide4.xml><?xml version="1.0" encoding="utf-8"?>
+<file path=ppt/slides/slide5.xml><?xml version="1.0" encoding="utf-8"?>
+<p:sld xmlns:a="http://schemas.openxmlformats.org/drawingml/2006/main" xmlns:r="http://schemas.openxmlformats.org/officeDocument/2006/relationships" xmlns:p="http://schemas.openxmlformats.org/presentationml/2006/main">
+  <p:cSld>
+    <p:spTree>
+      <p:nvGrpSpPr>
+        <p:cNvPr id="1" name=""/>
+        <p:cNvGrpSpPr/>
+        <p:nvPr/>
+      </p:nvGrpSpPr>
+      <p:grpSpPr>
+        <a:xfrm>
+          <a:off x="0" y="0"/>
+          <a:ext cx="0" cy="0"/>
+          <a:chOff x="0" y="0"/>
+          <a:chExt cx="0" cy="0"/>
+        </a:xfrm>
+      </p:grpSpPr>
+      <p:sp>
+        <p:nvSpPr>
+          <p:cNvPr id="2" name="Title 1">
+            <a:extLst>
+              <a:ext uri="{FF2B5EF4-FFF2-40B4-BE49-F238E27FC236}">
+                <a16:creationId xmlns:a16="http://schemas.microsoft.com/office/drawing/2014/main" id="{D1727A98-709B-4C59-BEDF-D8A966489096}"/>
+              </a:ext>
+            </a:extLst>
+          </p:cNvPr>
+          <p:cNvSpPr>
+            <a:spLocks noGrp="1"/>
+          </p:cNvSpPr>
+          <p:nvPr>
+            <p:ph type="title"/>
+          </p:nvPr>
+        </p:nvSpPr>
+        <p:spPr/>
+        <p:txBody>
+          <a:bodyPr/>
+          <a:lstStyle/>
+          <a:p>
+            <a:r>
+              <a:rPr lang="en-CA" dirty="0"/>
+              <a:t>Analyst perspective</a:t>
+            </a:r>
+          </a:p>
+        </p:txBody>
+      </p:sp>
+      <p:pic>
+        <p:nvPicPr>
+          <p:cNvPr id="4" name="Picture 3">
+            <a:extLst>
+              <a:ext uri="{FF2B5EF4-FFF2-40B4-BE49-F238E27FC236}">
+                <a16:creationId xmlns:a16="http://schemas.microsoft.com/office/drawing/2014/main" id="{1CDB3BA1-DF28-4827-883F-7D6606B63161}"/>
+              </a:ext>
+            </a:extLst>
+          </p:cNvPr>
+          <p:cNvPicPr/>
+          <p:nvPr/>
+        </p:nvPicPr>
+        <p:blipFill rotWithShape="1">
+          <a:blip r:embed="rId2"/>
+          <a:srcRect t="11106" r="2151" b="11258"/>
+          <a:stretch/>
+        </p:blipFill>
+        <p:spPr bwMode="auto">
+          <a:xfrm>
+            <a:off x="1864121" y="1926788"/>
+            <a:ext cx="8527431" cy="4183389"/>
+          </a:xfrm>
+          <a:prstGeom prst="rect">
+            <a:avLst/>
+          </a:prstGeom>
+          <a:ln>
+            <a:noFill/>
+          </a:ln>
+          <a:extLst>
+            <a:ext uri="{53640926-AAD7-44D8-BBD7-CCE9431645EC}">
+              <a14:shadowObscured xmlns:a14="http://schemas.microsoft.com/office/drawing/2010/main"/>
+            </a:ext>
+          </a:extLst>
+        </p:spPr>
+      </p:pic>
+    </p:spTree>
+    <p:extLst>
+      <p:ext uri="{BB962C8B-B14F-4D97-AF65-F5344CB8AC3E}">
+        <p14:creationId xmlns:p14="http://schemas.microsoft.com/office/powerpoint/2010/main" val="884827746"/>
+      </p:ext>
+    </p:extLst>
+  </p:cSld>
+  <p:clrMapOvr>
+    <a:masterClrMapping/>
+  </p:clrMapOvr>
+</p:sld>
+</file>
+
+<file path=ppt/slides/slide6.xml><?xml version="1.0" encoding="utf-8"?>
 <p:sld xmlns:a="http://schemas.openxmlformats.org/drawingml/2006/main" xmlns:r="http://schemas.openxmlformats.org/officeDocument/2006/relationships" xmlns:p="http://schemas.openxmlformats.org/presentationml/2006/main">
   <p:cSld>
     <p:spTree>
@@ -13275,7 +13698,7 @@
 </p:sld>
 </file>
 
-<file path=ppt/slides/slide5.xml><?xml version="1.0" encoding="utf-8"?>
+<file path=ppt/slides/slide7.xml><?xml version="1.0" encoding="utf-8"?>
 <p:sld xmlns:a="http://schemas.openxmlformats.org/drawingml/2006/main" xmlns:r="http://schemas.openxmlformats.org/officeDocument/2006/relationships" xmlns:p="http://schemas.openxmlformats.org/presentationml/2006/main">
   <p:cSld>
     <p:spTree>
@@ -13297,7 +13720,7 @@
           <p:cNvPr id="2" name="Title 1">
             <a:extLst>
               <a:ext uri="{FF2B5EF4-FFF2-40B4-BE49-F238E27FC236}">
-                <a16:creationId xmlns:a16="http://schemas.microsoft.com/office/drawing/2014/main" id="{7F4D5696-8025-42AA-8BE4-B4741DB042D8}"/>
+                <a16:creationId xmlns:a16="http://schemas.microsoft.com/office/drawing/2014/main" id="{98EE8689-AFC0-4710-9C53-E968166E514A}"/>
               </a:ext>
             </a:extLst>
           </p:cNvPr>
@@ -13308,12 +13731,28 @@
             <p:ph type="title"/>
           </p:nvPr>
         </p:nvSpPr>
-        <p:spPr/>
+        <p:spPr>
+          <a:xfrm>
+            <a:off x="1144589" y="352676"/>
+            <a:ext cx="9905998" cy="1478570"/>
+          </a:xfrm>
+        </p:spPr>
         <p:txBody>
           <a:bodyPr/>
           <a:lstStyle/>
           <a:p>
-            <a:endParaRPr lang="en-CA"/>
+            <a:r>
+              <a:rPr lang="en-CA" dirty="0"/>
+              <a:t>Team </a:t>
+            </a:r>
+            <a:r>
+              <a:rPr lang="en-CA" dirty="0" err="1"/>
+              <a:t>covfefe</a:t>
+            </a:r>
+            <a:r>
+              <a:rPr lang="en-CA" dirty="0"/>
+              <a:t> review</a:t>
+            </a:r>
           </a:p>
         </p:txBody>
       </p:sp>
@@ -13322,7 +13761,7 @@
           <p:cNvPr id="3" name="Content Placeholder 2">
             <a:extLst>
               <a:ext uri="{FF2B5EF4-FFF2-40B4-BE49-F238E27FC236}">
-                <a16:creationId xmlns:a16="http://schemas.microsoft.com/office/drawing/2014/main" id="{6D5950AD-DFA6-45B9-BA83-E45BD6F55B1B}"/>
+                <a16:creationId xmlns:a16="http://schemas.microsoft.com/office/drawing/2014/main" id="{5FAD60A8-C6FF-4494-8153-6BED71D73DC1}"/>
               </a:ext>
             </a:extLst>
           </p:cNvPr>
@@ -13333,19 +13772,76 @@
             <p:ph idx="1"/>
           </p:nvPr>
         </p:nvSpPr>
-        <p:spPr/>
+        <p:spPr>
+          <a:xfrm>
+            <a:off x="1141412" y="1438940"/>
+            <a:ext cx="4302457" cy="5419060"/>
+          </a:xfrm>
+        </p:spPr>
         <p:txBody>
-          <a:bodyPr/>
+          <a:bodyPr>
+            <a:normAutofit/>
+          </a:bodyPr>
           <a:lstStyle/>
           <a:p>
-            <a:endParaRPr lang="en-CA"/>
+            <a:r>
+              <a:rPr lang="en-CA" dirty="0"/>
+              <a:t>There GitHub page well organized with everything having its own folder</a:t>
+            </a:r>
+          </a:p>
+          <a:p>
+            <a:r>
+              <a:rPr lang="en-CA" dirty="0"/>
+              <a:t>The folder names are labeled correctly and correspond to what's in them</a:t>
+            </a:r>
+          </a:p>
+          <a:p>
+            <a:r>
+              <a:rPr lang="en-CA" dirty="0"/>
+              <a:t>Overall the organization of the GitHub page is good</a:t>
+            </a:r>
           </a:p>
         </p:txBody>
       </p:sp>
+      <p:pic>
+        <p:nvPicPr>
+          <p:cNvPr id="4" name="Picture 3">
+            <a:extLst>
+              <a:ext uri="{FF2B5EF4-FFF2-40B4-BE49-F238E27FC236}">
+                <a16:creationId xmlns:a16="http://schemas.microsoft.com/office/drawing/2014/main" id="{88441365-33B2-400A-B12F-1A37D7884499}"/>
+              </a:ext>
+            </a:extLst>
+          </p:cNvPr>
+          <p:cNvPicPr/>
+          <p:nvPr/>
+        </p:nvPicPr>
+        <p:blipFill rotWithShape="1">
+          <a:blip r:embed="rId2"/>
+          <a:srcRect l="14645" t="10369" r="15838" b="6690"/>
+          <a:stretch/>
+        </p:blipFill>
+        <p:spPr bwMode="auto">
+          <a:xfrm>
+            <a:off x="5443870" y="1566347"/>
+            <a:ext cx="6553561" cy="4766199"/>
+          </a:xfrm>
+          <a:prstGeom prst="rect">
+            <a:avLst/>
+          </a:prstGeom>
+          <a:ln>
+            <a:noFill/>
+          </a:ln>
+          <a:extLst>
+            <a:ext uri="{53640926-AAD7-44D8-BBD7-CCE9431645EC}">
+              <a14:shadowObscured xmlns:a14="http://schemas.microsoft.com/office/drawing/2010/main"/>
+            </a:ext>
+          </a:extLst>
+        </p:spPr>
+      </p:pic>
     </p:spTree>
     <p:extLst>
       <p:ext uri="{BB962C8B-B14F-4D97-AF65-F5344CB8AC3E}">
-        <p14:creationId xmlns:p14="http://schemas.microsoft.com/office/powerpoint/2010/main" val="3391573347"/>
+        <p14:creationId xmlns:p14="http://schemas.microsoft.com/office/powerpoint/2010/main" val="2889975537"/>
       </p:ext>
     </p:extLst>
   </p:cSld>
@@ -13355,7 +13851,7 @@
 </p:sld>
 </file>
 
-<file path=ppt/slides/slide6.xml><?xml version="1.0" encoding="utf-8"?>
+<file path=ppt/slides/slide8.xml><?xml version="1.0" encoding="utf-8"?>
 <p:sld xmlns:a="http://schemas.openxmlformats.org/drawingml/2006/main" xmlns:r="http://schemas.openxmlformats.org/officeDocument/2006/relationships" xmlns:p="http://schemas.openxmlformats.org/presentationml/2006/main">
   <p:cSld>
     <p:spTree>
@@ -13594,7 +14090,7 @@
 </p:sld>
 </file>
 
-<file path=ppt/slides/slide7.xml><?xml version="1.0" encoding="utf-8"?>
+<file path=ppt/slides/slide9.xml><?xml version="1.0" encoding="utf-8"?>
 <p:sld xmlns:a="http://schemas.openxmlformats.org/drawingml/2006/main" xmlns:r="http://schemas.openxmlformats.org/officeDocument/2006/relationships" xmlns:p="http://schemas.openxmlformats.org/presentationml/2006/main">
   <p:cSld>
     <p:spTree>
@@ -13665,210 +14161,6 @@
     <p:extLst>
       <p:ext uri="{BB962C8B-B14F-4D97-AF65-F5344CB8AC3E}">
         <p14:creationId xmlns:p14="http://schemas.microsoft.com/office/powerpoint/2010/main" val="3958323764"/>
-      </p:ext>
-    </p:extLst>
-  </p:cSld>
-  <p:clrMapOvr>
-    <a:masterClrMapping/>
-  </p:clrMapOvr>
-</p:sld>
-</file>
-
-<file path=ppt/slides/slide8.xml><?xml version="1.0" encoding="utf-8"?>
-<p:sld xmlns:a="http://schemas.openxmlformats.org/drawingml/2006/main" xmlns:r="http://schemas.openxmlformats.org/officeDocument/2006/relationships" xmlns:p="http://schemas.openxmlformats.org/presentationml/2006/main">
-  <p:cSld>
-    <p:spTree>
-      <p:nvGrpSpPr>
-        <p:cNvPr id="1" name=""/>
-        <p:cNvGrpSpPr/>
-        <p:nvPr/>
-      </p:nvGrpSpPr>
-      <p:grpSpPr>
-        <a:xfrm>
-          <a:off x="0" y="0"/>
-          <a:ext cx="0" cy="0"/>
-          <a:chOff x="0" y="0"/>
-          <a:chExt cx="0" cy="0"/>
-        </a:xfrm>
-      </p:grpSpPr>
-      <p:sp>
-        <p:nvSpPr>
-          <p:cNvPr id="2" name="Title 1">
-            <a:extLst>
-              <a:ext uri="{FF2B5EF4-FFF2-40B4-BE49-F238E27FC236}">
-                <a16:creationId xmlns:a16="http://schemas.microsoft.com/office/drawing/2014/main" id="{AD06EE58-4AF6-44A7-AA22-F8556EDA26A0}"/>
-              </a:ext>
-            </a:extLst>
-          </p:cNvPr>
-          <p:cNvSpPr>
-            <a:spLocks noGrp="1"/>
-          </p:cNvSpPr>
-          <p:nvPr>
-            <p:ph type="title"/>
-          </p:nvPr>
-        </p:nvSpPr>
-        <p:spPr/>
-        <p:txBody>
-          <a:bodyPr/>
-          <a:lstStyle/>
-          <a:p>
-            <a:r>
-              <a:rPr lang="en-US" altLang="en-US" dirty="0"/>
-              <a:t>Design pattern discussion (High-level focus)</a:t>
-            </a:r>
-            <a:endParaRPr lang="en-CA" dirty="0"/>
-          </a:p>
-        </p:txBody>
-      </p:sp>
-      <p:sp>
-        <p:nvSpPr>
-          <p:cNvPr id="3" name="Content Placeholder 2">
-            <a:extLst>
-              <a:ext uri="{FF2B5EF4-FFF2-40B4-BE49-F238E27FC236}">
-                <a16:creationId xmlns:a16="http://schemas.microsoft.com/office/drawing/2014/main" id="{448F4072-6D68-4CE4-B46A-A7709DB26F94}"/>
-              </a:ext>
-            </a:extLst>
-          </p:cNvPr>
-          <p:cNvSpPr>
-            <a:spLocks noGrp="1"/>
-          </p:cNvSpPr>
-          <p:nvPr>
-            <p:ph idx="1"/>
-          </p:nvPr>
-        </p:nvSpPr>
-        <p:spPr/>
-        <p:txBody>
-          <a:bodyPr/>
-          <a:lstStyle/>
-          <a:p>
-            <a:r>
-              <a:rPr lang="en-US" altLang="en-US" dirty="0"/>
-              <a:t>Comment on what design patterns the team used</a:t>
-            </a:r>
-          </a:p>
-          <a:p>
-            <a:pPr lvl="1"/>
-            <a:r>
-              <a:rPr lang="en-US" altLang="en-US" dirty="0"/>
-              <a:t>Provide samples where you are able</a:t>
-            </a:r>
-          </a:p>
-          <a:p>
-            <a:pPr lvl="2"/>
-            <a:r>
-              <a:rPr lang="en-US" altLang="en-US" dirty="0"/>
-              <a:t>Were they appropriate?</a:t>
-            </a:r>
-          </a:p>
-          <a:p>
-            <a:pPr lvl="2"/>
-            <a:r>
-              <a:rPr lang="en-US" altLang="en-US" dirty="0"/>
-              <a:t>Were there alternatives they could have also used?</a:t>
-            </a:r>
-          </a:p>
-          <a:p>
-            <a:r>
-              <a:rPr lang="en-US" altLang="en-US" dirty="0"/>
-              <a:t>If they didn’t use any Design Patterns, were there ones they could have tried?</a:t>
-            </a:r>
-          </a:p>
-          <a:p>
-            <a:pPr lvl="1"/>
-            <a:r>
-              <a:rPr lang="en-US" altLang="en-US" dirty="0"/>
-              <a:t>Provide samples/code snippets/areas of the code</a:t>
-            </a:r>
-          </a:p>
-          <a:p>
-            <a:endParaRPr lang="en-CA" dirty="0"/>
-          </a:p>
-        </p:txBody>
-      </p:sp>
-    </p:spTree>
-    <p:extLst>
-      <p:ext uri="{BB962C8B-B14F-4D97-AF65-F5344CB8AC3E}">
-        <p14:creationId xmlns:p14="http://schemas.microsoft.com/office/powerpoint/2010/main" val="1421288843"/>
-      </p:ext>
-    </p:extLst>
-  </p:cSld>
-  <p:clrMapOvr>
-    <a:masterClrMapping/>
-  </p:clrMapOvr>
-</p:sld>
-</file>
-
-<file path=ppt/slides/slide9.xml><?xml version="1.0" encoding="utf-8"?>
-<p:sld xmlns:a="http://schemas.openxmlformats.org/drawingml/2006/main" xmlns:r="http://schemas.openxmlformats.org/officeDocument/2006/relationships" xmlns:p="http://schemas.openxmlformats.org/presentationml/2006/main">
-  <p:cSld>
-    <p:spTree>
-      <p:nvGrpSpPr>
-        <p:cNvPr id="1" name=""/>
-        <p:cNvGrpSpPr/>
-        <p:nvPr/>
-      </p:nvGrpSpPr>
-      <p:grpSpPr>
-        <a:xfrm>
-          <a:off x="0" y="0"/>
-          <a:ext cx="0" cy="0"/>
-          <a:chOff x="0" y="0"/>
-          <a:chExt cx="0" cy="0"/>
-        </a:xfrm>
-      </p:grpSpPr>
-      <p:sp>
-        <p:nvSpPr>
-          <p:cNvPr id="2" name="Title 1">
-            <a:extLst>
-              <a:ext uri="{FF2B5EF4-FFF2-40B4-BE49-F238E27FC236}">
-                <a16:creationId xmlns:a16="http://schemas.microsoft.com/office/drawing/2014/main" id="{6C90E832-22A3-40B8-83FC-AB571942EC7C}"/>
-              </a:ext>
-            </a:extLst>
-          </p:cNvPr>
-          <p:cNvSpPr>
-            <a:spLocks noGrp="1"/>
-          </p:cNvSpPr>
-          <p:nvPr>
-            <p:ph type="title"/>
-          </p:nvPr>
-        </p:nvSpPr>
-        <p:spPr/>
-        <p:txBody>
-          <a:bodyPr/>
-          <a:lstStyle/>
-          <a:p>
-            <a:endParaRPr lang="en-CA"/>
-          </a:p>
-        </p:txBody>
-      </p:sp>
-      <p:sp>
-        <p:nvSpPr>
-          <p:cNvPr id="3" name="Content Placeholder 2">
-            <a:extLst>
-              <a:ext uri="{FF2B5EF4-FFF2-40B4-BE49-F238E27FC236}">
-                <a16:creationId xmlns:a16="http://schemas.microsoft.com/office/drawing/2014/main" id="{A6CC2F4B-AFFA-426E-A93E-05769A23E634}"/>
-              </a:ext>
-            </a:extLst>
-          </p:cNvPr>
-          <p:cNvSpPr>
-            <a:spLocks noGrp="1"/>
-          </p:cNvSpPr>
-          <p:nvPr>
-            <p:ph idx="1"/>
-          </p:nvPr>
-        </p:nvSpPr>
-        <p:spPr/>
-        <p:txBody>
-          <a:bodyPr/>
-          <a:lstStyle/>
-          <a:p>
-            <a:endParaRPr lang="en-CA"/>
-          </a:p>
-        </p:txBody>
-      </p:sp>
-    </p:spTree>
-    <p:extLst>
-      <p:ext uri="{BB962C8B-B14F-4D97-AF65-F5344CB8AC3E}">
-        <p14:creationId xmlns:p14="http://schemas.microsoft.com/office/powerpoint/2010/main" val="740593883"/>
       </p:ext>
     </p:extLst>
   </p:cSld>

</xml_diff>

<commit_message>
Update: continued adding to the slides
</commit_message>
<xml_diff>
--- a/Milestone 7/ENSE 470 Milestone 7.pptx
+++ b/Milestone 7/ENSE 470 Milestone 7.pptx
@@ -13,13 +13,14 @@
     <p:sldId id="259" r:id="rId7"/>
     <p:sldId id="272" r:id="rId8"/>
     <p:sldId id="261" r:id="rId9"/>
-    <p:sldId id="262" r:id="rId10"/>
-    <p:sldId id="263" r:id="rId11"/>
-    <p:sldId id="264" r:id="rId12"/>
-    <p:sldId id="265" r:id="rId13"/>
-    <p:sldId id="266" r:id="rId14"/>
-    <p:sldId id="267" r:id="rId15"/>
-    <p:sldId id="268" r:id="rId16"/>
+    <p:sldId id="273" r:id="rId10"/>
+    <p:sldId id="262" r:id="rId11"/>
+    <p:sldId id="274" r:id="rId12"/>
+    <p:sldId id="263" r:id="rId13"/>
+    <p:sldId id="264" r:id="rId14"/>
+    <p:sldId id="265" r:id="rId15"/>
+    <p:sldId id="266" r:id="rId16"/>
+    <p:sldId id="267" r:id="rId17"/>
   </p:sldIdLst>
   <p:sldSz cx="12192000" cy="6858000"/>
   <p:notesSz cx="6858000" cy="9144000"/>
@@ -176,7 +177,7 @@
           <a:noFill/>
           <a:extLst>
             <a:ext uri="{909E8E84-426E-40dd-AFC4-6F175D3DCCD1}">
-              <a14:hiddenFill xmlns="" xmlns:a14="http://schemas.microsoft.com/office/drawing/2010/main">
+              <a14:hiddenFill xmlns:a14="http://schemas.microsoft.com/office/drawing/2010/main" xmlns="">
                 <a:solidFill>
                   <a:srgbClr val="FFFFFF"/>
                 </a:solidFill>
@@ -236,7 +237,7 @@
             </a:ln>
             <a:extLst>
               <a:ext uri="{91240B29-F687-4f45-9708-019B960494DF}">
-                <a14:hiddenLine xmlns="" xmlns:a14="http://schemas.microsoft.com/office/drawing/2010/main" w="9525">
+                <a14:hiddenLine xmlns:a14="http://schemas.microsoft.com/office/drawing/2010/main" xmlns="" w="9525">
                   <a:solidFill>
                     <a:srgbClr val="000000"/>
                   </a:solidFill>
@@ -326,7 +327,7 @@
             </a:ln>
             <a:extLst>
               <a:ext uri="{91240B29-F687-4f45-9708-019B960494DF}">
-                <a14:hiddenLine xmlns="" xmlns:a14="http://schemas.microsoft.com/office/drawing/2010/main" w="9525">
+                <a14:hiddenLine xmlns:a14="http://schemas.microsoft.com/office/drawing/2010/main" xmlns="" w="9525">
                   <a:solidFill>
                     <a:srgbClr val="000000"/>
                   </a:solidFill>
@@ -416,7 +417,7 @@
             </a:ln>
             <a:extLst>
               <a:ext uri="{91240B29-F687-4f45-9708-019B960494DF}">
-                <a14:hiddenLine xmlns="" xmlns:a14="http://schemas.microsoft.com/office/drawing/2010/main" w="9525">
+                <a14:hiddenLine xmlns:a14="http://schemas.microsoft.com/office/drawing/2010/main" xmlns="" w="9525">
                   <a:solidFill>
                     <a:srgbClr val="000000"/>
                   </a:solidFill>
@@ -450,7 +451,7 @@
             </a:ln>
             <a:extLst>
               <a:ext uri="{91240B29-F687-4f45-9708-019B960494DF}">
-                <a14:hiddenLine xmlns="" xmlns:a14="http://schemas.microsoft.com/office/drawing/2010/main" w="9525">
+                <a14:hiddenLine xmlns:a14="http://schemas.microsoft.com/office/drawing/2010/main" xmlns="" w="9525">
                   <a:solidFill>
                     <a:srgbClr val="000000"/>
                   </a:solidFill>
@@ -540,7 +541,7 @@
             </a:ln>
             <a:extLst>
               <a:ext uri="{91240B29-F687-4f45-9708-019B960494DF}">
-                <a14:hiddenLine xmlns="" xmlns:a14="http://schemas.microsoft.com/office/drawing/2010/main" w="9525">
+                <a14:hiddenLine xmlns:a14="http://schemas.microsoft.com/office/drawing/2010/main" xmlns="" w="9525">
                   <a:solidFill>
                     <a:srgbClr val="000000"/>
                   </a:solidFill>
@@ -602,7 +603,7 @@
             </a:ln>
             <a:extLst>
               <a:ext uri="{91240B29-F687-4f45-9708-019B960494DF}">
-                <a14:hiddenLine xmlns="" xmlns:a14="http://schemas.microsoft.com/office/drawing/2010/main" w="9525">
+                <a14:hiddenLine xmlns:a14="http://schemas.microsoft.com/office/drawing/2010/main" xmlns="" w="9525">
                   <a:solidFill>
                     <a:srgbClr val="000000"/>
                   </a:solidFill>
@@ -664,7 +665,7 @@
             </a:ln>
             <a:extLst>
               <a:ext uri="{91240B29-F687-4f45-9708-019B960494DF}">
-                <a14:hiddenLine xmlns="" xmlns:a14="http://schemas.microsoft.com/office/drawing/2010/main" w="9525">
+                <a14:hiddenLine xmlns:a14="http://schemas.microsoft.com/office/drawing/2010/main" xmlns="" w="9525">
                   <a:solidFill>
                     <a:srgbClr val="000000"/>
                   </a:solidFill>
@@ -754,7 +755,7 @@
             </a:ln>
             <a:extLst>
               <a:ext uri="{91240B29-F687-4f45-9708-019B960494DF}">
-                <a14:hiddenLine xmlns="" xmlns:a14="http://schemas.microsoft.com/office/drawing/2010/main" w="9525">
+                <a14:hiddenLine xmlns:a14="http://schemas.microsoft.com/office/drawing/2010/main" xmlns="" w="9525">
                   <a:solidFill>
                     <a:srgbClr val="000000"/>
                   </a:solidFill>
@@ -816,7 +817,7 @@
             </a:ln>
             <a:extLst>
               <a:ext uri="{91240B29-F687-4f45-9708-019B960494DF}">
-                <a14:hiddenLine xmlns="" xmlns:a14="http://schemas.microsoft.com/office/drawing/2010/main" w="9525">
+                <a14:hiddenLine xmlns:a14="http://schemas.microsoft.com/office/drawing/2010/main" xmlns="" w="9525">
                   <a:solidFill>
                     <a:srgbClr val="000000"/>
                   </a:solidFill>
@@ -878,7 +879,7 @@
             </a:ln>
             <a:extLst>
               <a:ext uri="{91240B29-F687-4f45-9708-019B960494DF}">
-                <a14:hiddenLine xmlns="" xmlns:a14="http://schemas.microsoft.com/office/drawing/2010/main" w="9525">
+                <a14:hiddenLine xmlns:a14="http://schemas.microsoft.com/office/drawing/2010/main" xmlns="" w="9525">
                   <a:solidFill>
                     <a:srgbClr val="000000"/>
                   </a:solidFill>
@@ -968,7 +969,7 @@
             </a:ln>
             <a:extLst>
               <a:ext uri="{91240B29-F687-4f45-9708-019B960494DF}">
-                <a14:hiddenLine xmlns="" xmlns:a14="http://schemas.microsoft.com/office/drawing/2010/main" w="9525">
+                <a14:hiddenLine xmlns:a14="http://schemas.microsoft.com/office/drawing/2010/main" xmlns="" w="9525">
                   <a:solidFill>
                     <a:srgbClr val="000000"/>
                   </a:solidFill>
@@ -1058,7 +1059,7 @@
             </a:ln>
             <a:extLst>
               <a:ext uri="{91240B29-F687-4f45-9708-019B960494DF}">
-                <a14:hiddenLine xmlns="" xmlns:a14="http://schemas.microsoft.com/office/drawing/2010/main" w="9525">
+                <a14:hiddenLine xmlns:a14="http://schemas.microsoft.com/office/drawing/2010/main" xmlns="" w="9525">
                   <a:solidFill>
                     <a:srgbClr val="000000"/>
                   </a:solidFill>
@@ -1120,7 +1121,7 @@
             </a:ln>
             <a:extLst>
               <a:ext uri="{91240B29-F687-4f45-9708-019B960494DF}">
-                <a14:hiddenLine xmlns="" xmlns:a14="http://schemas.microsoft.com/office/drawing/2010/main" w="9525">
+                <a14:hiddenLine xmlns:a14="http://schemas.microsoft.com/office/drawing/2010/main" xmlns="" w="9525">
                   <a:solidFill>
                     <a:srgbClr val="000000"/>
                   </a:solidFill>
@@ -1230,7 +1231,7 @@
             </a:ln>
             <a:extLst>
               <a:ext uri="{91240B29-F687-4f45-9708-019B960494DF}">
-                <a14:hiddenLine xmlns="" xmlns:a14="http://schemas.microsoft.com/office/drawing/2010/main" w="9525">
+                <a14:hiddenLine xmlns:a14="http://schemas.microsoft.com/office/drawing/2010/main" xmlns="" w="9525">
                   <a:solidFill>
                     <a:srgbClr val="000000"/>
                   </a:solidFill>
@@ -1292,7 +1293,7 @@
             </a:ln>
             <a:extLst>
               <a:ext uri="{91240B29-F687-4f45-9708-019B960494DF}">
-                <a14:hiddenLine xmlns="" xmlns:a14="http://schemas.microsoft.com/office/drawing/2010/main" w="9525">
+                <a14:hiddenLine xmlns:a14="http://schemas.microsoft.com/office/drawing/2010/main" xmlns="" w="9525">
                   <a:solidFill>
                     <a:srgbClr val="000000"/>
                   </a:solidFill>
@@ -1382,7 +1383,7 @@
             </a:ln>
             <a:extLst>
               <a:ext uri="{91240B29-F687-4f45-9708-019B960494DF}">
-                <a14:hiddenLine xmlns="" xmlns:a14="http://schemas.microsoft.com/office/drawing/2010/main" w="9525">
+                <a14:hiddenLine xmlns:a14="http://schemas.microsoft.com/office/drawing/2010/main" xmlns="" w="9525">
                   <a:solidFill>
                     <a:srgbClr val="000000"/>
                   </a:solidFill>
@@ -1472,7 +1473,7 @@
             </a:ln>
             <a:extLst>
               <a:ext uri="{91240B29-F687-4f45-9708-019B960494DF}">
-                <a14:hiddenLine xmlns="" xmlns:a14="http://schemas.microsoft.com/office/drawing/2010/main" w="9525">
+                <a14:hiddenLine xmlns:a14="http://schemas.microsoft.com/office/drawing/2010/main" xmlns="" w="9525">
                   <a:solidFill>
                     <a:srgbClr val="000000"/>
                   </a:solidFill>
@@ -1534,7 +1535,7 @@
             </a:ln>
             <a:extLst>
               <a:ext uri="{91240B29-F687-4f45-9708-019B960494DF}">
-                <a14:hiddenLine xmlns="" xmlns:a14="http://schemas.microsoft.com/office/drawing/2010/main" w="9525">
+                <a14:hiddenLine xmlns:a14="http://schemas.microsoft.com/office/drawing/2010/main" xmlns="" w="9525">
                   <a:solidFill>
                     <a:srgbClr val="000000"/>
                   </a:solidFill>
@@ -1624,7 +1625,7 @@
             </a:ln>
             <a:extLst>
               <a:ext uri="{91240B29-F687-4f45-9708-019B960494DF}">
-                <a14:hiddenLine xmlns="" xmlns:a14="http://schemas.microsoft.com/office/drawing/2010/main" w="9525">
+                <a14:hiddenLine xmlns:a14="http://schemas.microsoft.com/office/drawing/2010/main" xmlns="" w="9525">
                   <a:solidFill>
                     <a:srgbClr val="000000"/>
                   </a:solidFill>
@@ -1714,7 +1715,7 @@
             </a:ln>
             <a:extLst>
               <a:ext uri="{91240B29-F687-4f45-9708-019B960494DF}">
-                <a14:hiddenLine xmlns="" xmlns:a14="http://schemas.microsoft.com/office/drawing/2010/main" w="9525">
+                <a14:hiddenLine xmlns:a14="http://schemas.microsoft.com/office/drawing/2010/main" xmlns="" w="9525">
                   <a:solidFill>
                     <a:srgbClr val="000000"/>
                   </a:solidFill>
@@ -1770,7 +1771,7 @@
             </a:ln>
             <a:extLst>
               <a:ext uri="{91240B29-F687-4f45-9708-019B960494DF}">
-                <a14:hiddenLine xmlns="" xmlns:a14="http://schemas.microsoft.com/office/drawing/2010/main" w="9525">
+                <a14:hiddenLine xmlns:a14="http://schemas.microsoft.com/office/drawing/2010/main" xmlns="" w="9525">
                   <a:solidFill>
                     <a:srgbClr val="000000"/>
                   </a:solidFill>
@@ -1860,7 +1861,7 @@
             </a:ln>
             <a:extLst>
               <a:ext uri="{91240B29-F687-4f45-9708-019B960494DF}">
-                <a14:hiddenLine xmlns="" xmlns:a14="http://schemas.microsoft.com/office/drawing/2010/main" w="9525">
+                <a14:hiddenLine xmlns:a14="http://schemas.microsoft.com/office/drawing/2010/main" xmlns="" w="9525">
                   <a:solidFill>
                     <a:srgbClr val="000000"/>
                   </a:solidFill>
@@ -1916,7 +1917,7 @@
             </a:ln>
             <a:extLst>
               <a:ext uri="{91240B29-F687-4f45-9708-019B960494DF}">
-                <a14:hiddenLine xmlns="" xmlns:a14="http://schemas.microsoft.com/office/drawing/2010/main" w="9525">
+                <a14:hiddenLine xmlns:a14="http://schemas.microsoft.com/office/drawing/2010/main" xmlns="" w="9525">
                   <a:solidFill>
                     <a:srgbClr val="000000"/>
                   </a:solidFill>
@@ -2006,7 +2007,7 @@
             </a:ln>
             <a:extLst>
               <a:ext uri="{91240B29-F687-4f45-9708-019B960494DF}">
-                <a14:hiddenLine xmlns="" xmlns:a14="http://schemas.microsoft.com/office/drawing/2010/main" w="9525">
+                <a14:hiddenLine xmlns:a14="http://schemas.microsoft.com/office/drawing/2010/main" xmlns="" w="9525">
                   <a:solidFill>
                     <a:srgbClr val="000000"/>
                   </a:solidFill>
@@ -2074,7 +2075,7 @@
             </a:ln>
             <a:extLst>
               <a:ext uri="{91240B29-F687-4f45-9708-019B960494DF}">
-                <a14:hiddenLine xmlns="" xmlns:a14="http://schemas.microsoft.com/office/drawing/2010/main" w="9525">
+                <a14:hiddenLine xmlns:a14="http://schemas.microsoft.com/office/drawing/2010/main" xmlns="" w="9525">
                   <a:solidFill>
                     <a:srgbClr val="000000"/>
                   </a:solidFill>
@@ -2164,7 +2165,7 @@
             </a:ln>
             <a:extLst>
               <a:ext uri="{91240B29-F687-4f45-9708-019B960494DF}">
-                <a14:hiddenLine xmlns="" xmlns:a14="http://schemas.microsoft.com/office/drawing/2010/main" w="9525">
+                <a14:hiddenLine xmlns:a14="http://schemas.microsoft.com/office/drawing/2010/main" xmlns="" w="9525">
                   <a:solidFill>
                     <a:srgbClr val="000000"/>
                   </a:solidFill>
@@ -2232,7 +2233,7 @@
             </a:ln>
             <a:extLst>
               <a:ext uri="{91240B29-F687-4f45-9708-019B960494DF}">
-                <a14:hiddenLine xmlns="" xmlns:a14="http://schemas.microsoft.com/office/drawing/2010/main" w="9525">
+                <a14:hiddenLine xmlns:a14="http://schemas.microsoft.com/office/drawing/2010/main" xmlns="" w="9525">
                   <a:solidFill>
                     <a:srgbClr val="000000"/>
                   </a:solidFill>
@@ -2322,7 +2323,7 @@
             </a:ln>
             <a:extLst>
               <a:ext uri="{91240B29-F687-4f45-9708-019B960494DF}">
-                <a14:hiddenLine xmlns="" xmlns:a14="http://schemas.microsoft.com/office/drawing/2010/main" w="9525">
+                <a14:hiddenLine xmlns:a14="http://schemas.microsoft.com/office/drawing/2010/main" xmlns="" w="9525">
                   <a:solidFill>
                     <a:srgbClr val="000000"/>
                   </a:solidFill>
@@ -2356,7 +2357,7 @@
             </a:ln>
             <a:extLst>
               <a:ext uri="{91240B29-F687-4f45-9708-019B960494DF}">
-                <a14:hiddenLine xmlns="" xmlns:a14="http://schemas.microsoft.com/office/drawing/2010/main" w="9525">
+                <a14:hiddenLine xmlns:a14="http://schemas.microsoft.com/office/drawing/2010/main" xmlns="" w="9525">
                   <a:solidFill>
                     <a:srgbClr val="000000"/>
                   </a:solidFill>
@@ -2446,7 +2447,7 @@
             </a:ln>
             <a:extLst>
               <a:ext uri="{91240B29-F687-4f45-9708-019B960494DF}">
-                <a14:hiddenLine xmlns="" xmlns:a14="http://schemas.microsoft.com/office/drawing/2010/main" w="9525">
+                <a14:hiddenLine xmlns:a14="http://schemas.microsoft.com/office/drawing/2010/main" xmlns="" w="9525">
                   <a:solidFill>
                     <a:srgbClr val="000000"/>
                   </a:solidFill>
@@ -2508,7 +2509,7 @@
             </a:ln>
             <a:extLst>
               <a:ext uri="{91240B29-F687-4f45-9708-019B960494DF}">
-                <a14:hiddenLine xmlns="" xmlns:a14="http://schemas.microsoft.com/office/drawing/2010/main" w="9525">
+                <a14:hiddenLine xmlns:a14="http://schemas.microsoft.com/office/drawing/2010/main" xmlns="" w="9525">
                   <a:solidFill>
                     <a:srgbClr val="000000"/>
                   </a:solidFill>
@@ -2570,7 +2571,7 @@
             </a:ln>
             <a:extLst>
               <a:ext uri="{91240B29-F687-4f45-9708-019B960494DF}">
-                <a14:hiddenLine xmlns="" xmlns:a14="http://schemas.microsoft.com/office/drawing/2010/main" w="9525">
+                <a14:hiddenLine xmlns:a14="http://schemas.microsoft.com/office/drawing/2010/main" xmlns="" w="9525">
                   <a:solidFill>
                     <a:srgbClr val="000000"/>
                   </a:solidFill>
@@ -2660,7 +2661,7 @@
             </a:ln>
             <a:extLst>
               <a:ext uri="{91240B29-F687-4f45-9708-019B960494DF}">
-                <a14:hiddenLine xmlns="" xmlns:a14="http://schemas.microsoft.com/office/drawing/2010/main" w="9525">
+                <a14:hiddenLine xmlns:a14="http://schemas.microsoft.com/office/drawing/2010/main" xmlns="" w="9525">
                   <a:solidFill>
                     <a:srgbClr val="000000"/>
                   </a:solidFill>
@@ -2728,7 +2729,7 @@
             </a:ln>
             <a:extLst>
               <a:ext uri="{91240B29-F687-4f45-9708-019B960494DF}">
-                <a14:hiddenLine xmlns="" xmlns:a14="http://schemas.microsoft.com/office/drawing/2010/main" w="9525">
+                <a14:hiddenLine xmlns:a14="http://schemas.microsoft.com/office/drawing/2010/main" xmlns="" w="9525">
                   <a:solidFill>
                     <a:srgbClr val="000000"/>
                   </a:solidFill>
@@ -2790,7 +2791,7 @@
             </a:ln>
             <a:extLst>
               <a:ext uri="{91240B29-F687-4f45-9708-019B960494DF}">
-                <a14:hiddenLine xmlns="" xmlns:a14="http://schemas.microsoft.com/office/drawing/2010/main" w="9525">
+                <a14:hiddenLine xmlns:a14="http://schemas.microsoft.com/office/drawing/2010/main" xmlns="" w="9525">
                   <a:solidFill>
                     <a:srgbClr val="000000"/>
                   </a:solidFill>
@@ -2880,7 +2881,7 @@
             </a:ln>
             <a:extLst>
               <a:ext uri="{91240B29-F687-4f45-9708-019B960494DF}">
-                <a14:hiddenLine xmlns="" xmlns:a14="http://schemas.microsoft.com/office/drawing/2010/main" w="9525">
+                <a14:hiddenLine xmlns:a14="http://schemas.microsoft.com/office/drawing/2010/main" xmlns="" w="9525">
                   <a:solidFill>
                     <a:srgbClr val="000000"/>
                   </a:solidFill>
@@ -2942,7 +2943,7 @@
             </a:ln>
             <a:extLst>
               <a:ext uri="{91240B29-F687-4f45-9708-019B960494DF}">
-                <a14:hiddenLine xmlns="" xmlns:a14="http://schemas.microsoft.com/office/drawing/2010/main" w="9525">
+                <a14:hiddenLine xmlns:a14="http://schemas.microsoft.com/office/drawing/2010/main" xmlns="" w="9525">
                   <a:solidFill>
                     <a:srgbClr val="000000"/>
                   </a:solidFill>
@@ -3032,7 +3033,7 @@
             </a:ln>
             <a:extLst>
               <a:ext uri="{91240B29-F687-4f45-9708-019B960494DF}">
-                <a14:hiddenLine xmlns="" xmlns:a14="http://schemas.microsoft.com/office/drawing/2010/main" w="9525">
+                <a14:hiddenLine xmlns:a14="http://schemas.microsoft.com/office/drawing/2010/main" xmlns="" w="9525">
                   <a:solidFill>
                     <a:srgbClr val="000000"/>
                   </a:solidFill>
@@ -3094,7 +3095,7 @@
             </a:ln>
             <a:extLst>
               <a:ext uri="{91240B29-F687-4f45-9708-019B960494DF}">
-                <a14:hiddenLine xmlns="" xmlns:a14="http://schemas.microsoft.com/office/drawing/2010/main" w="9525">
+                <a14:hiddenLine xmlns:a14="http://schemas.microsoft.com/office/drawing/2010/main" xmlns="" w="9525">
                   <a:solidFill>
                     <a:srgbClr val="000000"/>
                   </a:solidFill>
@@ -3184,7 +3185,7 @@
             </a:ln>
             <a:extLst>
               <a:ext uri="{91240B29-F687-4f45-9708-019B960494DF}">
-                <a14:hiddenLine xmlns="" xmlns:a14="http://schemas.microsoft.com/office/drawing/2010/main" w="9525">
+                <a14:hiddenLine xmlns:a14="http://schemas.microsoft.com/office/drawing/2010/main" xmlns="" w="9525">
                   <a:solidFill>
                     <a:srgbClr val="000000"/>
                   </a:solidFill>
@@ -3218,7 +3219,7 @@
             </a:ln>
             <a:extLst>
               <a:ext uri="{91240B29-F687-4f45-9708-019B960494DF}">
-                <a14:hiddenLine xmlns="" xmlns:a14="http://schemas.microsoft.com/office/drawing/2010/main" w="9525">
+                <a14:hiddenLine xmlns:a14="http://schemas.microsoft.com/office/drawing/2010/main" xmlns="" w="9525">
                   <a:solidFill>
                     <a:srgbClr val="000000"/>
                   </a:solidFill>
@@ -3283,7 +3284,7 @@
             </a:ln>
             <a:extLst>
               <a:ext uri="{91240B29-F687-4f45-9708-019B960494DF}">
-                <a14:hiddenLine xmlns="" xmlns:a14="http://schemas.microsoft.com/office/drawing/2010/main" w="9525">
+                <a14:hiddenLine xmlns:a14="http://schemas.microsoft.com/office/drawing/2010/main" xmlns="" w="9525">
                   <a:solidFill>
                     <a:srgbClr val="000000"/>
                   </a:solidFill>
@@ -3373,7 +3374,7 @@
             </a:ln>
             <a:extLst>
               <a:ext uri="{91240B29-F687-4f45-9708-019B960494DF}">
-                <a14:hiddenLine xmlns="" xmlns:a14="http://schemas.microsoft.com/office/drawing/2010/main" w="9525">
+                <a14:hiddenLine xmlns:a14="http://schemas.microsoft.com/office/drawing/2010/main" xmlns="" w="9525">
                   <a:solidFill>
                     <a:srgbClr val="000000"/>
                   </a:solidFill>
@@ -3435,7 +3436,7 @@
             </a:ln>
             <a:extLst>
               <a:ext uri="{91240B29-F687-4f45-9708-019B960494DF}">
-                <a14:hiddenLine xmlns="" xmlns:a14="http://schemas.microsoft.com/office/drawing/2010/main" w="9525">
+                <a14:hiddenLine xmlns:a14="http://schemas.microsoft.com/office/drawing/2010/main" xmlns="" w="9525">
                   <a:solidFill>
                     <a:srgbClr val="000000"/>
                   </a:solidFill>
@@ -3525,7 +3526,7 @@
             </a:ln>
             <a:extLst>
               <a:ext uri="{91240B29-F687-4f45-9708-019B960494DF}">
-                <a14:hiddenLine xmlns="" xmlns:a14="http://schemas.microsoft.com/office/drawing/2010/main" w="9525">
+                <a14:hiddenLine xmlns:a14="http://schemas.microsoft.com/office/drawing/2010/main" xmlns="" w="9525">
                   <a:solidFill>
                     <a:srgbClr val="000000"/>
                   </a:solidFill>
@@ -3615,7 +3616,7 @@
             </a:ln>
             <a:extLst>
               <a:ext uri="{91240B29-F687-4f45-9708-019B960494DF}">
-                <a14:hiddenLine xmlns="" xmlns:a14="http://schemas.microsoft.com/office/drawing/2010/main" w="9525">
+                <a14:hiddenLine xmlns:a14="http://schemas.microsoft.com/office/drawing/2010/main" xmlns="" w="9525">
                   <a:solidFill>
                     <a:srgbClr val="000000"/>
                   </a:solidFill>
@@ -3680,7 +3681,7 @@
             </a:ln>
             <a:extLst>
               <a:ext uri="{91240B29-F687-4f45-9708-019B960494DF}">
-                <a14:hiddenLine xmlns="" xmlns:a14="http://schemas.microsoft.com/office/drawing/2010/main" w="9525">
+                <a14:hiddenLine xmlns:a14="http://schemas.microsoft.com/office/drawing/2010/main" xmlns="" w="9525">
                   <a:solidFill>
                     <a:srgbClr val="000000"/>
                   </a:solidFill>
@@ -3742,7 +3743,7 @@
             </a:ln>
             <a:extLst>
               <a:ext uri="{91240B29-F687-4f45-9708-019B960494DF}">
-                <a14:hiddenLine xmlns="" xmlns:a14="http://schemas.microsoft.com/office/drawing/2010/main" w="9525">
+                <a14:hiddenLine xmlns:a14="http://schemas.microsoft.com/office/drawing/2010/main" xmlns="" w="9525">
                   <a:solidFill>
                     <a:srgbClr val="000000"/>
                   </a:solidFill>
@@ -3832,7 +3833,7 @@
             </a:ln>
             <a:extLst>
               <a:ext uri="{91240B29-F687-4f45-9708-019B960494DF}">
-                <a14:hiddenLine xmlns="" xmlns:a14="http://schemas.microsoft.com/office/drawing/2010/main" w="9525">
+                <a14:hiddenLine xmlns:a14="http://schemas.microsoft.com/office/drawing/2010/main" xmlns="" w="9525">
                   <a:solidFill>
                     <a:srgbClr val="000000"/>
                   </a:solidFill>
@@ -3922,7 +3923,7 @@
             </a:ln>
             <a:extLst>
               <a:ext uri="{91240B29-F687-4f45-9708-019B960494DF}">
-                <a14:hiddenLine xmlns="" xmlns:a14="http://schemas.microsoft.com/office/drawing/2010/main" w="9525">
+                <a14:hiddenLine xmlns:a14="http://schemas.microsoft.com/office/drawing/2010/main" xmlns="" w="9525">
                   <a:solidFill>
                     <a:srgbClr val="000000"/>
                   </a:solidFill>
@@ -3984,7 +3985,7 @@
             </a:ln>
             <a:extLst>
               <a:ext uri="{91240B29-F687-4f45-9708-019B960494DF}">
-                <a14:hiddenLine xmlns="" xmlns:a14="http://schemas.microsoft.com/office/drawing/2010/main" w="9525">
+                <a14:hiddenLine xmlns:a14="http://schemas.microsoft.com/office/drawing/2010/main" xmlns="" w="9525">
                   <a:solidFill>
                     <a:srgbClr val="000000"/>
                   </a:solidFill>
@@ -4104,7 +4105,7 @@
             </a:ln>
             <a:extLst>
               <a:ext uri="{91240B29-F687-4f45-9708-019B960494DF}">
-                <a14:hiddenLine xmlns="" xmlns:a14="http://schemas.microsoft.com/office/drawing/2010/main" w="9525">
+                <a14:hiddenLine xmlns:a14="http://schemas.microsoft.com/office/drawing/2010/main" xmlns="" w="9525">
                   <a:solidFill>
                     <a:srgbClr val="000000"/>
                   </a:solidFill>
@@ -4172,7 +4173,7 @@
             </a:ln>
             <a:extLst>
               <a:ext uri="{91240B29-F687-4f45-9708-019B960494DF}">
-                <a14:hiddenLine xmlns="" xmlns:a14="http://schemas.microsoft.com/office/drawing/2010/main" w="9525">
+                <a14:hiddenLine xmlns:a14="http://schemas.microsoft.com/office/drawing/2010/main" xmlns="" w="9525">
                   <a:solidFill>
                     <a:srgbClr val="000000"/>
                   </a:solidFill>
@@ -4262,7 +4263,7 @@
             </a:ln>
             <a:extLst>
               <a:ext uri="{91240B29-F687-4f45-9708-019B960494DF}">
-                <a14:hiddenLine xmlns="" xmlns:a14="http://schemas.microsoft.com/office/drawing/2010/main" w="9525">
+                <a14:hiddenLine xmlns:a14="http://schemas.microsoft.com/office/drawing/2010/main" xmlns="" w="9525">
                   <a:solidFill>
                     <a:srgbClr val="000000"/>
                   </a:solidFill>
@@ -4402,7 +4403,7 @@
           <a:p>
             <a:fld id="{99FB56CE-62CC-47B4-A280-D33BC8BCBDFC}" type="datetimeFigureOut">
               <a:rPr lang="en-CA" smtClean="0"/>
-              <a:t>2018-04-06</a:t>
+              <a:t>2018-04-07</a:t>
             </a:fld>
             <a:endParaRPr lang="en-CA"/>
           </a:p>
@@ -4669,7 +4670,7 @@
           <a:p>
             <a:fld id="{99FB56CE-62CC-47B4-A280-D33BC8BCBDFC}" type="datetimeFigureOut">
               <a:rPr lang="en-CA" smtClean="0"/>
-              <a:t>2018-04-06</a:t>
+              <a:t>2018-04-07</a:t>
             </a:fld>
             <a:endParaRPr lang="en-CA"/>
           </a:p>
@@ -4865,7 +4866,7 @@
           <a:p>
             <a:fld id="{99FB56CE-62CC-47B4-A280-D33BC8BCBDFC}" type="datetimeFigureOut">
               <a:rPr lang="en-CA" smtClean="0"/>
-              <a:t>2018-04-06</a:t>
+              <a:t>2018-04-07</a:t>
             </a:fld>
             <a:endParaRPr lang="en-CA"/>
           </a:p>
@@ -5128,7 +5129,7 @@
           <a:p>
             <a:fld id="{99FB56CE-62CC-47B4-A280-D33BC8BCBDFC}" type="datetimeFigureOut">
               <a:rPr lang="en-CA" smtClean="0"/>
-              <a:t>2018-04-06</a:t>
+              <a:t>2018-04-07</a:t>
             </a:fld>
             <a:endParaRPr lang="en-CA"/>
           </a:p>
@@ -5562,7 +5563,7 @@
           <a:p>
             <a:fld id="{99FB56CE-62CC-47B4-A280-D33BC8BCBDFC}" type="datetimeFigureOut">
               <a:rPr lang="en-CA" smtClean="0"/>
-              <a:t>2018-04-06</a:t>
+              <a:t>2018-04-07</a:t>
             </a:fld>
             <a:endParaRPr lang="en-CA"/>
           </a:p>
@@ -6108,7 +6109,7 @@
           <a:p>
             <a:fld id="{99FB56CE-62CC-47B4-A280-D33BC8BCBDFC}" type="datetimeFigureOut">
               <a:rPr lang="en-CA" smtClean="0"/>
-              <a:t>2018-04-06</a:t>
+              <a:t>2018-04-07</a:t>
             </a:fld>
             <a:endParaRPr lang="en-CA"/>
           </a:p>
@@ -6828,7 +6829,7 @@
           <a:p>
             <a:fld id="{99FB56CE-62CC-47B4-A280-D33BC8BCBDFC}" type="datetimeFigureOut">
               <a:rPr lang="en-CA" smtClean="0"/>
-              <a:t>2018-04-06</a:t>
+              <a:t>2018-04-07</a:t>
             </a:fld>
             <a:endParaRPr lang="en-CA"/>
           </a:p>
@@ -6998,7 +6999,7 @@
           <a:p>
             <a:fld id="{99FB56CE-62CC-47B4-A280-D33BC8BCBDFC}" type="datetimeFigureOut">
               <a:rPr lang="en-CA" smtClean="0"/>
-              <a:t>2018-04-06</a:t>
+              <a:t>2018-04-07</a:t>
             </a:fld>
             <a:endParaRPr lang="en-CA"/>
           </a:p>
@@ -7178,7 +7179,7 @@
           <a:p>
             <a:fld id="{99FB56CE-62CC-47B4-A280-D33BC8BCBDFC}" type="datetimeFigureOut">
               <a:rPr lang="en-CA" smtClean="0"/>
-              <a:t>2018-04-06</a:t>
+              <a:t>2018-04-07</a:t>
             </a:fld>
             <a:endParaRPr lang="en-CA"/>
           </a:p>
@@ -7348,7 +7349,7 @@
           <a:p>
             <a:fld id="{99FB56CE-62CC-47B4-A280-D33BC8BCBDFC}" type="datetimeFigureOut">
               <a:rPr lang="en-CA" smtClean="0"/>
-              <a:t>2018-04-06</a:t>
+              <a:t>2018-04-07</a:t>
             </a:fld>
             <a:endParaRPr lang="en-CA"/>
           </a:p>
@@ -7598,7 +7599,7 @@
           <a:p>
             <a:fld id="{99FB56CE-62CC-47B4-A280-D33BC8BCBDFC}" type="datetimeFigureOut">
               <a:rPr lang="en-CA" smtClean="0"/>
-              <a:t>2018-04-06</a:t>
+              <a:t>2018-04-07</a:t>
             </a:fld>
             <a:endParaRPr lang="en-CA"/>
           </a:p>
@@ -7830,7 +7831,7 @@
           <a:p>
             <a:fld id="{99FB56CE-62CC-47B4-A280-D33BC8BCBDFC}" type="datetimeFigureOut">
               <a:rPr lang="en-CA" smtClean="0"/>
-              <a:t>2018-04-06</a:t>
+              <a:t>2018-04-07</a:t>
             </a:fld>
             <a:endParaRPr lang="en-CA"/>
           </a:p>
@@ -8211,7 +8212,7 @@
           <a:p>
             <a:fld id="{99FB56CE-62CC-47B4-A280-D33BC8BCBDFC}" type="datetimeFigureOut">
               <a:rPr lang="en-CA" smtClean="0"/>
-              <a:t>2018-04-06</a:t>
+              <a:t>2018-04-07</a:t>
             </a:fld>
             <a:endParaRPr lang="en-CA"/>
           </a:p>
@@ -8329,7 +8330,7 @@
           <a:p>
             <a:fld id="{99FB56CE-62CC-47B4-A280-D33BC8BCBDFC}" type="datetimeFigureOut">
               <a:rPr lang="en-CA" smtClean="0"/>
-              <a:t>2018-04-06</a:t>
+              <a:t>2018-04-07</a:t>
             </a:fld>
             <a:endParaRPr lang="en-CA"/>
           </a:p>
@@ -8424,7 +8425,7 @@
           <a:p>
             <a:fld id="{99FB56CE-62CC-47B4-A280-D33BC8BCBDFC}" type="datetimeFigureOut">
               <a:rPr lang="en-CA" smtClean="0"/>
-              <a:t>2018-04-06</a:t>
+              <a:t>2018-04-07</a:t>
             </a:fld>
             <a:endParaRPr lang="en-CA"/>
           </a:p>
@@ -8673,7 +8674,7 @@
           <a:p>
             <a:fld id="{99FB56CE-62CC-47B4-A280-D33BC8BCBDFC}" type="datetimeFigureOut">
               <a:rPr lang="en-CA" smtClean="0"/>
-              <a:t>2018-04-06</a:t>
+              <a:t>2018-04-07</a:t>
             </a:fld>
             <a:endParaRPr lang="en-CA"/>
           </a:p>
@@ -8953,7 +8954,7 @@
           <a:p>
             <a:fld id="{99FB56CE-62CC-47B4-A280-D33BC8BCBDFC}" type="datetimeFigureOut">
               <a:rPr lang="en-CA" smtClean="0"/>
-              <a:t>2018-04-06</a:t>
+              <a:t>2018-04-07</a:t>
             </a:fld>
             <a:endParaRPr lang="en-CA"/>
           </a:p>
@@ -9069,7 +9070,7 @@
           <a:noFill/>
           <a:extLst>
             <a:ext uri="{909E8E84-426E-40dd-AFC4-6F175D3DCCD1}">
-              <a14:hiddenFill xmlns="" xmlns:a14="http://schemas.microsoft.com/office/drawing/2010/main">
+              <a14:hiddenFill xmlns:a14="http://schemas.microsoft.com/office/drawing/2010/main" xmlns="">
                 <a:solidFill>
                   <a:srgbClr val="FFFFFF"/>
                 </a:solidFill>
@@ -9143,7 +9144,7 @@
               </a:ln>
               <a:extLst>
                 <a:ext uri="{91240B29-F687-4f45-9708-019B960494DF}">
-                  <a14:hiddenLine xmlns="" xmlns:a14="http://schemas.microsoft.com/office/drawing/2010/main" w="9525">
+                  <a14:hiddenLine xmlns:a14="http://schemas.microsoft.com/office/drawing/2010/main" xmlns="" w="9525">
                     <a:solidFill>
                       <a:srgbClr val="000000"/>
                     </a:solidFill>
@@ -9233,7 +9234,7 @@
               </a:ln>
               <a:extLst>
                 <a:ext uri="{91240B29-F687-4f45-9708-019B960494DF}">
-                  <a14:hiddenLine xmlns="" xmlns:a14="http://schemas.microsoft.com/office/drawing/2010/main" w="9525">
+                  <a14:hiddenLine xmlns:a14="http://schemas.microsoft.com/office/drawing/2010/main" xmlns="" w="9525">
                     <a:solidFill>
                       <a:srgbClr val="000000"/>
                     </a:solidFill>
@@ -9323,7 +9324,7 @@
               </a:ln>
               <a:extLst>
                 <a:ext uri="{91240B29-F687-4f45-9708-019B960494DF}">
-                  <a14:hiddenLine xmlns="" xmlns:a14="http://schemas.microsoft.com/office/drawing/2010/main" w="9525">
+                  <a14:hiddenLine xmlns:a14="http://schemas.microsoft.com/office/drawing/2010/main" xmlns="" w="9525">
                     <a:solidFill>
                       <a:srgbClr val="000000"/>
                     </a:solidFill>
@@ -9385,7 +9386,7 @@
               </a:ln>
               <a:extLst>
                 <a:ext uri="{91240B29-F687-4f45-9708-019B960494DF}">
-                  <a14:hiddenLine xmlns="" xmlns:a14="http://schemas.microsoft.com/office/drawing/2010/main" w="9525">
+                  <a14:hiddenLine xmlns:a14="http://schemas.microsoft.com/office/drawing/2010/main" xmlns="" w="9525">
                     <a:solidFill>
                       <a:srgbClr val="000000"/>
                     </a:solidFill>
@@ -9475,7 +9476,7 @@
               </a:ln>
               <a:extLst>
                 <a:ext uri="{91240B29-F687-4f45-9708-019B960494DF}">
-                  <a14:hiddenLine xmlns="" xmlns:a14="http://schemas.microsoft.com/office/drawing/2010/main" w="9525">
+                  <a14:hiddenLine xmlns:a14="http://schemas.microsoft.com/office/drawing/2010/main" xmlns="" w="9525">
                     <a:solidFill>
                       <a:srgbClr val="000000"/>
                     </a:solidFill>
@@ -9537,7 +9538,7 @@
               </a:ln>
               <a:extLst>
                 <a:ext uri="{91240B29-F687-4f45-9708-019B960494DF}">
-                  <a14:hiddenLine xmlns="" xmlns:a14="http://schemas.microsoft.com/office/drawing/2010/main" w="9525">
+                  <a14:hiddenLine xmlns:a14="http://schemas.microsoft.com/office/drawing/2010/main" xmlns="" w="9525">
                     <a:solidFill>
                       <a:srgbClr val="000000"/>
                     </a:solidFill>
@@ -9599,7 +9600,7 @@
               </a:ln>
               <a:extLst>
                 <a:ext uri="{91240B29-F687-4f45-9708-019B960494DF}">
-                  <a14:hiddenLine xmlns="" xmlns:a14="http://schemas.microsoft.com/office/drawing/2010/main" w="9525">
+                  <a14:hiddenLine xmlns:a14="http://schemas.microsoft.com/office/drawing/2010/main" xmlns="" w="9525">
                     <a:solidFill>
                       <a:srgbClr val="000000"/>
                     </a:solidFill>
@@ -9689,7 +9690,7 @@
               </a:ln>
               <a:extLst>
                 <a:ext uri="{91240B29-F687-4f45-9708-019B960494DF}">
-                  <a14:hiddenLine xmlns="" xmlns:a14="http://schemas.microsoft.com/office/drawing/2010/main" w="9525">
+                  <a14:hiddenLine xmlns:a14="http://schemas.microsoft.com/office/drawing/2010/main" xmlns="" w="9525">
                     <a:solidFill>
                       <a:srgbClr val="000000"/>
                     </a:solidFill>
@@ -9779,7 +9780,7 @@
               </a:ln>
               <a:extLst>
                 <a:ext uri="{91240B29-F687-4f45-9708-019B960494DF}">
-                  <a14:hiddenLine xmlns="" xmlns:a14="http://schemas.microsoft.com/office/drawing/2010/main" w="9525">
+                  <a14:hiddenLine xmlns:a14="http://schemas.microsoft.com/office/drawing/2010/main" xmlns="" w="9525">
                     <a:solidFill>
                       <a:srgbClr val="000000"/>
                     </a:solidFill>
@@ -9841,7 +9842,7 @@
               </a:ln>
               <a:extLst>
                 <a:ext uri="{91240B29-F687-4f45-9708-019B960494DF}">
-                  <a14:hiddenLine xmlns="" xmlns:a14="http://schemas.microsoft.com/office/drawing/2010/main" w="9525">
+                  <a14:hiddenLine xmlns:a14="http://schemas.microsoft.com/office/drawing/2010/main" xmlns="" w="9525">
                     <a:solidFill>
                       <a:srgbClr val="000000"/>
                     </a:solidFill>
@@ -9951,7 +9952,7 @@
               </a:ln>
               <a:extLst>
                 <a:ext uri="{91240B29-F687-4f45-9708-019B960494DF}">
-                  <a14:hiddenLine xmlns="" xmlns:a14="http://schemas.microsoft.com/office/drawing/2010/main" w="9525">
+                  <a14:hiddenLine xmlns:a14="http://schemas.microsoft.com/office/drawing/2010/main" xmlns="" w="9525">
                     <a:solidFill>
                       <a:srgbClr val="000000"/>
                     </a:solidFill>
@@ -10035,7 +10036,7 @@
               </a:ln>
               <a:extLst>
                 <a:ext uri="{91240B29-F687-4f45-9708-019B960494DF}">
-                  <a14:hiddenLine xmlns="" xmlns:a14="http://schemas.microsoft.com/office/drawing/2010/main" w="9525">
+                  <a14:hiddenLine xmlns:a14="http://schemas.microsoft.com/office/drawing/2010/main" xmlns="" w="9525">
                     <a:solidFill>
                       <a:srgbClr val="000000"/>
                     </a:solidFill>
@@ -10097,7 +10098,7 @@
               </a:ln>
               <a:extLst>
                 <a:ext uri="{91240B29-F687-4f45-9708-019B960494DF}">
-                  <a14:hiddenLine xmlns="" xmlns:a14="http://schemas.microsoft.com/office/drawing/2010/main" w="9525">
+                  <a14:hiddenLine xmlns:a14="http://schemas.microsoft.com/office/drawing/2010/main" xmlns="" w="9525">
                     <a:solidFill>
                       <a:srgbClr val="000000"/>
                     </a:solidFill>
@@ -10159,7 +10160,7 @@
               </a:ln>
               <a:extLst>
                 <a:ext uri="{91240B29-F687-4f45-9708-019B960494DF}">
-                  <a14:hiddenLine xmlns="" xmlns:a14="http://schemas.microsoft.com/office/drawing/2010/main" w="9525">
+                  <a14:hiddenLine xmlns:a14="http://schemas.microsoft.com/office/drawing/2010/main" xmlns="" w="9525">
                     <a:solidFill>
                       <a:srgbClr val="000000"/>
                     </a:solidFill>
@@ -10249,7 +10250,7 @@
               </a:ln>
               <a:extLst>
                 <a:ext uri="{91240B29-F687-4f45-9708-019B960494DF}">
-                  <a14:hiddenLine xmlns="" xmlns:a14="http://schemas.microsoft.com/office/drawing/2010/main" w="9525">
+                  <a14:hiddenLine xmlns:a14="http://schemas.microsoft.com/office/drawing/2010/main" xmlns="" w="9525">
                     <a:solidFill>
                       <a:srgbClr val="000000"/>
                     </a:solidFill>
@@ -10283,7 +10284,7 @@
               </a:ln>
               <a:extLst>
                 <a:ext uri="{91240B29-F687-4f45-9708-019B960494DF}">
-                  <a14:hiddenLine xmlns="" xmlns:a14="http://schemas.microsoft.com/office/drawing/2010/main" w="9525">
+                  <a14:hiddenLine xmlns:a14="http://schemas.microsoft.com/office/drawing/2010/main" xmlns="" w="9525">
                     <a:solidFill>
                       <a:srgbClr val="000000"/>
                     </a:solidFill>
@@ -10348,7 +10349,7 @@
               </a:ln>
               <a:extLst>
                 <a:ext uri="{91240B29-F687-4f45-9708-019B960494DF}">
-                  <a14:hiddenLine xmlns="" xmlns:a14="http://schemas.microsoft.com/office/drawing/2010/main" w="9525">
+                  <a14:hiddenLine xmlns:a14="http://schemas.microsoft.com/office/drawing/2010/main" xmlns="" w="9525">
                     <a:solidFill>
                       <a:srgbClr val="000000"/>
                     </a:solidFill>
@@ -10438,7 +10439,7 @@
               </a:ln>
               <a:extLst>
                 <a:ext uri="{91240B29-F687-4f45-9708-019B960494DF}">
-                  <a14:hiddenLine xmlns="" xmlns:a14="http://schemas.microsoft.com/office/drawing/2010/main" w="9525">
+                  <a14:hiddenLine xmlns:a14="http://schemas.microsoft.com/office/drawing/2010/main" xmlns="" w="9525">
                     <a:solidFill>
                       <a:srgbClr val="000000"/>
                     </a:solidFill>
@@ -10500,7 +10501,7 @@
               </a:ln>
               <a:extLst>
                 <a:ext uri="{91240B29-F687-4f45-9708-019B960494DF}">
-                  <a14:hiddenLine xmlns="" xmlns:a14="http://schemas.microsoft.com/office/drawing/2010/main" w="9525">
+                  <a14:hiddenLine xmlns:a14="http://schemas.microsoft.com/office/drawing/2010/main" xmlns="" w="9525">
                     <a:solidFill>
                       <a:srgbClr val="000000"/>
                     </a:solidFill>
@@ -10590,7 +10591,7 @@
               </a:ln>
               <a:extLst>
                 <a:ext uri="{91240B29-F687-4f45-9708-019B960494DF}">
-                  <a14:hiddenLine xmlns="" xmlns:a14="http://schemas.microsoft.com/office/drawing/2010/main" w="9525">
+                  <a14:hiddenLine xmlns:a14="http://schemas.microsoft.com/office/drawing/2010/main" xmlns="" w="9525">
                     <a:solidFill>
                       <a:srgbClr val="000000"/>
                     </a:solidFill>
@@ -10655,7 +10656,7 @@
               </a:ln>
               <a:extLst>
                 <a:ext uri="{91240B29-F687-4f45-9708-019B960494DF}">
-                  <a14:hiddenLine xmlns="" xmlns:a14="http://schemas.microsoft.com/office/drawing/2010/main" w="9525">
+                  <a14:hiddenLine xmlns:a14="http://schemas.microsoft.com/office/drawing/2010/main" xmlns="" w="9525">
                     <a:solidFill>
                       <a:srgbClr val="000000"/>
                     </a:solidFill>
@@ -10717,7 +10718,7 @@
               </a:ln>
               <a:extLst>
                 <a:ext uri="{91240B29-F687-4f45-9708-019B960494DF}">
-                  <a14:hiddenLine xmlns="" xmlns:a14="http://schemas.microsoft.com/office/drawing/2010/main" w="9525">
+                  <a14:hiddenLine xmlns:a14="http://schemas.microsoft.com/office/drawing/2010/main" xmlns="" w="9525">
                     <a:solidFill>
                       <a:srgbClr val="000000"/>
                     </a:solidFill>
@@ -10807,7 +10808,7 @@
               </a:ln>
               <a:extLst>
                 <a:ext uri="{91240B29-F687-4f45-9708-019B960494DF}">
-                  <a14:hiddenLine xmlns="" xmlns:a14="http://schemas.microsoft.com/office/drawing/2010/main" w="9525">
+                  <a14:hiddenLine xmlns:a14="http://schemas.microsoft.com/office/drawing/2010/main" xmlns="" w="9525">
                     <a:solidFill>
                       <a:srgbClr val="000000"/>
                     </a:solidFill>
@@ -10897,7 +10898,7 @@
               </a:ln>
               <a:extLst>
                 <a:ext uri="{91240B29-F687-4f45-9708-019B960494DF}">
-                  <a14:hiddenLine xmlns="" xmlns:a14="http://schemas.microsoft.com/office/drawing/2010/main" w="9525">
+                  <a14:hiddenLine xmlns:a14="http://schemas.microsoft.com/office/drawing/2010/main" xmlns="" w="9525">
                     <a:solidFill>
                       <a:srgbClr val="000000"/>
                     </a:solidFill>
@@ -10962,7 +10963,7 @@
               </a:ln>
               <a:extLst>
                 <a:ext uri="{91240B29-F687-4f45-9708-019B960494DF}">
-                  <a14:hiddenLine xmlns="" xmlns:a14="http://schemas.microsoft.com/office/drawing/2010/main" w="9525">
+                  <a14:hiddenLine xmlns:a14="http://schemas.microsoft.com/office/drawing/2010/main" xmlns="" w="9525">
                     <a:solidFill>
                       <a:srgbClr val="000000"/>
                     </a:solidFill>
@@ -11082,7 +11083,7 @@
               </a:ln>
               <a:extLst>
                 <a:ext uri="{91240B29-F687-4f45-9708-019B960494DF}">
-                  <a14:hiddenLine xmlns="" xmlns:a14="http://schemas.microsoft.com/office/drawing/2010/main" w="9525">
+                  <a14:hiddenLine xmlns:a14="http://schemas.microsoft.com/office/drawing/2010/main" xmlns="" w="9525">
                     <a:solidFill>
                       <a:srgbClr val="000000"/>
                     </a:solidFill>
@@ -11180,7 +11181,7 @@
               </a:ln>
               <a:extLst>
                 <a:ext uri="{91240B29-F687-4f45-9708-019B960494DF}">
-                  <a14:hiddenLine xmlns="" xmlns:a14="http://schemas.microsoft.com/office/drawing/2010/main" w="9525">
+                  <a14:hiddenLine xmlns:a14="http://schemas.microsoft.com/office/drawing/2010/main" xmlns="" w="9525">
                     <a:solidFill>
                       <a:srgbClr val="000000"/>
                     </a:solidFill>
@@ -11295,7 +11296,7 @@
               </a:ln>
               <a:extLst>
                 <a:ext uri="{91240B29-F687-4f45-9708-019B960494DF}">
-                  <a14:hiddenLine xmlns="" xmlns:a14="http://schemas.microsoft.com/office/drawing/2010/main" w="9525">
+                  <a14:hiddenLine xmlns:a14="http://schemas.microsoft.com/office/drawing/2010/main" xmlns="" w="9525">
                     <a:solidFill>
                       <a:srgbClr val="000000"/>
                     </a:solidFill>
@@ -11385,7 +11386,7 @@
               </a:ln>
               <a:extLst>
                 <a:ext uri="{91240B29-F687-4f45-9708-019B960494DF}">
-                  <a14:hiddenLine xmlns="" xmlns:a14="http://schemas.microsoft.com/office/drawing/2010/main" w="9525">
+                  <a14:hiddenLine xmlns:a14="http://schemas.microsoft.com/office/drawing/2010/main" xmlns="" w="9525">
                     <a:solidFill>
                       <a:srgbClr val="000000"/>
                     </a:solidFill>
@@ -11450,7 +11451,7 @@
               </a:ln>
               <a:extLst>
                 <a:ext uri="{91240B29-F687-4f45-9708-019B960494DF}">
-                  <a14:hiddenLine xmlns="" xmlns:a14="http://schemas.microsoft.com/office/drawing/2010/main" w="9525">
+                  <a14:hiddenLine xmlns:a14="http://schemas.microsoft.com/office/drawing/2010/main" xmlns="" w="9525">
                     <a:solidFill>
                       <a:srgbClr val="000000"/>
                     </a:solidFill>
@@ -11540,7 +11541,7 @@
               </a:ln>
               <a:extLst>
                 <a:ext uri="{91240B29-F687-4f45-9708-019B960494DF}">
-                  <a14:hiddenLine xmlns="" xmlns:a14="http://schemas.microsoft.com/office/drawing/2010/main" w="9525">
+                  <a14:hiddenLine xmlns:a14="http://schemas.microsoft.com/office/drawing/2010/main" xmlns="" w="9525">
                     <a:solidFill>
                       <a:srgbClr val="000000"/>
                     </a:solidFill>
@@ -11608,7 +11609,7 @@
               </a:ln>
               <a:extLst>
                 <a:ext uri="{91240B29-F687-4f45-9708-019B960494DF}">
-                  <a14:hiddenLine xmlns="" xmlns:a14="http://schemas.microsoft.com/office/drawing/2010/main" w="9525">
+                  <a14:hiddenLine xmlns:a14="http://schemas.microsoft.com/office/drawing/2010/main" xmlns="" w="9525">
                     <a:solidFill>
                       <a:srgbClr val="000000"/>
                     </a:solidFill>
@@ -11698,7 +11699,7 @@
               </a:ln>
               <a:extLst>
                 <a:ext uri="{91240B29-F687-4f45-9708-019B960494DF}">
-                  <a14:hiddenLine xmlns="" xmlns:a14="http://schemas.microsoft.com/office/drawing/2010/main" w="9525">
+                  <a14:hiddenLine xmlns:a14="http://schemas.microsoft.com/office/drawing/2010/main" xmlns="" w="9525">
                     <a:solidFill>
                       <a:srgbClr val="000000"/>
                     </a:solidFill>
@@ -11766,7 +11767,7 @@
               </a:ln>
               <a:extLst>
                 <a:ext uri="{91240B29-F687-4f45-9708-019B960494DF}">
-                  <a14:hiddenLine xmlns="" xmlns:a14="http://schemas.microsoft.com/office/drawing/2010/main" w="9525">
+                  <a14:hiddenLine xmlns:a14="http://schemas.microsoft.com/office/drawing/2010/main" xmlns="" w="9525">
                     <a:solidFill>
                       <a:srgbClr val="000000"/>
                     </a:solidFill>
@@ -11856,7 +11857,7 @@
               </a:ln>
               <a:extLst>
                 <a:ext uri="{91240B29-F687-4f45-9708-019B960494DF}">
-                  <a14:hiddenLine xmlns="" xmlns:a14="http://schemas.microsoft.com/office/drawing/2010/main" w="9525">
+                  <a14:hiddenLine xmlns:a14="http://schemas.microsoft.com/office/drawing/2010/main" xmlns="" w="9525">
                     <a:solidFill>
                       <a:srgbClr val="000000"/>
                     </a:solidFill>
@@ -11890,7 +11891,7 @@
               </a:ln>
               <a:extLst>
                 <a:ext uri="{91240B29-F687-4f45-9708-019B960494DF}">
-                  <a14:hiddenLine xmlns="" xmlns:a14="http://schemas.microsoft.com/office/drawing/2010/main" w="9525">
+                  <a14:hiddenLine xmlns:a14="http://schemas.microsoft.com/office/drawing/2010/main" xmlns="" w="9525">
                     <a:solidFill>
                       <a:srgbClr val="000000"/>
                     </a:solidFill>
@@ -12030,7 +12031,7 @@
           <a:p>
             <a:fld id="{99FB56CE-62CC-47B4-A280-D33BC8BCBDFC}" type="datetimeFigureOut">
               <a:rPr lang="en-CA" smtClean="0"/>
-              <a:t>2018-04-06</a:t>
+              <a:t>2018-04-07</a:t>
             </a:fld>
             <a:endParaRPr lang="en-CA"/>
           </a:p>
@@ -12584,6 +12585,198 @@
           <p:cNvPr id="2" name="Title 1">
             <a:extLst>
               <a:ext uri="{FF2B5EF4-FFF2-40B4-BE49-F238E27FC236}">
+                <a16:creationId xmlns:a16="http://schemas.microsoft.com/office/drawing/2014/main" id="{B5A5B0C2-8D5C-4201-B191-F45AA35AB8A2}"/>
+              </a:ext>
+            </a:extLst>
+          </p:cNvPr>
+          <p:cNvSpPr>
+            <a:spLocks noGrp="1"/>
+          </p:cNvSpPr>
+          <p:nvPr>
+            <p:ph type="title"/>
+          </p:nvPr>
+        </p:nvSpPr>
+        <p:spPr/>
+        <p:txBody>
+          <a:bodyPr/>
+          <a:lstStyle/>
+          <a:p>
+            <a:r>
+              <a:rPr lang="en-CA" dirty="0"/>
+              <a:t>Refactor review</a:t>
+            </a:r>
+          </a:p>
+        </p:txBody>
+      </p:sp>
+      <p:sp>
+        <p:nvSpPr>
+          <p:cNvPr id="3" name="Content Placeholder 2">
+            <a:extLst>
+              <a:ext uri="{FF2B5EF4-FFF2-40B4-BE49-F238E27FC236}">
+                <a16:creationId xmlns:a16="http://schemas.microsoft.com/office/drawing/2014/main" id="{C4208F60-4C04-44B3-8DD9-7B96F37D8F13}"/>
+              </a:ext>
+            </a:extLst>
+          </p:cNvPr>
+          <p:cNvSpPr>
+            <a:spLocks noGrp="1"/>
+          </p:cNvSpPr>
+          <p:nvPr>
+            <p:ph idx="1"/>
+          </p:nvPr>
+        </p:nvSpPr>
+        <p:spPr/>
+        <p:txBody>
+          <a:bodyPr/>
+          <a:lstStyle/>
+          <a:p>
+            <a:pPr marL="0" indent="0">
+              <a:buNone/>
+            </a:pPr>
+            <a:r>
+              <a:rPr lang="en-CA" dirty="0"/>
+              <a:t>Code For Application</a:t>
+            </a:r>
+          </a:p>
+          <a:p>
+            <a:r>
+              <a:rPr lang="en-CA" dirty="0" err="1"/>
+              <a:t>sdsdsd</a:t>
+            </a:r>
+            <a:endParaRPr lang="en-CA" dirty="0"/>
+          </a:p>
+        </p:txBody>
+      </p:sp>
+    </p:spTree>
+    <p:extLst>
+      <p:ext uri="{BB962C8B-B14F-4D97-AF65-F5344CB8AC3E}">
+        <p14:creationId xmlns:p14="http://schemas.microsoft.com/office/powerpoint/2010/main" val="3958323764"/>
+      </p:ext>
+    </p:extLst>
+  </p:cSld>
+  <p:clrMapOvr>
+    <a:masterClrMapping/>
+  </p:clrMapOvr>
+</p:sld>
+</file>
+
+<file path=ppt/slides/slide11.xml><?xml version="1.0" encoding="utf-8"?>
+<p:sld xmlns:a="http://schemas.openxmlformats.org/drawingml/2006/main" xmlns:r="http://schemas.openxmlformats.org/officeDocument/2006/relationships" xmlns:p="http://schemas.openxmlformats.org/presentationml/2006/main">
+  <p:cSld>
+    <p:spTree>
+      <p:nvGrpSpPr>
+        <p:cNvPr id="1" name=""/>
+        <p:cNvGrpSpPr/>
+        <p:nvPr/>
+      </p:nvGrpSpPr>
+      <p:grpSpPr>
+        <a:xfrm>
+          <a:off x="0" y="0"/>
+          <a:ext cx="0" cy="0"/>
+          <a:chOff x="0" y="0"/>
+          <a:chExt cx="0" cy="0"/>
+        </a:xfrm>
+      </p:grpSpPr>
+      <p:sp>
+        <p:nvSpPr>
+          <p:cNvPr id="2" name="Title 1">
+            <a:extLst>
+              <a:ext uri="{FF2B5EF4-FFF2-40B4-BE49-F238E27FC236}">
+                <a16:creationId xmlns:a16="http://schemas.microsoft.com/office/drawing/2014/main" id="{EB0AE8D7-ADA3-47BF-A679-B814DC82D735}"/>
+              </a:ext>
+            </a:extLst>
+          </p:cNvPr>
+          <p:cNvSpPr>
+            <a:spLocks noGrp="1"/>
+          </p:cNvSpPr>
+          <p:nvPr>
+            <p:ph type="title"/>
+          </p:nvPr>
+        </p:nvSpPr>
+        <p:spPr/>
+        <p:txBody>
+          <a:bodyPr/>
+          <a:lstStyle/>
+          <a:p>
+            <a:r>
+              <a:rPr lang="en-CA" dirty="0"/>
+              <a:t>Refactor review</a:t>
+            </a:r>
+          </a:p>
+        </p:txBody>
+      </p:sp>
+      <p:sp>
+        <p:nvSpPr>
+          <p:cNvPr id="3" name="Content Placeholder 2">
+            <a:extLst>
+              <a:ext uri="{FF2B5EF4-FFF2-40B4-BE49-F238E27FC236}">
+                <a16:creationId xmlns:a16="http://schemas.microsoft.com/office/drawing/2014/main" id="{CBC82DFA-DAA5-4A6D-BCB2-17E5FD1E5813}"/>
+              </a:ext>
+            </a:extLst>
+          </p:cNvPr>
+          <p:cNvSpPr>
+            <a:spLocks noGrp="1"/>
+          </p:cNvSpPr>
+          <p:nvPr>
+            <p:ph idx="1"/>
+          </p:nvPr>
+        </p:nvSpPr>
+        <p:spPr/>
+        <p:txBody>
+          <a:bodyPr/>
+          <a:lstStyle/>
+          <a:p>
+            <a:pPr marL="0" indent="0">
+              <a:buNone/>
+            </a:pPr>
+            <a:r>
+              <a:rPr lang="en-CA" dirty="0"/>
+              <a:t>Code Smells</a:t>
+            </a:r>
+          </a:p>
+          <a:p>
+            <a:r>
+              <a:rPr lang="en-CA" dirty="0" err="1"/>
+              <a:t>jh</a:t>
+            </a:r>
+            <a:endParaRPr lang="en-CA" dirty="0"/>
+          </a:p>
+        </p:txBody>
+      </p:sp>
+    </p:spTree>
+    <p:extLst>
+      <p:ext uri="{BB962C8B-B14F-4D97-AF65-F5344CB8AC3E}">
+        <p14:creationId xmlns:p14="http://schemas.microsoft.com/office/powerpoint/2010/main" val="2243034424"/>
+      </p:ext>
+    </p:extLst>
+  </p:cSld>
+  <p:clrMapOvr>
+    <a:masterClrMapping/>
+  </p:clrMapOvr>
+</p:sld>
+</file>
+
+<file path=ppt/slides/slide12.xml><?xml version="1.0" encoding="utf-8"?>
+<p:sld xmlns:a="http://schemas.openxmlformats.org/drawingml/2006/main" xmlns:r="http://schemas.openxmlformats.org/officeDocument/2006/relationships" xmlns:p="http://schemas.openxmlformats.org/presentationml/2006/main">
+  <p:cSld>
+    <p:spTree>
+      <p:nvGrpSpPr>
+        <p:cNvPr id="1" name=""/>
+        <p:cNvGrpSpPr/>
+        <p:nvPr/>
+      </p:nvGrpSpPr>
+      <p:grpSpPr>
+        <a:xfrm>
+          <a:off x="0" y="0"/>
+          <a:ext cx="0" cy="0"/>
+          <a:chOff x="0" y="0"/>
+          <a:chExt cx="0" cy="0"/>
+        </a:xfrm>
+      </p:grpSpPr>
+      <p:sp>
+        <p:nvSpPr>
+          <p:cNvPr id="2" name="Title 1">
+            <a:extLst>
+              <a:ext uri="{FF2B5EF4-FFF2-40B4-BE49-F238E27FC236}">
                 <a16:creationId xmlns:a16="http://schemas.microsoft.com/office/drawing/2014/main" id="{AD06EE58-4AF6-44A7-AA22-F8556EDA26A0}"/>
               </a:ext>
             </a:extLst>
@@ -12686,7 +12879,7 @@
 </p:sld>
 </file>
 
-<file path=ppt/slides/slide11.xml><?xml version="1.0" encoding="utf-8"?>
+<file path=ppt/slides/slide13.xml><?xml version="1.0" encoding="utf-8"?>
 <p:sld xmlns:a="http://schemas.openxmlformats.org/drawingml/2006/main" xmlns:r="http://schemas.openxmlformats.org/officeDocument/2006/relationships" xmlns:p="http://schemas.openxmlformats.org/presentationml/2006/main">
   <p:cSld>
     <p:spTree>
@@ -12766,7 +12959,7 @@
 </p:sld>
 </file>
 
-<file path=ppt/slides/slide12.xml><?xml version="1.0" encoding="utf-8"?>
+<file path=ppt/slides/slide14.xml><?xml version="1.0" encoding="utf-8"?>
 <p:sld xmlns:a="http://schemas.openxmlformats.org/drawingml/2006/main" xmlns:r="http://schemas.openxmlformats.org/officeDocument/2006/relationships" xmlns:p="http://schemas.openxmlformats.org/presentationml/2006/main">
   <p:cSld>
     <p:spTree>
@@ -12857,7 +13050,7 @@
 </p:sld>
 </file>
 
-<file path=ppt/slides/slide13.xml><?xml version="1.0" encoding="utf-8"?>
+<file path=ppt/slides/slide15.xml><?xml version="1.0" encoding="utf-8"?>
 <p:sld xmlns:a="http://schemas.openxmlformats.org/drawingml/2006/main" xmlns:r="http://schemas.openxmlformats.org/officeDocument/2006/relationships" xmlns:p="http://schemas.openxmlformats.org/presentationml/2006/main">
   <p:cSld>
     <p:spTree>
@@ -12937,7 +13130,7 @@
 </p:sld>
 </file>
 
-<file path=ppt/slides/slide14.xml><?xml version="1.0" encoding="utf-8"?>
+<file path=ppt/slides/slide16.xml><?xml version="1.0" encoding="utf-8"?>
 <p:sld xmlns:a="http://schemas.openxmlformats.org/drawingml/2006/main" xmlns:r="http://schemas.openxmlformats.org/officeDocument/2006/relationships" xmlns:p="http://schemas.openxmlformats.org/presentationml/2006/main">
   <p:cSld>
     <p:spTree>
@@ -12970,7 +13163,12 @@
             <p:ph type="title"/>
           </p:nvPr>
         </p:nvSpPr>
-        <p:spPr/>
+        <p:spPr>
+          <a:xfrm>
+            <a:off x="1141412" y="744279"/>
+            <a:ext cx="9905998" cy="743208"/>
+          </a:xfrm>
+        </p:spPr>
         <p:txBody>
           <a:bodyPr/>
           <a:lstStyle/>
@@ -12999,10 +13197,15 @@
             <p:ph idx="1"/>
           </p:nvPr>
         </p:nvSpPr>
-        <p:spPr/>
+        <p:spPr>
+          <a:xfrm>
+            <a:off x="1141412" y="1623236"/>
+            <a:ext cx="9905999" cy="5054011"/>
+          </a:xfrm>
+        </p:spPr>
         <p:txBody>
           <a:bodyPr>
-            <a:normAutofit fontScale="85000" lnSpcReduction="10000"/>
+            <a:normAutofit fontScale="92500" lnSpcReduction="20000"/>
           </a:bodyPr>
           <a:lstStyle/>
           <a:p>
@@ -13020,7 +13223,16 @@
             </a:pPr>
             <a:r>
               <a:rPr lang="en-US" dirty="0"/>
-              <a:t>[Response here]</a:t>
+              <a:t>It was interesting looking at a different approach to designing the application</a:t>
+            </a:r>
+          </a:p>
+          <a:p>
+            <a:pPr lvl="1">
+              <a:defRPr/>
+            </a:pPr>
+            <a:r>
+              <a:rPr lang="en-US" dirty="0"/>
+              <a:t>It adds different perspectives seeing different design approaches</a:t>
             </a:r>
           </a:p>
           <a:p>
@@ -13038,7 +13250,15 @@
             </a:pPr>
             <a:r>
               <a:rPr lang="en-US" dirty="0"/>
-              <a:t>[Response here]</a:t>
+              <a:t>Things that we could have improved on ourselves, by looking at what team </a:t>
+            </a:r>
+            <a:r>
+              <a:rPr lang="en-US" dirty="0" err="1"/>
+              <a:t>Covfefe</a:t>
+            </a:r>
+            <a:r>
+              <a:rPr lang="en-US" dirty="0"/>
+              <a:t> had or was missing</a:t>
             </a:r>
           </a:p>
           <a:p>
@@ -13056,7 +13276,15 @@
             </a:pPr>
             <a:r>
               <a:rPr lang="en-US" dirty="0"/>
-              <a:t>[Response here]</a:t>
+              <a:t>We can use the feedback that we receive for the group reviewing our application as well as ideas from reviewing team </a:t>
+            </a:r>
+            <a:r>
+              <a:rPr lang="en-US" dirty="0" err="1"/>
+              <a:t>Covfefe’s</a:t>
+            </a:r>
+            <a:r>
+              <a:rPr lang="en-US" dirty="0"/>
+              <a:t> application in the future</a:t>
             </a:r>
           </a:p>
           <a:p>
@@ -13073,10 +13301,9 @@
               <a:defRPr/>
             </a:pPr>
             <a:r>
-              <a:rPr lang="en-US" dirty="0"/>
-              <a:t>[Response here]</a:t>
-            </a:r>
-            <a:endParaRPr lang="en-CA" dirty="0"/>
+              <a:rPr lang="en-CA" dirty="0"/>
+              <a:t>For the most part we were fine</a:t>
+            </a:r>
           </a:p>
         </p:txBody>
       </p:sp>
@@ -13084,86 +13311,6 @@
     <p:extLst>
       <p:ext uri="{BB962C8B-B14F-4D97-AF65-F5344CB8AC3E}">
         <p14:creationId xmlns:p14="http://schemas.microsoft.com/office/powerpoint/2010/main" val="2133758053"/>
-      </p:ext>
-    </p:extLst>
-  </p:cSld>
-  <p:clrMapOvr>
-    <a:masterClrMapping/>
-  </p:clrMapOvr>
-</p:sld>
-</file>
-
-<file path=ppt/slides/slide15.xml><?xml version="1.0" encoding="utf-8"?>
-<p:sld xmlns:a="http://schemas.openxmlformats.org/drawingml/2006/main" xmlns:r="http://schemas.openxmlformats.org/officeDocument/2006/relationships" xmlns:p="http://schemas.openxmlformats.org/presentationml/2006/main">
-  <p:cSld>
-    <p:spTree>
-      <p:nvGrpSpPr>
-        <p:cNvPr id="1" name=""/>
-        <p:cNvGrpSpPr/>
-        <p:nvPr/>
-      </p:nvGrpSpPr>
-      <p:grpSpPr>
-        <a:xfrm>
-          <a:off x="0" y="0"/>
-          <a:ext cx="0" cy="0"/>
-          <a:chOff x="0" y="0"/>
-          <a:chExt cx="0" cy="0"/>
-        </a:xfrm>
-      </p:grpSpPr>
-      <p:sp>
-        <p:nvSpPr>
-          <p:cNvPr id="2" name="Title 1">
-            <a:extLst>
-              <a:ext uri="{FF2B5EF4-FFF2-40B4-BE49-F238E27FC236}">
-                <a16:creationId xmlns:a16="http://schemas.microsoft.com/office/drawing/2014/main" id="{D87E921E-9262-4E9D-8119-1B8DA3B0D63A}"/>
-              </a:ext>
-            </a:extLst>
-          </p:cNvPr>
-          <p:cNvSpPr>
-            <a:spLocks noGrp="1"/>
-          </p:cNvSpPr>
-          <p:nvPr>
-            <p:ph type="title"/>
-          </p:nvPr>
-        </p:nvSpPr>
-        <p:spPr/>
-        <p:txBody>
-          <a:bodyPr/>
-          <a:lstStyle/>
-          <a:p>
-            <a:endParaRPr lang="en-CA"/>
-          </a:p>
-        </p:txBody>
-      </p:sp>
-      <p:sp>
-        <p:nvSpPr>
-          <p:cNvPr id="3" name="Content Placeholder 2">
-            <a:extLst>
-              <a:ext uri="{FF2B5EF4-FFF2-40B4-BE49-F238E27FC236}">
-                <a16:creationId xmlns:a16="http://schemas.microsoft.com/office/drawing/2014/main" id="{E2A517A1-B39A-4956-913E-1A784A7981D2}"/>
-              </a:ext>
-            </a:extLst>
-          </p:cNvPr>
-          <p:cNvSpPr>
-            <a:spLocks noGrp="1"/>
-          </p:cNvSpPr>
-          <p:nvPr>
-            <p:ph idx="1"/>
-          </p:nvPr>
-        </p:nvSpPr>
-        <p:spPr/>
-        <p:txBody>
-          <a:bodyPr/>
-          <a:lstStyle/>
-          <a:p>
-            <a:endParaRPr lang="en-CA"/>
-          </a:p>
-        </p:txBody>
-      </p:sp>
-    </p:spTree>
-    <p:extLst>
-      <p:ext uri="{BB962C8B-B14F-4D97-AF65-F5344CB8AC3E}">
-        <p14:creationId xmlns:p14="http://schemas.microsoft.com/office/powerpoint/2010/main" val="305204702"/>
       </p:ext>
     </p:extLst>
   </p:cSld>
@@ -13780,7 +13927,7 @@
         </p:spPr>
         <p:txBody>
           <a:bodyPr>
-            <a:normAutofit/>
+            <a:normAutofit fontScale="92500"/>
           </a:bodyPr>
           <a:lstStyle/>
           <a:p>
@@ -13798,7 +13945,13 @@
           <a:p>
             <a:r>
               <a:rPr lang="en-CA" dirty="0"/>
-              <a:t>Overall the organization of the GitHub page is good</a:t>
+              <a:t>The documentation could maybe provide a bit more detail</a:t>
+            </a:r>
+          </a:p>
+          <a:p>
+            <a:r>
+              <a:rPr lang="en-CA" dirty="0"/>
+              <a:t>Overall the organization of the GitHub page is good and it wasn’t to difficult to find where to locate things</a:t>
             </a:r>
           </a:p>
         </p:txBody>
@@ -14112,7 +14265,7 @@
           <p:cNvPr id="2" name="Title 1">
             <a:extLst>
               <a:ext uri="{FF2B5EF4-FFF2-40B4-BE49-F238E27FC236}">
-                <a16:creationId xmlns:a16="http://schemas.microsoft.com/office/drawing/2014/main" id="{B5A5B0C2-8D5C-4201-B191-F45AA35AB8A2}"/>
+                <a16:creationId xmlns:a16="http://schemas.microsoft.com/office/drawing/2014/main" id="{4A8B22DD-748E-4C64-A0F6-FC7824240AD5}"/>
               </a:ext>
             </a:extLst>
           </p:cNvPr>
@@ -14123,12 +14276,20 @@
             <p:ph type="title"/>
           </p:nvPr>
         </p:nvSpPr>
-        <p:spPr/>
+        <p:spPr>
+          <a:xfrm>
+            <a:off x="1141412" y="547634"/>
+            <a:ext cx="9905998" cy="841687"/>
+          </a:xfrm>
+        </p:spPr>
         <p:txBody>
           <a:bodyPr/>
           <a:lstStyle/>
           <a:p>
-            <a:endParaRPr lang="en-CA"/>
+            <a:r>
+              <a:rPr lang="en-CA" dirty="0"/>
+              <a:t>Refactor review</a:t>
+            </a:r>
           </a:p>
         </p:txBody>
       </p:sp>
@@ -14137,7 +14298,7 @@
           <p:cNvPr id="3" name="Content Placeholder 2">
             <a:extLst>
               <a:ext uri="{FF2B5EF4-FFF2-40B4-BE49-F238E27FC236}">
-                <a16:creationId xmlns:a16="http://schemas.microsoft.com/office/drawing/2014/main" id="{C4208F60-4C04-44B3-8DD9-7B96F37D8F13}"/>
+                <a16:creationId xmlns:a16="http://schemas.microsoft.com/office/drawing/2014/main" id="{7E43A16F-79BF-4063-9960-798E605E0CDA}"/>
               </a:ext>
             </a:extLst>
           </p:cNvPr>
@@ -14148,19 +14309,54 @@
             <p:ph idx="1"/>
           </p:nvPr>
         </p:nvSpPr>
-        <p:spPr/>
+        <p:spPr>
+          <a:xfrm>
+            <a:off x="1141411" y="1389320"/>
+            <a:ext cx="9905999" cy="5468680"/>
+          </a:xfrm>
+        </p:spPr>
         <p:txBody>
           <a:bodyPr/>
           <a:lstStyle/>
           <a:p>
-            <a:endParaRPr lang="en-CA"/>
+            <a:pPr marL="0" indent="0">
+              <a:buNone/>
+            </a:pPr>
+            <a:r>
+              <a:rPr lang="en-CA" dirty="0"/>
+              <a:t>ATDD templates</a:t>
+            </a:r>
+          </a:p>
+          <a:p>
+            <a:r>
+              <a:rPr lang="en-CA" dirty="0"/>
+              <a:t>Most of the tests passed/failed as intended</a:t>
+            </a:r>
+          </a:p>
+          <a:p>
+            <a:r>
+              <a:rPr lang="en-CA" dirty="0"/>
+              <a:t>Some didn’t because maybe either the functionality was wasn’t fully complete or it didn’t quite work as intended</a:t>
+            </a:r>
+          </a:p>
+          <a:p>
+            <a:r>
+              <a:rPr lang="en-CA" dirty="0"/>
+              <a:t>All the templates are accounted for on the user story map</a:t>
+            </a:r>
+          </a:p>
+          <a:p>
+            <a:r>
+              <a:rPr lang="en-CA" dirty="0"/>
+              <a:t>Templates are accessible through the milestone 5 and 6 presentations but were not posted individually, However, they were not to difficult to find</a:t>
+            </a:r>
           </a:p>
         </p:txBody>
       </p:sp>
     </p:spTree>
     <p:extLst>
       <p:ext uri="{BB962C8B-B14F-4D97-AF65-F5344CB8AC3E}">
-        <p14:creationId xmlns:p14="http://schemas.microsoft.com/office/powerpoint/2010/main" val="3958323764"/>
+        <p14:creationId xmlns:p14="http://schemas.microsoft.com/office/powerpoint/2010/main" val="791782776"/>
       </p:ext>
     </p:extLst>
   </p:cSld>

</xml_diff>

<commit_message>
Updated: added more to slides
</commit_message>
<xml_diff>
--- a/Milestone 7/ENSE 470 Milestone 7.pptx
+++ b/Milestone 7/ENSE 470 Milestone 7.pptx
@@ -10,17 +10,13 @@
     <p:sldId id="269" r:id="rId4"/>
     <p:sldId id="270" r:id="rId5"/>
     <p:sldId id="271" r:id="rId6"/>
-    <p:sldId id="259" r:id="rId7"/>
-    <p:sldId id="272" r:id="rId8"/>
-    <p:sldId id="261" r:id="rId9"/>
-    <p:sldId id="273" r:id="rId10"/>
-    <p:sldId id="262" r:id="rId11"/>
-    <p:sldId id="274" r:id="rId12"/>
-    <p:sldId id="263" r:id="rId13"/>
-    <p:sldId id="264" r:id="rId14"/>
-    <p:sldId id="265" r:id="rId15"/>
-    <p:sldId id="266" r:id="rId16"/>
-    <p:sldId id="267" r:id="rId17"/>
+    <p:sldId id="272" r:id="rId7"/>
+    <p:sldId id="261" r:id="rId8"/>
+    <p:sldId id="273" r:id="rId9"/>
+    <p:sldId id="263" r:id="rId10"/>
+    <p:sldId id="264" r:id="rId11"/>
+    <p:sldId id="266" r:id="rId12"/>
+    <p:sldId id="267" r:id="rId13"/>
   </p:sldIdLst>
   <p:sldSz cx="12192000" cy="6858000"/>
   <p:notesSz cx="6858000" cy="9144000"/>
@@ -177,7 +173,7 @@
           <a:noFill/>
           <a:extLst>
             <a:ext uri="{909E8E84-426E-40dd-AFC4-6F175D3DCCD1}">
-              <a14:hiddenFill xmlns:a14="http://schemas.microsoft.com/office/drawing/2010/main" xmlns="">
+              <a14:hiddenFill xmlns="" xmlns:a14="http://schemas.microsoft.com/office/drawing/2010/main">
                 <a:solidFill>
                   <a:srgbClr val="FFFFFF"/>
                 </a:solidFill>
@@ -237,7 +233,7 @@
             </a:ln>
             <a:extLst>
               <a:ext uri="{91240B29-F687-4f45-9708-019B960494DF}">
-                <a14:hiddenLine xmlns:a14="http://schemas.microsoft.com/office/drawing/2010/main" xmlns="" w="9525">
+                <a14:hiddenLine xmlns="" xmlns:a14="http://schemas.microsoft.com/office/drawing/2010/main" w="9525">
                   <a:solidFill>
                     <a:srgbClr val="000000"/>
                   </a:solidFill>
@@ -327,7 +323,7 @@
             </a:ln>
             <a:extLst>
               <a:ext uri="{91240B29-F687-4f45-9708-019B960494DF}">
-                <a14:hiddenLine xmlns:a14="http://schemas.microsoft.com/office/drawing/2010/main" xmlns="" w="9525">
+                <a14:hiddenLine xmlns="" xmlns:a14="http://schemas.microsoft.com/office/drawing/2010/main" w="9525">
                   <a:solidFill>
                     <a:srgbClr val="000000"/>
                   </a:solidFill>
@@ -417,7 +413,7 @@
             </a:ln>
             <a:extLst>
               <a:ext uri="{91240B29-F687-4f45-9708-019B960494DF}">
-                <a14:hiddenLine xmlns:a14="http://schemas.microsoft.com/office/drawing/2010/main" xmlns="" w="9525">
+                <a14:hiddenLine xmlns="" xmlns:a14="http://schemas.microsoft.com/office/drawing/2010/main" w="9525">
                   <a:solidFill>
                     <a:srgbClr val="000000"/>
                   </a:solidFill>
@@ -451,7 +447,7 @@
             </a:ln>
             <a:extLst>
               <a:ext uri="{91240B29-F687-4f45-9708-019B960494DF}">
-                <a14:hiddenLine xmlns:a14="http://schemas.microsoft.com/office/drawing/2010/main" xmlns="" w="9525">
+                <a14:hiddenLine xmlns="" xmlns:a14="http://schemas.microsoft.com/office/drawing/2010/main" w="9525">
                   <a:solidFill>
                     <a:srgbClr val="000000"/>
                   </a:solidFill>
@@ -541,7 +537,7 @@
             </a:ln>
             <a:extLst>
               <a:ext uri="{91240B29-F687-4f45-9708-019B960494DF}">
-                <a14:hiddenLine xmlns:a14="http://schemas.microsoft.com/office/drawing/2010/main" xmlns="" w="9525">
+                <a14:hiddenLine xmlns="" xmlns:a14="http://schemas.microsoft.com/office/drawing/2010/main" w="9525">
                   <a:solidFill>
                     <a:srgbClr val="000000"/>
                   </a:solidFill>
@@ -603,7 +599,7 @@
             </a:ln>
             <a:extLst>
               <a:ext uri="{91240B29-F687-4f45-9708-019B960494DF}">
-                <a14:hiddenLine xmlns:a14="http://schemas.microsoft.com/office/drawing/2010/main" xmlns="" w="9525">
+                <a14:hiddenLine xmlns="" xmlns:a14="http://schemas.microsoft.com/office/drawing/2010/main" w="9525">
                   <a:solidFill>
                     <a:srgbClr val="000000"/>
                   </a:solidFill>
@@ -665,7 +661,7 @@
             </a:ln>
             <a:extLst>
               <a:ext uri="{91240B29-F687-4f45-9708-019B960494DF}">
-                <a14:hiddenLine xmlns:a14="http://schemas.microsoft.com/office/drawing/2010/main" xmlns="" w="9525">
+                <a14:hiddenLine xmlns="" xmlns:a14="http://schemas.microsoft.com/office/drawing/2010/main" w="9525">
                   <a:solidFill>
                     <a:srgbClr val="000000"/>
                   </a:solidFill>
@@ -755,7 +751,7 @@
             </a:ln>
             <a:extLst>
               <a:ext uri="{91240B29-F687-4f45-9708-019B960494DF}">
-                <a14:hiddenLine xmlns:a14="http://schemas.microsoft.com/office/drawing/2010/main" xmlns="" w="9525">
+                <a14:hiddenLine xmlns="" xmlns:a14="http://schemas.microsoft.com/office/drawing/2010/main" w="9525">
                   <a:solidFill>
                     <a:srgbClr val="000000"/>
                   </a:solidFill>
@@ -817,7 +813,7 @@
             </a:ln>
             <a:extLst>
               <a:ext uri="{91240B29-F687-4f45-9708-019B960494DF}">
-                <a14:hiddenLine xmlns:a14="http://schemas.microsoft.com/office/drawing/2010/main" xmlns="" w="9525">
+                <a14:hiddenLine xmlns="" xmlns:a14="http://schemas.microsoft.com/office/drawing/2010/main" w="9525">
                   <a:solidFill>
                     <a:srgbClr val="000000"/>
                   </a:solidFill>
@@ -879,7 +875,7 @@
             </a:ln>
             <a:extLst>
               <a:ext uri="{91240B29-F687-4f45-9708-019B960494DF}">
-                <a14:hiddenLine xmlns:a14="http://schemas.microsoft.com/office/drawing/2010/main" xmlns="" w="9525">
+                <a14:hiddenLine xmlns="" xmlns:a14="http://schemas.microsoft.com/office/drawing/2010/main" w="9525">
                   <a:solidFill>
                     <a:srgbClr val="000000"/>
                   </a:solidFill>
@@ -969,7 +965,7 @@
             </a:ln>
             <a:extLst>
               <a:ext uri="{91240B29-F687-4f45-9708-019B960494DF}">
-                <a14:hiddenLine xmlns:a14="http://schemas.microsoft.com/office/drawing/2010/main" xmlns="" w="9525">
+                <a14:hiddenLine xmlns="" xmlns:a14="http://schemas.microsoft.com/office/drawing/2010/main" w="9525">
                   <a:solidFill>
                     <a:srgbClr val="000000"/>
                   </a:solidFill>
@@ -1059,7 +1055,7 @@
             </a:ln>
             <a:extLst>
               <a:ext uri="{91240B29-F687-4f45-9708-019B960494DF}">
-                <a14:hiddenLine xmlns:a14="http://schemas.microsoft.com/office/drawing/2010/main" xmlns="" w="9525">
+                <a14:hiddenLine xmlns="" xmlns:a14="http://schemas.microsoft.com/office/drawing/2010/main" w="9525">
                   <a:solidFill>
                     <a:srgbClr val="000000"/>
                   </a:solidFill>
@@ -1121,7 +1117,7 @@
             </a:ln>
             <a:extLst>
               <a:ext uri="{91240B29-F687-4f45-9708-019B960494DF}">
-                <a14:hiddenLine xmlns:a14="http://schemas.microsoft.com/office/drawing/2010/main" xmlns="" w="9525">
+                <a14:hiddenLine xmlns="" xmlns:a14="http://schemas.microsoft.com/office/drawing/2010/main" w="9525">
                   <a:solidFill>
                     <a:srgbClr val="000000"/>
                   </a:solidFill>
@@ -1231,7 +1227,7 @@
             </a:ln>
             <a:extLst>
               <a:ext uri="{91240B29-F687-4f45-9708-019B960494DF}">
-                <a14:hiddenLine xmlns:a14="http://schemas.microsoft.com/office/drawing/2010/main" xmlns="" w="9525">
+                <a14:hiddenLine xmlns="" xmlns:a14="http://schemas.microsoft.com/office/drawing/2010/main" w="9525">
                   <a:solidFill>
                     <a:srgbClr val="000000"/>
                   </a:solidFill>
@@ -1293,7 +1289,7 @@
             </a:ln>
             <a:extLst>
               <a:ext uri="{91240B29-F687-4f45-9708-019B960494DF}">
-                <a14:hiddenLine xmlns:a14="http://schemas.microsoft.com/office/drawing/2010/main" xmlns="" w="9525">
+                <a14:hiddenLine xmlns="" xmlns:a14="http://schemas.microsoft.com/office/drawing/2010/main" w="9525">
                   <a:solidFill>
                     <a:srgbClr val="000000"/>
                   </a:solidFill>
@@ -1383,7 +1379,7 @@
             </a:ln>
             <a:extLst>
               <a:ext uri="{91240B29-F687-4f45-9708-019B960494DF}">
-                <a14:hiddenLine xmlns:a14="http://schemas.microsoft.com/office/drawing/2010/main" xmlns="" w="9525">
+                <a14:hiddenLine xmlns="" xmlns:a14="http://schemas.microsoft.com/office/drawing/2010/main" w="9525">
                   <a:solidFill>
                     <a:srgbClr val="000000"/>
                   </a:solidFill>
@@ -1473,7 +1469,7 @@
             </a:ln>
             <a:extLst>
               <a:ext uri="{91240B29-F687-4f45-9708-019B960494DF}">
-                <a14:hiddenLine xmlns:a14="http://schemas.microsoft.com/office/drawing/2010/main" xmlns="" w="9525">
+                <a14:hiddenLine xmlns="" xmlns:a14="http://schemas.microsoft.com/office/drawing/2010/main" w="9525">
                   <a:solidFill>
                     <a:srgbClr val="000000"/>
                   </a:solidFill>
@@ -1535,7 +1531,7 @@
             </a:ln>
             <a:extLst>
               <a:ext uri="{91240B29-F687-4f45-9708-019B960494DF}">
-                <a14:hiddenLine xmlns:a14="http://schemas.microsoft.com/office/drawing/2010/main" xmlns="" w="9525">
+                <a14:hiddenLine xmlns="" xmlns:a14="http://schemas.microsoft.com/office/drawing/2010/main" w="9525">
                   <a:solidFill>
                     <a:srgbClr val="000000"/>
                   </a:solidFill>
@@ -1625,7 +1621,7 @@
             </a:ln>
             <a:extLst>
               <a:ext uri="{91240B29-F687-4f45-9708-019B960494DF}">
-                <a14:hiddenLine xmlns:a14="http://schemas.microsoft.com/office/drawing/2010/main" xmlns="" w="9525">
+                <a14:hiddenLine xmlns="" xmlns:a14="http://schemas.microsoft.com/office/drawing/2010/main" w="9525">
                   <a:solidFill>
                     <a:srgbClr val="000000"/>
                   </a:solidFill>
@@ -1715,7 +1711,7 @@
             </a:ln>
             <a:extLst>
               <a:ext uri="{91240B29-F687-4f45-9708-019B960494DF}">
-                <a14:hiddenLine xmlns:a14="http://schemas.microsoft.com/office/drawing/2010/main" xmlns="" w="9525">
+                <a14:hiddenLine xmlns="" xmlns:a14="http://schemas.microsoft.com/office/drawing/2010/main" w="9525">
                   <a:solidFill>
                     <a:srgbClr val="000000"/>
                   </a:solidFill>
@@ -1771,7 +1767,7 @@
             </a:ln>
             <a:extLst>
               <a:ext uri="{91240B29-F687-4f45-9708-019B960494DF}">
-                <a14:hiddenLine xmlns:a14="http://schemas.microsoft.com/office/drawing/2010/main" xmlns="" w="9525">
+                <a14:hiddenLine xmlns="" xmlns:a14="http://schemas.microsoft.com/office/drawing/2010/main" w="9525">
                   <a:solidFill>
                     <a:srgbClr val="000000"/>
                   </a:solidFill>
@@ -1861,7 +1857,7 @@
             </a:ln>
             <a:extLst>
               <a:ext uri="{91240B29-F687-4f45-9708-019B960494DF}">
-                <a14:hiddenLine xmlns:a14="http://schemas.microsoft.com/office/drawing/2010/main" xmlns="" w="9525">
+                <a14:hiddenLine xmlns="" xmlns:a14="http://schemas.microsoft.com/office/drawing/2010/main" w="9525">
                   <a:solidFill>
                     <a:srgbClr val="000000"/>
                   </a:solidFill>
@@ -1917,7 +1913,7 @@
             </a:ln>
             <a:extLst>
               <a:ext uri="{91240B29-F687-4f45-9708-019B960494DF}">
-                <a14:hiddenLine xmlns:a14="http://schemas.microsoft.com/office/drawing/2010/main" xmlns="" w="9525">
+                <a14:hiddenLine xmlns="" xmlns:a14="http://schemas.microsoft.com/office/drawing/2010/main" w="9525">
                   <a:solidFill>
                     <a:srgbClr val="000000"/>
                   </a:solidFill>
@@ -2007,7 +2003,7 @@
             </a:ln>
             <a:extLst>
               <a:ext uri="{91240B29-F687-4f45-9708-019B960494DF}">
-                <a14:hiddenLine xmlns:a14="http://schemas.microsoft.com/office/drawing/2010/main" xmlns="" w="9525">
+                <a14:hiddenLine xmlns="" xmlns:a14="http://schemas.microsoft.com/office/drawing/2010/main" w="9525">
                   <a:solidFill>
                     <a:srgbClr val="000000"/>
                   </a:solidFill>
@@ -2075,7 +2071,7 @@
             </a:ln>
             <a:extLst>
               <a:ext uri="{91240B29-F687-4f45-9708-019B960494DF}">
-                <a14:hiddenLine xmlns:a14="http://schemas.microsoft.com/office/drawing/2010/main" xmlns="" w="9525">
+                <a14:hiddenLine xmlns="" xmlns:a14="http://schemas.microsoft.com/office/drawing/2010/main" w="9525">
                   <a:solidFill>
                     <a:srgbClr val="000000"/>
                   </a:solidFill>
@@ -2165,7 +2161,7 @@
             </a:ln>
             <a:extLst>
               <a:ext uri="{91240B29-F687-4f45-9708-019B960494DF}">
-                <a14:hiddenLine xmlns:a14="http://schemas.microsoft.com/office/drawing/2010/main" xmlns="" w="9525">
+                <a14:hiddenLine xmlns="" xmlns:a14="http://schemas.microsoft.com/office/drawing/2010/main" w="9525">
                   <a:solidFill>
                     <a:srgbClr val="000000"/>
                   </a:solidFill>
@@ -2233,7 +2229,7 @@
             </a:ln>
             <a:extLst>
               <a:ext uri="{91240B29-F687-4f45-9708-019B960494DF}">
-                <a14:hiddenLine xmlns:a14="http://schemas.microsoft.com/office/drawing/2010/main" xmlns="" w="9525">
+                <a14:hiddenLine xmlns="" xmlns:a14="http://schemas.microsoft.com/office/drawing/2010/main" w="9525">
                   <a:solidFill>
                     <a:srgbClr val="000000"/>
                   </a:solidFill>
@@ -2323,7 +2319,7 @@
             </a:ln>
             <a:extLst>
               <a:ext uri="{91240B29-F687-4f45-9708-019B960494DF}">
-                <a14:hiddenLine xmlns:a14="http://schemas.microsoft.com/office/drawing/2010/main" xmlns="" w="9525">
+                <a14:hiddenLine xmlns="" xmlns:a14="http://schemas.microsoft.com/office/drawing/2010/main" w="9525">
                   <a:solidFill>
                     <a:srgbClr val="000000"/>
                   </a:solidFill>
@@ -2357,7 +2353,7 @@
             </a:ln>
             <a:extLst>
               <a:ext uri="{91240B29-F687-4f45-9708-019B960494DF}">
-                <a14:hiddenLine xmlns:a14="http://schemas.microsoft.com/office/drawing/2010/main" xmlns="" w="9525">
+                <a14:hiddenLine xmlns="" xmlns:a14="http://schemas.microsoft.com/office/drawing/2010/main" w="9525">
                   <a:solidFill>
                     <a:srgbClr val="000000"/>
                   </a:solidFill>
@@ -2447,7 +2443,7 @@
             </a:ln>
             <a:extLst>
               <a:ext uri="{91240B29-F687-4f45-9708-019B960494DF}">
-                <a14:hiddenLine xmlns:a14="http://schemas.microsoft.com/office/drawing/2010/main" xmlns="" w="9525">
+                <a14:hiddenLine xmlns="" xmlns:a14="http://schemas.microsoft.com/office/drawing/2010/main" w="9525">
                   <a:solidFill>
                     <a:srgbClr val="000000"/>
                   </a:solidFill>
@@ -2509,7 +2505,7 @@
             </a:ln>
             <a:extLst>
               <a:ext uri="{91240B29-F687-4f45-9708-019B960494DF}">
-                <a14:hiddenLine xmlns:a14="http://schemas.microsoft.com/office/drawing/2010/main" xmlns="" w="9525">
+                <a14:hiddenLine xmlns="" xmlns:a14="http://schemas.microsoft.com/office/drawing/2010/main" w="9525">
                   <a:solidFill>
                     <a:srgbClr val="000000"/>
                   </a:solidFill>
@@ -2571,7 +2567,7 @@
             </a:ln>
             <a:extLst>
               <a:ext uri="{91240B29-F687-4f45-9708-019B960494DF}">
-                <a14:hiddenLine xmlns:a14="http://schemas.microsoft.com/office/drawing/2010/main" xmlns="" w="9525">
+                <a14:hiddenLine xmlns="" xmlns:a14="http://schemas.microsoft.com/office/drawing/2010/main" w="9525">
                   <a:solidFill>
                     <a:srgbClr val="000000"/>
                   </a:solidFill>
@@ -2661,7 +2657,7 @@
             </a:ln>
             <a:extLst>
               <a:ext uri="{91240B29-F687-4f45-9708-019B960494DF}">
-                <a14:hiddenLine xmlns:a14="http://schemas.microsoft.com/office/drawing/2010/main" xmlns="" w="9525">
+                <a14:hiddenLine xmlns="" xmlns:a14="http://schemas.microsoft.com/office/drawing/2010/main" w="9525">
                   <a:solidFill>
                     <a:srgbClr val="000000"/>
                   </a:solidFill>
@@ -2729,7 +2725,7 @@
             </a:ln>
             <a:extLst>
               <a:ext uri="{91240B29-F687-4f45-9708-019B960494DF}">
-                <a14:hiddenLine xmlns:a14="http://schemas.microsoft.com/office/drawing/2010/main" xmlns="" w="9525">
+                <a14:hiddenLine xmlns="" xmlns:a14="http://schemas.microsoft.com/office/drawing/2010/main" w="9525">
                   <a:solidFill>
                     <a:srgbClr val="000000"/>
                   </a:solidFill>
@@ -2791,7 +2787,7 @@
             </a:ln>
             <a:extLst>
               <a:ext uri="{91240B29-F687-4f45-9708-019B960494DF}">
-                <a14:hiddenLine xmlns:a14="http://schemas.microsoft.com/office/drawing/2010/main" xmlns="" w="9525">
+                <a14:hiddenLine xmlns="" xmlns:a14="http://schemas.microsoft.com/office/drawing/2010/main" w="9525">
                   <a:solidFill>
                     <a:srgbClr val="000000"/>
                   </a:solidFill>
@@ -2881,7 +2877,7 @@
             </a:ln>
             <a:extLst>
               <a:ext uri="{91240B29-F687-4f45-9708-019B960494DF}">
-                <a14:hiddenLine xmlns:a14="http://schemas.microsoft.com/office/drawing/2010/main" xmlns="" w="9525">
+                <a14:hiddenLine xmlns="" xmlns:a14="http://schemas.microsoft.com/office/drawing/2010/main" w="9525">
                   <a:solidFill>
                     <a:srgbClr val="000000"/>
                   </a:solidFill>
@@ -2943,7 +2939,7 @@
             </a:ln>
             <a:extLst>
               <a:ext uri="{91240B29-F687-4f45-9708-019B960494DF}">
-                <a14:hiddenLine xmlns:a14="http://schemas.microsoft.com/office/drawing/2010/main" xmlns="" w="9525">
+                <a14:hiddenLine xmlns="" xmlns:a14="http://schemas.microsoft.com/office/drawing/2010/main" w="9525">
                   <a:solidFill>
                     <a:srgbClr val="000000"/>
                   </a:solidFill>
@@ -3033,7 +3029,7 @@
             </a:ln>
             <a:extLst>
               <a:ext uri="{91240B29-F687-4f45-9708-019B960494DF}">
-                <a14:hiddenLine xmlns:a14="http://schemas.microsoft.com/office/drawing/2010/main" xmlns="" w="9525">
+                <a14:hiddenLine xmlns="" xmlns:a14="http://schemas.microsoft.com/office/drawing/2010/main" w="9525">
                   <a:solidFill>
                     <a:srgbClr val="000000"/>
                   </a:solidFill>
@@ -3095,7 +3091,7 @@
             </a:ln>
             <a:extLst>
               <a:ext uri="{91240B29-F687-4f45-9708-019B960494DF}">
-                <a14:hiddenLine xmlns:a14="http://schemas.microsoft.com/office/drawing/2010/main" xmlns="" w="9525">
+                <a14:hiddenLine xmlns="" xmlns:a14="http://schemas.microsoft.com/office/drawing/2010/main" w="9525">
                   <a:solidFill>
                     <a:srgbClr val="000000"/>
                   </a:solidFill>
@@ -3185,7 +3181,7 @@
             </a:ln>
             <a:extLst>
               <a:ext uri="{91240B29-F687-4f45-9708-019B960494DF}">
-                <a14:hiddenLine xmlns:a14="http://schemas.microsoft.com/office/drawing/2010/main" xmlns="" w="9525">
+                <a14:hiddenLine xmlns="" xmlns:a14="http://schemas.microsoft.com/office/drawing/2010/main" w="9525">
                   <a:solidFill>
                     <a:srgbClr val="000000"/>
                   </a:solidFill>
@@ -3219,7 +3215,7 @@
             </a:ln>
             <a:extLst>
               <a:ext uri="{91240B29-F687-4f45-9708-019B960494DF}">
-                <a14:hiddenLine xmlns:a14="http://schemas.microsoft.com/office/drawing/2010/main" xmlns="" w="9525">
+                <a14:hiddenLine xmlns="" xmlns:a14="http://schemas.microsoft.com/office/drawing/2010/main" w="9525">
                   <a:solidFill>
                     <a:srgbClr val="000000"/>
                   </a:solidFill>
@@ -3284,7 +3280,7 @@
             </a:ln>
             <a:extLst>
               <a:ext uri="{91240B29-F687-4f45-9708-019B960494DF}">
-                <a14:hiddenLine xmlns:a14="http://schemas.microsoft.com/office/drawing/2010/main" xmlns="" w="9525">
+                <a14:hiddenLine xmlns="" xmlns:a14="http://schemas.microsoft.com/office/drawing/2010/main" w="9525">
                   <a:solidFill>
                     <a:srgbClr val="000000"/>
                   </a:solidFill>
@@ -3374,7 +3370,7 @@
             </a:ln>
             <a:extLst>
               <a:ext uri="{91240B29-F687-4f45-9708-019B960494DF}">
-                <a14:hiddenLine xmlns:a14="http://schemas.microsoft.com/office/drawing/2010/main" xmlns="" w="9525">
+                <a14:hiddenLine xmlns="" xmlns:a14="http://schemas.microsoft.com/office/drawing/2010/main" w="9525">
                   <a:solidFill>
                     <a:srgbClr val="000000"/>
                   </a:solidFill>
@@ -3436,7 +3432,7 @@
             </a:ln>
             <a:extLst>
               <a:ext uri="{91240B29-F687-4f45-9708-019B960494DF}">
-                <a14:hiddenLine xmlns:a14="http://schemas.microsoft.com/office/drawing/2010/main" xmlns="" w="9525">
+                <a14:hiddenLine xmlns="" xmlns:a14="http://schemas.microsoft.com/office/drawing/2010/main" w="9525">
                   <a:solidFill>
                     <a:srgbClr val="000000"/>
                   </a:solidFill>
@@ -3526,7 +3522,7 @@
             </a:ln>
             <a:extLst>
               <a:ext uri="{91240B29-F687-4f45-9708-019B960494DF}">
-                <a14:hiddenLine xmlns:a14="http://schemas.microsoft.com/office/drawing/2010/main" xmlns="" w="9525">
+                <a14:hiddenLine xmlns="" xmlns:a14="http://schemas.microsoft.com/office/drawing/2010/main" w="9525">
                   <a:solidFill>
                     <a:srgbClr val="000000"/>
                   </a:solidFill>
@@ -3616,7 +3612,7 @@
             </a:ln>
             <a:extLst>
               <a:ext uri="{91240B29-F687-4f45-9708-019B960494DF}">
-                <a14:hiddenLine xmlns:a14="http://schemas.microsoft.com/office/drawing/2010/main" xmlns="" w="9525">
+                <a14:hiddenLine xmlns="" xmlns:a14="http://schemas.microsoft.com/office/drawing/2010/main" w="9525">
                   <a:solidFill>
                     <a:srgbClr val="000000"/>
                   </a:solidFill>
@@ -3681,7 +3677,7 @@
             </a:ln>
             <a:extLst>
               <a:ext uri="{91240B29-F687-4f45-9708-019B960494DF}">
-                <a14:hiddenLine xmlns:a14="http://schemas.microsoft.com/office/drawing/2010/main" xmlns="" w="9525">
+                <a14:hiddenLine xmlns="" xmlns:a14="http://schemas.microsoft.com/office/drawing/2010/main" w="9525">
                   <a:solidFill>
                     <a:srgbClr val="000000"/>
                   </a:solidFill>
@@ -3743,7 +3739,7 @@
             </a:ln>
             <a:extLst>
               <a:ext uri="{91240B29-F687-4f45-9708-019B960494DF}">
-                <a14:hiddenLine xmlns:a14="http://schemas.microsoft.com/office/drawing/2010/main" xmlns="" w="9525">
+                <a14:hiddenLine xmlns="" xmlns:a14="http://schemas.microsoft.com/office/drawing/2010/main" w="9525">
                   <a:solidFill>
                     <a:srgbClr val="000000"/>
                   </a:solidFill>
@@ -3833,7 +3829,7 @@
             </a:ln>
             <a:extLst>
               <a:ext uri="{91240B29-F687-4f45-9708-019B960494DF}">
-                <a14:hiddenLine xmlns:a14="http://schemas.microsoft.com/office/drawing/2010/main" xmlns="" w="9525">
+                <a14:hiddenLine xmlns="" xmlns:a14="http://schemas.microsoft.com/office/drawing/2010/main" w="9525">
                   <a:solidFill>
                     <a:srgbClr val="000000"/>
                   </a:solidFill>
@@ -3923,7 +3919,7 @@
             </a:ln>
             <a:extLst>
               <a:ext uri="{91240B29-F687-4f45-9708-019B960494DF}">
-                <a14:hiddenLine xmlns:a14="http://schemas.microsoft.com/office/drawing/2010/main" xmlns="" w="9525">
+                <a14:hiddenLine xmlns="" xmlns:a14="http://schemas.microsoft.com/office/drawing/2010/main" w="9525">
                   <a:solidFill>
                     <a:srgbClr val="000000"/>
                   </a:solidFill>
@@ -3985,7 +3981,7 @@
             </a:ln>
             <a:extLst>
               <a:ext uri="{91240B29-F687-4f45-9708-019B960494DF}">
-                <a14:hiddenLine xmlns:a14="http://schemas.microsoft.com/office/drawing/2010/main" xmlns="" w="9525">
+                <a14:hiddenLine xmlns="" xmlns:a14="http://schemas.microsoft.com/office/drawing/2010/main" w="9525">
                   <a:solidFill>
                     <a:srgbClr val="000000"/>
                   </a:solidFill>
@@ -4105,7 +4101,7 @@
             </a:ln>
             <a:extLst>
               <a:ext uri="{91240B29-F687-4f45-9708-019B960494DF}">
-                <a14:hiddenLine xmlns:a14="http://schemas.microsoft.com/office/drawing/2010/main" xmlns="" w="9525">
+                <a14:hiddenLine xmlns="" xmlns:a14="http://schemas.microsoft.com/office/drawing/2010/main" w="9525">
                   <a:solidFill>
                     <a:srgbClr val="000000"/>
                   </a:solidFill>
@@ -4173,7 +4169,7 @@
             </a:ln>
             <a:extLst>
               <a:ext uri="{91240B29-F687-4f45-9708-019B960494DF}">
-                <a14:hiddenLine xmlns:a14="http://schemas.microsoft.com/office/drawing/2010/main" xmlns="" w="9525">
+                <a14:hiddenLine xmlns="" xmlns:a14="http://schemas.microsoft.com/office/drawing/2010/main" w="9525">
                   <a:solidFill>
                     <a:srgbClr val="000000"/>
                   </a:solidFill>
@@ -4263,7 +4259,7 @@
             </a:ln>
             <a:extLst>
               <a:ext uri="{91240B29-F687-4f45-9708-019B960494DF}">
-                <a14:hiddenLine xmlns:a14="http://schemas.microsoft.com/office/drawing/2010/main" xmlns="" w="9525">
+                <a14:hiddenLine xmlns="" xmlns:a14="http://schemas.microsoft.com/office/drawing/2010/main" w="9525">
                   <a:solidFill>
                     <a:srgbClr val="000000"/>
                   </a:solidFill>
@@ -4403,7 +4399,7 @@
           <a:p>
             <a:fld id="{99FB56CE-62CC-47B4-A280-D33BC8BCBDFC}" type="datetimeFigureOut">
               <a:rPr lang="en-CA" smtClean="0"/>
-              <a:t>2018-04-07</a:t>
+              <a:t>2018-04-11</a:t>
             </a:fld>
             <a:endParaRPr lang="en-CA"/>
           </a:p>
@@ -4670,7 +4666,7 @@
           <a:p>
             <a:fld id="{99FB56CE-62CC-47B4-A280-D33BC8BCBDFC}" type="datetimeFigureOut">
               <a:rPr lang="en-CA" smtClean="0"/>
-              <a:t>2018-04-07</a:t>
+              <a:t>2018-04-11</a:t>
             </a:fld>
             <a:endParaRPr lang="en-CA"/>
           </a:p>
@@ -4866,7 +4862,7 @@
           <a:p>
             <a:fld id="{99FB56CE-62CC-47B4-A280-D33BC8BCBDFC}" type="datetimeFigureOut">
               <a:rPr lang="en-CA" smtClean="0"/>
-              <a:t>2018-04-07</a:t>
+              <a:t>2018-04-11</a:t>
             </a:fld>
             <a:endParaRPr lang="en-CA"/>
           </a:p>
@@ -5129,7 +5125,7 @@
           <a:p>
             <a:fld id="{99FB56CE-62CC-47B4-A280-D33BC8BCBDFC}" type="datetimeFigureOut">
               <a:rPr lang="en-CA" smtClean="0"/>
-              <a:t>2018-04-07</a:t>
+              <a:t>2018-04-11</a:t>
             </a:fld>
             <a:endParaRPr lang="en-CA"/>
           </a:p>
@@ -5563,7 +5559,7 @@
           <a:p>
             <a:fld id="{99FB56CE-62CC-47B4-A280-D33BC8BCBDFC}" type="datetimeFigureOut">
               <a:rPr lang="en-CA" smtClean="0"/>
-              <a:t>2018-04-07</a:t>
+              <a:t>2018-04-11</a:t>
             </a:fld>
             <a:endParaRPr lang="en-CA"/>
           </a:p>
@@ -6109,7 +6105,7 @@
           <a:p>
             <a:fld id="{99FB56CE-62CC-47B4-A280-D33BC8BCBDFC}" type="datetimeFigureOut">
               <a:rPr lang="en-CA" smtClean="0"/>
-              <a:t>2018-04-07</a:t>
+              <a:t>2018-04-11</a:t>
             </a:fld>
             <a:endParaRPr lang="en-CA"/>
           </a:p>
@@ -6829,7 +6825,7 @@
           <a:p>
             <a:fld id="{99FB56CE-62CC-47B4-A280-D33BC8BCBDFC}" type="datetimeFigureOut">
               <a:rPr lang="en-CA" smtClean="0"/>
-              <a:t>2018-04-07</a:t>
+              <a:t>2018-04-11</a:t>
             </a:fld>
             <a:endParaRPr lang="en-CA"/>
           </a:p>
@@ -6999,7 +6995,7 @@
           <a:p>
             <a:fld id="{99FB56CE-62CC-47B4-A280-D33BC8BCBDFC}" type="datetimeFigureOut">
               <a:rPr lang="en-CA" smtClean="0"/>
-              <a:t>2018-04-07</a:t>
+              <a:t>2018-04-11</a:t>
             </a:fld>
             <a:endParaRPr lang="en-CA"/>
           </a:p>
@@ -7179,7 +7175,7 @@
           <a:p>
             <a:fld id="{99FB56CE-62CC-47B4-A280-D33BC8BCBDFC}" type="datetimeFigureOut">
               <a:rPr lang="en-CA" smtClean="0"/>
-              <a:t>2018-04-07</a:t>
+              <a:t>2018-04-11</a:t>
             </a:fld>
             <a:endParaRPr lang="en-CA"/>
           </a:p>
@@ -7349,7 +7345,7 @@
           <a:p>
             <a:fld id="{99FB56CE-62CC-47B4-A280-D33BC8BCBDFC}" type="datetimeFigureOut">
               <a:rPr lang="en-CA" smtClean="0"/>
-              <a:t>2018-04-07</a:t>
+              <a:t>2018-04-11</a:t>
             </a:fld>
             <a:endParaRPr lang="en-CA"/>
           </a:p>
@@ -7599,7 +7595,7 @@
           <a:p>
             <a:fld id="{99FB56CE-62CC-47B4-A280-D33BC8BCBDFC}" type="datetimeFigureOut">
               <a:rPr lang="en-CA" smtClean="0"/>
-              <a:t>2018-04-07</a:t>
+              <a:t>2018-04-11</a:t>
             </a:fld>
             <a:endParaRPr lang="en-CA"/>
           </a:p>
@@ -7831,7 +7827,7 @@
           <a:p>
             <a:fld id="{99FB56CE-62CC-47B4-A280-D33BC8BCBDFC}" type="datetimeFigureOut">
               <a:rPr lang="en-CA" smtClean="0"/>
-              <a:t>2018-04-07</a:t>
+              <a:t>2018-04-11</a:t>
             </a:fld>
             <a:endParaRPr lang="en-CA"/>
           </a:p>
@@ -8212,7 +8208,7 @@
           <a:p>
             <a:fld id="{99FB56CE-62CC-47B4-A280-D33BC8BCBDFC}" type="datetimeFigureOut">
               <a:rPr lang="en-CA" smtClean="0"/>
-              <a:t>2018-04-07</a:t>
+              <a:t>2018-04-11</a:t>
             </a:fld>
             <a:endParaRPr lang="en-CA"/>
           </a:p>
@@ -8330,7 +8326,7 @@
           <a:p>
             <a:fld id="{99FB56CE-62CC-47B4-A280-D33BC8BCBDFC}" type="datetimeFigureOut">
               <a:rPr lang="en-CA" smtClean="0"/>
-              <a:t>2018-04-07</a:t>
+              <a:t>2018-04-11</a:t>
             </a:fld>
             <a:endParaRPr lang="en-CA"/>
           </a:p>
@@ -8425,7 +8421,7 @@
           <a:p>
             <a:fld id="{99FB56CE-62CC-47B4-A280-D33BC8BCBDFC}" type="datetimeFigureOut">
               <a:rPr lang="en-CA" smtClean="0"/>
-              <a:t>2018-04-07</a:t>
+              <a:t>2018-04-11</a:t>
             </a:fld>
             <a:endParaRPr lang="en-CA"/>
           </a:p>
@@ -8674,7 +8670,7 @@
           <a:p>
             <a:fld id="{99FB56CE-62CC-47B4-A280-D33BC8BCBDFC}" type="datetimeFigureOut">
               <a:rPr lang="en-CA" smtClean="0"/>
-              <a:t>2018-04-07</a:t>
+              <a:t>2018-04-11</a:t>
             </a:fld>
             <a:endParaRPr lang="en-CA"/>
           </a:p>
@@ -8954,7 +8950,7 @@
           <a:p>
             <a:fld id="{99FB56CE-62CC-47B4-A280-D33BC8BCBDFC}" type="datetimeFigureOut">
               <a:rPr lang="en-CA" smtClean="0"/>
-              <a:t>2018-04-07</a:t>
+              <a:t>2018-04-11</a:t>
             </a:fld>
             <a:endParaRPr lang="en-CA"/>
           </a:p>
@@ -9070,7 +9066,7 @@
           <a:noFill/>
           <a:extLst>
             <a:ext uri="{909E8E84-426E-40dd-AFC4-6F175D3DCCD1}">
-              <a14:hiddenFill xmlns:a14="http://schemas.microsoft.com/office/drawing/2010/main" xmlns="">
+              <a14:hiddenFill xmlns="" xmlns:a14="http://schemas.microsoft.com/office/drawing/2010/main">
                 <a:solidFill>
                   <a:srgbClr val="FFFFFF"/>
                 </a:solidFill>
@@ -9144,7 +9140,7 @@
               </a:ln>
               <a:extLst>
                 <a:ext uri="{91240B29-F687-4f45-9708-019B960494DF}">
-                  <a14:hiddenLine xmlns:a14="http://schemas.microsoft.com/office/drawing/2010/main" xmlns="" w="9525">
+                  <a14:hiddenLine xmlns="" xmlns:a14="http://schemas.microsoft.com/office/drawing/2010/main" w="9525">
                     <a:solidFill>
                       <a:srgbClr val="000000"/>
                     </a:solidFill>
@@ -9234,7 +9230,7 @@
               </a:ln>
               <a:extLst>
                 <a:ext uri="{91240B29-F687-4f45-9708-019B960494DF}">
-                  <a14:hiddenLine xmlns:a14="http://schemas.microsoft.com/office/drawing/2010/main" xmlns="" w="9525">
+                  <a14:hiddenLine xmlns="" xmlns:a14="http://schemas.microsoft.com/office/drawing/2010/main" w="9525">
                     <a:solidFill>
                       <a:srgbClr val="000000"/>
                     </a:solidFill>
@@ -9324,7 +9320,7 @@
               </a:ln>
               <a:extLst>
                 <a:ext uri="{91240B29-F687-4f45-9708-019B960494DF}">
-                  <a14:hiddenLine xmlns:a14="http://schemas.microsoft.com/office/drawing/2010/main" xmlns="" w="9525">
+                  <a14:hiddenLine xmlns="" xmlns:a14="http://schemas.microsoft.com/office/drawing/2010/main" w="9525">
                     <a:solidFill>
                       <a:srgbClr val="000000"/>
                     </a:solidFill>
@@ -9386,7 +9382,7 @@
               </a:ln>
               <a:extLst>
                 <a:ext uri="{91240B29-F687-4f45-9708-019B960494DF}">
-                  <a14:hiddenLine xmlns:a14="http://schemas.microsoft.com/office/drawing/2010/main" xmlns="" w="9525">
+                  <a14:hiddenLine xmlns="" xmlns:a14="http://schemas.microsoft.com/office/drawing/2010/main" w="9525">
                     <a:solidFill>
                       <a:srgbClr val="000000"/>
                     </a:solidFill>
@@ -9476,7 +9472,7 @@
               </a:ln>
               <a:extLst>
                 <a:ext uri="{91240B29-F687-4f45-9708-019B960494DF}">
-                  <a14:hiddenLine xmlns:a14="http://schemas.microsoft.com/office/drawing/2010/main" xmlns="" w="9525">
+                  <a14:hiddenLine xmlns="" xmlns:a14="http://schemas.microsoft.com/office/drawing/2010/main" w="9525">
                     <a:solidFill>
                       <a:srgbClr val="000000"/>
                     </a:solidFill>
@@ -9538,7 +9534,7 @@
               </a:ln>
               <a:extLst>
                 <a:ext uri="{91240B29-F687-4f45-9708-019B960494DF}">
-                  <a14:hiddenLine xmlns:a14="http://schemas.microsoft.com/office/drawing/2010/main" xmlns="" w="9525">
+                  <a14:hiddenLine xmlns="" xmlns:a14="http://schemas.microsoft.com/office/drawing/2010/main" w="9525">
                     <a:solidFill>
                       <a:srgbClr val="000000"/>
                     </a:solidFill>
@@ -9600,7 +9596,7 @@
               </a:ln>
               <a:extLst>
                 <a:ext uri="{91240B29-F687-4f45-9708-019B960494DF}">
-                  <a14:hiddenLine xmlns:a14="http://schemas.microsoft.com/office/drawing/2010/main" xmlns="" w="9525">
+                  <a14:hiddenLine xmlns="" xmlns:a14="http://schemas.microsoft.com/office/drawing/2010/main" w="9525">
                     <a:solidFill>
                       <a:srgbClr val="000000"/>
                     </a:solidFill>
@@ -9690,7 +9686,7 @@
               </a:ln>
               <a:extLst>
                 <a:ext uri="{91240B29-F687-4f45-9708-019B960494DF}">
-                  <a14:hiddenLine xmlns:a14="http://schemas.microsoft.com/office/drawing/2010/main" xmlns="" w="9525">
+                  <a14:hiddenLine xmlns="" xmlns:a14="http://schemas.microsoft.com/office/drawing/2010/main" w="9525">
                     <a:solidFill>
                       <a:srgbClr val="000000"/>
                     </a:solidFill>
@@ -9780,7 +9776,7 @@
               </a:ln>
               <a:extLst>
                 <a:ext uri="{91240B29-F687-4f45-9708-019B960494DF}">
-                  <a14:hiddenLine xmlns:a14="http://schemas.microsoft.com/office/drawing/2010/main" xmlns="" w="9525">
+                  <a14:hiddenLine xmlns="" xmlns:a14="http://schemas.microsoft.com/office/drawing/2010/main" w="9525">
                     <a:solidFill>
                       <a:srgbClr val="000000"/>
                     </a:solidFill>
@@ -9842,7 +9838,7 @@
               </a:ln>
               <a:extLst>
                 <a:ext uri="{91240B29-F687-4f45-9708-019B960494DF}">
-                  <a14:hiddenLine xmlns:a14="http://schemas.microsoft.com/office/drawing/2010/main" xmlns="" w="9525">
+                  <a14:hiddenLine xmlns="" xmlns:a14="http://schemas.microsoft.com/office/drawing/2010/main" w="9525">
                     <a:solidFill>
                       <a:srgbClr val="000000"/>
                     </a:solidFill>
@@ -9952,7 +9948,7 @@
               </a:ln>
               <a:extLst>
                 <a:ext uri="{91240B29-F687-4f45-9708-019B960494DF}">
-                  <a14:hiddenLine xmlns:a14="http://schemas.microsoft.com/office/drawing/2010/main" xmlns="" w="9525">
+                  <a14:hiddenLine xmlns="" xmlns:a14="http://schemas.microsoft.com/office/drawing/2010/main" w="9525">
                     <a:solidFill>
                       <a:srgbClr val="000000"/>
                     </a:solidFill>
@@ -10036,7 +10032,7 @@
               </a:ln>
               <a:extLst>
                 <a:ext uri="{91240B29-F687-4f45-9708-019B960494DF}">
-                  <a14:hiddenLine xmlns:a14="http://schemas.microsoft.com/office/drawing/2010/main" xmlns="" w="9525">
+                  <a14:hiddenLine xmlns="" xmlns:a14="http://schemas.microsoft.com/office/drawing/2010/main" w="9525">
                     <a:solidFill>
                       <a:srgbClr val="000000"/>
                     </a:solidFill>
@@ -10098,7 +10094,7 @@
               </a:ln>
               <a:extLst>
                 <a:ext uri="{91240B29-F687-4f45-9708-019B960494DF}">
-                  <a14:hiddenLine xmlns:a14="http://schemas.microsoft.com/office/drawing/2010/main" xmlns="" w="9525">
+                  <a14:hiddenLine xmlns="" xmlns:a14="http://schemas.microsoft.com/office/drawing/2010/main" w="9525">
                     <a:solidFill>
                       <a:srgbClr val="000000"/>
                     </a:solidFill>
@@ -10160,7 +10156,7 @@
               </a:ln>
               <a:extLst>
                 <a:ext uri="{91240B29-F687-4f45-9708-019B960494DF}">
-                  <a14:hiddenLine xmlns:a14="http://schemas.microsoft.com/office/drawing/2010/main" xmlns="" w="9525">
+                  <a14:hiddenLine xmlns="" xmlns:a14="http://schemas.microsoft.com/office/drawing/2010/main" w="9525">
                     <a:solidFill>
                       <a:srgbClr val="000000"/>
                     </a:solidFill>
@@ -10250,7 +10246,7 @@
               </a:ln>
               <a:extLst>
                 <a:ext uri="{91240B29-F687-4f45-9708-019B960494DF}">
-                  <a14:hiddenLine xmlns:a14="http://schemas.microsoft.com/office/drawing/2010/main" xmlns="" w="9525">
+                  <a14:hiddenLine xmlns="" xmlns:a14="http://schemas.microsoft.com/office/drawing/2010/main" w="9525">
                     <a:solidFill>
                       <a:srgbClr val="000000"/>
                     </a:solidFill>
@@ -10284,7 +10280,7 @@
               </a:ln>
               <a:extLst>
                 <a:ext uri="{91240B29-F687-4f45-9708-019B960494DF}">
-                  <a14:hiddenLine xmlns:a14="http://schemas.microsoft.com/office/drawing/2010/main" xmlns="" w="9525">
+                  <a14:hiddenLine xmlns="" xmlns:a14="http://schemas.microsoft.com/office/drawing/2010/main" w="9525">
                     <a:solidFill>
                       <a:srgbClr val="000000"/>
                     </a:solidFill>
@@ -10349,7 +10345,7 @@
               </a:ln>
               <a:extLst>
                 <a:ext uri="{91240B29-F687-4f45-9708-019B960494DF}">
-                  <a14:hiddenLine xmlns:a14="http://schemas.microsoft.com/office/drawing/2010/main" xmlns="" w="9525">
+                  <a14:hiddenLine xmlns="" xmlns:a14="http://schemas.microsoft.com/office/drawing/2010/main" w="9525">
                     <a:solidFill>
                       <a:srgbClr val="000000"/>
                     </a:solidFill>
@@ -10439,7 +10435,7 @@
               </a:ln>
               <a:extLst>
                 <a:ext uri="{91240B29-F687-4f45-9708-019B960494DF}">
-                  <a14:hiddenLine xmlns:a14="http://schemas.microsoft.com/office/drawing/2010/main" xmlns="" w="9525">
+                  <a14:hiddenLine xmlns="" xmlns:a14="http://schemas.microsoft.com/office/drawing/2010/main" w="9525">
                     <a:solidFill>
                       <a:srgbClr val="000000"/>
                     </a:solidFill>
@@ -10501,7 +10497,7 @@
               </a:ln>
               <a:extLst>
                 <a:ext uri="{91240B29-F687-4f45-9708-019B960494DF}">
-                  <a14:hiddenLine xmlns:a14="http://schemas.microsoft.com/office/drawing/2010/main" xmlns="" w="9525">
+                  <a14:hiddenLine xmlns="" xmlns:a14="http://schemas.microsoft.com/office/drawing/2010/main" w="9525">
                     <a:solidFill>
                       <a:srgbClr val="000000"/>
                     </a:solidFill>
@@ -10591,7 +10587,7 @@
               </a:ln>
               <a:extLst>
                 <a:ext uri="{91240B29-F687-4f45-9708-019B960494DF}">
-                  <a14:hiddenLine xmlns:a14="http://schemas.microsoft.com/office/drawing/2010/main" xmlns="" w="9525">
+                  <a14:hiddenLine xmlns="" xmlns:a14="http://schemas.microsoft.com/office/drawing/2010/main" w="9525">
                     <a:solidFill>
                       <a:srgbClr val="000000"/>
                     </a:solidFill>
@@ -10656,7 +10652,7 @@
               </a:ln>
               <a:extLst>
                 <a:ext uri="{91240B29-F687-4f45-9708-019B960494DF}">
-                  <a14:hiddenLine xmlns:a14="http://schemas.microsoft.com/office/drawing/2010/main" xmlns="" w="9525">
+                  <a14:hiddenLine xmlns="" xmlns:a14="http://schemas.microsoft.com/office/drawing/2010/main" w="9525">
                     <a:solidFill>
                       <a:srgbClr val="000000"/>
                     </a:solidFill>
@@ -10718,7 +10714,7 @@
               </a:ln>
               <a:extLst>
                 <a:ext uri="{91240B29-F687-4f45-9708-019B960494DF}">
-                  <a14:hiddenLine xmlns:a14="http://schemas.microsoft.com/office/drawing/2010/main" xmlns="" w="9525">
+                  <a14:hiddenLine xmlns="" xmlns:a14="http://schemas.microsoft.com/office/drawing/2010/main" w="9525">
                     <a:solidFill>
                       <a:srgbClr val="000000"/>
                     </a:solidFill>
@@ -10808,7 +10804,7 @@
               </a:ln>
               <a:extLst>
                 <a:ext uri="{91240B29-F687-4f45-9708-019B960494DF}">
-                  <a14:hiddenLine xmlns:a14="http://schemas.microsoft.com/office/drawing/2010/main" xmlns="" w="9525">
+                  <a14:hiddenLine xmlns="" xmlns:a14="http://schemas.microsoft.com/office/drawing/2010/main" w="9525">
                     <a:solidFill>
                       <a:srgbClr val="000000"/>
                     </a:solidFill>
@@ -10898,7 +10894,7 @@
               </a:ln>
               <a:extLst>
                 <a:ext uri="{91240B29-F687-4f45-9708-019B960494DF}">
-                  <a14:hiddenLine xmlns:a14="http://schemas.microsoft.com/office/drawing/2010/main" xmlns="" w="9525">
+                  <a14:hiddenLine xmlns="" xmlns:a14="http://schemas.microsoft.com/office/drawing/2010/main" w="9525">
                     <a:solidFill>
                       <a:srgbClr val="000000"/>
                     </a:solidFill>
@@ -10963,7 +10959,7 @@
               </a:ln>
               <a:extLst>
                 <a:ext uri="{91240B29-F687-4f45-9708-019B960494DF}">
-                  <a14:hiddenLine xmlns:a14="http://schemas.microsoft.com/office/drawing/2010/main" xmlns="" w="9525">
+                  <a14:hiddenLine xmlns="" xmlns:a14="http://schemas.microsoft.com/office/drawing/2010/main" w="9525">
                     <a:solidFill>
                       <a:srgbClr val="000000"/>
                     </a:solidFill>
@@ -11083,7 +11079,7 @@
               </a:ln>
               <a:extLst>
                 <a:ext uri="{91240B29-F687-4f45-9708-019B960494DF}">
-                  <a14:hiddenLine xmlns:a14="http://schemas.microsoft.com/office/drawing/2010/main" xmlns="" w="9525">
+                  <a14:hiddenLine xmlns="" xmlns:a14="http://schemas.microsoft.com/office/drawing/2010/main" w="9525">
                     <a:solidFill>
                       <a:srgbClr val="000000"/>
                     </a:solidFill>
@@ -11181,7 +11177,7 @@
               </a:ln>
               <a:extLst>
                 <a:ext uri="{91240B29-F687-4f45-9708-019B960494DF}">
-                  <a14:hiddenLine xmlns:a14="http://schemas.microsoft.com/office/drawing/2010/main" xmlns="" w="9525">
+                  <a14:hiddenLine xmlns="" xmlns:a14="http://schemas.microsoft.com/office/drawing/2010/main" w="9525">
                     <a:solidFill>
                       <a:srgbClr val="000000"/>
                     </a:solidFill>
@@ -11296,7 +11292,7 @@
               </a:ln>
               <a:extLst>
                 <a:ext uri="{91240B29-F687-4f45-9708-019B960494DF}">
-                  <a14:hiddenLine xmlns:a14="http://schemas.microsoft.com/office/drawing/2010/main" xmlns="" w="9525">
+                  <a14:hiddenLine xmlns="" xmlns:a14="http://schemas.microsoft.com/office/drawing/2010/main" w="9525">
                     <a:solidFill>
                       <a:srgbClr val="000000"/>
                     </a:solidFill>
@@ -11386,7 +11382,7 @@
               </a:ln>
               <a:extLst>
                 <a:ext uri="{91240B29-F687-4f45-9708-019B960494DF}">
-                  <a14:hiddenLine xmlns:a14="http://schemas.microsoft.com/office/drawing/2010/main" xmlns="" w="9525">
+                  <a14:hiddenLine xmlns="" xmlns:a14="http://schemas.microsoft.com/office/drawing/2010/main" w="9525">
                     <a:solidFill>
                       <a:srgbClr val="000000"/>
                     </a:solidFill>
@@ -11451,7 +11447,7 @@
               </a:ln>
               <a:extLst>
                 <a:ext uri="{91240B29-F687-4f45-9708-019B960494DF}">
-                  <a14:hiddenLine xmlns:a14="http://schemas.microsoft.com/office/drawing/2010/main" xmlns="" w="9525">
+                  <a14:hiddenLine xmlns="" xmlns:a14="http://schemas.microsoft.com/office/drawing/2010/main" w="9525">
                     <a:solidFill>
                       <a:srgbClr val="000000"/>
                     </a:solidFill>
@@ -11541,7 +11537,7 @@
               </a:ln>
               <a:extLst>
                 <a:ext uri="{91240B29-F687-4f45-9708-019B960494DF}">
-                  <a14:hiddenLine xmlns:a14="http://schemas.microsoft.com/office/drawing/2010/main" xmlns="" w="9525">
+                  <a14:hiddenLine xmlns="" xmlns:a14="http://schemas.microsoft.com/office/drawing/2010/main" w="9525">
                     <a:solidFill>
                       <a:srgbClr val="000000"/>
                     </a:solidFill>
@@ -11609,7 +11605,7 @@
               </a:ln>
               <a:extLst>
                 <a:ext uri="{91240B29-F687-4f45-9708-019B960494DF}">
-                  <a14:hiddenLine xmlns:a14="http://schemas.microsoft.com/office/drawing/2010/main" xmlns="" w="9525">
+                  <a14:hiddenLine xmlns="" xmlns:a14="http://schemas.microsoft.com/office/drawing/2010/main" w="9525">
                     <a:solidFill>
                       <a:srgbClr val="000000"/>
                     </a:solidFill>
@@ -11699,7 +11695,7 @@
               </a:ln>
               <a:extLst>
                 <a:ext uri="{91240B29-F687-4f45-9708-019B960494DF}">
-                  <a14:hiddenLine xmlns:a14="http://schemas.microsoft.com/office/drawing/2010/main" xmlns="" w="9525">
+                  <a14:hiddenLine xmlns="" xmlns:a14="http://schemas.microsoft.com/office/drawing/2010/main" w="9525">
                     <a:solidFill>
                       <a:srgbClr val="000000"/>
                     </a:solidFill>
@@ -11767,7 +11763,7 @@
               </a:ln>
               <a:extLst>
                 <a:ext uri="{91240B29-F687-4f45-9708-019B960494DF}">
-                  <a14:hiddenLine xmlns:a14="http://schemas.microsoft.com/office/drawing/2010/main" xmlns="" w="9525">
+                  <a14:hiddenLine xmlns="" xmlns:a14="http://schemas.microsoft.com/office/drawing/2010/main" w="9525">
                     <a:solidFill>
                       <a:srgbClr val="000000"/>
                     </a:solidFill>
@@ -11857,7 +11853,7 @@
               </a:ln>
               <a:extLst>
                 <a:ext uri="{91240B29-F687-4f45-9708-019B960494DF}">
-                  <a14:hiddenLine xmlns:a14="http://schemas.microsoft.com/office/drawing/2010/main" xmlns="" w="9525">
+                  <a14:hiddenLine xmlns="" xmlns:a14="http://schemas.microsoft.com/office/drawing/2010/main" w="9525">
                     <a:solidFill>
                       <a:srgbClr val="000000"/>
                     </a:solidFill>
@@ -11891,7 +11887,7 @@
               </a:ln>
               <a:extLst>
                 <a:ext uri="{91240B29-F687-4f45-9708-019B960494DF}">
-                  <a14:hiddenLine xmlns:a14="http://schemas.microsoft.com/office/drawing/2010/main" xmlns="" w="9525">
+                  <a14:hiddenLine xmlns="" xmlns:a14="http://schemas.microsoft.com/office/drawing/2010/main" w="9525">
                     <a:solidFill>
                       <a:srgbClr val="000000"/>
                     </a:solidFill>
@@ -12031,7 +12027,7 @@
           <a:p>
             <a:fld id="{99FB56CE-62CC-47B4-A280-D33BC8BCBDFC}" type="datetimeFigureOut">
               <a:rPr lang="en-CA" smtClean="0"/>
-              <a:t>2018-04-07</a:t>
+              <a:t>2018-04-11</a:t>
             </a:fld>
             <a:endParaRPr lang="en-CA"/>
           </a:p>
@@ -12585,322 +12581,6 @@
           <p:cNvPr id="2" name="Title 1">
             <a:extLst>
               <a:ext uri="{FF2B5EF4-FFF2-40B4-BE49-F238E27FC236}">
-                <a16:creationId xmlns:a16="http://schemas.microsoft.com/office/drawing/2014/main" id="{B5A5B0C2-8D5C-4201-B191-F45AA35AB8A2}"/>
-              </a:ext>
-            </a:extLst>
-          </p:cNvPr>
-          <p:cNvSpPr>
-            <a:spLocks noGrp="1"/>
-          </p:cNvSpPr>
-          <p:nvPr>
-            <p:ph type="title"/>
-          </p:nvPr>
-        </p:nvSpPr>
-        <p:spPr/>
-        <p:txBody>
-          <a:bodyPr/>
-          <a:lstStyle/>
-          <a:p>
-            <a:r>
-              <a:rPr lang="en-CA" dirty="0"/>
-              <a:t>Refactor review</a:t>
-            </a:r>
-          </a:p>
-        </p:txBody>
-      </p:sp>
-      <p:sp>
-        <p:nvSpPr>
-          <p:cNvPr id="3" name="Content Placeholder 2">
-            <a:extLst>
-              <a:ext uri="{FF2B5EF4-FFF2-40B4-BE49-F238E27FC236}">
-                <a16:creationId xmlns:a16="http://schemas.microsoft.com/office/drawing/2014/main" id="{C4208F60-4C04-44B3-8DD9-7B96F37D8F13}"/>
-              </a:ext>
-            </a:extLst>
-          </p:cNvPr>
-          <p:cNvSpPr>
-            <a:spLocks noGrp="1"/>
-          </p:cNvSpPr>
-          <p:nvPr>
-            <p:ph idx="1"/>
-          </p:nvPr>
-        </p:nvSpPr>
-        <p:spPr/>
-        <p:txBody>
-          <a:bodyPr/>
-          <a:lstStyle/>
-          <a:p>
-            <a:pPr marL="0" indent="0">
-              <a:buNone/>
-            </a:pPr>
-            <a:r>
-              <a:rPr lang="en-CA" dirty="0"/>
-              <a:t>Code For Application</a:t>
-            </a:r>
-          </a:p>
-          <a:p>
-            <a:r>
-              <a:rPr lang="en-CA" dirty="0" err="1"/>
-              <a:t>sdsdsd</a:t>
-            </a:r>
-            <a:endParaRPr lang="en-CA" dirty="0"/>
-          </a:p>
-        </p:txBody>
-      </p:sp>
-    </p:spTree>
-    <p:extLst>
-      <p:ext uri="{BB962C8B-B14F-4D97-AF65-F5344CB8AC3E}">
-        <p14:creationId xmlns:p14="http://schemas.microsoft.com/office/powerpoint/2010/main" val="3958323764"/>
-      </p:ext>
-    </p:extLst>
-  </p:cSld>
-  <p:clrMapOvr>
-    <a:masterClrMapping/>
-  </p:clrMapOvr>
-</p:sld>
-</file>
-
-<file path=ppt/slides/slide11.xml><?xml version="1.0" encoding="utf-8"?>
-<p:sld xmlns:a="http://schemas.openxmlformats.org/drawingml/2006/main" xmlns:r="http://schemas.openxmlformats.org/officeDocument/2006/relationships" xmlns:p="http://schemas.openxmlformats.org/presentationml/2006/main">
-  <p:cSld>
-    <p:spTree>
-      <p:nvGrpSpPr>
-        <p:cNvPr id="1" name=""/>
-        <p:cNvGrpSpPr/>
-        <p:nvPr/>
-      </p:nvGrpSpPr>
-      <p:grpSpPr>
-        <a:xfrm>
-          <a:off x="0" y="0"/>
-          <a:ext cx="0" cy="0"/>
-          <a:chOff x="0" y="0"/>
-          <a:chExt cx="0" cy="0"/>
-        </a:xfrm>
-      </p:grpSpPr>
-      <p:sp>
-        <p:nvSpPr>
-          <p:cNvPr id="2" name="Title 1">
-            <a:extLst>
-              <a:ext uri="{FF2B5EF4-FFF2-40B4-BE49-F238E27FC236}">
-                <a16:creationId xmlns:a16="http://schemas.microsoft.com/office/drawing/2014/main" id="{EB0AE8D7-ADA3-47BF-A679-B814DC82D735}"/>
-              </a:ext>
-            </a:extLst>
-          </p:cNvPr>
-          <p:cNvSpPr>
-            <a:spLocks noGrp="1"/>
-          </p:cNvSpPr>
-          <p:nvPr>
-            <p:ph type="title"/>
-          </p:nvPr>
-        </p:nvSpPr>
-        <p:spPr/>
-        <p:txBody>
-          <a:bodyPr/>
-          <a:lstStyle/>
-          <a:p>
-            <a:r>
-              <a:rPr lang="en-CA" dirty="0"/>
-              <a:t>Refactor review</a:t>
-            </a:r>
-          </a:p>
-        </p:txBody>
-      </p:sp>
-      <p:sp>
-        <p:nvSpPr>
-          <p:cNvPr id="3" name="Content Placeholder 2">
-            <a:extLst>
-              <a:ext uri="{FF2B5EF4-FFF2-40B4-BE49-F238E27FC236}">
-                <a16:creationId xmlns:a16="http://schemas.microsoft.com/office/drawing/2014/main" id="{CBC82DFA-DAA5-4A6D-BCB2-17E5FD1E5813}"/>
-              </a:ext>
-            </a:extLst>
-          </p:cNvPr>
-          <p:cNvSpPr>
-            <a:spLocks noGrp="1"/>
-          </p:cNvSpPr>
-          <p:nvPr>
-            <p:ph idx="1"/>
-          </p:nvPr>
-        </p:nvSpPr>
-        <p:spPr/>
-        <p:txBody>
-          <a:bodyPr/>
-          <a:lstStyle/>
-          <a:p>
-            <a:pPr marL="0" indent="0">
-              <a:buNone/>
-            </a:pPr>
-            <a:r>
-              <a:rPr lang="en-CA" dirty="0"/>
-              <a:t>Code Smells</a:t>
-            </a:r>
-          </a:p>
-          <a:p>
-            <a:r>
-              <a:rPr lang="en-CA" dirty="0" err="1"/>
-              <a:t>jh</a:t>
-            </a:r>
-            <a:endParaRPr lang="en-CA" dirty="0"/>
-          </a:p>
-        </p:txBody>
-      </p:sp>
-    </p:spTree>
-    <p:extLst>
-      <p:ext uri="{BB962C8B-B14F-4D97-AF65-F5344CB8AC3E}">
-        <p14:creationId xmlns:p14="http://schemas.microsoft.com/office/powerpoint/2010/main" val="2243034424"/>
-      </p:ext>
-    </p:extLst>
-  </p:cSld>
-  <p:clrMapOvr>
-    <a:masterClrMapping/>
-  </p:clrMapOvr>
-</p:sld>
-</file>
-
-<file path=ppt/slides/slide12.xml><?xml version="1.0" encoding="utf-8"?>
-<p:sld xmlns:a="http://schemas.openxmlformats.org/drawingml/2006/main" xmlns:r="http://schemas.openxmlformats.org/officeDocument/2006/relationships" xmlns:p="http://schemas.openxmlformats.org/presentationml/2006/main">
-  <p:cSld>
-    <p:spTree>
-      <p:nvGrpSpPr>
-        <p:cNvPr id="1" name=""/>
-        <p:cNvGrpSpPr/>
-        <p:nvPr/>
-      </p:nvGrpSpPr>
-      <p:grpSpPr>
-        <a:xfrm>
-          <a:off x="0" y="0"/>
-          <a:ext cx="0" cy="0"/>
-          <a:chOff x="0" y="0"/>
-          <a:chExt cx="0" cy="0"/>
-        </a:xfrm>
-      </p:grpSpPr>
-      <p:sp>
-        <p:nvSpPr>
-          <p:cNvPr id="2" name="Title 1">
-            <a:extLst>
-              <a:ext uri="{FF2B5EF4-FFF2-40B4-BE49-F238E27FC236}">
-                <a16:creationId xmlns:a16="http://schemas.microsoft.com/office/drawing/2014/main" id="{AD06EE58-4AF6-44A7-AA22-F8556EDA26A0}"/>
-              </a:ext>
-            </a:extLst>
-          </p:cNvPr>
-          <p:cNvSpPr>
-            <a:spLocks noGrp="1"/>
-          </p:cNvSpPr>
-          <p:nvPr>
-            <p:ph type="title"/>
-          </p:nvPr>
-        </p:nvSpPr>
-        <p:spPr/>
-        <p:txBody>
-          <a:bodyPr/>
-          <a:lstStyle/>
-          <a:p>
-            <a:r>
-              <a:rPr lang="en-US" altLang="en-US" dirty="0"/>
-              <a:t>Design pattern discussion (High-level focus)</a:t>
-            </a:r>
-            <a:endParaRPr lang="en-CA" dirty="0"/>
-          </a:p>
-        </p:txBody>
-      </p:sp>
-      <p:sp>
-        <p:nvSpPr>
-          <p:cNvPr id="3" name="Content Placeholder 2">
-            <a:extLst>
-              <a:ext uri="{FF2B5EF4-FFF2-40B4-BE49-F238E27FC236}">
-                <a16:creationId xmlns:a16="http://schemas.microsoft.com/office/drawing/2014/main" id="{448F4072-6D68-4CE4-B46A-A7709DB26F94}"/>
-              </a:ext>
-            </a:extLst>
-          </p:cNvPr>
-          <p:cNvSpPr>
-            <a:spLocks noGrp="1"/>
-          </p:cNvSpPr>
-          <p:nvPr>
-            <p:ph idx="1"/>
-          </p:nvPr>
-        </p:nvSpPr>
-        <p:spPr/>
-        <p:txBody>
-          <a:bodyPr/>
-          <a:lstStyle/>
-          <a:p>
-            <a:r>
-              <a:rPr lang="en-US" altLang="en-US" dirty="0"/>
-              <a:t>Comment on what design patterns the team used</a:t>
-            </a:r>
-          </a:p>
-          <a:p>
-            <a:pPr lvl="1"/>
-            <a:r>
-              <a:rPr lang="en-US" altLang="en-US" dirty="0"/>
-              <a:t>Provide samples where you are able</a:t>
-            </a:r>
-          </a:p>
-          <a:p>
-            <a:pPr lvl="2"/>
-            <a:r>
-              <a:rPr lang="en-US" altLang="en-US" dirty="0"/>
-              <a:t>Were they appropriate?</a:t>
-            </a:r>
-          </a:p>
-          <a:p>
-            <a:pPr lvl="2"/>
-            <a:r>
-              <a:rPr lang="en-US" altLang="en-US" dirty="0"/>
-              <a:t>Were there alternatives they could have also used?</a:t>
-            </a:r>
-          </a:p>
-          <a:p>
-            <a:r>
-              <a:rPr lang="en-US" altLang="en-US" dirty="0"/>
-              <a:t>If they didn’t use any Design Patterns, were there ones they could have tried?</a:t>
-            </a:r>
-          </a:p>
-          <a:p>
-            <a:pPr lvl="1"/>
-            <a:r>
-              <a:rPr lang="en-US" altLang="en-US" dirty="0"/>
-              <a:t>Provide samples/code snippets/areas of the code</a:t>
-            </a:r>
-          </a:p>
-          <a:p>
-            <a:endParaRPr lang="en-CA" dirty="0"/>
-          </a:p>
-        </p:txBody>
-      </p:sp>
-    </p:spTree>
-    <p:extLst>
-      <p:ext uri="{BB962C8B-B14F-4D97-AF65-F5344CB8AC3E}">
-        <p14:creationId xmlns:p14="http://schemas.microsoft.com/office/powerpoint/2010/main" val="1421288843"/>
-      </p:ext>
-    </p:extLst>
-  </p:cSld>
-  <p:clrMapOvr>
-    <a:masterClrMapping/>
-  </p:clrMapOvr>
-</p:sld>
-</file>
-
-<file path=ppt/slides/slide13.xml><?xml version="1.0" encoding="utf-8"?>
-<p:sld xmlns:a="http://schemas.openxmlformats.org/drawingml/2006/main" xmlns:r="http://schemas.openxmlformats.org/officeDocument/2006/relationships" xmlns:p="http://schemas.openxmlformats.org/presentationml/2006/main">
-  <p:cSld>
-    <p:spTree>
-      <p:nvGrpSpPr>
-        <p:cNvPr id="1" name=""/>
-        <p:cNvGrpSpPr/>
-        <p:nvPr/>
-      </p:nvGrpSpPr>
-      <p:grpSpPr>
-        <a:xfrm>
-          <a:off x="0" y="0"/>
-          <a:ext cx="0" cy="0"/>
-          <a:chOff x="0" y="0"/>
-          <a:chExt cx="0" cy="0"/>
-        </a:xfrm>
-      </p:grpSpPr>
-      <p:sp>
-        <p:nvSpPr>
-          <p:cNvPr id="2" name="Title 1">
-            <a:extLst>
-              <a:ext uri="{FF2B5EF4-FFF2-40B4-BE49-F238E27FC236}">
                 <a16:creationId xmlns:a16="http://schemas.microsoft.com/office/drawing/2014/main" id="{6C90E832-22A3-40B8-83FC-AB571942EC7C}"/>
               </a:ext>
             </a:extLst>
@@ -12917,7 +12597,11 @@
           <a:bodyPr/>
           <a:lstStyle/>
           <a:p>
-            <a:endParaRPr lang="en-CA"/>
+            <a:r>
+              <a:rPr lang="en-US" altLang="en-US" dirty="0"/>
+              <a:t>Design pattern discussion (High-level focus)</a:t>
+            </a:r>
+            <a:endParaRPr lang="en-CA" dirty="0"/>
           </a:p>
         </p:txBody>
       </p:sp>
@@ -12959,98 +12643,7 @@
 </p:sld>
 </file>
 
-<file path=ppt/slides/slide14.xml><?xml version="1.0" encoding="utf-8"?>
-<p:sld xmlns:a="http://schemas.openxmlformats.org/drawingml/2006/main" xmlns:r="http://schemas.openxmlformats.org/officeDocument/2006/relationships" xmlns:p="http://schemas.openxmlformats.org/presentationml/2006/main">
-  <p:cSld>
-    <p:spTree>
-      <p:nvGrpSpPr>
-        <p:cNvPr id="1" name=""/>
-        <p:cNvGrpSpPr/>
-        <p:nvPr/>
-      </p:nvGrpSpPr>
-      <p:grpSpPr>
-        <a:xfrm>
-          <a:off x="0" y="0"/>
-          <a:ext cx="0" cy="0"/>
-          <a:chOff x="0" y="0"/>
-          <a:chExt cx="0" cy="0"/>
-        </a:xfrm>
-      </p:grpSpPr>
-      <p:sp>
-        <p:nvSpPr>
-          <p:cNvPr id="2" name="Title 1">
-            <a:extLst>
-              <a:ext uri="{FF2B5EF4-FFF2-40B4-BE49-F238E27FC236}">
-                <a16:creationId xmlns:a16="http://schemas.microsoft.com/office/drawing/2014/main" id="{81755132-8168-4DD5-8374-56FE5DFD5024}"/>
-              </a:ext>
-            </a:extLst>
-          </p:cNvPr>
-          <p:cNvSpPr>
-            <a:spLocks noGrp="1"/>
-          </p:cNvSpPr>
-          <p:nvPr>
-            <p:ph type="title"/>
-          </p:nvPr>
-        </p:nvSpPr>
-        <p:spPr/>
-        <p:txBody>
-          <a:bodyPr/>
-          <a:lstStyle/>
-          <a:p>
-            <a:r>
-              <a:rPr lang="en-US" altLang="en-US" dirty="0"/>
-              <a:t>Reviewed team’s response</a:t>
-            </a:r>
-            <a:endParaRPr lang="en-CA" dirty="0"/>
-          </a:p>
-        </p:txBody>
-      </p:sp>
-      <p:sp>
-        <p:nvSpPr>
-          <p:cNvPr id="3" name="Content Placeholder 2">
-            <a:extLst>
-              <a:ext uri="{FF2B5EF4-FFF2-40B4-BE49-F238E27FC236}">
-                <a16:creationId xmlns:a16="http://schemas.microsoft.com/office/drawing/2014/main" id="{7A2E8853-5DB3-42A3-815B-E25A5689B873}"/>
-              </a:ext>
-            </a:extLst>
-          </p:cNvPr>
-          <p:cNvSpPr>
-            <a:spLocks noGrp="1"/>
-          </p:cNvSpPr>
-          <p:nvPr>
-            <p:ph idx="1"/>
-          </p:nvPr>
-        </p:nvSpPr>
-        <p:spPr/>
-        <p:txBody>
-          <a:bodyPr/>
-          <a:lstStyle/>
-          <a:p>
-            <a:r>
-              <a:rPr lang="en-US" altLang="en-US" dirty="0"/>
-              <a:t>Ask the reviewed team if they have any questions or comments. This in the spirit of positive non/critical discussion and/or debate</a:t>
-            </a:r>
-            <a:endParaRPr lang="en-CA" altLang="en-US" dirty="0"/>
-          </a:p>
-          <a:p>
-            <a:endParaRPr lang="en-CA" dirty="0"/>
-          </a:p>
-        </p:txBody>
-      </p:sp>
-    </p:spTree>
-    <p:extLst>
-      <p:ext uri="{BB962C8B-B14F-4D97-AF65-F5344CB8AC3E}">
-        <p14:creationId xmlns:p14="http://schemas.microsoft.com/office/powerpoint/2010/main" val="1143874902"/>
-      </p:ext>
-    </p:extLst>
-  </p:cSld>
-  <p:clrMapOvr>
-    <a:masterClrMapping/>
-  </p:clrMapOvr>
-</p:sld>
-</file>
-
-<file path=ppt/slides/slide15.xml><?xml version="1.0" encoding="utf-8"?>
+<file path=ppt/slides/slide11.xml><?xml version="1.0" encoding="utf-8"?>
 <p:sld xmlns:a="http://schemas.openxmlformats.org/drawingml/2006/main" xmlns:r="http://schemas.openxmlformats.org/officeDocument/2006/relationships" xmlns:p="http://schemas.openxmlformats.org/presentationml/2006/main">
   <p:cSld>
     <p:spTree>
@@ -13083,37 +12676,55 @@
             <p:ph type="title"/>
           </p:nvPr>
         </p:nvSpPr>
-        <p:spPr/>
+        <p:spPr>
+          <a:xfrm>
+            <a:off x="1143001" y="2284285"/>
+            <a:ext cx="9905998" cy="1478570"/>
+          </a:xfrm>
+        </p:spPr>
         <p:txBody>
           <a:bodyPr/>
           <a:lstStyle/>
           <a:p>
-            <a:endParaRPr lang="en-CA"/>
+            <a:r>
+              <a:rPr lang="en-CA" dirty="0"/>
+              <a:t>Reviewed teams response</a:t>
+            </a:r>
           </a:p>
         </p:txBody>
       </p:sp>
       <p:sp>
         <p:nvSpPr>
-          <p:cNvPr id="3" name="Content Placeholder 2">
+          <p:cNvPr id="4" name="TextBox 3">
             <a:extLst>
               <a:ext uri="{FF2B5EF4-FFF2-40B4-BE49-F238E27FC236}">
-                <a16:creationId xmlns:a16="http://schemas.microsoft.com/office/drawing/2014/main" id="{F5C986C6-FA96-4BD2-BFC4-2620DDC645EA}"/>
+                <a16:creationId xmlns:a16="http://schemas.microsoft.com/office/drawing/2014/main" id="{A019A7A9-4C7A-42F6-8E34-63D333D1C97A}"/>
               </a:ext>
             </a:extLst>
           </p:cNvPr>
-          <p:cNvSpPr>
-            <a:spLocks noGrp="1"/>
-          </p:cNvSpPr>
-          <p:nvPr>
-            <p:ph idx="1"/>
-          </p:nvPr>
+          <p:cNvSpPr txBox="1"/>
+          <p:nvPr/>
         </p:nvSpPr>
-        <p:spPr/>
+        <p:spPr>
+          <a:xfrm>
+            <a:off x="1143001" y="3501245"/>
+            <a:ext cx="4876801" cy="523220"/>
+          </a:xfrm>
+          <a:prstGeom prst="rect">
+            <a:avLst/>
+          </a:prstGeom>
+          <a:noFill/>
+        </p:spPr>
         <p:txBody>
-          <a:bodyPr/>
+          <a:bodyPr wrap="square" rtlCol="0">
+            <a:spAutoFit/>
+          </a:bodyPr>
           <a:lstStyle/>
           <a:p>
-            <a:endParaRPr lang="en-CA"/>
+            <a:r>
+              <a:rPr lang="en-CA" sz="2800" dirty="0"/>
+              <a:t>Comments or Question?</a:t>
+            </a:r>
           </a:p>
         </p:txBody>
       </p:sp>
@@ -13130,7 +12741,7 @@
 </p:sld>
 </file>
 
-<file path=ppt/slides/slide16.xml><?xml version="1.0" encoding="utf-8"?>
+<file path=ppt/slides/slide12.xml><?xml version="1.0" encoding="utf-8"?>
 <p:sld xmlns:a="http://schemas.openxmlformats.org/drawingml/2006/main" xmlns:r="http://schemas.openxmlformats.org/officeDocument/2006/relationships" xmlns:p="http://schemas.openxmlformats.org/presentationml/2006/main">
   <p:cSld>
     <p:spTree>
@@ -13737,136 +13348,6 @@
           <p:cNvPr id="2" name="Title 1">
             <a:extLst>
               <a:ext uri="{FF2B5EF4-FFF2-40B4-BE49-F238E27FC236}">
-                <a16:creationId xmlns:a16="http://schemas.microsoft.com/office/drawing/2014/main" id="{54CB95FF-940C-4EB0-A50C-38946DF6B7DE}"/>
-              </a:ext>
-            </a:extLst>
-          </p:cNvPr>
-          <p:cNvSpPr>
-            <a:spLocks noGrp="1"/>
-          </p:cNvSpPr>
-          <p:nvPr>
-            <p:ph type="title"/>
-          </p:nvPr>
-        </p:nvSpPr>
-        <p:spPr/>
-        <p:txBody>
-          <a:bodyPr/>
-          <a:lstStyle/>
-          <a:p>
-            <a:r>
-              <a:rPr lang="en-US" altLang="en-US" dirty="0"/>
-              <a:t>Team GitHub review</a:t>
-            </a:r>
-            <a:endParaRPr lang="en-CA" dirty="0"/>
-          </a:p>
-        </p:txBody>
-      </p:sp>
-      <p:sp>
-        <p:nvSpPr>
-          <p:cNvPr id="3" name="Content Placeholder 2">
-            <a:extLst>
-              <a:ext uri="{FF2B5EF4-FFF2-40B4-BE49-F238E27FC236}">
-                <a16:creationId xmlns:a16="http://schemas.microsoft.com/office/drawing/2014/main" id="{6F1D7D91-80AB-4A6B-B15E-2FE54FAC0020}"/>
-              </a:ext>
-            </a:extLst>
-          </p:cNvPr>
-          <p:cNvSpPr>
-            <a:spLocks noGrp="1"/>
-          </p:cNvSpPr>
-          <p:nvPr>
-            <p:ph idx="1"/>
-          </p:nvPr>
-        </p:nvSpPr>
-        <p:spPr/>
-        <p:txBody>
-          <a:bodyPr>
-            <a:normAutofit lnSpcReduction="10000"/>
-          </a:bodyPr>
-          <a:lstStyle/>
-          <a:p>
-            <a:r>
-              <a:rPr lang="en-US" altLang="en-US" dirty="0"/>
-              <a:t>Is the team’s GitHub readable?</a:t>
-            </a:r>
-          </a:p>
-          <a:p>
-            <a:pPr lvl="1"/>
-            <a:r>
-              <a:rPr lang="en-US" altLang="en-US" dirty="0"/>
-              <a:t>Log in or show a quick visual/snapshot of their GitHub</a:t>
-            </a:r>
-          </a:p>
-          <a:p>
-            <a:r>
-              <a:rPr lang="en-US" altLang="en-US" dirty="0"/>
-              <a:t>Does the team provide good documentation?</a:t>
-            </a:r>
-          </a:p>
-          <a:p>
-            <a:r>
-              <a:rPr lang="en-US" altLang="en-US" dirty="0"/>
-              <a:t>Is your team able to understand the file/folder names/structure (flow)?</a:t>
-            </a:r>
-          </a:p>
-          <a:p>
-            <a:r>
-              <a:rPr lang="en-US" altLang="en-US" dirty="0"/>
-              <a:t>Would your team be able to easily and quickly pick up where they left off?</a:t>
-            </a:r>
-          </a:p>
-          <a:p>
-            <a:r>
-              <a:rPr lang="en-US" altLang="en-US" dirty="0"/>
-              <a:t>Do you have any comments/guidance for the team in this area?</a:t>
-            </a:r>
-          </a:p>
-          <a:p>
-            <a:pPr lvl="1"/>
-            <a:r>
-              <a:rPr lang="en-US" altLang="en-US" dirty="0"/>
-              <a:t>Ok if no – if things are awesome though, explain why you think so</a:t>
-            </a:r>
-          </a:p>
-          <a:p>
-            <a:endParaRPr lang="en-CA" dirty="0"/>
-          </a:p>
-        </p:txBody>
-      </p:sp>
-    </p:spTree>
-    <p:extLst>
-      <p:ext uri="{BB962C8B-B14F-4D97-AF65-F5344CB8AC3E}">
-        <p14:creationId xmlns:p14="http://schemas.microsoft.com/office/powerpoint/2010/main" val="3807616809"/>
-      </p:ext>
-    </p:extLst>
-  </p:cSld>
-  <p:clrMapOvr>
-    <a:masterClrMapping/>
-  </p:clrMapOvr>
-</p:sld>
-</file>
-
-<file path=ppt/slides/slide7.xml><?xml version="1.0" encoding="utf-8"?>
-<p:sld xmlns:a="http://schemas.openxmlformats.org/drawingml/2006/main" xmlns:r="http://schemas.openxmlformats.org/officeDocument/2006/relationships" xmlns:p="http://schemas.openxmlformats.org/presentationml/2006/main">
-  <p:cSld>
-    <p:spTree>
-      <p:nvGrpSpPr>
-        <p:cNvPr id="1" name=""/>
-        <p:cNvGrpSpPr/>
-        <p:nvPr/>
-      </p:nvGrpSpPr>
-      <p:grpSpPr>
-        <a:xfrm>
-          <a:off x="0" y="0"/>
-          <a:ext cx="0" cy="0"/>
-          <a:chOff x="0" y="0"/>
-          <a:chExt cx="0" cy="0"/>
-        </a:xfrm>
-      </p:grpSpPr>
-      <p:sp>
-        <p:nvSpPr>
-          <p:cNvPr id="2" name="Title 1">
-            <a:extLst>
-              <a:ext uri="{FF2B5EF4-FFF2-40B4-BE49-F238E27FC236}">
                 <a16:creationId xmlns:a16="http://schemas.microsoft.com/office/drawing/2014/main" id="{98EE8689-AFC0-4710-9C53-E968166E514A}"/>
               </a:ext>
             </a:extLst>
@@ -13895,6 +13376,14 @@
             <a:r>
               <a:rPr lang="en-CA" dirty="0" err="1"/>
               <a:t>covfefe</a:t>
+            </a:r>
+            <a:r>
+              <a:rPr lang="en-CA" dirty="0"/>
+              <a:t> </a:t>
+            </a:r>
+            <a:r>
+              <a:rPr lang="en-CA" dirty="0" err="1"/>
+              <a:t>github</a:t>
             </a:r>
             <a:r>
               <a:rPr lang="en-CA" dirty="0"/>
@@ -13927,7 +13416,7 @@
         </p:spPr>
         <p:txBody>
           <a:bodyPr>
-            <a:normAutofit fontScale="92500"/>
+            <a:normAutofit fontScale="92500" lnSpcReduction="20000"/>
           </a:bodyPr>
           <a:lstStyle/>
           <a:p>
@@ -13946,6 +13435,12 @@
             <a:r>
               <a:rPr lang="en-CA" dirty="0"/>
               <a:t>The documentation could maybe provide a bit more detail</a:t>
+            </a:r>
+          </a:p>
+          <a:p>
+            <a:r>
+              <a:rPr lang="en-CA" dirty="0"/>
+              <a:t>Shouldn’t be to hard to pick up where they left off</a:t>
             </a:r>
           </a:p>
           <a:p>
@@ -14004,7 +13499,7 @@
 </p:sld>
 </file>
 
-<file path=ppt/slides/slide8.xml><?xml version="1.0" encoding="utf-8"?>
+<file path=ppt/slides/slide7.xml><?xml version="1.0" encoding="utf-8"?>
 <p:sld xmlns:a="http://schemas.openxmlformats.org/drawingml/2006/main" xmlns:r="http://schemas.openxmlformats.org/officeDocument/2006/relationships" xmlns:p="http://schemas.openxmlformats.org/presentationml/2006/main">
   <p:cSld>
     <p:spTree>
@@ -14243,7 +13738,7 @@
 </p:sld>
 </file>
 
-<file path=ppt/slides/slide9.xml><?xml version="1.0" encoding="utf-8"?>
+<file path=ppt/slides/slide8.xml><?xml version="1.0" encoding="utf-8"?>
 <p:sld xmlns:a="http://schemas.openxmlformats.org/drawingml/2006/main" xmlns:r="http://schemas.openxmlformats.org/officeDocument/2006/relationships" xmlns:p="http://schemas.openxmlformats.org/presentationml/2006/main">
   <p:cSld>
     <p:spTree>
@@ -14324,19 +13819,40 @@
             </a:pPr>
             <a:r>
               <a:rPr lang="en-CA" dirty="0"/>
+              <a:t>Code</a:t>
+            </a:r>
+          </a:p>
+          <a:p>
+            <a:r>
+              <a:rPr lang="en-CA" dirty="0"/>
+              <a:t>They used HTML, CSS, JavaScript, MySQL, PHP </a:t>
+            </a:r>
+          </a:p>
+          <a:p>
+            <a:pPr marL="0" indent="0">
+              <a:buNone/>
+            </a:pPr>
+            <a:endParaRPr lang="en-CA" dirty="0"/>
+          </a:p>
+          <a:p>
+            <a:pPr marL="0" indent="0">
+              <a:buNone/>
+            </a:pPr>
+            <a:r>
+              <a:rPr lang="en-CA" dirty="0"/>
               <a:t>ATDD templates</a:t>
+            </a:r>
+          </a:p>
+          <a:p>
+            <a:r>
+              <a:rPr lang="en-CA" dirty="0"/>
+              <a:t>In total there were 6 different tests with 16 tests cases</a:t>
             </a:r>
           </a:p>
           <a:p>
             <a:r>
               <a:rPr lang="en-CA" dirty="0"/>
               <a:t>Most of the tests passed/failed as intended</a:t>
-            </a:r>
-          </a:p>
-          <a:p>
-            <a:r>
-              <a:rPr lang="en-CA" dirty="0"/>
-              <a:t>Some didn’t because maybe either the functionality was wasn’t fully complete or it didn’t quite work as intended</a:t>
             </a:r>
           </a:p>
           <a:p>
@@ -14357,6 +13873,130 @@
     <p:extLst>
       <p:ext uri="{BB962C8B-B14F-4D97-AF65-F5344CB8AC3E}">
         <p14:creationId xmlns:p14="http://schemas.microsoft.com/office/powerpoint/2010/main" val="791782776"/>
+      </p:ext>
+    </p:extLst>
+  </p:cSld>
+  <p:clrMapOvr>
+    <a:masterClrMapping/>
+  </p:clrMapOvr>
+</p:sld>
+</file>
+
+<file path=ppt/slides/slide9.xml><?xml version="1.0" encoding="utf-8"?>
+<p:sld xmlns:a="http://schemas.openxmlformats.org/drawingml/2006/main" xmlns:r="http://schemas.openxmlformats.org/officeDocument/2006/relationships" xmlns:p="http://schemas.openxmlformats.org/presentationml/2006/main">
+  <p:cSld>
+    <p:spTree>
+      <p:nvGrpSpPr>
+        <p:cNvPr id="1" name=""/>
+        <p:cNvGrpSpPr/>
+        <p:nvPr/>
+      </p:nvGrpSpPr>
+      <p:grpSpPr>
+        <a:xfrm>
+          <a:off x="0" y="0"/>
+          <a:ext cx="0" cy="0"/>
+          <a:chOff x="0" y="0"/>
+          <a:chExt cx="0" cy="0"/>
+        </a:xfrm>
+      </p:grpSpPr>
+      <p:sp>
+        <p:nvSpPr>
+          <p:cNvPr id="2" name="Title 1">
+            <a:extLst>
+              <a:ext uri="{FF2B5EF4-FFF2-40B4-BE49-F238E27FC236}">
+                <a16:creationId xmlns:a16="http://schemas.microsoft.com/office/drawing/2014/main" id="{AD06EE58-4AF6-44A7-AA22-F8556EDA26A0}"/>
+              </a:ext>
+            </a:extLst>
+          </p:cNvPr>
+          <p:cNvSpPr>
+            <a:spLocks noGrp="1"/>
+          </p:cNvSpPr>
+          <p:nvPr>
+            <p:ph type="title"/>
+          </p:nvPr>
+        </p:nvSpPr>
+        <p:spPr/>
+        <p:txBody>
+          <a:bodyPr/>
+          <a:lstStyle/>
+          <a:p>
+            <a:r>
+              <a:rPr lang="en-US" altLang="en-US" dirty="0"/>
+              <a:t>Design pattern discussion (High-level focus)</a:t>
+            </a:r>
+            <a:endParaRPr lang="en-CA" dirty="0"/>
+          </a:p>
+        </p:txBody>
+      </p:sp>
+      <p:sp>
+        <p:nvSpPr>
+          <p:cNvPr id="3" name="Content Placeholder 2">
+            <a:extLst>
+              <a:ext uri="{FF2B5EF4-FFF2-40B4-BE49-F238E27FC236}">
+                <a16:creationId xmlns:a16="http://schemas.microsoft.com/office/drawing/2014/main" id="{448F4072-6D68-4CE4-B46A-A7709DB26F94}"/>
+              </a:ext>
+            </a:extLst>
+          </p:cNvPr>
+          <p:cNvSpPr>
+            <a:spLocks noGrp="1"/>
+          </p:cNvSpPr>
+          <p:nvPr>
+            <p:ph idx="1"/>
+          </p:nvPr>
+        </p:nvSpPr>
+        <p:spPr/>
+        <p:txBody>
+          <a:bodyPr/>
+          <a:lstStyle/>
+          <a:p>
+            <a:r>
+              <a:rPr lang="en-US" altLang="en-US" dirty="0"/>
+              <a:t>Comment on what design patterns the team used</a:t>
+            </a:r>
+          </a:p>
+          <a:p>
+            <a:pPr lvl="1"/>
+            <a:r>
+              <a:rPr lang="en-US" altLang="en-US" dirty="0"/>
+              <a:t>Provide samples where you are able</a:t>
+            </a:r>
+          </a:p>
+          <a:p>
+            <a:pPr lvl="2"/>
+            <a:r>
+              <a:rPr lang="en-US" altLang="en-US" dirty="0"/>
+              <a:t>Were they appropriate?</a:t>
+            </a:r>
+          </a:p>
+          <a:p>
+            <a:pPr lvl="2"/>
+            <a:r>
+              <a:rPr lang="en-US" altLang="en-US" dirty="0"/>
+              <a:t>Were there alternatives they could have also used?</a:t>
+            </a:r>
+          </a:p>
+          <a:p>
+            <a:r>
+              <a:rPr lang="en-US" altLang="en-US" dirty="0"/>
+              <a:t>If they didn’t use any Design Patterns, were there ones they could have tried?</a:t>
+            </a:r>
+          </a:p>
+          <a:p>
+            <a:pPr lvl="1"/>
+            <a:r>
+              <a:rPr lang="en-US" altLang="en-US" dirty="0"/>
+              <a:t>Provide samples/code snippets/areas of the code</a:t>
+            </a:r>
+          </a:p>
+          <a:p>
+            <a:endParaRPr lang="en-CA" dirty="0"/>
+          </a:p>
+        </p:txBody>
+      </p:sp>
+    </p:spTree>
+    <p:extLst>
+      <p:ext uri="{BB962C8B-B14F-4D97-AF65-F5344CB8AC3E}">
+        <p14:creationId xmlns:p14="http://schemas.microsoft.com/office/powerpoint/2010/main" val="1421288843"/>
       </p:ext>
     </p:extLst>
   </p:cSld>

</xml_diff>

<commit_message>
Updated: changed the order of the last two slides, added Team Covfefe's ATDD templates
</commit_message>
<xml_diff>
--- a/Milestone 7/ENSE 470 Milestone 7.pptx
+++ b/Milestone 7/ENSE 470 Milestone 7.pptx
@@ -15,8 +15,8 @@
     <p:sldId id="273" r:id="rId9"/>
     <p:sldId id="263" r:id="rId10"/>
     <p:sldId id="264" r:id="rId11"/>
-    <p:sldId id="266" r:id="rId12"/>
-    <p:sldId id="267" r:id="rId13"/>
+    <p:sldId id="267" r:id="rId12"/>
+    <p:sldId id="266" r:id="rId13"/>
   </p:sldIdLst>
   <p:sldSz cx="12192000" cy="6858000"/>
   <p:notesSz cx="6858000" cy="9144000"/>
@@ -12665,7 +12665,7 @@
           <p:cNvPr id="2" name="Title 1">
             <a:extLst>
               <a:ext uri="{FF2B5EF4-FFF2-40B4-BE49-F238E27FC236}">
-                <a16:creationId xmlns:a16="http://schemas.microsoft.com/office/drawing/2014/main" id="{70D9AC21-BE07-495A-B657-27C5EE70E1E3}"/>
+                <a16:creationId xmlns:a16="http://schemas.microsoft.com/office/drawing/2014/main" id="{234688A5-970F-464D-9D47-B2468E60A79D}"/>
               </a:ext>
             </a:extLst>
           </p:cNvPr>
@@ -12678,8 +12678,8 @@
         </p:nvSpPr>
         <p:spPr>
           <a:xfrm>
-            <a:off x="1143001" y="2284285"/>
-            <a:ext cx="9905998" cy="1478570"/>
+            <a:off x="1141412" y="744279"/>
+            <a:ext cx="9905998" cy="743208"/>
           </a:xfrm>
         </p:spPr>
         <p:txBody>
@@ -12687,43 +12687,135 @@
           <a:lstStyle/>
           <a:p>
             <a:r>
-              <a:rPr lang="en-CA" dirty="0"/>
-              <a:t>Reviewed teams response</a:t>
-            </a:r>
+              <a:rPr lang="en-US" altLang="en-US" dirty="0"/>
+              <a:t>Group reflection</a:t>
+            </a:r>
+            <a:endParaRPr lang="en-CA" dirty="0"/>
           </a:p>
         </p:txBody>
       </p:sp>
       <p:sp>
         <p:nvSpPr>
-          <p:cNvPr id="4" name="TextBox 3">
+          <p:cNvPr id="3" name="Content Placeholder 2">
             <a:extLst>
               <a:ext uri="{FF2B5EF4-FFF2-40B4-BE49-F238E27FC236}">
-                <a16:creationId xmlns:a16="http://schemas.microsoft.com/office/drawing/2014/main" id="{A019A7A9-4C7A-42F6-8E34-63D333D1C97A}"/>
+                <a16:creationId xmlns:a16="http://schemas.microsoft.com/office/drawing/2014/main" id="{73890263-2E3F-4935-AC5D-5933EFBBFF7F}"/>
               </a:ext>
             </a:extLst>
           </p:cNvPr>
-          <p:cNvSpPr txBox="1"/>
-          <p:nvPr/>
+          <p:cNvSpPr>
+            <a:spLocks noGrp="1"/>
+          </p:cNvSpPr>
+          <p:nvPr>
+            <p:ph idx="1"/>
+          </p:nvPr>
         </p:nvSpPr>
         <p:spPr>
           <a:xfrm>
-            <a:off x="1143001" y="3501245"/>
-            <a:ext cx="4876801" cy="523220"/>
+            <a:off x="1141412" y="1623236"/>
+            <a:ext cx="9905999" cy="5054011"/>
           </a:xfrm>
-          <a:prstGeom prst="rect">
-            <a:avLst/>
-          </a:prstGeom>
-          <a:noFill/>
         </p:spPr>
         <p:txBody>
-          <a:bodyPr wrap="square" rtlCol="0">
-            <a:spAutoFit/>
+          <a:bodyPr>
+            <a:normAutofit fontScale="92500" lnSpcReduction="20000"/>
           </a:bodyPr>
           <a:lstStyle/>
           <a:p>
-            <a:r>
-              <a:rPr lang="en-CA" sz="2800" dirty="0"/>
-              <a:t>Comments or Question?</a:t>
+            <a:pPr>
+              <a:defRPr/>
+            </a:pPr>
+            <a:r>
+              <a:rPr lang="en-US" dirty="0"/>
+              <a:t>How did you feel about this milestone? What did you like about it? What did you dislike?</a:t>
+            </a:r>
+          </a:p>
+          <a:p>
+            <a:pPr lvl="1">
+              <a:defRPr/>
+            </a:pPr>
+            <a:r>
+              <a:rPr lang="en-US" dirty="0"/>
+              <a:t>It was interesting looking at a different approach to designing the application</a:t>
+            </a:r>
+          </a:p>
+          <a:p>
+            <a:pPr lvl="1">
+              <a:defRPr/>
+            </a:pPr>
+            <a:r>
+              <a:rPr lang="en-US" dirty="0"/>
+              <a:t>It adds different perspectives seeing different design approaches</a:t>
+            </a:r>
+          </a:p>
+          <a:p>
+            <a:pPr>
+              <a:defRPr/>
+            </a:pPr>
+            <a:r>
+              <a:rPr lang="en-US" dirty="0"/>
+              <a:t>What did you learn about yourself as you collaborated and worked through this milestone?</a:t>
+            </a:r>
+          </a:p>
+          <a:p>
+            <a:pPr lvl="1">
+              <a:defRPr/>
+            </a:pPr>
+            <a:r>
+              <a:rPr lang="en-US" dirty="0"/>
+              <a:t>Things that we could have improved on ourselves, by looking at what team </a:t>
+            </a:r>
+            <a:r>
+              <a:rPr lang="en-US" dirty="0" err="1"/>
+              <a:t>Covfefe</a:t>
+            </a:r>
+            <a:r>
+              <a:rPr lang="en-US" dirty="0"/>
+              <a:t> had or was missing</a:t>
+            </a:r>
+          </a:p>
+          <a:p>
+            <a:pPr>
+              <a:defRPr/>
+            </a:pPr>
+            <a:r>
+              <a:rPr lang="en-US" dirty="0"/>
+              <a:t>How will you use what you have learned going forward?</a:t>
+            </a:r>
+          </a:p>
+          <a:p>
+            <a:pPr lvl="1">
+              <a:defRPr/>
+            </a:pPr>
+            <a:r>
+              <a:rPr lang="en-US" dirty="0"/>
+              <a:t>We can use the feedback that we receive for the group reviewing our application as well as ideas from reviewing team </a:t>
+            </a:r>
+            <a:r>
+              <a:rPr lang="en-US" dirty="0" err="1"/>
+              <a:t>Covfefe’s</a:t>
+            </a:r>
+            <a:r>
+              <a:rPr lang="en-US" dirty="0"/>
+              <a:t> application in the future</a:t>
+            </a:r>
+          </a:p>
+          <a:p>
+            <a:pPr>
+              <a:defRPr/>
+            </a:pPr>
+            <a:r>
+              <a:rPr lang="en-US" dirty="0"/>
+              <a:t>What “stuff &amp; things” related to this milestone would you want help with?</a:t>
+            </a:r>
+          </a:p>
+          <a:p>
+            <a:pPr lvl="1">
+              <a:defRPr/>
+            </a:pPr>
+            <a:r>
+              <a:rPr lang="en-CA" dirty="0"/>
+              <a:t>For the most part we were fine</a:t>
             </a:r>
           </a:p>
         </p:txBody>
@@ -12731,7 +12823,7 @@
     </p:spTree>
     <p:extLst>
       <p:ext uri="{BB962C8B-B14F-4D97-AF65-F5344CB8AC3E}">
-        <p14:creationId xmlns:p14="http://schemas.microsoft.com/office/powerpoint/2010/main" val="1750318169"/>
+        <p14:creationId xmlns:p14="http://schemas.microsoft.com/office/powerpoint/2010/main" val="2133758053"/>
       </p:ext>
     </p:extLst>
   </p:cSld>
@@ -12763,7 +12855,7 @@
           <p:cNvPr id="2" name="Title 1">
             <a:extLst>
               <a:ext uri="{FF2B5EF4-FFF2-40B4-BE49-F238E27FC236}">
-                <a16:creationId xmlns:a16="http://schemas.microsoft.com/office/drawing/2014/main" id="{234688A5-970F-464D-9D47-B2468E60A79D}"/>
+                <a16:creationId xmlns:a16="http://schemas.microsoft.com/office/drawing/2014/main" id="{70D9AC21-BE07-495A-B657-27C5EE70E1E3}"/>
               </a:ext>
             </a:extLst>
           </p:cNvPr>
@@ -12776,8 +12868,8 @@
         </p:nvSpPr>
         <p:spPr>
           <a:xfrm>
-            <a:off x="1141412" y="744279"/>
-            <a:ext cx="9905998" cy="743208"/>
+            <a:off x="1143001" y="2284285"/>
+            <a:ext cx="9905998" cy="1478570"/>
           </a:xfrm>
         </p:spPr>
         <p:txBody>
@@ -12785,135 +12877,43 @@
           <a:lstStyle/>
           <a:p>
             <a:r>
-              <a:rPr lang="en-US" altLang="en-US" dirty="0"/>
-              <a:t>Group reflection</a:t>
-            </a:r>
-            <a:endParaRPr lang="en-CA" dirty="0"/>
+              <a:rPr lang="en-CA" dirty="0"/>
+              <a:t>Reviewed teams response</a:t>
+            </a:r>
           </a:p>
         </p:txBody>
       </p:sp>
       <p:sp>
         <p:nvSpPr>
-          <p:cNvPr id="3" name="Content Placeholder 2">
+          <p:cNvPr id="4" name="TextBox 3">
             <a:extLst>
               <a:ext uri="{FF2B5EF4-FFF2-40B4-BE49-F238E27FC236}">
-                <a16:creationId xmlns:a16="http://schemas.microsoft.com/office/drawing/2014/main" id="{73890263-2E3F-4935-AC5D-5933EFBBFF7F}"/>
+                <a16:creationId xmlns:a16="http://schemas.microsoft.com/office/drawing/2014/main" id="{A019A7A9-4C7A-42F6-8E34-63D333D1C97A}"/>
               </a:ext>
             </a:extLst>
           </p:cNvPr>
-          <p:cNvSpPr>
-            <a:spLocks noGrp="1"/>
-          </p:cNvSpPr>
-          <p:nvPr>
-            <p:ph idx="1"/>
-          </p:nvPr>
+          <p:cNvSpPr txBox="1"/>
+          <p:nvPr/>
         </p:nvSpPr>
         <p:spPr>
           <a:xfrm>
-            <a:off x="1141412" y="1623236"/>
-            <a:ext cx="9905999" cy="5054011"/>
+            <a:off x="1143001" y="3501245"/>
+            <a:ext cx="4876801" cy="523220"/>
           </a:xfrm>
+          <a:prstGeom prst="rect">
+            <a:avLst/>
+          </a:prstGeom>
+          <a:noFill/>
         </p:spPr>
         <p:txBody>
-          <a:bodyPr>
-            <a:normAutofit fontScale="92500" lnSpcReduction="20000"/>
+          <a:bodyPr wrap="square" rtlCol="0">
+            <a:spAutoFit/>
           </a:bodyPr>
           <a:lstStyle/>
           <a:p>
-            <a:pPr>
-              <a:defRPr/>
-            </a:pPr>
-            <a:r>
-              <a:rPr lang="en-US" dirty="0"/>
-              <a:t>How did you feel about this milestone? What did you like about it? What did you dislike?</a:t>
-            </a:r>
-          </a:p>
-          <a:p>
-            <a:pPr lvl="1">
-              <a:defRPr/>
-            </a:pPr>
-            <a:r>
-              <a:rPr lang="en-US" dirty="0"/>
-              <a:t>It was interesting looking at a different approach to designing the application</a:t>
-            </a:r>
-          </a:p>
-          <a:p>
-            <a:pPr lvl="1">
-              <a:defRPr/>
-            </a:pPr>
-            <a:r>
-              <a:rPr lang="en-US" dirty="0"/>
-              <a:t>It adds different perspectives seeing different design approaches</a:t>
-            </a:r>
-          </a:p>
-          <a:p>
-            <a:pPr>
-              <a:defRPr/>
-            </a:pPr>
-            <a:r>
-              <a:rPr lang="en-US" dirty="0"/>
-              <a:t>What did you learn about yourself as you collaborated and worked through this milestone?</a:t>
-            </a:r>
-          </a:p>
-          <a:p>
-            <a:pPr lvl="1">
-              <a:defRPr/>
-            </a:pPr>
-            <a:r>
-              <a:rPr lang="en-US" dirty="0"/>
-              <a:t>Things that we could have improved on ourselves, by looking at what team </a:t>
-            </a:r>
-            <a:r>
-              <a:rPr lang="en-US" dirty="0" err="1"/>
-              <a:t>Covfefe</a:t>
-            </a:r>
-            <a:r>
-              <a:rPr lang="en-US" dirty="0"/>
-              <a:t> had or was missing</a:t>
-            </a:r>
-          </a:p>
-          <a:p>
-            <a:pPr>
-              <a:defRPr/>
-            </a:pPr>
-            <a:r>
-              <a:rPr lang="en-US" dirty="0"/>
-              <a:t>How will you use what you have learned going forward?</a:t>
-            </a:r>
-          </a:p>
-          <a:p>
-            <a:pPr lvl="1">
-              <a:defRPr/>
-            </a:pPr>
-            <a:r>
-              <a:rPr lang="en-US" dirty="0"/>
-              <a:t>We can use the feedback that we receive for the group reviewing our application as well as ideas from reviewing team </a:t>
-            </a:r>
-            <a:r>
-              <a:rPr lang="en-US" dirty="0" err="1"/>
-              <a:t>Covfefe’s</a:t>
-            </a:r>
-            <a:r>
-              <a:rPr lang="en-US" dirty="0"/>
-              <a:t> application in the future</a:t>
-            </a:r>
-          </a:p>
-          <a:p>
-            <a:pPr>
-              <a:defRPr/>
-            </a:pPr>
-            <a:r>
-              <a:rPr lang="en-US" dirty="0"/>
-              <a:t>What “stuff &amp; things” related to this milestone would you want help with?</a:t>
-            </a:r>
-          </a:p>
-          <a:p>
-            <a:pPr lvl="1">
-              <a:defRPr/>
-            </a:pPr>
-            <a:r>
-              <a:rPr lang="en-CA" dirty="0"/>
-              <a:t>For the most part we were fine</a:t>
+            <a:r>
+              <a:rPr lang="en-CA" sz="2800" dirty="0"/>
+              <a:t>Comments or Question?</a:t>
             </a:r>
           </a:p>
         </p:txBody>
@@ -12921,7 +12921,7 @@
     </p:spTree>
     <p:extLst>
       <p:ext uri="{BB962C8B-B14F-4D97-AF65-F5344CB8AC3E}">
-        <p14:creationId xmlns:p14="http://schemas.microsoft.com/office/powerpoint/2010/main" val="2133758053"/>
+        <p14:creationId xmlns:p14="http://schemas.microsoft.com/office/powerpoint/2010/main" val="1750318169"/>
       </p:ext>
     </p:extLst>
   </p:cSld>

</xml_diff>

<commit_message>
Updated: removed duplicate slides, fixed small errors
</commit_message>
<xml_diff>
--- a/Milestone 7/ENSE 470 Milestone 7.pptx
+++ b/Milestone 7/ENSE 470 Milestone 7.pptx
@@ -13,10 +13,9 @@
     <p:sldId id="272" r:id="rId7"/>
     <p:sldId id="261" r:id="rId8"/>
     <p:sldId id="273" r:id="rId9"/>
-    <p:sldId id="263" r:id="rId10"/>
-    <p:sldId id="264" r:id="rId11"/>
-    <p:sldId id="267" r:id="rId12"/>
-    <p:sldId id="266" r:id="rId13"/>
+    <p:sldId id="264" r:id="rId10"/>
+    <p:sldId id="267" r:id="rId11"/>
+    <p:sldId id="266" r:id="rId12"/>
   </p:sldIdLst>
   <p:sldSz cx="12192000" cy="6858000"/>
   <p:notesSz cx="6858000" cy="9144000"/>
@@ -173,7 +172,7 @@
           <a:noFill/>
           <a:extLst>
             <a:ext uri="{909E8E84-426E-40dd-AFC4-6F175D3DCCD1}">
-              <a14:hiddenFill xmlns="" xmlns:a14="http://schemas.microsoft.com/office/drawing/2010/main">
+              <a14:hiddenFill xmlns:a14="http://schemas.microsoft.com/office/drawing/2010/main" xmlns="">
                 <a:solidFill>
                   <a:srgbClr val="FFFFFF"/>
                 </a:solidFill>
@@ -233,7 +232,7 @@
             </a:ln>
             <a:extLst>
               <a:ext uri="{91240B29-F687-4f45-9708-019B960494DF}">
-                <a14:hiddenLine xmlns="" xmlns:a14="http://schemas.microsoft.com/office/drawing/2010/main" w="9525">
+                <a14:hiddenLine xmlns:a14="http://schemas.microsoft.com/office/drawing/2010/main" xmlns="" w="9525">
                   <a:solidFill>
                     <a:srgbClr val="000000"/>
                   </a:solidFill>
@@ -323,7 +322,7 @@
             </a:ln>
             <a:extLst>
               <a:ext uri="{91240B29-F687-4f45-9708-019B960494DF}">
-                <a14:hiddenLine xmlns="" xmlns:a14="http://schemas.microsoft.com/office/drawing/2010/main" w="9525">
+                <a14:hiddenLine xmlns:a14="http://schemas.microsoft.com/office/drawing/2010/main" xmlns="" w="9525">
                   <a:solidFill>
                     <a:srgbClr val="000000"/>
                   </a:solidFill>
@@ -413,7 +412,7 @@
             </a:ln>
             <a:extLst>
               <a:ext uri="{91240B29-F687-4f45-9708-019B960494DF}">
-                <a14:hiddenLine xmlns="" xmlns:a14="http://schemas.microsoft.com/office/drawing/2010/main" w="9525">
+                <a14:hiddenLine xmlns:a14="http://schemas.microsoft.com/office/drawing/2010/main" xmlns="" w="9525">
                   <a:solidFill>
                     <a:srgbClr val="000000"/>
                   </a:solidFill>
@@ -447,7 +446,7 @@
             </a:ln>
             <a:extLst>
               <a:ext uri="{91240B29-F687-4f45-9708-019B960494DF}">
-                <a14:hiddenLine xmlns="" xmlns:a14="http://schemas.microsoft.com/office/drawing/2010/main" w="9525">
+                <a14:hiddenLine xmlns:a14="http://schemas.microsoft.com/office/drawing/2010/main" xmlns="" w="9525">
                   <a:solidFill>
                     <a:srgbClr val="000000"/>
                   </a:solidFill>
@@ -537,7 +536,7 @@
             </a:ln>
             <a:extLst>
               <a:ext uri="{91240B29-F687-4f45-9708-019B960494DF}">
-                <a14:hiddenLine xmlns="" xmlns:a14="http://schemas.microsoft.com/office/drawing/2010/main" w="9525">
+                <a14:hiddenLine xmlns:a14="http://schemas.microsoft.com/office/drawing/2010/main" xmlns="" w="9525">
                   <a:solidFill>
                     <a:srgbClr val="000000"/>
                   </a:solidFill>
@@ -599,7 +598,7 @@
             </a:ln>
             <a:extLst>
               <a:ext uri="{91240B29-F687-4f45-9708-019B960494DF}">
-                <a14:hiddenLine xmlns="" xmlns:a14="http://schemas.microsoft.com/office/drawing/2010/main" w="9525">
+                <a14:hiddenLine xmlns:a14="http://schemas.microsoft.com/office/drawing/2010/main" xmlns="" w="9525">
                   <a:solidFill>
                     <a:srgbClr val="000000"/>
                   </a:solidFill>
@@ -661,7 +660,7 @@
             </a:ln>
             <a:extLst>
               <a:ext uri="{91240B29-F687-4f45-9708-019B960494DF}">
-                <a14:hiddenLine xmlns="" xmlns:a14="http://schemas.microsoft.com/office/drawing/2010/main" w="9525">
+                <a14:hiddenLine xmlns:a14="http://schemas.microsoft.com/office/drawing/2010/main" xmlns="" w="9525">
                   <a:solidFill>
                     <a:srgbClr val="000000"/>
                   </a:solidFill>
@@ -751,7 +750,7 @@
             </a:ln>
             <a:extLst>
               <a:ext uri="{91240B29-F687-4f45-9708-019B960494DF}">
-                <a14:hiddenLine xmlns="" xmlns:a14="http://schemas.microsoft.com/office/drawing/2010/main" w="9525">
+                <a14:hiddenLine xmlns:a14="http://schemas.microsoft.com/office/drawing/2010/main" xmlns="" w="9525">
                   <a:solidFill>
                     <a:srgbClr val="000000"/>
                   </a:solidFill>
@@ -813,7 +812,7 @@
             </a:ln>
             <a:extLst>
               <a:ext uri="{91240B29-F687-4f45-9708-019B960494DF}">
-                <a14:hiddenLine xmlns="" xmlns:a14="http://schemas.microsoft.com/office/drawing/2010/main" w="9525">
+                <a14:hiddenLine xmlns:a14="http://schemas.microsoft.com/office/drawing/2010/main" xmlns="" w="9525">
                   <a:solidFill>
                     <a:srgbClr val="000000"/>
                   </a:solidFill>
@@ -875,7 +874,7 @@
             </a:ln>
             <a:extLst>
               <a:ext uri="{91240B29-F687-4f45-9708-019B960494DF}">
-                <a14:hiddenLine xmlns="" xmlns:a14="http://schemas.microsoft.com/office/drawing/2010/main" w="9525">
+                <a14:hiddenLine xmlns:a14="http://schemas.microsoft.com/office/drawing/2010/main" xmlns="" w="9525">
                   <a:solidFill>
                     <a:srgbClr val="000000"/>
                   </a:solidFill>
@@ -965,7 +964,7 @@
             </a:ln>
             <a:extLst>
               <a:ext uri="{91240B29-F687-4f45-9708-019B960494DF}">
-                <a14:hiddenLine xmlns="" xmlns:a14="http://schemas.microsoft.com/office/drawing/2010/main" w="9525">
+                <a14:hiddenLine xmlns:a14="http://schemas.microsoft.com/office/drawing/2010/main" xmlns="" w="9525">
                   <a:solidFill>
                     <a:srgbClr val="000000"/>
                   </a:solidFill>
@@ -1055,7 +1054,7 @@
             </a:ln>
             <a:extLst>
               <a:ext uri="{91240B29-F687-4f45-9708-019B960494DF}">
-                <a14:hiddenLine xmlns="" xmlns:a14="http://schemas.microsoft.com/office/drawing/2010/main" w="9525">
+                <a14:hiddenLine xmlns:a14="http://schemas.microsoft.com/office/drawing/2010/main" xmlns="" w="9525">
                   <a:solidFill>
                     <a:srgbClr val="000000"/>
                   </a:solidFill>
@@ -1117,7 +1116,7 @@
             </a:ln>
             <a:extLst>
               <a:ext uri="{91240B29-F687-4f45-9708-019B960494DF}">
-                <a14:hiddenLine xmlns="" xmlns:a14="http://schemas.microsoft.com/office/drawing/2010/main" w="9525">
+                <a14:hiddenLine xmlns:a14="http://schemas.microsoft.com/office/drawing/2010/main" xmlns="" w="9525">
                   <a:solidFill>
                     <a:srgbClr val="000000"/>
                   </a:solidFill>
@@ -1227,7 +1226,7 @@
             </a:ln>
             <a:extLst>
               <a:ext uri="{91240B29-F687-4f45-9708-019B960494DF}">
-                <a14:hiddenLine xmlns="" xmlns:a14="http://schemas.microsoft.com/office/drawing/2010/main" w="9525">
+                <a14:hiddenLine xmlns:a14="http://schemas.microsoft.com/office/drawing/2010/main" xmlns="" w="9525">
                   <a:solidFill>
                     <a:srgbClr val="000000"/>
                   </a:solidFill>
@@ -1289,7 +1288,7 @@
             </a:ln>
             <a:extLst>
               <a:ext uri="{91240B29-F687-4f45-9708-019B960494DF}">
-                <a14:hiddenLine xmlns="" xmlns:a14="http://schemas.microsoft.com/office/drawing/2010/main" w="9525">
+                <a14:hiddenLine xmlns:a14="http://schemas.microsoft.com/office/drawing/2010/main" xmlns="" w="9525">
                   <a:solidFill>
                     <a:srgbClr val="000000"/>
                   </a:solidFill>
@@ -1379,7 +1378,7 @@
             </a:ln>
             <a:extLst>
               <a:ext uri="{91240B29-F687-4f45-9708-019B960494DF}">
-                <a14:hiddenLine xmlns="" xmlns:a14="http://schemas.microsoft.com/office/drawing/2010/main" w="9525">
+                <a14:hiddenLine xmlns:a14="http://schemas.microsoft.com/office/drawing/2010/main" xmlns="" w="9525">
                   <a:solidFill>
                     <a:srgbClr val="000000"/>
                   </a:solidFill>
@@ -1469,7 +1468,7 @@
             </a:ln>
             <a:extLst>
               <a:ext uri="{91240B29-F687-4f45-9708-019B960494DF}">
-                <a14:hiddenLine xmlns="" xmlns:a14="http://schemas.microsoft.com/office/drawing/2010/main" w="9525">
+                <a14:hiddenLine xmlns:a14="http://schemas.microsoft.com/office/drawing/2010/main" xmlns="" w="9525">
                   <a:solidFill>
                     <a:srgbClr val="000000"/>
                   </a:solidFill>
@@ -1531,7 +1530,7 @@
             </a:ln>
             <a:extLst>
               <a:ext uri="{91240B29-F687-4f45-9708-019B960494DF}">
-                <a14:hiddenLine xmlns="" xmlns:a14="http://schemas.microsoft.com/office/drawing/2010/main" w="9525">
+                <a14:hiddenLine xmlns:a14="http://schemas.microsoft.com/office/drawing/2010/main" xmlns="" w="9525">
                   <a:solidFill>
                     <a:srgbClr val="000000"/>
                   </a:solidFill>
@@ -1621,7 +1620,7 @@
             </a:ln>
             <a:extLst>
               <a:ext uri="{91240B29-F687-4f45-9708-019B960494DF}">
-                <a14:hiddenLine xmlns="" xmlns:a14="http://schemas.microsoft.com/office/drawing/2010/main" w="9525">
+                <a14:hiddenLine xmlns:a14="http://schemas.microsoft.com/office/drawing/2010/main" xmlns="" w="9525">
                   <a:solidFill>
                     <a:srgbClr val="000000"/>
                   </a:solidFill>
@@ -1711,7 +1710,7 @@
             </a:ln>
             <a:extLst>
               <a:ext uri="{91240B29-F687-4f45-9708-019B960494DF}">
-                <a14:hiddenLine xmlns="" xmlns:a14="http://schemas.microsoft.com/office/drawing/2010/main" w="9525">
+                <a14:hiddenLine xmlns:a14="http://schemas.microsoft.com/office/drawing/2010/main" xmlns="" w="9525">
                   <a:solidFill>
                     <a:srgbClr val="000000"/>
                   </a:solidFill>
@@ -1767,7 +1766,7 @@
             </a:ln>
             <a:extLst>
               <a:ext uri="{91240B29-F687-4f45-9708-019B960494DF}">
-                <a14:hiddenLine xmlns="" xmlns:a14="http://schemas.microsoft.com/office/drawing/2010/main" w="9525">
+                <a14:hiddenLine xmlns:a14="http://schemas.microsoft.com/office/drawing/2010/main" xmlns="" w="9525">
                   <a:solidFill>
                     <a:srgbClr val="000000"/>
                   </a:solidFill>
@@ -1857,7 +1856,7 @@
             </a:ln>
             <a:extLst>
               <a:ext uri="{91240B29-F687-4f45-9708-019B960494DF}">
-                <a14:hiddenLine xmlns="" xmlns:a14="http://schemas.microsoft.com/office/drawing/2010/main" w="9525">
+                <a14:hiddenLine xmlns:a14="http://schemas.microsoft.com/office/drawing/2010/main" xmlns="" w="9525">
                   <a:solidFill>
                     <a:srgbClr val="000000"/>
                   </a:solidFill>
@@ -1913,7 +1912,7 @@
             </a:ln>
             <a:extLst>
               <a:ext uri="{91240B29-F687-4f45-9708-019B960494DF}">
-                <a14:hiddenLine xmlns="" xmlns:a14="http://schemas.microsoft.com/office/drawing/2010/main" w="9525">
+                <a14:hiddenLine xmlns:a14="http://schemas.microsoft.com/office/drawing/2010/main" xmlns="" w="9525">
                   <a:solidFill>
                     <a:srgbClr val="000000"/>
                   </a:solidFill>
@@ -2003,7 +2002,7 @@
             </a:ln>
             <a:extLst>
               <a:ext uri="{91240B29-F687-4f45-9708-019B960494DF}">
-                <a14:hiddenLine xmlns="" xmlns:a14="http://schemas.microsoft.com/office/drawing/2010/main" w="9525">
+                <a14:hiddenLine xmlns:a14="http://schemas.microsoft.com/office/drawing/2010/main" xmlns="" w="9525">
                   <a:solidFill>
                     <a:srgbClr val="000000"/>
                   </a:solidFill>
@@ -2071,7 +2070,7 @@
             </a:ln>
             <a:extLst>
               <a:ext uri="{91240B29-F687-4f45-9708-019B960494DF}">
-                <a14:hiddenLine xmlns="" xmlns:a14="http://schemas.microsoft.com/office/drawing/2010/main" w="9525">
+                <a14:hiddenLine xmlns:a14="http://schemas.microsoft.com/office/drawing/2010/main" xmlns="" w="9525">
                   <a:solidFill>
                     <a:srgbClr val="000000"/>
                   </a:solidFill>
@@ -2161,7 +2160,7 @@
             </a:ln>
             <a:extLst>
               <a:ext uri="{91240B29-F687-4f45-9708-019B960494DF}">
-                <a14:hiddenLine xmlns="" xmlns:a14="http://schemas.microsoft.com/office/drawing/2010/main" w="9525">
+                <a14:hiddenLine xmlns:a14="http://schemas.microsoft.com/office/drawing/2010/main" xmlns="" w="9525">
                   <a:solidFill>
                     <a:srgbClr val="000000"/>
                   </a:solidFill>
@@ -2229,7 +2228,7 @@
             </a:ln>
             <a:extLst>
               <a:ext uri="{91240B29-F687-4f45-9708-019B960494DF}">
-                <a14:hiddenLine xmlns="" xmlns:a14="http://schemas.microsoft.com/office/drawing/2010/main" w="9525">
+                <a14:hiddenLine xmlns:a14="http://schemas.microsoft.com/office/drawing/2010/main" xmlns="" w="9525">
                   <a:solidFill>
                     <a:srgbClr val="000000"/>
                   </a:solidFill>
@@ -2319,7 +2318,7 @@
             </a:ln>
             <a:extLst>
               <a:ext uri="{91240B29-F687-4f45-9708-019B960494DF}">
-                <a14:hiddenLine xmlns="" xmlns:a14="http://schemas.microsoft.com/office/drawing/2010/main" w="9525">
+                <a14:hiddenLine xmlns:a14="http://schemas.microsoft.com/office/drawing/2010/main" xmlns="" w="9525">
                   <a:solidFill>
                     <a:srgbClr val="000000"/>
                   </a:solidFill>
@@ -2353,7 +2352,7 @@
             </a:ln>
             <a:extLst>
               <a:ext uri="{91240B29-F687-4f45-9708-019B960494DF}">
-                <a14:hiddenLine xmlns="" xmlns:a14="http://schemas.microsoft.com/office/drawing/2010/main" w="9525">
+                <a14:hiddenLine xmlns:a14="http://schemas.microsoft.com/office/drawing/2010/main" xmlns="" w="9525">
                   <a:solidFill>
                     <a:srgbClr val="000000"/>
                   </a:solidFill>
@@ -2443,7 +2442,7 @@
             </a:ln>
             <a:extLst>
               <a:ext uri="{91240B29-F687-4f45-9708-019B960494DF}">
-                <a14:hiddenLine xmlns="" xmlns:a14="http://schemas.microsoft.com/office/drawing/2010/main" w="9525">
+                <a14:hiddenLine xmlns:a14="http://schemas.microsoft.com/office/drawing/2010/main" xmlns="" w="9525">
                   <a:solidFill>
                     <a:srgbClr val="000000"/>
                   </a:solidFill>
@@ -2505,7 +2504,7 @@
             </a:ln>
             <a:extLst>
               <a:ext uri="{91240B29-F687-4f45-9708-019B960494DF}">
-                <a14:hiddenLine xmlns="" xmlns:a14="http://schemas.microsoft.com/office/drawing/2010/main" w="9525">
+                <a14:hiddenLine xmlns:a14="http://schemas.microsoft.com/office/drawing/2010/main" xmlns="" w="9525">
                   <a:solidFill>
                     <a:srgbClr val="000000"/>
                   </a:solidFill>
@@ -2567,7 +2566,7 @@
             </a:ln>
             <a:extLst>
               <a:ext uri="{91240B29-F687-4f45-9708-019B960494DF}">
-                <a14:hiddenLine xmlns="" xmlns:a14="http://schemas.microsoft.com/office/drawing/2010/main" w="9525">
+                <a14:hiddenLine xmlns:a14="http://schemas.microsoft.com/office/drawing/2010/main" xmlns="" w="9525">
                   <a:solidFill>
                     <a:srgbClr val="000000"/>
                   </a:solidFill>
@@ -2657,7 +2656,7 @@
             </a:ln>
             <a:extLst>
               <a:ext uri="{91240B29-F687-4f45-9708-019B960494DF}">
-                <a14:hiddenLine xmlns="" xmlns:a14="http://schemas.microsoft.com/office/drawing/2010/main" w="9525">
+                <a14:hiddenLine xmlns:a14="http://schemas.microsoft.com/office/drawing/2010/main" xmlns="" w="9525">
                   <a:solidFill>
                     <a:srgbClr val="000000"/>
                   </a:solidFill>
@@ -2725,7 +2724,7 @@
             </a:ln>
             <a:extLst>
               <a:ext uri="{91240B29-F687-4f45-9708-019B960494DF}">
-                <a14:hiddenLine xmlns="" xmlns:a14="http://schemas.microsoft.com/office/drawing/2010/main" w="9525">
+                <a14:hiddenLine xmlns:a14="http://schemas.microsoft.com/office/drawing/2010/main" xmlns="" w="9525">
                   <a:solidFill>
                     <a:srgbClr val="000000"/>
                   </a:solidFill>
@@ -2787,7 +2786,7 @@
             </a:ln>
             <a:extLst>
               <a:ext uri="{91240B29-F687-4f45-9708-019B960494DF}">
-                <a14:hiddenLine xmlns="" xmlns:a14="http://schemas.microsoft.com/office/drawing/2010/main" w="9525">
+                <a14:hiddenLine xmlns:a14="http://schemas.microsoft.com/office/drawing/2010/main" xmlns="" w="9525">
                   <a:solidFill>
                     <a:srgbClr val="000000"/>
                   </a:solidFill>
@@ -2877,7 +2876,7 @@
             </a:ln>
             <a:extLst>
               <a:ext uri="{91240B29-F687-4f45-9708-019B960494DF}">
-                <a14:hiddenLine xmlns="" xmlns:a14="http://schemas.microsoft.com/office/drawing/2010/main" w="9525">
+                <a14:hiddenLine xmlns:a14="http://schemas.microsoft.com/office/drawing/2010/main" xmlns="" w="9525">
                   <a:solidFill>
                     <a:srgbClr val="000000"/>
                   </a:solidFill>
@@ -2939,7 +2938,7 @@
             </a:ln>
             <a:extLst>
               <a:ext uri="{91240B29-F687-4f45-9708-019B960494DF}">
-                <a14:hiddenLine xmlns="" xmlns:a14="http://schemas.microsoft.com/office/drawing/2010/main" w="9525">
+                <a14:hiddenLine xmlns:a14="http://schemas.microsoft.com/office/drawing/2010/main" xmlns="" w="9525">
                   <a:solidFill>
                     <a:srgbClr val="000000"/>
                   </a:solidFill>
@@ -3029,7 +3028,7 @@
             </a:ln>
             <a:extLst>
               <a:ext uri="{91240B29-F687-4f45-9708-019B960494DF}">
-                <a14:hiddenLine xmlns="" xmlns:a14="http://schemas.microsoft.com/office/drawing/2010/main" w="9525">
+                <a14:hiddenLine xmlns:a14="http://schemas.microsoft.com/office/drawing/2010/main" xmlns="" w="9525">
                   <a:solidFill>
                     <a:srgbClr val="000000"/>
                   </a:solidFill>
@@ -3091,7 +3090,7 @@
             </a:ln>
             <a:extLst>
               <a:ext uri="{91240B29-F687-4f45-9708-019B960494DF}">
-                <a14:hiddenLine xmlns="" xmlns:a14="http://schemas.microsoft.com/office/drawing/2010/main" w="9525">
+                <a14:hiddenLine xmlns:a14="http://schemas.microsoft.com/office/drawing/2010/main" xmlns="" w="9525">
                   <a:solidFill>
                     <a:srgbClr val="000000"/>
                   </a:solidFill>
@@ -3181,7 +3180,7 @@
             </a:ln>
             <a:extLst>
               <a:ext uri="{91240B29-F687-4f45-9708-019B960494DF}">
-                <a14:hiddenLine xmlns="" xmlns:a14="http://schemas.microsoft.com/office/drawing/2010/main" w="9525">
+                <a14:hiddenLine xmlns:a14="http://schemas.microsoft.com/office/drawing/2010/main" xmlns="" w="9525">
                   <a:solidFill>
                     <a:srgbClr val="000000"/>
                   </a:solidFill>
@@ -3215,7 +3214,7 @@
             </a:ln>
             <a:extLst>
               <a:ext uri="{91240B29-F687-4f45-9708-019B960494DF}">
-                <a14:hiddenLine xmlns="" xmlns:a14="http://schemas.microsoft.com/office/drawing/2010/main" w="9525">
+                <a14:hiddenLine xmlns:a14="http://schemas.microsoft.com/office/drawing/2010/main" xmlns="" w="9525">
                   <a:solidFill>
                     <a:srgbClr val="000000"/>
                   </a:solidFill>
@@ -3280,7 +3279,7 @@
             </a:ln>
             <a:extLst>
               <a:ext uri="{91240B29-F687-4f45-9708-019B960494DF}">
-                <a14:hiddenLine xmlns="" xmlns:a14="http://schemas.microsoft.com/office/drawing/2010/main" w="9525">
+                <a14:hiddenLine xmlns:a14="http://schemas.microsoft.com/office/drawing/2010/main" xmlns="" w="9525">
                   <a:solidFill>
                     <a:srgbClr val="000000"/>
                   </a:solidFill>
@@ -3370,7 +3369,7 @@
             </a:ln>
             <a:extLst>
               <a:ext uri="{91240B29-F687-4f45-9708-019B960494DF}">
-                <a14:hiddenLine xmlns="" xmlns:a14="http://schemas.microsoft.com/office/drawing/2010/main" w="9525">
+                <a14:hiddenLine xmlns:a14="http://schemas.microsoft.com/office/drawing/2010/main" xmlns="" w="9525">
                   <a:solidFill>
                     <a:srgbClr val="000000"/>
                   </a:solidFill>
@@ -3432,7 +3431,7 @@
             </a:ln>
             <a:extLst>
               <a:ext uri="{91240B29-F687-4f45-9708-019B960494DF}">
-                <a14:hiddenLine xmlns="" xmlns:a14="http://schemas.microsoft.com/office/drawing/2010/main" w="9525">
+                <a14:hiddenLine xmlns:a14="http://schemas.microsoft.com/office/drawing/2010/main" xmlns="" w="9525">
                   <a:solidFill>
                     <a:srgbClr val="000000"/>
                   </a:solidFill>
@@ -3522,7 +3521,7 @@
             </a:ln>
             <a:extLst>
               <a:ext uri="{91240B29-F687-4f45-9708-019B960494DF}">
-                <a14:hiddenLine xmlns="" xmlns:a14="http://schemas.microsoft.com/office/drawing/2010/main" w="9525">
+                <a14:hiddenLine xmlns:a14="http://schemas.microsoft.com/office/drawing/2010/main" xmlns="" w="9525">
                   <a:solidFill>
                     <a:srgbClr val="000000"/>
                   </a:solidFill>
@@ -3612,7 +3611,7 @@
             </a:ln>
             <a:extLst>
               <a:ext uri="{91240B29-F687-4f45-9708-019B960494DF}">
-                <a14:hiddenLine xmlns="" xmlns:a14="http://schemas.microsoft.com/office/drawing/2010/main" w="9525">
+                <a14:hiddenLine xmlns:a14="http://schemas.microsoft.com/office/drawing/2010/main" xmlns="" w="9525">
                   <a:solidFill>
                     <a:srgbClr val="000000"/>
                   </a:solidFill>
@@ -3677,7 +3676,7 @@
             </a:ln>
             <a:extLst>
               <a:ext uri="{91240B29-F687-4f45-9708-019B960494DF}">
-                <a14:hiddenLine xmlns="" xmlns:a14="http://schemas.microsoft.com/office/drawing/2010/main" w="9525">
+                <a14:hiddenLine xmlns:a14="http://schemas.microsoft.com/office/drawing/2010/main" xmlns="" w="9525">
                   <a:solidFill>
                     <a:srgbClr val="000000"/>
                   </a:solidFill>
@@ -3739,7 +3738,7 @@
             </a:ln>
             <a:extLst>
               <a:ext uri="{91240B29-F687-4f45-9708-019B960494DF}">
-                <a14:hiddenLine xmlns="" xmlns:a14="http://schemas.microsoft.com/office/drawing/2010/main" w="9525">
+                <a14:hiddenLine xmlns:a14="http://schemas.microsoft.com/office/drawing/2010/main" xmlns="" w="9525">
                   <a:solidFill>
                     <a:srgbClr val="000000"/>
                   </a:solidFill>
@@ -3829,7 +3828,7 @@
             </a:ln>
             <a:extLst>
               <a:ext uri="{91240B29-F687-4f45-9708-019B960494DF}">
-                <a14:hiddenLine xmlns="" xmlns:a14="http://schemas.microsoft.com/office/drawing/2010/main" w="9525">
+                <a14:hiddenLine xmlns:a14="http://schemas.microsoft.com/office/drawing/2010/main" xmlns="" w="9525">
                   <a:solidFill>
                     <a:srgbClr val="000000"/>
                   </a:solidFill>
@@ -3919,7 +3918,7 @@
             </a:ln>
             <a:extLst>
               <a:ext uri="{91240B29-F687-4f45-9708-019B960494DF}">
-                <a14:hiddenLine xmlns="" xmlns:a14="http://schemas.microsoft.com/office/drawing/2010/main" w="9525">
+                <a14:hiddenLine xmlns:a14="http://schemas.microsoft.com/office/drawing/2010/main" xmlns="" w="9525">
                   <a:solidFill>
                     <a:srgbClr val="000000"/>
                   </a:solidFill>
@@ -3981,7 +3980,7 @@
             </a:ln>
             <a:extLst>
               <a:ext uri="{91240B29-F687-4f45-9708-019B960494DF}">
-                <a14:hiddenLine xmlns="" xmlns:a14="http://schemas.microsoft.com/office/drawing/2010/main" w="9525">
+                <a14:hiddenLine xmlns:a14="http://schemas.microsoft.com/office/drawing/2010/main" xmlns="" w="9525">
                   <a:solidFill>
                     <a:srgbClr val="000000"/>
                   </a:solidFill>
@@ -4101,7 +4100,7 @@
             </a:ln>
             <a:extLst>
               <a:ext uri="{91240B29-F687-4f45-9708-019B960494DF}">
-                <a14:hiddenLine xmlns="" xmlns:a14="http://schemas.microsoft.com/office/drawing/2010/main" w="9525">
+                <a14:hiddenLine xmlns:a14="http://schemas.microsoft.com/office/drawing/2010/main" xmlns="" w="9525">
                   <a:solidFill>
                     <a:srgbClr val="000000"/>
                   </a:solidFill>
@@ -4169,7 +4168,7 @@
             </a:ln>
             <a:extLst>
               <a:ext uri="{91240B29-F687-4f45-9708-019B960494DF}">
-                <a14:hiddenLine xmlns="" xmlns:a14="http://schemas.microsoft.com/office/drawing/2010/main" w="9525">
+                <a14:hiddenLine xmlns:a14="http://schemas.microsoft.com/office/drawing/2010/main" xmlns="" w="9525">
                   <a:solidFill>
                     <a:srgbClr val="000000"/>
                   </a:solidFill>
@@ -4259,7 +4258,7 @@
             </a:ln>
             <a:extLst>
               <a:ext uri="{91240B29-F687-4f45-9708-019B960494DF}">
-                <a14:hiddenLine xmlns="" xmlns:a14="http://schemas.microsoft.com/office/drawing/2010/main" w="9525">
+                <a14:hiddenLine xmlns:a14="http://schemas.microsoft.com/office/drawing/2010/main" xmlns="" w="9525">
                   <a:solidFill>
                     <a:srgbClr val="000000"/>
                   </a:solidFill>
@@ -9066,7 +9065,7 @@
           <a:noFill/>
           <a:extLst>
             <a:ext uri="{909E8E84-426E-40dd-AFC4-6F175D3DCCD1}">
-              <a14:hiddenFill xmlns="" xmlns:a14="http://schemas.microsoft.com/office/drawing/2010/main">
+              <a14:hiddenFill xmlns:a14="http://schemas.microsoft.com/office/drawing/2010/main" xmlns="">
                 <a:solidFill>
                   <a:srgbClr val="FFFFFF"/>
                 </a:solidFill>
@@ -9140,7 +9139,7 @@
               </a:ln>
               <a:extLst>
                 <a:ext uri="{91240B29-F687-4f45-9708-019B960494DF}">
-                  <a14:hiddenLine xmlns="" xmlns:a14="http://schemas.microsoft.com/office/drawing/2010/main" w="9525">
+                  <a14:hiddenLine xmlns:a14="http://schemas.microsoft.com/office/drawing/2010/main" xmlns="" w="9525">
                     <a:solidFill>
                       <a:srgbClr val="000000"/>
                     </a:solidFill>
@@ -9230,7 +9229,7 @@
               </a:ln>
               <a:extLst>
                 <a:ext uri="{91240B29-F687-4f45-9708-019B960494DF}">
-                  <a14:hiddenLine xmlns="" xmlns:a14="http://schemas.microsoft.com/office/drawing/2010/main" w="9525">
+                  <a14:hiddenLine xmlns:a14="http://schemas.microsoft.com/office/drawing/2010/main" xmlns="" w="9525">
                     <a:solidFill>
                       <a:srgbClr val="000000"/>
                     </a:solidFill>
@@ -9320,7 +9319,7 @@
               </a:ln>
               <a:extLst>
                 <a:ext uri="{91240B29-F687-4f45-9708-019B960494DF}">
-                  <a14:hiddenLine xmlns="" xmlns:a14="http://schemas.microsoft.com/office/drawing/2010/main" w="9525">
+                  <a14:hiddenLine xmlns:a14="http://schemas.microsoft.com/office/drawing/2010/main" xmlns="" w="9525">
                     <a:solidFill>
                       <a:srgbClr val="000000"/>
                     </a:solidFill>
@@ -9382,7 +9381,7 @@
               </a:ln>
               <a:extLst>
                 <a:ext uri="{91240B29-F687-4f45-9708-019B960494DF}">
-                  <a14:hiddenLine xmlns="" xmlns:a14="http://schemas.microsoft.com/office/drawing/2010/main" w="9525">
+                  <a14:hiddenLine xmlns:a14="http://schemas.microsoft.com/office/drawing/2010/main" xmlns="" w="9525">
                     <a:solidFill>
                       <a:srgbClr val="000000"/>
                     </a:solidFill>
@@ -9472,7 +9471,7 @@
               </a:ln>
               <a:extLst>
                 <a:ext uri="{91240B29-F687-4f45-9708-019B960494DF}">
-                  <a14:hiddenLine xmlns="" xmlns:a14="http://schemas.microsoft.com/office/drawing/2010/main" w="9525">
+                  <a14:hiddenLine xmlns:a14="http://schemas.microsoft.com/office/drawing/2010/main" xmlns="" w="9525">
                     <a:solidFill>
                       <a:srgbClr val="000000"/>
                     </a:solidFill>
@@ -9534,7 +9533,7 @@
               </a:ln>
               <a:extLst>
                 <a:ext uri="{91240B29-F687-4f45-9708-019B960494DF}">
-                  <a14:hiddenLine xmlns="" xmlns:a14="http://schemas.microsoft.com/office/drawing/2010/main" w="9525">
+                  <a14:hiddenLine xmlns:a14="http://schemas.microsoft.com/office/drawing/2010/main" xmlns="" w="9525">
                     <a:solidFill>
                       <a:srgbClr val="000000"/>
                     </a:solidFill>
@@ -9596,7 +9595,7 @@
               </a:ln>
               <a:extLst>
                 <a:ext uri="{91240B29-F687-4f45-9708-019B960494DF}">
-                  <a14:hiddenLine xmlns="" xmlns:a14="http://schemas.microsoft.com/office/drawing/2010/main" w="9525">
+                  <a14:hiddenLine xmlns:a14="http://schemas.microsoft.com/office/drawing/2010/main" xmlns="" w="9525">
                     <a:solidFill>
                       <a:srgbClr val="000000"/>
                     </a:solidFill>
@@ -9686,7 +9685,7 @@
               </a:ln>
               <a:extLst>
                 <a:ext uri="{91240B29-F687-4f45-9708-019B960494DF}">
-                  <a14:hiddenLine xmlns="" xmlns:a14="http://schemas.microsoft.com/office/drawing/2010/main" w="9525">
+                  <a14:hiddenLine xmlns:a14="http://schemas.microsoft.com/office/drawing/2010/main" xmlns="" w="9525">
                     <a:solidFill>
                       <a:srgbClr val="000000"/>
                     </a:solidFill>
@@ -9776,7 +9775,7 @@
               </a:ln>
               <a:extLst>
                 <a:ext uri="{91240B29-F687-4f45-9708-019B960494DF}">
-                  <a14:hiddenLine xmlns="" xmlns:a14="http://schemas.microsoft.com/office/drawing/2010/main" w="9525">
+                  <a14:hiddenLine xmlns:a14="http://schemas.microsoft.com/office/drawing/2010/main" xmlns="" w="9525">
                     <a:solidFill>
                       <a:srgbClr val="000000"/>
                     </a:solidFill>
@@ -9838,7 +9837,7 @@
               </a:ln>
               <a:extLst>
                 <a:ext uri="{91240B29-F687-4f45-9708-019B960494DF}">
-                  <a14:hiddenLine xmlns="" xmlns:a14="http://schemas.microsoft.com/office/drawing/2010/main" w="9525">
+                  <a14:hiddenLine xmlns:a14="http://schemas.microsoft.com/office/drawing/2010/main" xmlns="" w="9525">
                     <a:solidFill>
                       <a:srgbClr val="000000"/>
                     </a:solidFill>
@@ -9948,7 +9947,7 @@
               </a:ln>
               <a:extLst>
                 <a:ext uri="{91240B29-F687-4f45-9708-019B960494DF}">
-                  <a14:hiddenLine xmlns="" xmlns:a14="http://schemas.microsoft.com/office/drawing/2010/main" w="9525">
+                  <a14:hiddenLine xmlns:a14="http://schemas.microsoft.com/office/drawing/2010/main" xmlns="" w="9525">
                     <a:solidFill>
                       <a:srgbClr val="000000"/>
                     </a:solidFill>
@@ -10032,7 +10031,7 @@
               </a:ln>
               <a:extLst>
                 <a:ext uri="{91240B29-F687-4f45-9708-019B960494DF}">
-                  <a14:hiddenLine xmlns="" xmlns:a14="http://schemas.microsoft.com/office/drawing/2010/main" w="9525">
+                  <a14:hiddenLine xmlns:a14="http://schemas.microsoft.com/office/drawing/2010/main" xmlns="" w="9525">
                     <a:solidFill>
                       <a:srgbClr val="000000"/>
                     </a:solidFill>
@@ -10094,7 +10093,7 @@
               </a:ln>
               <a:extLst>
                 <a:ext uri="{91240B29-F687-4f45-9708-019B960494DF}">
-                  <a14:hiddenLine xmlns="" xmlns:a14="http://schemas.microsoft.com/office/drawing/2010/main" w="9525">
+                  <a14:hiddenLine xmlns:a14="http://schemas.microsoft.com/office/drawing/2010/main" xmlns="" w="9525">
                     <a:solidFill>
                       <a:srgbClr val="000000"/>
                     </a:solidFill>
@@ -10156,7 +10155,7 @@
               </a:ln>
               <a:extLst>
                 <a:ext uri="{91240B29-F687-4f45-9708-019B960494DF}">
-                  <a14:hiddenLine xmlns="" xmlns:a14="http://schemas.microsoft.com/office/drawing/2010/main" w="9525">
+                  <a14:hiddenLine xmlns:a14="http://schemas.microsoft.com/office/drawing/2010/main" xmlns="" w="9525">
                     <a:solidFill>
                       <a:srgbClr val="000000"/>
                     </a:solidFill>
@@ -10246,7 +10245,7 @@
               </a:ln>
               <a:extLst>
                 <a:ext uri="{91240B29-F687-4f45-9708-019B960494DF}">
-                  <a14:hiddenLine xmlns="" xmlns:a14="http://schemas.microsoft.com/office/drawing/2010/main" w="9525">
+                  <a14:hiddenLine xmlns:a14="http://schemas.microsoft.com/office/drawing/2010/main" xmlns="" w="9525">
                     <a:solidFill>
                       <a:srgbClr val="000000"/>
                     </a:solidFill>
@@ -10280,7 +10279,7 @@
               </a:ln>
               <a:extLst>
                 <a:ext uri="{91240B29-F687-4f45-9708-019B960494DF}">
-                  <a14:hiddenLine xmlns="" xmlns:a14="http://schemas.microsoft.com/office/drawing/2010/main" w="9525">
+                  <a14:hiddenLine xmlns:a14="http://schemas.microsoft.com/office/drawing/2010/main" xmlns="" w="9525">
                     <a:solidFill>
                       <a:srgbClr val="000000"/>
                     </a:solidFill>
@@ -10345,7 +10344,7 @@
               </a:ln>
               <a:extLst>
                 <a:ext uri="{91240B29-F687-4f45-9708-019B960494DF}">
-                  <a14:hiddenLine xmlns="" xmlns:a14="http://schemas.microsoft.com/office/drawing/2010/main" w="9525">
+                  <a14:hiddenLine xmlns:a14="http://schemas.microsoft.com/office/drawing/2010/main" xmlns="" w="9525">
                     <a:solidFill>
                       <a:srgbClr val="000000"/>
                     </a:solidFill>
@@ -10435,7 +10434,7 @@
               </a:ln>
               <a:extLst>
                 <a:ext uri="{91240B29-F687-4f45-9708-019B960494DF}">
-                  <a14:hiddenLine xmlns="" xmlns:a14="http://schemas.microsoft.com/office/drawing/2010/main" w="9525">
+                  <a14:hiddenLine xmlns:a14="http://schemas.microsoft.com/office/drawing/2010/main" xmlns="" w="9525">
                     <a:solidFill>
                       <a:srgbClr val="000000"/>
                     </a:solidFill>
@@ -10497,7 +10496,7 @@
               </a:ln>
               <a:extLst>
                 <a:ext uri="{91240B29-F687-4f45-9708-019B960494DF}">
-                  <a14:hiddenLine xmlns="" xmlns:a14="http://schemas.microsoft.com/office/drawing/2010/main" w="9525">
+                  <a14:hiddenLine xmlns:a14="http://schemas.microsoft.com/office/drawing/2010/main" xmlns="" w="9525">
                     <a:solidFill>
                       <a:srgbClr val="000000"/>
                     </a:solidFill>
@@ -10587,7 +10586,7 @@
               </a:ln>
               <a:extLst>
                 <a:ext uri="{91240B29-F687-4f45-9708-019B960494DF}">
-                  <a14:hiddenLine xmlns="" xmlns:a14="http://schemas.microsoft.com/office/drawing/2010/main" w="9525">
+                  <a14:hiddenLine xmlns:a14="http://schemas.microsoft.com/office/drawing/2010/main" xmlns="" w="9525">
                     <a:solidFill>
                       <a:srgbClr val="000000"/>
                     </a:solidFill>
@@ -10652,7 +10651,7 @@
               </a:ln>
               <a:extLst>
                 <a:ext uri="{91240B29-F687-4f45-9708-019B960494DF}">
-                  <a14:hiddenLine xmlns="" xmlns:a14="http://schemas.microsoft.com/office/drawing/2010/main" w="9525">
+                  <a14:hiddenLine xmlns:a14="http://schemas.microsoft.com/office/drawing/2010/main" xmlns="" w="9525">
                     <a:solidFill>
                       <a:srgbClr val="000000"/>
                     </a:solidFill>
@@ -10714,7 +10713,7 @@
               </a:ln>
               <a:extLst>
                 <a:ext uri="{91240B29-F687-4f45-9708-019B960494DF}">
-                  <a14:hiddenLine xmlns="" xmlns:a14="http://schemas.microsoft.com/office/drawing/2010/main" w="9525">
+                  <a14:hiddenLine xmlns:a14="http://schemas.microsoft.com/office/drawing/2010/main" xmlns="" w="9525">
                     <a:solidFill>
                       <a:srgbClr val="000000"/>
                     </a:solidFill>
@@ -10804,7 +10803,7 @@
               </a:ln>
               <a:extLst>
                 <a:ext uri="{91240B29-F687-4f45-9708-019B960494DF}">
-                  <a14:hiddenLine xmlns="" xmlns:a14="http://schemas.microsoft.com/office/drawing/2010/main" w="9525">
+                  <a14:hiddenLine xmlns:a14="http://schemas.microsoft.com/office/drawing/2010/main" xmlns="" w="9525">
                     <a:solidFill>
                       <a:srgbClr val="000000"/>
                     </a:solidFill>
@@ -10894,7 +10893,7 @@
               </a:ln>
               <a:extLst>
                 <a:ext uri="{91240B29-F687-4f45-9708-019B960494DF}">
-                  <a14:hiddenLine xmlns="" xmlns:a14="http://schemas.microsoft.com/office/drawing/2010/main" w="9525">
+                  <a14:hiddenLine xmlns:a14="http://schemas.microsoft.com/office/drawing/2010/main" xmlns="" w="9525">
                     <a:solidFill>
                       <a:srgbClr val="000000"/>
                     </a:solidFill>
@@ -10959,7 +10958,7 @@
               </a:ln>
               <a:extLst>
                 <a:ext uri="{91240B29-F687-4f45-9708-019B960494DF}">
-                  <a14:hiddenLine xmlns="" xmlns:a14="http://schemas.microsoft.com/office/drawing/2010/main" w="9525">
+                  <a14:hiddenLine xmlns:a14="http://schemas.microsoft.com/office/drawing/2010/main" xmlns="" w="9525">
                     <a:solidFill>
                       <a:srgbClr val="000000"/>
                     </a:solidFill>
@@ -11079,7 +11078,7 @@
               </a:ln>
               <a:extLst>
                 <a:ext uri="{91240B29-F687-4f45-9708-019B960494DF}">
-                  <a14:hiddenLine xmlns="" xmlns:a14="http://schemas.microsoft.com/office/drawing/2010/main" w="9525">
+                  <a14:hiddenLine xmlns:a14="http://schemas.microsoft.com/office/drawing/2010/main" xmlns="" w="9525">
                     <a:solidFill>
                       <a:srgbClr val="000000"/>
                     </a:solidFill>
@@ -11177,7 +11176,7 @@
               </a:ln>
               <a:extLst>
                 <a:ext uri="{91240B29-F687-4f45-9708-019B960494DF}">
-                  <a14:hiddenLine xmlns="" xmlns:a14="http://schemas.microsoft.com/office/drawing/2010/main" w="9525">
+                  <a14:hiddenLine xmlns:a14="http://schemas.microsoft.com/office/drawing/2010/main" xmlns="" w="9525">
                     <a:solidFill>
                       <a:srgbClr val="000000"/>
                     </a:solidFill>
@@ -11292,7 +11291,7 @@
               </a:ln>
               <a:extLst>
                 <a:ext uri="{91240B29-F687-4f45-9708-019B960494DF}">
-                  <a14:hiddenLine xmlns="" xmlns:a14="http://schemas.microsoft.com/office/drawing/2010/main" w="9525">
+                  <a14:hiddenLine xmlns:a14="http://schemas.microsoft.com/office/drawing/2010/main" xmlns="" w="9525">
                     <a:solidFill>
                       <a:srgbClr val="000000"/>
                     </a:solidFill>
@@ -11382,7 +11381,7 @@
               </a:ln>
               <a:extLst>
                 <a:ext uri="{91240B29-F687-4f45-9708-019B960494DF}">
-                  <a14:hiddenLine xmlns="" xmlns:a14="http://schemas.microsoft.com/office/drawing/2010/main" w="9525">
+                  <a14:hiddenLine xmlns:a14="http://schemas.microsoft.com/office/drawing/2010/main" xmlns="" w="9525">
                     <a:solidFill>
                       <a:srgbClr val="000000"/>
                     </a:solidFill>
@@ -11447,7 +11446,7 @@
               </a:ln>
               <a:extLst>
                 <a:ext uri="{91240B29-F687-4f45-9708-019B960494DF}">
-                  <a14:hiddenLine xmlns="" xmlns:a14="http://schemas.microsoft.com/office/drawing/2010/main" w="9525">
+                  <a14:hiddenLine xmlns:a14="http://schemas.microsoft.com/office/drawing/2010/main" xmlns="" w="9525">
                     <a:solidFill>
                       <a:srgbClr val="000000"/>
                     </a:solidFill>
@@ -11537,7 +11536,7 @@
               </a:ln>
               <a:extLst>
                 <a:ext uri="{91240B29-F687-4f45-9708-019B960494DF}">
-                  <a14:hiddenLine xmlns="" xmlns:a14="http://schemas.microsoft.com/office/drawing/2010/main" w="9525">
+                  <a14:hiddenLine xmlns:a14="http://schemas.microsoft.com/office/drawing/2010/main" xmlns="" w="9525">
                     <a:solidFill>
                       <a:srgbClr val="000000"/>
                     </a:solidFill>
@@ -11605,7 +11604,7 @@
               </a:ln>
               <a:extLst>
                 <a:ext uri="{91240B29-F687-4f45-9708-019B960494DF}">
-                  <a14:hiddenLine xmlns="" xmlns:a14="http://schemas.microsoft.com/office/drawing/2010/main" w="9525">
+                  <a14:hiddenLine xmlns:a14="http://schemas.microsoft.com/office/drawing/2010/main" xmlns="" w="9525">
                     <a:solidFill>
                       <a:srgbClr val="000000"/>
                     </a:solidFill>
@@ -11695,7 +11694,7 @@
               </a:ln>
               <a:extLst>
                 <a:ext uri="{91240B29-F687-4f45-9708-019B960494DF}">
-                  <a14:hiddenLine xmlns="" xmlns:a14="http://schemas.microsoft.com/office/drawing/2010/main" w="9525">
+                  <a14:hiddenLine xmlns:a14="http://schemas.microsoft.com/office/drawing/2010/main" xmlns="" w="9525">
                     <a:solidFill>
                       <a:srgbClr val="000000"/>
                     </a:solidFill>
@@ -11763,7 +11762,7 @@
               </a:ln>
               <a:extLst>
                 <a:ext uri="{91240B29-F687-4f45-9708-019B960494DF}">
-                  <a14:hiddenLine xmlns="" xmlns:a14="http://schemas.microsoft.com/office/drawing/2010/main" w="9525">
+                  <a14:hiddenLine xmlns:a14="http://schemas.microsoft.com/office/drawing/2010/main" xmlns="" w="9525">
                     <a:solidFill>
                       <a:srgbClr val="000000"/>
                     </a:solidFill>
@@ -11853,7 +11852,7 @@
               </a:ln>
               <a:extLst>
                 <a:ext uri="{91240B29-F687-4f45-9708-019B960494DF}">
-                  <a14:hiddenLine xmlns="" xmlns:a14="http://schemas.microsoft.com/office/drawing/2010/main" w="9525">
+                  <a14:hiddenLine xmlns:a14="http://schemas.microsoft.com/office/drawing/2010/main" xmlns="" w="9525">
                     <a:solidFill>
                       <a:srgbClr val="000000"/>
                     </a:solidFill>
@@ -11887,7 +11886,7 @@
               </a:ln>
               <a:extLst>
                 <a:ext uri="{91240B29-F687-4f45-9708-019B960494DF}">
-                  <a14:hiddenLine xmlns="" xmlns:a14="http://schemas.microsoft.com/office/drawing/2010/main" w="9525">
+                  <a14:hiddenLine xmlns:a14="http://schemas.microsoft.com/office/drawing/2010/main" xmlns="" w="9525">
                     <a:solidFill>
                       <a:srgbClr val="000000"/>
                     </a:solidFill>
@@ -12581,90 +12580,6 @@
           <p:cNvPr id="2" name="Title 1">
             <a:extLst>
               <a:ext uri="{FF2B5EF4-FFF2-40B4-BE49-F238E27FC236}">
-                <a16:creationId xmlns:a16="http://schemas.microsoft.com/office/drawing/2014/main" id="{6C90E832-22A3-40B8-83FC-AB571942EC7C}"/>
-              </a:ext>
-            </a:extLst>
-          </p:cNvPr>
-          <p:cNvSpPr>
-            <a:spLocks noGrp="1"/>
-          </p:cNvSpPr>
-          <p:nvPr>
-            <p:ph type="title"/>
-          </p:nvPr>
-        </p:nvSpPr>
-        <p:spPr/>
-        <p:txBody>
-          <a:bodyPr/>
-          <a:lstStyle/>
-          <a:p>
-            <a:r>
-              <a:rPr lang="en-US" altLang="en-US" dirty="0"/>
-              <a:t>Design pattern discussion (High-level focus)</a:t>
-            </a:r>
-            <a:endParaRPr lang="en-CA" dirty="0"/>
-          </a:p>
-        </p:txBody>
-      </p:sp>
-      <p:sp>
-        <p:nvSpPr>
-          <p:cNvPr id="3" name="Content Placeholder 2">
-            <a:extLst>
-              <a:ext uri="{FF2B5EF4-FFF2-40B4-BE49-F238E27FC236}">
-                <a16:creationId xmlns:a16="http://schemas.microsoft.com/office/drawing/2014/main" id="{A6CC2F4B-AFFA-426E-A93E-05769A23E634}"/>
-              </a:ext>
-            </a:extLst>
-          </p:cNvPr>
-          <p:cNvSpPr>
-            <a:spLocks noGrp="1"/>
-          </p:cNvSpPr>
-          <p:nvPr>
-            <p:ph idx="1"/>
-          </p:nvPr>
-        </p:nvSpPr>
-        <p:spPr/>
-        <p:txBody>
-          <a:bodyPr/>
-          <a:lstStyle/>
-          <a:p>
-            <a:endParaRPr lang="en-CA"/>
-          </a:p>
-        </p:txBody>
-      </p:sp>
-    </p:spTree>
-    <p:extLst>
-      <p:ext uri="{BB962C8B-B14F-4D97-AF65-F5344CB8AC3E}">
-        <p14:creationId xmlns:p14="http://schemas.microsoft.com/office/powerpoint/2010/main" val="740593883"/>
-      </p:ext>
-    </p:extLst>
-  </p:cSld>
-  <p:clrMapOvr>
-    <a:masterClrMapping/>
-  </p:clrMapOvr>
-</p:sld>
-</file>
-
-<file path=ppt/slides/slide11.xml><?xml version="1.0" encoding="utf-8"?>
-<p:sld xmlns:a="http://schemas.openxmlformats.org/drawingml/2006/main" xmlns:r="http://schemas.openxmlformats.org/officeDocument/2006/relationships" xmlns:p="http://schemas.openxmlformats.org/presentationml/2006/main">
-  <p:cSld>
-    <p:spTree>
-      <p:nvGrpSpPr>
-        <p:cNvPr id="1" name=""/>
-        <p:cNvGrpSpPr/>
-        <p:nvPr/>
-      </p:nvGrpSpPr>
-      <p:grpSpPr>
-        <a:xfrm>
-          <a:off x="0" y="0"/>
-          <a:ext cx="0" cy="0"/>
-          <a:chOff x="0" y="0"/>
-          <a:chExt cx="0" cy="0"/>
-        </a:xfrm>
-      </p:grpSpPr>
-      <p:sp>
-        <p:nvSpPr>
-          <p:cNvPr id="2" name="Title 1">
-            <a:extLst>
-              <a:ext uri="{FF2B5EF4-FFF2-40B4-BE49-F238E27FC236}">
                 <a16:creationId xmlns:a16="http://schemas.microsoft.com/office/drawing/2014/main" id="{234688A5-970F-464D-9D47-B2468E60A79D}"/>
               </a:ext>
             </a:extLst>
@@ -12763,15 +12678,7 @@
             </a:pPr>
             <a:r>
               <a:rPr lang="en-US" dirty="0"/>
-              <a:t>Things that we could have improved on ourselves, by looking at what team </a:t>
-            </a:r>
-            <a:r>
-              <a:rPr lang="en-US" dirty="0" err="1"/>
-              <a:t>Covfefe</a:t>
-            </a:r>
-            <a:r>
-              <a:rPr lang="en-US" dirty="0"/>
-              <a:t> had or was missing</a:t>
+              <a:t>We learned how to use refactoring Techniques which help to change messy code to more clean and simple code.</a:t>
             </a:r>
           </a:p>
           <a:p>
@@ -12833,7 +12740,7 @@
 </p:sld>
 </file>
 
-<file path=ppt/slides/slide12.xml><?xml version="1.0" encoding="utf-8"?>
+<file path=ppt/slides/slide11.xml><?xml version="1.0" encoding="utf-8"?>
 <p:sld xmlns:a="http://schemas.openxmlformats.org/drawingml/2006/main" xmlns:r="http://schemas.openxmlformats.org/officeDocument/2006/relationships" xmlns:p="http://schemas.openxmlformats.org/presentationml/2006/main">
   <p:cSld>
     <p:spTree>
@@ -12913,7 +12820,7 @@
           <a:p>
             <a:r>
               <a:rPr lang="en-CA" sz="2800" dirty="0"/>
-              <a:t>Comments or Question?</a:t>
+              <a:t>Comments or Questions?</a:t>
             </a:r>
           </a:p>
         </p:txBody>
@@ -13904,7 +13811,7 @@
           <p:cNvPr id="2" name="Title 1">
             <a:extLst>
               <a:ext uri="{FF2B5EF4-FFF2-40B4-BE49-F238E27FC236}">
-                <a16:creationId xmlns:a16="http://schemas.microsoft.com/office/drawing/2014/main" id="{AD06EE58-4AF6-44A7-AA22-F8556EDA26A0}"/>
+                <a16:creationId xmlns:a16="http://schemas.microsoft.com/office/drawing/2014/main" id="{6C90E832-22A3-40B8-83FC-AB571942EC7C}"/>
               </a:ext>
             </a:extLst>
           </p:cNvPr>
@@ -13933,7 +13840,7 @@
           <p:cNvPr id="3" name="Content Placeholder 2">
             <a:extLst>
               <a:ext uri="{FF2B5EF4-FFF2-40B4-BE49-F238E27FC236}">
-                <a16:creationId xmlns:a16="http://schemas.microsoft.com/office/drawing/2014/main" id="{448F4072-6D68-4CE4-B46A-A7709DB26F94}"/>
+                <a16:creationId xmlns:a16="http://schemas.microsoft.com/office/drawing/2014/main" id="{A6CC2F4B-AFFA-426E-A93E-05769A23E634}"/>
               </a:ext>
             </a:extLst>
           </p:cNvPr>
@@ -13944,48 +13851,76 @@
             <p:ph idx="1"/>
           </p:nvPr>
         </p:nvSpPr>
-        <p:spPr/>
+        <p:spPr>
+          <a:xfrm>
+            <a:off x="1141412" y="2249486"/>
+            <a:ext cx="9905999" cy="3989995"/>
+          </a:xfrm>
+        </p:spPr>
         <p:txBody>
           <a:bodyPr/>
           <a:lstStyle/>
           <a:p>
-            <a:r>
-              <a:rPr lang="en-US" altLang="en-US" dirty="0"/>
-              <a:t>Comment on what design patterns the team used</a:t>
-            </a:r>
-          </a:p>
-          <a:p>
-            <a:pPr lvl="1"/>
-            <a:r>
-              <a:rPr lang="en-US" altLang="en-US" dirty="0"/>
-              <a:t>Provide samples where you are able</a:t>
-            </a:r>
-          </a:p>
-          <a:p>
-            <a:pPr lvl="2"/>
-            <a:r>
-              <a:rPr lang="en-US" altLang="en-US" dirty="0"/>
-              <a:t>Were they appropriate?</a:t>
-            </a:r>
-          </a:p>
-          <a:p>
-            <a:pPr lvl="2"/>
-            <a:r>
-              <a:rPr lang="en-US" altLang="en-US" dirty="0"/>
-              <a:t>Were there alternatives they could have also used?</a:t>
-            </a:r>
-          </a:p>
-          <a:p>
-            <a:r>
-              <a:rPr lang="en-US" altLang="en-US" dirty="0"/>
-              <a:t>If they didn’t use any Design Patterns, were there ones they could have tried?</a:t>
-            </a:r>
-          </a:p>
-          <a:p>
-            <a:pPr lvl="1"/>
-            <a:r>
-              <a:rPr lang="en-US" altLang="en-US" dirty="0"/>
-              <a:t>Provide samples/code snippets/areas of the code</a:t>
+            <a:pPr marL="457200" lvl="1" indent="0">
+              <a:buNone/>
+            </a:pPr>
+            <a:r>
+              <a:rPr lang="en-US" altLang="en-US" sz="2400" dirty="0"/>
+              <a:t>The design pattern they used are : </a:t>
+            </a:r>
+          </a:p>
+          <a:p>
+            <a:pPr lvl="1">
+              <a:buNone/>
+            </a:pPr>
+            <a:r>
+              <a:rPr lang="en-US" sz="2400" dirty="0"/>
+              <a:t>From the Structural design patterns.</a:t>
+            </a:r>
+          </a:p>
+          <a:p>
+            <a:pPr lvl="1">
+              <a:buNone/>
+            </a:pPr>
+            <a:r>
+              <a:rPr lang="en-US" sz="2400" dirty="0"/>
+              <a:t>- composite </a:t>
+            </a:r>
+          </a:p>
+          <a:p>
+            <a:pPr lvl="1">
+              <a:buNone/>
+            </a:pPr>
+            <a:r>
+              <a:rPr lang="en-US" sz="2400" dirty="0"/>
+              <a:t>- Façade</a:t>
+            </a:r>
+          </a:p>
+          <a:p>
+            <a:pPr lvl="1">
+              <a:buNone/>
+            </a:pPr>
+            <a:r>
+              <a:rPr lang="en-US" sz="2400" dirty="0"/>
+              <a:t>From Behavioral design patterns:</a:t>
+            </a:r>
+          </a:p>
+          <a:p>
+            <a:pPr lvl="1">
+              <a:buNone/>
+            </a:pPr>
+            <a:r>
+              <a:rPr lang="en-US" sz="2400" dirty="0"/>
+              <a:t>- Observer</a:t>
+            </a:r>
+          </a:p>
+          <a:p>
+            <a:pPr lvl="1">
+              <a:buNone/>
+            </a:pPr>
+            <a:r>
+              <a:rPr lang="en-US" sz="2400" dirty="0"/>
+              <a:t>- Strategy</a:t>
             </a:r>
           </a:p>
           <a:p>
@@ -13996,7 +13931,7 @@
     </p:spTree>
     <p:extLst>
       <p:ext uri="{BB962C8B-B14F-4D97-AF65-F5344CB8AC3E}">
-        <p14:creationId xmlns:p14="http://schemas.microsoft.com/office/powerpoint/2010/main" val="1421288843"/>
+        <p14:creationId xmlns:p14="http://schemas.microsoft.com/office/powerpoint/2010/main" val="740593883"/>
       </p:ext>
     </p:extLst>
   </p:cSld>

</xml_diff>

<commit_message>
Updated: finished remaining slides, milestone 7 complete
</commit_message>
<xml_diff>
--- a/Milestone 7/ENSE 470 Milestone 7.pptx
+++ b/Milestone 7/ENSE 470 Milestone 7.pptx
@@ -11,11 +11,14 @@
     <p:sldId id="270" r:id="rId5"/>
     <p:sldId id="271" r:id="rId6"/>
     <p:sldId id="272" r:id="rId7"/>
-    <p:sldId id="261" r:id="rId8"/>
-    <p:sldId id="273" r:id="rId9"/>
-    <p:sldId id="264" r:id="rId10"/>
-    <p:sldId id="267" r:id="rId11"/>
-    <p:sldId id="266" r:id="rId12"/>
+    <p:sldId id="273" r:id="rId8"/>
+    <p:sldId id="274" r:id="rId9"/>
+    <p:sldId id="275" r:id="rId10"/>
+    <p:sldId id="276" r:id="rId11"/>
+    <p:sldId id="277" r:id="rId12"/>
+    <p:sldId id="264" r:id="rId13"/>
+    <p:sldId id="267" r:id="rId14"/>
+    <p:sldId id="266" r:id="rId15"/>
   </p:sldIdLst>
   <p:sldSz cx="12192000" cy="6858000"/>
   <p:notesSz cx="6858000" cy="9144000"/>
@@ -172,7 +175,7 @@
           <a:noFill/>
           <a:extLst>
             <a:ext uri="{909E8E84-426E-40dd-AFC4-6F175D3DCCD1}">
-              <a14:hiddenFill xmlns:a14="http://schemas.microsoft.com/office/drawing/2010/main" xmlns="">
+              <a14:hiddenFill xmlns="" xmlns:a14="http://schemas.microsoft.com/office/drawing/2010/main">
                 <a:solidFill>
                   <a:srgbClr val="FFFFFF"/>
                 </a:solidFill>
@@ -232,7 +235,7 @@
             </a:ln>
             <a:extLst>
               <a:ext uri="{91240B29-F687-4f45-9708-019B960494DF}">
-                <a14:hiddenLine xmlns:a14="http://schemas.microsoft.com/office/drawing/2010/main" xmlns="" w="9525">
+                <a14:hiddenLine xmlns="" xmlns:a14="http://schemas.microsoft.com/office/drawing/2010/main" w="9525">
                   <a:solidFill>
                     <a:srgbClr val="000000"/>
                   </a:solidFill>
@@ -322,7 +325,7 @@
             </a:ln>
             <a:extLst>
               <a:ext uri="{91240B29-F687-4f45-9708-019B960494DF}">
-                <a14:hiddenLine xmlns:a14="http://schemas.microsoft.com/office/drawing/2010/main" xmlns="" w="9525">
+                <a14:hiddenLine xmlns="" xmlns:a14="http://schemas.microsoft.com/office/drawing/2010/main" w="9525">
                   <a:solidFill>
                     <a:srgbClr val="000000"/>
                   </a:solidFill>
@@ -412,7 +415,7 @@
             </a:ln>
             <a:extLst>
               <a:ext uri="{91240B29-F687-4f45-9708-019B960494DF}">
-                <a14:hiddenLine xmlns:a14="http://schemas.microsoft.com/office/drawing/2010/main" xmlns="" w="9525">
+                <a14:hiddenLine xmlns="" xmlns:a14="http://schemas.microsoft.com/office/drawing/2010/main" w="9525">
                   <a:solidFill>
                     <a:srgbClr val="000000"/>
                   </a:solidFill>
@@ -446,7 +449,7 @@
             </a:ln>
             <a:extLst>
               <a:ext uri="{91240B29-F687-4f45-9708-019B960494DF}">
-                <a14:hiddenLine xmlns:a14="http://schemas.microsoft.com/office/drawing/2010/main" xmlns="" w="9525">
+                <a14:hiddenLine xmlns="" xmlns:a14="http://schemas.microsoft.com/office/drawing/2010/main" w="9525">
                   <a:solidFill>
                     <a:srgbClr val="000000"/>
                   </a:solidFill>
@@ -536,7 +539,7 @@
             </a:ln>
             <a:extLst>
               <a:ext uri="{91240B29-F687-4f45-9708-019B960494DF}">
-                <a14:hiddenLine xmlns:a14="http://schemas.microsoft.com/office/drawing/2010/main" xmlns="" w="9525">
+                <a14:hiddenLine xmlns="" xmlns:a14="http://schemas.microsoft.com/office/drawing/2010/main" w="9525">
                   <a:solidFill>
                     <a:srgbClr val="000000"/>
                   </a:solidFill>
@@ -598,7 +601,7 @@
             </a:ln>
             <a:extLst>
               <a:ext uri="{91240B29-F687-4f45-9708-019B960494DF}">
-                <a14:hiddenLine xmlns:a14="http://schemas.microsoft.com/office/drawing/2010/main" xmlns="" w="9525">
+                <a14:hiddenLine xmlns="" xmlns:a14="http://schemas.microsoft.com/office/drawing/2010/main" w="9525">
                   <a:solidFill>
                     <a:srgbClr val="000000"/>
                   </a:solidFill>
@@ -660,7 +663,7 @@
             </a:ln>
             <a:extLst>
               <a:ext uri="{91240B29-F687-4f45-9708-019B960494DF}">
-                <a14:hiddenLine xmlns:a14="http://schemas.microsoft.com/office/drawing/2010/main" xmlns="" w="9525">
+                <a14:hiddenLine xmlns="" xmlns:a14="http://schemas.microsoft.com/office/drawing/2010/main" w="9525">
                   <a:solidFill>
                     <a:srgbClr val="000000"/>
                   </a:solidFill>
@@ -750,7 +753,7 @@
             </a:ln>
             <a:extLst>
               <a:ext uri="{91240B29-F687-4f45-9708-019B960494DF}">
-                <a14:hiddenLine xmlns:a14="http://schemas.microsoft.com/office/drawing/2010/main" xmlns="" w="9525">
+                <a14:hiddenLine xmlns="" xmlns:a14="http://schemas.microsoft.com/office/drawing/2010/main" w="9525">
                   <a:solidFill>
                     <a:srgbClr val="000000"/>
                   </a:solidFill>
@@ -812,7 +815,7 @@
             </a:ln>
             <a:extLst>
               <a:ext uri="{91240B29-F687-4f45-9708-019B960494DF}">
-                <a14:hiddenLine xmlns:a14="http://schemas.microsoft.com/office/drawing/2010/main" xmlns="" w="9525">
+                <a14:hiddenLine xmlns="" xmlns:a14="http://schemas.microsoft.com/office/drawing/2010/main" w="9525">
                   <a:solidFill>
                     <a:srgbClr val="000000"/>
                   </a:solidFill>
@@ -874,7 +877,7 @@
             </a:ln>
             <a:extLst>
               <a:ext uri="{91240B29-F687-4f45-9708-019B960494DF}">
-                <a14:hiddenLine xmlns:a14="http://schemas.microsoft.com/office/drawing/2010/main" xmlns="" w="9525">
+                <a14:hiddenLine xmlns="" xmlns:a14="http://schemas.microsoft.com/office/drawing/2010/main" w="9525">
                   <a:solidFill>
                     <a:srgbClr val="000000"/>
                   </a:solidFill>
@@ -964,7 +967,7 @@
             </a:ln>
             <a:extLst>
               <a:ext uri="{91240B29-F687-4f45-9708-019B960494DF}">
-                <a14:hiddenLine xmlns:a14="http://schemas.microsoft.com/office/drawing/2010/main" xmlns="" w="9525">
+                <a14:hiddenLine xmlns="" xmlns:a14="http://schemas.microsoft.com/office/drawing/2010/main" w="9525">
                   <a:solidFill>
                     <a:srgbClr val="000000"/>
                   </a:solidFill>
@@ -1054,7 +1057,7 @@
             </a:ln>
             <a:extLst>
               <a:ext uri="{91240B29-F687-4f45-9708-019B960494DF}">
-                <a14:hiddenLine xmlns:a14="http://schemas.microsoft.com/office/drawing/2010/main" xmlns="" w="9525">
+                <a14:hiddenLine xmlns="" xmlns:a14="http://schemas.microsoft.com/office/drawing/2010/main" w="9525">
                   <a:solidFill>
                     <a:srgbClr val="000000"/>
                   </a:solidFill>
@@ -1116,7 +1119,7 @@
             </a:ln>
             <a:extLst>
               <a:ext uri="{91240B29-F687-4f45-9708-019B960494DF}">
-                <a14:hiddenLine xmlns:a14="http://schemas.microsoft.com/office/drawing/2010/main" xmlns="" w="9525">
+                <a14:hiddenLine xmlns="" xmlns:a14="http://schemas.microsoft.com/office/drawing/2010/main" w="9525">
                   <a:solidFill>
                     <a:srgbClr val="000000"/>
                   </a:solidFill>
@@ -1226,7 +1229,7 @@
             </a:ln>
             <a:extLst>
               <a:ext uri="{91240B29-F687-4f45-9708-019B960494DF}">
-                <a14:hiddenLine xmlns:a14="http://schemas.microsoft.com/office/drawing/2010/main" xmlns="" w="9525">
+                <a14:hiddenLine xmlns="" xmlns:a14="http://schemas.microsoft.com/office/drawing/2010/main" w="9525">
                   <a:solidFill>
                     <a:srgbClr val="000000"/>
                   </a:solidFill>
@@ -1288,7 +1291,7 @@
             </a:ln>
             <a:extLst>
               <a:ext uri="{91240B29-F687-4f45-9708-019B960494DF}">
-                <a14:hiddenLine xmlns:a14="http://schemas.microsoft.com/office/drawing/2010/main" xmlns="" w="9525">
+                <a14:hiddenLine xmlns="" xmlns:a14="http://schemas.microsoft.com/office/drawing/2010/main" w="9525">
                   <a:solidFill>
                     <a:srgbClr val="000000"/>
                   </a:solidFill>
@@ -1378,7 +1381,7 @@
             </a:ln>
             <a:extLst>
               <a:ext uri="{91240B29-F687-4f45-9708-019B960494DF}">
-                <a14:hiddenLine xmlns:a14="http://schemas.microsoft.com/office/drawing/2010/main" xmlns="" w="9525">
+                <a14:hiddenLine xmlns="" xmlns:a14="http://schemas.microsoft.com/office/drawing/2010/main" w="9525">
                   <a:solidFill>
                     <a:srgbClr val="000000"/>
                   </a:solidFill>
@@ -1468,7 +1471,7 @@
             </a:ln>
             <a:extLst>
               <a:ext uri="{91240B29-F687-4f45-9708-019B960494DF}">
-                <a14:hiddenLine xmlns:a14="http://schemas.microsoft.com/office/drawing/2010/main" xmlns="" w="9525">
+                <a14:hiddenLine xmlns="" xmlns:a14="http://schemas.microsoft.com/office/drawing/2010/main" w="9525">
                   <a:solidFill>
                     <a:srgbClr val="000000"/>
                   </a:solidFill>
@@ -1530,7 +1533,7 @@
             </a:ln>
             <a:extLst>
               <a:ext uri="{91240B29-F687-4f45-9708-019B960494DF}">
-                <a14:hiddenLine xmlns:a14="http://schemas.microsoft.com/office/drawing/2010/main" xmlns="" w="9525">
+                <a14:hiddenLine xmlns="" xmlns:a14="http://schemas.microsoft.com/office/drawing/2010/main" w="9525">
                   <a:solidFill>
                     <a:srgbClr val="000000"/>
                   </a:solidFill>
@@ -1620,7 +1623,7 @@
             </a:ln>
             <a:extLst>
               <a:ext uri="{91240B29-F687-4f45-9708-019B960494DF}">
-                <a14:hiddenLine xmlns:a14="http://schemas.microsoft.com/office/drawing/2010/main" xmlns="" w="9525">
+                <a14:hiddenLine xmlns="" xmlns:a14="http://schemas.microsoft.com/office/drawing/2010/main" w="9525">
                   <a:solidFill>
                     <a:srgbClr val="000000"/>
                   </a:solidFill>
@@ -1710,7 +1713,7 @@
             </a:ln>
             <a:extLst>
               <a:ext uri="{91240B29-F687-4f45-9708-019B960494DF}">
-                <a14:hiddenLine xmlns:a14="http://schemas.microsoft.com/office/drawing/2010/main" xmlns="" w="9525">
+                <a14:hiddenLine xmlns="" xmlns:a14="http://schemas.microsoft.com/office/drawing/2010/main" w="9525">
                   <a:solidFill>
                     <a:srgbClr val="000000"/>
                   </a:solidFill>
@@ -1766,7 +1769,7 @@
             </a:ln>
             <a:extLst>
               <a:ext uri="{91240B29-F687-4f45-9708-019B960494DF}">
-                <a14:hiddenLine xmlns:a14="http://schemas.microsoft.com/office/drawing/2010/main" xmlns="" w="9525">
+                <a14:hiddenLine xmlns="" xmlns:a14="http://schemas.microsoft.com/office/drawing/2010/main" w="9525">
                   <a:solidFill>
                     <a:srgbClr val="000000"/>
                   </a:solidFill>
@@ -1856,7 +1859,7 @@
             </a:ln>
             <a:extLst>
               <a:ext uri="{91240B29-F687-4f45-9708-019B960494DF}">
-                <a14:hiddenLine xmlns:a14="http://schemas.microsoft.com/office/drawing/2010/main" xmlns="" w="9525">
+                <a14:hiddenLine xmlns="" xmlns:a14="http://schemas.microsoft.com/office/drawing/2010/main" w="9525">
                   <a:solidFill>
                     <a:srgbClr val="000000"/>
                   </a:solidFill>
@@ -1912,7 +1915,7 @@
             </a:ln>
             <a:extLst>
               <a:ext uri="{91240B29-F687-4f45-9708-019B960494DF}">
-                <a14:hiddenLine xmlns:a14="http://schemas.microsoft.com/office/drawing/2010/main" xmlns="" w="9525">
+                <a14:hiddenLine xmlns="" xmlns:a14="http://schemas.microsoft.com/office/drawing/2010/main" w="9525">
                   <a:solidFill>
                     <a:srgbClr val="000000"/>
                   </a:solidFill>
@@ -2002,7 +2005,7 @@
             </a:ln>
             <a:extLst>
               <a:ext uri="{91240B29-F687-4f45-9708-019B960494DF}">
-                <a14:hiddenLine xmlns:a14="http://schemas.microsoft.com/office/drawing/2010/main" xmlns="" w="9525">
+                <a14:hiddenLine xmlns="" xmlns:a14="http://schemas.microsoft.com/office/drawing/2010/main" w="9525">
                   <a:solidFill>
                     <a:srgbClr val="000000"/>
                   </a:solidFill>
@@ -2070,7 +2073,7 @@
             </a:ln>
             <a:extLst>
               <a:ext uri="{91240B29-F687-4f45-9708-019B960494DF}">
-                <a14:hiddenLine xmlns:a14="http://schemas.microsoft.com/office/drawing/2010/main" xmlns="" w="9525">
+                <a14:hiddenLine xmlns="" xmlns:a14="http://schemas.microsoft.com/office/drawing/2010/main" w="9525">
                   <a:solidFill>
                     <a:srgbClr val="000000"/>
                   </a:solidFill>
@@ -2160,7 +2163,7 @@
             </a:ln>
             <a:extLst>
               <a:ext uri="{91240B29-F687-4f45-9708-019B960494DF}">
-                <a14:hiddenLine xmlns:a14="http://schemas.microsoft.com/office/drawing/2010/main" xmlns="" w="9525">
+                <a14:hiddenLine xmlns="" xmlns:a14="http://schemas.microsoft.com/office/drawing/2010/main" w="9525">
                   <a:solidFill>
                     <a:srgbClr val="000000"/>
                   </a:solidFill>
@@ -2228,7 +2231,7 @@
             </a:ln>
             <a:extLst>
               <a:ext uri="{91240B29-F687-4f45-9708-019B960494DF}">
-                <a14:hiddenLine xmlns:a14="http://schemas.microsoft.com/office/drawing/2010/main" xmlns="" w="9525">
+                <a14:hiddenLine xmlns="" xmlns:a14="http://schemas.microsoft.com/office/drawing/2010/main" w="9525">
                   <a:solidFill>
                     <a:srgbClr val="000000"/>
                   </a:solidFill>
@@ -2318,7 +2321,7 @@
             </a:ln>
             <a:extLst>
               <a:ext uri="{91240B29-F687-4f45-9708-019B960494DF}">
-                <a14:hiddenLine xmlns:a14="http://schemas.microsoft.com/office/drawing/2010/main" xmlns="" w="9525">
+                <a14:hiddenLine xmlns="" xmlns:a14="http://schemas.microsoft.com/office/drawing/2010/main" w="9525">
                   <a:solidFill>
                     <a:srgbClr val="000000"/>
                   </a:solidFill>
@@ -2352,7 +2355,7 @@
             </a:ln>
             <a:extLst>
               <a:ext uri="{91240B29-F687-4f45-9708-019B960494DF}">
-                <a14:hiddenLine xmlns:a14="http://schemas.microsoft.com/office/drawing/2010/main" xmlns="" w="9525">
+                <a14:hiddenLine xmlns="" xmlns:a14="http://schemas.microsoft.com/office/drawing/2010/main" w="9525">
                   <a:solidFill>
                     <a:srgbClr val="000000"/>
                   </a:solidFill>
@@ -2442,7 +2445,7 @@
             </a:ln>
             <a:extLst>
               <a:ext uri="{91240B29-F687-4f45-9708-019B960494DF}">
-                <a14:hiddenLine xmlns:a14="http://schemas.microsoft.com/office/drawing/2010/main" xmlns="" w="9525">
+                <a14:hiddenLine xmlns="" xmlns:a14="http://schemas.microsoft.com/office/drawing/2010/main" w="9525">
                   <a:solidFill>
                     <a:srgbClr val="000000"/>
                   </a:solidFill>
@@ -2504,7 +2507,7 @@
             </a:ln>
             <a:extLst>
               <a:ext uri="{91240B29-F687-4f45-9708-019B960494DF}">
-                <a14:hiddenLine xmlns:a14="http://schemas.microsoft.com/office/drawing/2010/main" xmlns="" w="9525">
+                <a14:hiddenLine xmlns="" xmlns:a14="http://schemas.microsoft.com/office/drawing/2010/main" w="9525">
                   <a:solidFill>
                     <a:srgbClr val="000000"/>
                   </a:solidFill>
@@ -2566,7 +2569,7 @@
             </a:ln>
             <a:extLst>
               <a:ext uri="{91240B29-F687-4f45-9708-019B960494DF}">
-                <a14:hiddenLine xmlns:a14="http://schemas.microsoft.com/office/drawing/2010/main" xmlns="" w="9525">
+                <a14:hiddenLine xmlns="" xmlns:a14="http://schemas.microsoft.com/office/drawing/2010/main" w="9525">
                   <a:solidFill>
                     <a:srgbClr val="000000"/>
                   </a:solidFill>
@@ -2656,7 +2659,7 @@
             </a:ln>
             <a:extLst>
               <a:ext uri="{91240B29-F687-4f45-9708-019B960494DF}">
-                <a14:hiddenLine xmlns:a14="http://schemas.microsoft.com/office/drawing/2010/main" xmlns="" w="9525">
+                <a14:hiddenLine xmlns="" xmlns:a14="http://schemas.microsoft.com/office/drawing/2010/main" w="9525">
                   <a:solidFill>
                     <a:srgbClr val="000000"/>
                   </a:solidFill>
@@ -2724,7 +2727,7 @@
             </a:ln>
             <a:extLst>
               <a:ext uri="{91240B29-F687-4f45-9708-019B960494DF}">
-                <a14:hiddenLine xmlns:a14="http://schemas.microsoft.com/office/drawing/2010/main" xmlns="" w="9525">
+                <a14:hiddenLine xmlns="" xmlns:a14="http://schemas.microsoft.com/office/drawing/2010/main" w="9525">
                   <a:solidFill>
                     <a:srgbClr val="000000"/>
                   </a:solidFill>
@@ -2786,7 +2789,7 @@
             </a:ln>
             <a:extLst>
               <a:ext uri="{91240B29-F687-4f45-9708-019B960494DF}">
-                <a14:hiddenLine xmlns:a14="http://schemas.microsoft.com/office/drawing/2010/main" xmlns="" w="9525">
+                <a14:hiddenLine xmlns="" xmlns:a14="http://schemas.microsoft.com/office/drawing/2010/main" w="9525">
                   <a:solidFill>
                     <a:srgbClr val="000000"/>
                   </a:solidFill>
@@ -2876,7 +2879,7 @@
             </a:ln>
             <a:extLst>
               <a:ext uri="{91240B29-F687-4f45-9708-019B960494DF}">
-                <a14:hiddenLine xmlns:a14="http://schemas.microsoft.com/office/drawing/2010/main" xmlns="" w="9525">
+                <a14:hiddenLine xmlns="" xmlns:a14="http://schemas.microsoft.com/office/drawing/2010/main" w="9525">
                   <a:solidFill>
                     <a:srgbClr val="000000"/>
                   </a:solidFill>
@@ -2938,7 +2941,7 @@
             </a:ln>
             <a:extLst>
               <a:ext uri="{91240B29-F687-4f45-9708-019B960494DF}">
-                <a14:hiddenLine xmlns:a14="http://schemas.microsoft.com/office/drawing/2010/main" xmlns="" w="9525">
+                <a14:hiddenLine xmlns="" xmlns:a14="http://schemas.microsoft.com/office/drawing/2010/main" w="9525">
                   <a:solidFill>
                     <a:srgbClr val="000000"/>
                   </a:solidFill>
@@ -3028,7 +3031,7 @@
             </a:ln>
             <a:extLst>
               <a:ext uri="{91240B29-F687-4f45-9708-019B960494DF}">
-                <a14:hiddenLine xmlns:a14="http://schemas.microsoft.com/office/drawing/2010/main" xmlns="" w="9525">
+                <a14:hiddenLine xmlns="" xmlns:a14="http://schemas.microsoft.com/office/drawing/2010/main" w="9525">
                   <a:solidFill>
                     <a:srgbClr val="000000"/>
                   </a:solidFill>
@@ -3090,7 +3093,7 @@
             </a:ln>
             <a:extLst>
               <a:ext uri="{91240B29-F687-4f45-9708-019B960494DF}">
-                <a14:hiddenLine xmlns:a14="http://schemas.microsoft.com/office/drawing/2010/main" xmlns="" w="9525">
+                <a14:hiddenLine xmlns="" xmlns:a14="http://schemas.microsoft.com/office/drawing/2010/main" w="9525">
                   <a:solidFill>
                     <a:srgbClr val="000000"/>
                   </a:solidFill>
@@ -3180,7 +3183,7 @@
             </a:ln>
             <a:extLst>
               <a:ext uri="{91240B29-F687-4f45-9708-019B960494DF}">
-                <a14:hiddenLine xmlns:a14="http://schemas.microsoft.com/office/drawing/2010/main" xmlns="" w="9525">
+                <a14:hiddenLine xmlns="" xmlns:a14="http://schemas.microsoft.com/office/drawing/2010/main" w="9525">
                   <a:solidFill>
                     <a:srgbClr val="000000"/>
                   </a:solidFill>
@@ -3214,7 +3217,7 @@
             </a:ln>
             <a:extLst>
               <a:ext uri="{91240B29-F687-4f45-9708-019B960494DF}">
-                <a14:hiddenLine xmlns:a14="http://schemas.microsoft.com/office/drawing/2010/main" xmlns="" w="9525">
+                <a14:hiddenLine xmlns="" xmlns:a14="http://schemas.microsoft.com/office/drawing/2010/main" w="9525">
                   <a:solidFill>
                     <a:srgbClr val="000000"/>
                   </a:solidFill>
@@ -3279,7 +3282,7 @@
             </a:ln>
             <a:extLst>
               <a:ext uri="{91240B29-F687-4f45-9708-019B960494DF}">
-                <a14:hiddenLine xmlns:a14="http://schemas.microsoft.com/office/drawing/2010/main" xmlns="" w="9525">
+                <a14:hiddenLine xmlns="" xmlns:a14="http://schemas.microsoft.com/office/drawing/2010/main" w="9525">
                   <a:solidFill>
                     <a:srgbClr val="000000"/>
                   </a:solidFill>
@@ -3369,7 +3372,7 @@
             </a:ln>
             <a:extLst>
               <a:ext uri="{91240B29-F687-4f45-9708-019B960494DF}">
-                <a14:hiddenLine xmlns:a14="http://schemas.microsoft.com/office/drawing/2010/main" xmlns="" w="9525">
+                <a14:hiddenLine xmlns="" xmlns:a14="http://schemas.microsoft.com/office/drawing/2010/main" w="9525">
                   <a:solidFill>
                     <a:srgbClr val="000000"/>
                   </a:solidFill>
@@ -3431,7 +3434,7 @@
             </a:ln>
             <a:extLst>
               <a:ext uri="{91240B29-F687-4f45-9708-019B960494DF}">
-                <a14:hiddenLine xmlns:a14="http://schemas.microsoft.com/office/drawing/2010/main" xmlns="" w="9525">
+                <a14:hiddenLine xmlns="" xmlns:a14="http://schemas.microsoft.com/office/drawing/2010/main" w="9525">
                   <a:solidFill>
                     <a:srgbClr val="000000"/>
                   </a:solidFill>
@@ -3521,7 +3524,7 @@
             </a:ln>
             <a:extLst>
               <a:ext uri="{91240B29-F687-4f45-9708-019B960494DF}">
-                <a14:hiddenLine xmlns:a14="http://schemas.microsoft.com/office/drawing/2010/main" xmlns="" w="9525">
+                <a14:hiddenLine xmlns="" xmlns:a14="http://schemas.microsoft.com/office/drawing/2010/main" w="9525">
                   <a:solidFill>
                     <a:srgbClr val="000000"/>
                   </a:solidFill>
@@ -3611,7 +3614,7 @@
             </a:ln>
             <a:extLst>
               <a:ext uri="{91240B29-F687-4f45-9708-019B960494DF}">
-                <a14:hiddenLine xmlns:a14="http://schemas.microsoft.com/office/drawing/2010/main" xmlns="" w="9525">
+                <a14:hiddenLine xmlns="" xmlns:a14="http://schemas.microsoft.com/office/drawing/2010/main" w="9525">
                   <a:solidFill>
                     <a:srgbClr val="000000"/>
                   </a:solidFill>
@@ -3676,7 +3679,7 @@
             </a:ln>
             <a:extLst>
               <a:ext uri="{91240B29-F687-4f45-9708-019B960494DF}">
-                <a14:hiddenLine xmlns:a14="http://schemas.microsoft.com/office/drawing/2010/main" xmlns="" w="9525">
+                <a14:hiddenLine xmlns="" xmlns:a14="http://schemas.microsoft.com/office/drawing/2010/main" w="9525">
                   <a:solidFill>
                     <a:srgbClr val="000000"/>
                   </a:solidFill>
@@ -3738,7 +3741,7 @@
             </a:ln>
             <a:extLst>
               <a:ext uri="{91240B29-F687-4f45-9708-019B960494DF}">
-                <a14:hiddenLine xmlns:a14="http://schemas.microsoft.com/office/drawing/2010/main" xmlns="" w="9525">
+                <a14:hiddenLine xmlns="" xmlns:a14="http://schemas.microsoft.com/office/drawing/2010/main" w="9525">
                   <a:solidFill>
                     <a:srgbClr val="000000"/>
                   </a:solidFill>
@@ -3828,7 +3831,7 @@
             </a:ln>
             <a:extLst>
               <a:ext uri="{91240B29-F687-4f45-9708-019B960494DF}">
-                <a14:hiddenLine xmlns:a14="http://schemas.microsoft.com/office/drawing/2010/main" xmlns="" w="9525">
+                <a14:hiddenLine xmlns="" xmlns:a14="http://schemas.microsoft.com/office/drawing/2010/main" w="9525">
                   <a:solidFill>
                     <a:srgbClr val="000000"/>
                   </a:solidFill>
@@ -3918,7 +3921,7 @@
             </a:ln>
             <a:extLst>
               <a:ext uri="{91240B29-F687-4f45-9708-019B960494DF}">
-                <a14:hiddenLine xmlns:a14="http://schemas.microsoft.com/office/drawing/2010/main" xmlns="" w="9525">
+                <a14:hiddenLine xmlns="" xmlns:a14="http://schemas.microsoft.com/office/drawing/2010/main" w="9525">
                   <a:solidFill>
                     <a:srgbClr val="000000"/>
                   </a:solidFill>
@@ -3980,7 +3983,7 @@
             </a:ln>
             <a:extLst>
               <a:ext uri="{91240B29-F687-4f45-9708-019B960494DF}">
-                <a14:hiddenLine xmlns:a14="http://schemas.microsoft.com/office/drawing/2010/main" xmlns="" w="9525">
+                <a14:hiddenLine xmlns="" xmlns:a14="http://schemas.microsoft.com/office/drawing/2010/main" w="9525">
                   <a:solidFill>
                     <a:srgbClr val="000000"/>
                   </a:solidFill>
@@ -4100,7 +4103,7 @@
             </a:ln>
             <a:extLst>
               <a:ext uri="{91240B29-F687-4f45-9708-019B960494DF}">
-                <a14:hiddenLine xmlns:a14="http://schemas.microsoft.com/office/drawing/2010/main" xmlns="" w="9525">
+                <a14:hiddenLine xmlns="" xmlns:a14="http://schemas.microsoft.com/office/drawing/2010/main" w="9525">
                   <a:solidFill>
                     <a:srgbClr val="000000"/>
                   </a:solidFill>
@@ -4168,7 +4171,7 @@
             </a:ln>
             <a:extLst>
               <a:ext uri="{91240B29-F687-4f45-9708-019B960494DF}">
-                <a14:hiddenLine xmlns:a14="http://schemas.microsoft.com/office/drawing/2010/main" xmlns="" w="9525">
+                <a14:hiddenLine xmlns="" xmlns:a14="http://schemas.microsoft.com/office/drawing/2010/main" w="9525">
                   <a:solidFill>
                     <a:srgbClr val="000000"/>
                   </a:solidFill>
@@ -4258,7 +4261,7 @@
             </a:ln>
             <a:extLst>
               <a:ext uri="{91240B29-F687-4f45-9708-019B960494DF}">
-                <a14:hiddenLine xmlns:a14="http://schemas.microsoft.com/office/drawing/2010/main" xmlns="" w="9525">
+                <a14:hiddenLine xmlns="" xmlns:a14="http://schemas.microsoft.com/office/drawing/2010/main" w="9525">
                   <a:solidFill>
                     <a:srgbClr val="000000"/>
                   </a:solidFill>
@@ -4398,7 +4401,7 @@
           <a:p>
             <a:fld id="{99FB56CE-62CC-47B4-A280-D33BC8BCBDFC}" type="datetimeFigureOut">
               <a:rPr lang="en-CA" smtClean="0"/>
-              <a:t>2018-04-11</a:t>
+              <a:t>2018-04-12</a:t>
             </a:fld>
             <a:endParaRPr lang="en-CA"/>
           </a:p>
@@ -4665,7 +4668,7 @@
           <a:p>
             <a:fld id="{99FB56CE-62CC-47B4-A280-D33BC8BCBDFC}" type="datetimeFigureOut">
               <a:rPr lang="en-CA" smtClean="0"/>
-              <a:t>2018-04-11</a:t>
+              <a:t>2018-04-12</a:t>
             </a:fld>
             <a:endParaRPr lang="en-CA"/>
           </a:p>
@@ -4861,7 +4864,7 @@
           <a:p>
             <a:fld id="{99FB56CE-62CC-47B4-A280-D33BC8BCBDFC}" type="datetimeFigureOut">
               <a:rPr lang="en-CA" smtClean="0"/>
-              <a:t>2018-04-11</a:t>
+              <a:t>2018-04-12</a:t>
             </a:fld>
             <a:endParaRPr lang="en-CA"/>
           </a:p>
@@ -5124,7 +5127,7 @@
           <a:p>
             <a:fld id="{99FB56CE-62CC-47B4-A280-D33BC8BCBDFC}" type="datetimeFigureOut">
               <a:rPr lang="en-CA" smtClean="0"/>
-              <a:t>2018-04-11</a:t>
+              <a:t>2018-04-12</a:t>
             </a:fld>
             <a:endParaRPr lang="en-CA"/>
           </a:p>
@@ -5558,7 +5561,7 @@
           <a:p>
             <a:fld id="{99FB56CE-62CC-47B4-A280-D33BC8BCBDFC}" type="datetimeFigureOut">
               <a:rPr lang="en-CA" smtClean="0"/>
-              <a:t>2018-04-11</a:t>
+              <a:t>2018-04-12</a:t>
             </a:fld>
             <a:endParaRPr lang="en-CA"/>
           </a:p>
@@ -6104,7 +6107,7 @@
           <a:p>
             <a:fld id="{99FB56CE-62CC-47B4-A280-D33BC8BCBDFC}" type="datetimeFigureOut">
               <a:rPr lang="en-CA" smtClean="0"/>
-              <a:t>2018-04-11</a:t>
+              <a:t>2018-04-12</a:t>
             </a:fld>
             <a:endParaRPr lang="en-CA"/>
           </a:p>
@@ -6824,7 +6827,7 @@
           <a:p>
             <a:fld id="{99FB56CE-62CC-47B4-A280-D33BC8BCBDFC}" type="datetimeFigureOut">
               <a:rPr lang="en-CA" smtClean="0"/>
-              <a:t>2018-04-11</a:t>
+              <a:t>2018-04-12</a:t>
             </a:fld>
             <a:endParaRPr lang="en-CA"/>
           </a:p>
@@ -6994,7 +6997,7 @@
           <a:p>
             <a:fld id="{99FB56CE-62CC-47B4-A280-D33BC8BCBDFC}" type="datetimeFigureOut">
               <a:rPr lang="en-CA" smtClean="0"/>
-              <a:t>2018-04-11</a:t>
+              <a:t>2018-04-12</a:t>
             </a:fld>
             <a:endParaRPr lang="en-CA"/>
           </a:p>
@@ -7174,7 +7177,7 @@
           <a:p>
             <a:fld id="{99FB56CE-62CC-47B4-A280-D33BC8BCBDFC}" type="datetimeFigureOut">
               <a:rPr lang="en-CA" smtClean="0"/>
-              <a:t>2018-04-11</a:t>
+              <a:t>2018-04-12</a:t>
             </a:fld>
             <a:endParaRPr lang="en-CA"/>
           </a:p>
@@ -7344,7 +7347,7 @@
           <a:p>
             <a:fld id="{99FB56CE-62CC-47B4-A280-D33BC8BCBDFC}" type="datetimeFigureOut">
               <a:rPr lang="en-CA" smtClean="0"/>
-              <a:t>2018-04-11</a:t>
+              <a:t>2018-04-12</a:t>
             </a:fld>
             <a:endParaRPr lang="en-CA"/>
           </a:p>
@@ -7594,7 +7597,7 @@
           <a:p>
             <a:fld id="{99FB56CE-62CC-47B4-A280-D33BC8BCBDFC}" type="datetimeFigureOut">
               <a:rPr lang="en-CA" smtClean="0"/>
-              <a:t>2018-04-11</a:t>
+              <a:t>2018-04-12</a:t>
             </a:fld>
             <a:endParaRPr lang="en-CA"/>
           </a:p>
@@ -7826,7 +7829,7 @@
           <a:p>
             <a:fld id="{99FB56CE-62CC-47B4-A280-D33BC8BCBDFC}" type="datetimeFigureOut">
               <a:rPr lang="en-CA" smtClean="0"/>
-              <a:t>2018-04-11</a:t>
+              <a:t>2018-04-12</a:t>
             </a:fld>
             <a:endParaRPr lang="en-CA"/>
           </a:p>
@@ -8207,7 +8210,7 @@
           <a:p>
             <a:fld id="{99FB56CE-62CC-47B4-A280-D33BC8BCBDFC}" type="datetimeFigureOut">
               <a:rPr lang="en-CA" smtClean="0"/>
-              <a:t>2018-04-11</a:t>
+              <a:t>2018-04-12</a:t>
             </a:fld>
             <a:endParaRPr lang="en-CA"/>
           </a:p>
@@ -8325,7 +8328,7 @@
           <a:p>
             <a:fld id="{99FB56CE-62CC-47B4-A280-D33BC8BCBDFC}" type="datetimeFigureOut">
               <a:rPr lang="en-CA" smtClean="0"/>
-              <a:t>2018-04-11</a:t>
+              <a:t>2018-04-12</a:t>
             </a:fld>
             <a:endParaRPr lang="en-CA"/>
           </a:p>
@@ -8420,7 +8423,7 @@
           <a:p>
             <a:fld id="{99FB56CE-62CC-47B4-A280-D33BC8BCBDFC}" type="datetimeFigureOut">
               <a:rPr lang="en-CA" smtClean="0"/>
-              <a:t>2018-04-11</a:t>
+              <a:t>2018-04-12</a:t>
             </a:fld>
             <a:endParaRPr lang="en-CA"/>
           </a:p>
@@ -8669,7 +8672,7 @@
           <a:p>
             <a:fld id="{99FB56CE-62CC-47B4-A280-D33BC8BCBDFC}" type="datetimeFigureOut">
               <a:rPr lang="en-CA" smtClean="0"/>
-              <a:t>2018-04-11</a:t>
+              <a:t>2018-04-12</a:t>
             </a:fld>
             <a:endParaRPr lang="en-CA"/>
           </a:p>
@@ -8949,7 +8952,7 @@
           <a:p>
             <a:fld id="{99FB56CE-62CC-47B4-A280-D33BC8BCBDFC}" type="datetimeFigureOut">
               <a:rPr lang="en-CA" smtClean="0"/>
-              <a:t>2018-04-11</a:t>
+              <a:t>2018-04-12</a:t>
             </a:fld>
             <a:endParaRPr lang="en-CA"/>
           </a:p>
@@ -9065,7 +9068,7 @@
           <a:noFill/>
           <a:extLst>
             <a:ext uri="{909E8E84-426E-40dd-AFC4-6F175D3DCCD1}">
-              <a14:hiddenFill xmlns:a14="http://schemas.microsoft.com/office/drawing/2010/main" xmlns="">
+              <a14:hiddenFill xmlns="" xmlns:a14="http://schemas.microsoft.com/office/drawing/2010/main">
                 <a:solidFill>
                   <a:srgbClr val="FFFFFF"/>
                 </a:solidFill>
@@ -9139,7 +9142,7 @@
               </a:ln>
               <a:extLst>
                 <a:ext uri="{91240B29-F687-4f45-9708-019B960494DF}">
-                  <a14:hiddenLine xmlns:a14="http://schemas.microsoft.com/office/drawing/2010/main" xmlns="" w="9525">
+                  <a14:hiddenLine xmlns="" xmlns:a14="http://schemas.microsoft.com/office/drawing/2010/main" w="9525">
                     <a:solidFill>
                       <a:srgbClr val="000000"/>
                     </a:solidFill>
@@ -9229,7 +9232,7 @@
               </a:ln>
               <a:extLst>
                 <a:ext uri="{91240B29-F687-4f45-9708-019B960494DF}">
-                  <a14:hiddenLine xmlns:a14="http://schemas.microsoft.com/office/drawing/2010/main" xmlns="" w="9525">
+                  <a14:hiddenLine xmlns="" xmlns:a14="http://schemas.microsoft.com/office/drawing/2010/main" w="9525">
                     <a:solidFill>
                       <a:srgbClr val="000000"/>
                     </a:solidFill>
@@ -9319,7 +9322,7 @@
               </a:ln>
               <a:extLst>
                 <a:ext uri="{91240B29-F687-4f45-9708-019B960494DF}">
-                  <a14:hiddenLine xmlns:a14="http://schemas.microsoft.com/office/drawing/2010/main" xmlns="" w="9525">
+                  <a14:hiddenLine xmlns="" xmlns:a14="http://schemas.microsoft.com/office/drawing/2010/main" w="9525">
                     <a:solidFill>
                       <a:srgbClr val="000000"/>
                     </a:solidFill>
@@ -9381,7 +9384,7 @@
               </a:ln>
               <a:extLst>
                 <a:ext uri="{91240B29-F687-4f45-9708-019B960494DF}">
-                  <a14:hiddenLine xmlns:a14="http://schemas.microsoft.com/office/drawing/2010/main" xmlns="" w="9525">
+                  <a14:hiddenLine xmlns="" xmlns:a14="http://schemas.microsoft.com/office/drawing/2010/main" w="9525">
                     <a:solidFill>
                       <a:srgbClr val="000000"/>
                     </a:solidFill>
@@ -9471,7 +9474,7 @@
               </a:ln>
               <a:extLst>
                 <a:ext uri="{91240B29-F687-4f45-9708-019B960494DF}">
-                  <a14:hiddenLine xmlns:a14="http://schemas.microsoft.com/office/drawing/2010/main" xmlns="" w="9525">
+                  <a14:hiddenLine xmlns="" xmlns:a14="http://schemas.microsoft.com/office/drawing/2010/main" w="9525">
                     <a:solidFill>
                       <a:srgbClr val="000000"/>
                     </a:solidFill>
@@ -9533,7 +9536,7 @@
               </a:ln>
               <a:extLst>
                 <a:ext uri="{91240B29-F687-4f45-9708-019B960494DF}">
-                  <a14:hiddenLine xmlns:a14="http://schemas.microsoft.com/office/drawing/2010/main" xmlns="" w="9525">
+                  <a14:hiddenLine xmlns="" xmlns:a14="http://schemas.microsoft.com/office/drawing/2010/main" w="9525">
                     <a:solidFill>
                       <a:srgbClr val="000000"/>
                     </a:solidFill>
@@ -9595,7 +9598,7 @@
               </a:ln>
               <a:extLst>
                 <a:ext uri="{91240B29-F687-4f45-9708-019B960494DF}">
-                  <a14:hiddenLine xmlns:a14="http://schemas.microsoft.com/office/drawing/2010/main" xmlns="" w="9525">
+                  <a14:hiddenLine xmlns="" xmlns:a14="http://schemas.microsoft.com/office/drawing/2010/main" w="9525">
                     <a:solidFill>
                       <a:srgbClr val="000000"/>
                     </a:solidFill>
@@ -9685,7 +9688,7 @@
               </a:ln>
               <a:extLst>
                 <a:ext uri="{91240B29-F687-4f45-9708-019B960494DF}">
-                  <a14:hiddenLine xmlns:a14="http://schemas.microsoft.com/office/drawing/2010/main" xmlns="" w="9525">
+                  <a14:hiddenLine xmlns="" xmlns:a14="http://schemas.microsoft.com/office/drawing/2010/main" w="9525">
                     <a:solidFill>
                       <a:srgbClr val="000000"/>
                     </a:solidFill>
@@ -9775,7 +9778,7 @@
               </a:ln>
               <a:extLst>
                 <a:ext uri="{91240B29-F687-4f45-9708-019B960494DF}">
-                  <a14:hiddenLine xmlns:a14="http://schemas.microsoft.com/office/drawing/2010/main" xmlns="" w="9525">
+                  <a14:hiddenLine xmlns="" xmlns:a14="http://schemas.microsoft.com/office/drawing/2010/main" w="9525">
                     <a:solidFill>
                       <a:srgbClr val="000000"/>
                     </a:solidFill>
@@ -9837,7 +9840,7 @@
               </a:ln>
               <a:extLst>
                 <a:ext uri="{91240B29-F687-4f45-9708-019B960494DF}">
-                  <a14:hiddenLine xmlns:a14="http://schemas.microsoft.com/office/drawing/2010/main" xmlns="" w="9525">
+                  <a14:hiddenLine xmlns="" xmlns:a14="http://schemas.microsoft.com/office/drawing/2010/main" w="9525">
                     <a:solidFill>
                       <a:srgbClr val="000000"/>
                     </a:solidFill>
@@ -9947,7 +9950,7 @@
               </a:ln>
               <a:extLst>
                 <a:ext uri="{91240B29-F687-4f45-9708-019B960494DF}">
-                  <a14:hiddenLine xmlns:a14="http://schemas.microsoft.com/office/drawing/2010/main" xmlns="" w="9525">
+                  <a14:hiddenLine xmlns="" xmlns:a14="http://schemas.microsoft.com/office/drawing/2010/main" w="9525">
                     <a:solidFill>
                       <a:srgbClr val="000000"/>
                     </a:solidFill>
@@ -10031,7 +10034,7 @@
               </a:ln>
               <a:extLst>
                 <a:ext uri="{91240B29-F687-4f45-9708-019B960494DF}">
-                  <a14:hiddenLine xmlns:a14="http://schemas.microsoft.com/office/drawing/2010/main" xmlns="" w="9525">
+                  <a14:hiddenLine xmlns="" xmlns:a14="http://schemas.microsoft.com/office/drawing/2010/main" w="9525">
                     <a:solidFill>
                       <a:srgbClr val="000000"/>
                     </a:solidFill>
@@ -10093,7 +10096,7 @@
               </a:ln>
               <a:extLst>
                 <a:ext uri="{91240B29-F687-4f45-9708-019B960494DF}">
-                  <a14:hiddenLine xmlns:a14="http://schemas.microsoft.com/office/drawing/2010/main" xmlns="" w="9525">
+                  <a14:hiddenLine xmlns="" xmlns:a14="http://schemas.microsoft.com/office/drawing/2010/main" w="9525">
                     <a:solidFill>
                       <a:srgbClr val="000000"/>
                     </a:solidFill>
@@ -10155,7 +10158,7 @@
               </a:ln>
               <a:extLst>
                 <a:ext uri="{91240B29-F687-4f45-9708-019B960494DF}">
-                  <a14:hiddenLine xmlns:a14="http://schemas.microsoft.com/office/drawing/2010/main" xmlns="" w="9525">
+                  <a14:hiddenLine xmlns="" xmlns:a14="http://schemas.microsoft.com/office/drawing/2010/main" w="9525">
                     <a:solidFill>
                       <a:srgbClr val="000000"/>
                     </a:solidFill>
@@ -10245,7 +10248,7 @@
               </a:ln>
               <a:extLst>
                 <a:ext uri="{91240B29-F687-4f45-9708-019B960494DF}">
-                  <a14:hiddenLine xmlns:a14="http://schemas.microsoft.com/office/drawing/2010/main" xmlns="" w="9525">
+                  <a14:hiddenLine xmlns="" xmlns:a14="http://schemas.microsoft.com/office/drawing/2010/main" w="9525">
                     <a:solidFill>
                       <a:srgbClr val="000000"/>
                     </a:solidFill>
@@ -10279,7 +10282,7 @@
               </a:ln>
               <a:extLst>
                 <a:ext uri="{91240B29-F687-4f45-9708-019B960494DF}">
-                  <a14:hiddenLine xmlns:a14="http://schemas.microsoft.com/office/drawing/2010/main" xmlns="" w="9525">
+                  <a14:hiddenLine xmlns="" xmlns:a14="http://schemas.microsoft.com/office/drawing/2010/main" w="9525">
                     <a:solidFill>
                       <a:srgbClr val="000000"/>
                     </a:solidFill>
@@ -10344,7 +10347,7 @@
               </a:ln>
               <a:extLst>
                 <a:ext uri="{91240B29-F687-4f45-9708-019B960494DF}">
-                  <a14:hiddenLine xmlns:a14="http://schemas.microsoft.com/office/drawing/2010/main" xmlns="" w="9525">
+                  <a14:hiddenLine xmlns="" xmlns:a14="http://schemas.microsoft.com/office/drawing/2010/main" w="9525">
                     <a:solidFill>
                       <a:srgbClr val="000000"/>
                     </a:solidFill>
@@ -10434,7 +10437,7 @@
               </a:ln>
               <a:extLst>
                 <a:ext uri="{91240B29-F687-4f45-9708-019B960494DF}">
-                  <a14:hiddenLine xmlns:a14="http://schemas.microsoft.com/office/drawing/2010/main" xmlns="" w="9525">
+                  <a14:hiddenLine xmlns="" xmlns:a14="http://schemas.microsoft.com/office/drawing/2010/main" w="9525">
                     <a:solidFill>
                       <a:srgbClr val="000000"/>
                     </a:solidFill>
@@ -10496,7 +10499,7 @@
               </a:ln>
               <a:extLst>
                 <a:ext uri="{91240B29-F687-4f45-9708-019B960494DF}">
-                  <a14:hiddenLine xmlns:a14="http://schemas.microsoft.com/office/drawing/2010/main" xmlns="" w="9525">
+                  <a14:hiddenLine xmlns="" xmlns:a14="http://schemas.microsoft.com/office/drawing/2010/main" w="9525">
                     <a:solidFill>
                       <a:srgbClr val="000000"/>
                     </a:solidFill>
@@ -10586,7 +10589,7 @@
               </a:ln>
               <a:extLst>
                 <a:ext uri="{91240B29-F687-4f45-9708-019B960494DF}">
-                  <a14:hiddenLine xmlns:a14="http://schemas.microsoft.com/office/drawing/2010/main" xmlns="" w="9525">
+                  <a14:hiddenLine xmlns="" xmlns:a14="http://schemas.microsoft.com/office/drawing/2010/main" w="9525">
                     <a:solidFill>
                       <a:srgbClr val="000000"/>
                     </a:solidFill>
@@ -10651,7 +10654,7 @@
               </a:ln>
               <a:extLst>
                 <a:ext uri="{91240B29-F687-4f45-9708-019B960494DF}">
-                  <a14:hiddenLine xmlns:a14="http://schemas.microsoft.com/office/drawing/2010/main" xmlns="" w="9525">
+                  <a14:hiddenLine xmlns="" xmlns:a14="http://schemas.microsoft.com/office/drawing/2010/main" w="9525">
                     <a:solidFill>
                       <a:srgbClr val="000000"/>
                     </a:solidFill>
@@ -10713,7 +10716,7 @@
               </a:ln>
               <a:extLst>
                 <a:ext uri="{91240B29-F687-4f45-9708-019B960494DF}">
-                  <a14:hiddenLine xmlns:a14="http://schemas.microsoft.com/office/drawing/2010/main" xmlns="" w="9525">
+                  <a14:hiddenLine xmlns="" xmlns:a14="http://schemas.microsoft.com/office/drawing/2010/main" w="9525">
                     <a:solidFill>
                       <a:srgbClr val="000000"/>
                     </a:solidFill>
@@ -10803,7 +10806,7 @@
               </a:ln>
               <a:extLst>
                 <a:ext uri="{91240B29-F687-4f45-9708-019B960494DF}">
-                  <a14:hiddenLine xmlns:a14="http://schemas.microsoft.com/office/drawing/2010/main" xmlns="" w="9525">
+                  <a14:hiddenLine xmlns="" xmlns:a14="http://schemas.microsoft.com/office/drawing/2010/main" w="9525">
                     <a:solidFill>
                       <a:srgbClr val="000000"/>
                     </a:solidFill>
@@ -10893,7 +10896,7 @@
               </a:ln>
               <a:extLst>
                 <a:ext uri="{91240B29-F687-4f45-9708-019B960494DF}">
-                  <a14:hiddenLine xmlns:a14="http://schemas.microsoft.com/office/drawing/2010/main" xmlns="" w="9525">
+                  <a14:hiddenLine xmlns="" xmlns:a14="http://schemas.microsoft.com/office/drawing/2010/main" w="9525">
                     <a:solidFill>
                       <a:srgbClr val="000000"/>
                     </a:solidFill>
@@ -10958,7 +10961,7 @@
               </a:ln>
               <a:extLst>
                 <a:ext uri="{91240B29-F687-4f45-9708-019B960494DF}">
-                  <a14:hiddenLine xmlns:a14="http://schemas.microsoft.com/office/drawing/2010/main" xmlns="" w="9525">
+                  <a14:hiddenLine xmlns="" xmlns:a14="http://schemas.microsoft.com/office/drawing/2010/main" w="9525">
                     <a:solidFill>
                       <a:srgbClr val="000000"/>
                     </a:solidFill>
@@ -11078,7 +11081,7 @@
               </a:ln>
               <a:extLst>
                 <a:ext uri="{91240B29-F687-4f45-9708-019B960494DF}">
-                  <a14:hiddenLine xmlns:a14="http://schemas.microsoft.com/office/drawing/2010/main" xmlns="" w="9525">
+                  <a14:hiddenLine xmlns="" xmlns:a14="http://schemas.microsoft.com/office/drawing/2010/main" w="9525">
                     <a:solidFill>
                       <a:srgbClr val="000000"/>
                     </a:solidFill>
@@ -11176,7 +11179,7 @@
               </a:ln>
               <a:extLst>
                 <a:ext uri="{91240B29-F687-4f45-9708-019B960494DF}">
-                  <a14:hiddenLine xmlns:a14="http://schemas.microsoft.com/office/drawing/2010/main" xmlns="" w="9525">
+                  <a14:hiddenLine xmlns="" xmlns:a14="http://schemas.microsoft.com/office/drawing/2010/main" w="9525">
                     <a:solidFill>
                       <a:srgbClr val="000000"/>
                     </a:solidFill>
@@ -11291,7 +11294,7 @@
               </a:ln>
               <a:extLst>
                 <a:ext uri="{91240B29-F687-4f45-9708-019B960494DF}">
-                  <a14:hiddenLine xmlns:a14="http://schemas.microsoft.com/office/drawing/2010/main" xmlns="" w="9525">
+                  <a14:hiddenLine xmlns="" xmlns:a14="http://schemas.microsoft.com/office/drawing/2010/main" w="9525">
                     <a:solidFill>
                       <a:srgbClr val="000000"/>
                     </a:solidFill>
@@ -11381,7 +11384,7 @@
               </a:ln>
               <a:extLst>
                 <a:ext uri="{91240B29-F687-4f45-9708-019B960494DF}">
-                  <a14:hiddenLine xmlns:a14="http://schemas.microsoft.com/office/drawing/2010/main" xmlns="" w="9525">
+                  <a14:hiddenLine xmlns="" xmlns:a14="http://schemas.microsoft.com/office/drawing/2010/main" w="9525">
                     <a:solidFill>
                       <a:srgbClr val="000000"/>
                     </a:solidFill>
@@ -11446,7 +11449,7 @@
               </a:ln>
               <a:extLst>
                 <a:ext uri="{91240B29-F687-4f45-9708-019B960494DF}">
-                  <a14:hiddenLine xmlns:a14="http://schemas.microsoft.com/office/drawing/2010/main" xmlns="" w="9525">
+                  <a14:hiddenLine xmlns="" xmlns:a14="http://schemas.microsoft.com/office/drawing/2010/main" w="9525">
                     <a:solidFill>
                       <a:srgbClr val="000000"/>
                     </a:solidFill>
@@ -11536,7 +11539,7 @@
               </a:ln>
               <a:extLst>
                 <a:ext uri="{91240B29-F687-4f45-9708-019B960494DF}">
-                  <a14:hiddenLine xmlns:a14="http://schemas.microsoft.com/office/drawing/2010/main" xmlns="" w="9525">
+                  <a14:hiddenLine xmlns="" xmlns:a14="http://schemas.microsoft.com/office/drawing/2010/main" w="9525">
                     <a:solidFill>
                       <a:srgbClr val="000000"/>
                     </a:solidFill>
@@ -11604,7 +11607,7 @@
               </a:ln>
               <a:extLst>
                 <a:ext uri="{91240B29-F687-4f45-9708-019B960494DF}">
-                  <a14:hiddenLine xmlns:a14="http://schemas.microsoft.com/office/drawing/2010/main" xmlns="" w="9525">
+                  <a14:hiddenLine xmlns="" xmlns:a14="http://schemas.microsoft.com/office/drawing/2010/main" w="9525">
                     <a:solidFill>
                       <a:srgbClr val="000000"/>
                     </a:solidFill>
@@ -11694,7 +11697,7 @@
               </a:ln>
               <a:extLst>
                 <a:ext uri="{91240B29-F687-4f45-9708-019B960494DF}">
-                  <a14:hiddenLine xmlns:a14="http://schemas.microsoft.com/office/drawing/2010/main" xmlns="" w="9525">
+                  <a14:hiddenLine xmlns="" xmlns:a14="http://schemas.microsoft.com/office/drawing/2010/main" w="9525">
                     <a:solidFill>
                       <a:srgbClr val="000000"/>
                     </a:solidFill>
@@ -11762,7 +11765,7 @@
               </a:ln>
               <a:extLst>
                 <a:ext uri="{91240B29-F687-4f45-9708-019B960494DF}">
-                  <a14:hiddenLine xmlns:a14="http://schemas.microsoft.com/office/drawing/2010/main" xmlns="" w="9525">
+                  <a14:hiddenLine xmlns="" xmlns:a14="http://schemas.microsoft.com/office/drawing/2010/main" w="9525">
                     <a:solidFill>
                       <a:srgbClr val="000000"/>
                     </a:solidFill>
@@ -11852,7 +11855,7 @@
               </a:ln>
               <a:extLst>
                 <a:ext uri="{91240B29-F687-4f45-9708-019B960494DF}">
-                  <a14:hiddenLine xmlns:a14="http://schemas.microsoft.com/office/drawing/2010/main" xmlns="" w="9525">
+                  <a14:hiddenLine xmlns="" xmlns:a14="http://schemas.microsoft.com/office/drawing/2010/main" w="9525">
                     <a:solidFill>
                       <a:srgbClr val="000000"/>
                     </a:solidFill>
@@ -11886,7 +11889,7 @@
               </a:ln>
               <a:extLst>
                 <a:ext uri="{91240B29-F687-4f45-9708-019B960494DF}">
-                  <a14:hiddenLine xmlns:a14="http://schemas.microsoft.com/office/drawing/2010/main" xmlns="" w="9525">
+                  <a14:hiddenLine xmlns="" xmlns:a14="http://schemas.microsoft.com/office/drawing/2010/main" w="9525">
                     <a:solidFill>
                       <a:srgbClr val="000000"/>
                     </a:solidFill>
@@ -12026,7 +12029,7 @@
           <a:p>
             <a:fld id="{99FB56CE-62CC-47B4-A280-D33BC8BCBDFC}" type="datetimeFigureOut">
               <a:rPr lang="en-CA" smtClean="0"/>
-              <a:t>2018-04-11</a:t>
+              <a:t>2018-04-12</a:t>
             </a:fld>
             <a:endParaRPr lang="en-CA"/>
           </a:p>
@@ -12580,6 +12583,424 @@
           <p:cNvPr id="2" name="Title 1">
             <a:extLst>
               <a:ext uri="{FF2B5EF4-FFF2-40B4-BE49-F238E27FC236}">
+                <a16:creationId xmlns:a16="http://schemas.microsoft.com/office/drawing/2014/main" id="{A6B21F03-BACB-4991-AA3F-D90B5BB4529F}"/>
+              </a:ext>
+            </a:extLst>
+          </p:cNvPr>
+          <p:cNvSpPr>
+            <a:spLocks noGrp="1"/>
+          </p:cNvSpPr>
+          <p:nvPr>
+            <p:ph type="title"/>
+          </p:nvPr>
+        </p:nvSpPr>
+        <p:spPr/>
+        <p:txBody>
+          <a:bodyPr/>
+          <a:lstStyle/>
+          <a:p>
+            <a:r>
+              <a:rPr lang="en-CA" dirty="0"/>
+              <a:t>Refactor Review</a:t>
+            </a:r>
+          </a:p>
+        </p:txBody>
+      </p:sp>
+      <p:sp>
+        <p:nvSpPr>
+          <p:cNvPr id="3" name="Content Placeholder 2">
+            <a:extLst>
+              <a:ext uri="{FF2B5EF4-FFF2-40B4-BE49-F238E27FC236}">
+                <a16:creationId xmlns:a16="http://schemas.microsoft.com/office/drawing/2014/main" id="{11B7BDAB-E0DB-4474-A5D9-C9C0FFA876F3}"/>
+              </a:ext>
+            </a:extLst>
+          </p:cNvPr>
+          <p:cNvSpPr>
+            <a:spLocks noGrp="1"/>
+          </p:cNvSpPr>
+          <p:nvPr>
+            <p:ph idx="1"/>
+          </p:nvPr>
+        </p:nvSpPr>
+        <p:spPr>
+          <a:xfrm>
+            <a:off x="1141413" y="1710770"/>
+            <a:ext cx="9905999" cy="3541714"/>
+          </a:xfrm>
+        </p:spPr>
+        <p:txBody>
+          <a:bodyPr/>
+          <a:lstStyle/>
+          <a:p>
+            <a:pPr marL="0" indent="0">
+              <a:buNone/>
+            </a:pPr>
+            <a:r>
+              <a:rPr lang="en-US" dirty="0"/>
+              <a:t>Code Smells</a:t>
+            </a:r>
+          </a:p>
+          <a:p>
+            <a:r>
+              <a:rPr lang="en-US" dirty="0"/>
+              <a:t>There are only client-side checks for requesting software.</a:t>
+            </a:r>
+            <a:endParaRPr lang="en-CA" dirty="0"/>
+          </a:p>
+        </p:txBody>
+      </p:sp>
+      <p:pic>
+        <p:nvPicPr>
+          <p:cNvPr id="3074" name="Picture 2" descr="https://lh3.googleusercontent.com/KD3Lv8JyGZq8V_aORqkh4sZFqygq6KyYyvPACvC-IDaABDwC_Ntf7j1QKuCk-2_NY-zJ8JKqeRa360HiSyrWqQJ5cfNUymPdbS5U70fmDwBg1k15rGkCHSaYxnDZjqIN4O3lwP9R">
+            <a:extLst>
+              <a:ext uri="{FF2B5EF4-FFF2-40B4-BE49-F238E27FC236}">
+                <a16:creationId xmlns:a16="http://schemas.microsoft.com/office/drawing/2014/main" id="{0897C1BB-3FB7-4EC8-A336-7CE03F51885C}"/>
+              </a:ext>
+            </a:extLst>
+          </p:cNvPr>
+          <p:cNvPicPr>
+            <a:picLocks noChangeAspect="1" noChangeArrowheads="1"/>
+          </p:cNvPicPr>
+          <p:nvPr/>
+        </p:nvPicPr>
+        <p:blipFill>
+          <a:blip r:embed="rId2">
+            <a:extLst>
+              <a:ext uri="{28A0092B-C50C-407E-A947-70E740481C1C}">
+                <a14:useLocalDpi xmlns:a14="http://schemas.microsoft.com/office/drawing/2010/main" val="0"/>
+              </a:ext>
+            </a:extLst>
+          </a:blip>
+          <a:srcRect/>
+          <a:stretch>
+            <a:fillRect/>
+          </a:stretch>
+        </p:blipFill>
+        <p:spPr bwMode="auto">
+          <a:xfrm>
+            <a:off x="2552930" y="2967470"/>
+            <a:ext cx="7082964" cy="3586886"/>
+          </a:xfrm>
+          <a:prstGeom prst="rect">
+            <a:avLst/>
+          </a:prstGeom>
+          <a:noFill/>
+          <a:extLst>
+            <a:ext uri="{909E8E84-426E-40DD-AFC4-6F175D3DCCD1}">
+              <a14:hiddenFill xmlns:a14="http://schemas.microsoft.com/office/drawing/2010/main">
+                <a:solidFill>
+                  <a:srgbClr val="FFFFFF"/>
+                </a:solidFill>
+              </a14:hiddenFill>
+            </a:ext>
+          </a:extLst>
+        </p:spPr>
+      </p:pic>
+    </p:spTree>
+    <p:extLst>
+      <p:ext uri="{BB962C8B-B14F-4D97-AF65-F5344CB8AC3E}">
+        <p14:creationId xmlns:p14="http://schemas.microsoft.com/office/powerpoint/2010/main" val="788890911"/>
+      </p:ext>
+    </p:extLst>
+  </p:cSld>
+  <p:clrMapOvr>
+    <a:masterClrMapping/>
+  </p:clrMapOvr>
+</p:sld>
+</file>
+
+<file path=ppt/slides/slide11.xml><?xml version="1.0" encoding="utf-8"?>
+<p:sld xmlns:a="http://schemas.openxmlformats.org/drawingml/2006/main" xmlns:r="http://schemas.openxmlformats.org/officeDocument/2006/relationships" xmlns:p="http://schemas.openxmlformats.org/presentationml/2006/main">
+  <p:cSld>
+    <p:spTree>
+      <p:nvGrpSpPr>
+        <p:cNvPr id="1" name=""/>
+        <p:cNvGrpSpPr/>
+        <p:nvPr/>
+      </p:nvGrpSpPr>
+      <p:grpSpPr>
+        <a:xfrm>
+          <a:off x="0" y="0"/>
+          <a:ext cx="0" cy="0"/>
+          <a:chOff x="0" y="0"/>
+          <a:chExt cx="0" cy="0"/>
+        </a:xfrm>
+      </p:grpSpPr>
+      <p:sp>
+        <p:nvSpPr>
+          <p:cNvPr id="2" name="Title 1">
+            <a:extLst>
+              <a:ext uri="{FF2B5EF4-FFF2-40B4-BE49-F238E27FC236}">
+                <a16:creationId xmlns:a16="http://schemas.microsoft.com/office/drawing/2014/main" id="{1E15C220-B0EB-472A-A294-75476830EEAE}"/>
+              </a:ext>
+            </a:extLst>
+          </p:cNvPr>
+          <p:cNvSpPr>
+            <a:spLocks noGrp="1"/>
+          </p:cNvSpPr>
+          <p:nvPr>
+            <p:ph type="title"/>
+          </p:nvPr>
+        </p:nvSpPr>
+        <p:spPr>
+          <a:xfrm>
+            <a:off x="1141413" y="618518"/>
+            <a:ext cx="9905998" cy="855863"/>
+          </a:xfrm>
+        </p:spPr>
+        <p:txBody>
+          <a:bodyPr/>
+          <a:lstStyle/>
+          <a:p>
+            <a:r>
+              <a:rPr lang="en-CA" dirty="0"/>
+              <a:t>Refactor review</a:t>
+            </a:r>
+          </a:p>
+        </p:txBody>
+      </p:sp>
+      <p:sp>
+        <p:nvSpPr>
+          <p:cNvPr id="3" name="Content Placeholder 2">
+            <a:extLst>
+              <a:ext uri="{FF2B5EF4-FFF2-40B4-BE49-F238E27FC236}">
+                <a16:creationId xmlns:a16="http://schemas.microsoft.com/office/drawing/2014/main" id="{EF9540D5-9207-4C83-B818-C031E7E2ACA7}"/>
+              </a:ext>
+            </a:extLst>
+          </p:cNvPr>
+          <p:cNvSpPr>
+            <a:spLocks noGrp="1"/>
+          </p:cNvSpPr>
+          <p:nvPr>
+            <p:ph idx="1"/>
+          </p:nvPr>
+        </p:nvSpPr>
+        <p:spPr>
+          <a:xfrm>
+            <a:off x="1141413" y="1335085"/>
+            <a:ext cx="9905999" cy="5522915"/>
+          </a:xfrm>
+        </p:spPr>
+        <p:txBody>
+          <a:bodyPr>
+            <a:normAutofit lnSpcReduction="10000"/>
+          </a:bodyPr>
+          <a:lstStyle/>
+          <a:p>
+            <a:pPr marL="0" indent="0">
+              <a:buNone/>
+            </a:pPr>
+            <a:r>
+              <a:rPr lang="en-CA" dirty="0"/>
+              <a:t>Refactoring Methods</a:t>
+            </a:r>
+          </a:p>
+          <a:p>
+            <a:r>
+              <a:rPr lang="en-CA" dirty="0"/>
+              <a:t>Separating code for reuse, there are a lot of methods that implement the same code</a:t>
+            </a:r>
+          </a:p>
+          <a:p>
+            <a:r>
+              <a:rPr lang="en-CA" dirty="0"/>
+              <a:t>Incorporate OOP paradigm </a:t>
+            </a:r>
+            <a:r>
+              <a:rPr lang="en-US" dirty="0"/>
+              <a:t>in order to maintain a loosely coupled design using PHP classes</a:t>
+            </a:r>
+          </a:p>
+          <a:p>
+            <a:r>
+              <a:rPr lang="en-US" dirty="0"/>
+              <a:t>Use Observer pattern to notify users of pending and active requests</a:t>
+            </a:r>
+          </a:p>
+          <a:p>
+            <a:r>
+              <a:rPr lang="en-US" dirty="0"/>
+              <a:t>Use Factory pattern to instantiate objects for different types of authentication</a:t>
+            </a:r>
+          </a:p>
+          <a:p>
+            <a:r>
+              <a:rPr lang="en-US" dirty="0"/>
+              <a:t>Have authentication objects inherit from the same abstract parent, allowing an abstract method to be chosen at runtime</a:t>
+            </a:r>
+          </a:p>
+          <a:p>
+            <a:r>
+              <a:rPr lang="en-CA" dirty="0"/>
+              <a:t>Add server-side validation to reduce spam and prevent users from making invalid requests</a:t>
+            </a:r>
+          </a:p>
+        </p:txBody>
+      </p:sp>
+    </p:spTree>
+    <p:extLst>
+      <p:ext uri="{BB962C8B-B14F-4D97-AF65-F5344CB8AC3E}">
+        <p14:creationId xmlns:p14="http://schemas.microsoft.com/office/powerpoint/2010/main" val="3077754297"/>
+      </p:ext>
+    </p:extLst>
+  </p:cSld>
+  <p:clrMapOvr>
+    <a:masterClrMapping/>
+  </p:clrMapOvr>
+</p:sld>
+</file>
+
+<file path=ppt/slides/slide12.xml><?xml version="1.0" encoding="utf-8"?>
+<p:sld xmlns:a="http://schemas.openxmlformats.org/drawingml/2006/main" xmlns:r="http://schemas.openxmlformats.org/officeDocument/2006/relationships" xmlns:p="http://schemas.openxmlformats.org/presentationml/2006/main">
+  <p:cSld>
+    <p:spTree>
+      <p:nvGrpSpPr>
+        <p:cNvPr id="1" name=""/>
+        <p:cNvGrpSpPr/>
+        <p:nvPr/>
+      </p:nvGrpSpPr>
+      <p:grpSpPr>
+        <a:xfrm>
+          <a:off x="0" y="0"/>
+          <a:ext cx="0" cy="0"/>
+          <a:chOff x="0" y="0"/>
+          <a:chExt cx="0" cy="0"/>
+        </a:xfrm>
+      </p:grpSpPr>
+      <p:sp>
+        <p:nvSpPr>
+          <p:cNvPr id="2" name="Title 1">
+            <a:extLst>
+              <a:ext uri="{FF2B5EF4-FFF2-40B4-BE49-F238E27FC236}">
+                <a16:creationId xmlns:a16="http://schemas.microsoft.com/office/drawing/2014/main" id="{6C90E832-22A3-40B8-83FC-AB571942EC7C}"/>
+              </a:ext>
+            </a:extLst>
+          </p:cNvPr>
+          <p:cNvSpPr>
+            <a:spLocks noGrp="1"/>
+          </p:cNvSpPr>
+          <p:nvPr>
+            <p:ph type="title"/>
+          </p:nvPr>
+        </p:nvSpPr>
+        <p:spPr/>
+        <p:txBody>
+          <a:bodyPr/>
+          <a:lstStyle/>
+          <a:p>
+            <a:r>
+              <a:rPr lang="en-US" altLang="en-US" dirty="0"/>
+              <a:t>Design pattern discussion (High-level focus)</a:t>
+            </a:r>
+            <a:endParaRPr lang="en-CA" dirty="0"/>
+          </a:p>
+        </p:txBody>
+      </p:sp>
+      <p:sp>
+        <p:nvSpPr>
+          <p:cNvPr id="3" name="Content Placeholder 2">
+            <a:extLst>
+              <a:ext uri="{FF2B5EF4-FFF2-40B4-BE49-F238E27FC236}">
+                <a16:creationId xmlns:a16="http://schemas.microsoft.com/office/drawing/2014/main" id="{A6CC2F4B-AFFA-426E-A93E-05769A23E634}"/>
+              </a:ext>
+            </a:extLst>
+          </p:cNvPr>
+          <p:cNvSpPr>
+            <a:spLocks noGrp="1"/>
+          </p:cNvSpPr>
+          <p:nvPr>
+            <p:ph idx="1"/>
+          </p:nvPr>
+        </p:nvSpPr>
+        <p:spPr>
+          <a:xfrm>
+            <a:off x="1141412" y="2249486"/>
+            <a:ext cx="9905999" cy="3989995"/>
+          </a:xfrm>
+        </p:spPr>
+        <p:txBody>
+          <a:bodyPr/>
+          <a:lstStyle/>
+          <a:p>
+            <a:pPr marL="457200" lvl="1" indent="0">
+              <a:buNone/>
+            </a:pPr>
+            <a:r>
+              <a:rPr lang="en-US" altLang="en-US" sz="2400" dirty="0"/>
+              <a:t>The design pattern they used are :</a:t>
+            </a:r>
+          </a:p>
+          <a:p>
+            <a:pPr lvl="1"/>
+            <a:r>
+              <a:rPr lang="en-US" altLang="en-US" sz="2400" dirty="0"/>
+              <a:t>Strategy – was used to determine what type of user is logged in, either user approver or analyst  </a:t>
+            </a:r>
+            <a:r>
+              <a:rPr lang="en-US" sz="2400" dirty="0"/>
+              <a:t> </a:t>
+            </a:r>
+          </a:p>
+          <a:p>
+            <a:pPr lvl="1"/>
+            <a:r>
+              <a:rPr lang="en-US" sz="2400" dirty="0"/>
+              <a:t>Façade – was used to complete a request from the user’s perspective</a:t>
+            </a:r>
+          </a:p>
+          <a:p>
+            <a:pPr lvl="1"/>
+            <a:r>
+              <a:rPr lang="en-US" sz="2400" dirty="0"/>
+              <a:t>Observer – was used to notify analysts and approvers of software that needed to be handled</a:t>
+            </a:r>
+          </a:p>
+          <a:p>
+            <a:pPr lvl="1">
+              <a:buNone/>
+            </a:pPr>
+            <a:endParaRPr lang="en-US" sz="2400" dirty="0"/>
+          </a:p>
+          <a:p>
+            <a:endParaRPr lang="en-CA" dirty="0"/>
+          </a:p>
+        </p:txBody>
+      </p:sp>
+    </p:spTree>
+    <p:extLst>
+      <p:ext uri="{BB962C8B-B14F-4D97-AF65-F5344CB8AC3E}">
+        <p14:creationId xmlns:p14="http://schemas.microsoft.com/office/powerpoint/2010/main" val="740593883"/>
+      </p:ext>
+    </p:extLst>
+  </p:cSld>
+  <p:clrMapOvr>
+    <a:masterClrMapping/>
+  </p:clrMapOvr>
+</p:sld>
+</file>
+
+<file path=ppt/slides/slide13.xml><?xml version="1.0" encoding="utf-8"?>
+<p:sld xmlns:a="http://schemas.openxmlformats.org/drawingml/2006/main" xmlns:r="http://schemas.openxmlformats.org/officeDocument/2006/relationships" xmlns:p="http://schemas.openxmlformats.org/presentationml/2006/main">
+  <p:cSld>
+    <p:spTree>
+      <p:nvGrpSpPr>
+        <p:cNvPr id="1" name=""/>
+        <p:cNvGrpSpPr/>
+        <p:nvPr/>
+      </p:nvGrpSpPr>
+      <p:grpSpPr>
+        <a:xfrm>
+          <a:off x="0" y="0"/>
+          <a:ext cx="0" cy="0"/>
+          <a:chOff x="0" y="0"/>
+          <a:chExt cx="0" cy="0"/>
+        </a:xfrm>
+      </p:grpSpPr>
+      <p:sp>
+        <p:nvSpPr>
+          <p:cNvPr id="2" name="Title 1">
+            <a:extLst>
+              <a:ext uri="{FF2B5EF4-FFF2-40B4-BE49-F238E27FC236}">
                 <a16:creationId xmlns:a16="http://schemas.microsoft.com/office/drawing/2014/main" id="{234688A5-970F-464D-9D47-B2468E60A79D}"/>
               </a:ext>
             </a:extLst>
@@ -12740,7 +13161,7 @@
 </p:sld>
 </file>
 
-<file path=ppt/slides/slide11.xml><?xml version="1.0" encoding="utf-8"?>
+<file path=ppt/slides/slide14.xml><?xml version="1.0" encoding="utf-8"?>
 <p:sld xmlns:a="http://schemas.openxmlformats.org/drawingml/2006/main" xmlns:r="http://schemas.openxmlformats.org/officeDocument/2006/relationships" xmlns:p="http://schemas.openxmlformats.org/presentationml/2006/main">
   <p:cSld>
     <p:spTree>
@@ -13428,7 +13849,7 @@
           <p:cNvPr id="2" name="Title 1">
             <a:extLst>
               <a:ext uri="{FF2B5EF4-FFF2-40B4-BE49-F238E27FC236}">
-                <a16:creationId xmlns:a16="http://schemas.microsoft.com/office/drawing/2014/main" id="{0CD12965-4F03-487C-8182-39C3676BD887}"/>
+                <a16:creationId xmlns:a16="http://schemas.microsoft.com/office/drawing/2014/main" id="{4A8B22DD-748E-4C64-A0F6-FC7824240AD5}"/>
               </a:ext>
             </a:extLst>
           </p:cNvPr>
@@ -13441,8 +13862,8 @@
         </p:nvSpPr>
         <p:spPr>
           <a:xfrm>
-            <a:off x="1141413" y="272258"/>
-            <a:ext cx="9905998" cy="1478570"/>
+            <a:off x="1141412" y="547634"/>
+            <a:ext cx="9905998" cy="841687"/>
           </a:xfrm>
         </p:spPr>
         <p:txBody>
@@ -13450,10 +13871,9 @@
           <a:lstStyle/>
           <a:p>
             <a:r>
-              <a:rPr lang="en-US" altLang="en-US" dirty="0"/>
-              <a:t>Refactor review (High-level focus)</a:t>
-            </a:r>
-            <a:endParaRPr lang="en-CA" dirty="0"/>
+              <a:rPr lang="en-CA" dirty="0"/>
+              <a:t>Refactor review</a:t>
+            </a:r>
           </a:p>
         </p:txBody>
       </p:sp>
@@ -13462,7 +13882,7 @@
           <p:cNvPr id="3" name="Content Placeholder 2">
             <a:extLst>
               <a:ext uri="{FF2B5EF4-FFF2-40B4-BE49-F238E27FC236}">
-                <a16:creationId xmlns:a16="http://schemas.microsoft.com/office/drawing/2014/main" id="{422D1545-A1F2-4F68-8327-91932D5C93F9}"/>
+                <a16:creationId xmlns:a16="http://schemas.microsoft.com/office/drawing/2014/main" id="{7E43A16F-79BF-4063-9960-798E605E0CDA}"/>
               </a:ext>
             </a:extLst>
           </p:cNvPr>
@@ -13475,167 +13895,70 @@
         </p:nvSpPr>
         <p:spPr>
           <a:xfrm>
-            <a:off x="1141412" y="1403498"/>
-            <a:ext cx="9905999" cy="5454501"/>
+            <a:off x="1141411" y="1389320"/>
+            <a:ext cx="9905999" cy="5468680"/>
           </a:xfrm>
         </p:spPr>
         <p:txBody>
-          <a:bodyPr>
-            <a:normAutofit fontScale="85000" lnSpcReduction="10000"/>
-          </a:bodyPr>
+          <a:bodyPr/>
           <a:lstStyle/>
           <a:p>
-            <a:pPr>
-              <a:defRPr/>
+            <a:pPr marL="0" indent="0">
+              <a:buNone/>
             </a:pPr>
             <a:r>
-              <a:rPr lang="en-US" altLang="en-US" dirty="0"/>
-              <a:t>Is the team’s code obvious/readable for other programmers</a:t>
-            </a:r>
-          </a:p>
-          <a:p>
-            <a:pPr lvl="1">
-              <a:defRPr/>
+              <a:rPr lang="en-CA" dirty="0"/>
+              <a:t>Code</a:t>
+            </a:r>
+          </a:p>
+          <a:p>
+            <a:r>
+              <a:rPr lang="en-CA" dirty="0"/>
+              <a:t>They used HTML, CSS, JavaScript, MySQL, PHP,  AJAX</a:t>
+            </a:r>
+          </a:p>
+          <a:p>
+            <a:endParaRPr lang="en-CA" dirty="0"/>
+          </a:p>
+          <a:p>
+            <a:pPr marL="0" indent="0">
+              <a:buNone/>
             </a:pPr>
             <a:r>
-              <a:rPr lang="en-US" altLang="en-US" dirty="0"/>
-              <a:t>Will others understand what’s going on?</a:t>
-            </a:r>
-          </a:p>
-          <a:p>
-            <a:pPr lvl="1">
-              <a:defRPr/>
-            </a:pPr>
-            <a:r>
-              <a:rPr lang="en-US" altLang="en-US" dirty="0"/>
-              <a:t>Does your team understand what is going on?</a:t>
-            </a:r>
-          </a:p>
-          <a:p>
-            <a:pPr lvl="1">
-              <a:defRPr/>
-            </a:pPr>
-            <a:r>
-              <a:rPr lang="en-US" altLang="en-US" dirty="0"/>
-              <a:t>Does the code provided as-is appear easy to maintain? – yes/no – Why?</a:t>
-            </a:r>
-          </a:p>
-          <a:p>
-            <a:pPr>
-              <a:defRPr/>
-            </a:pPr>
-            <a:r>
-              <a:rPr lang="en-US" altLang="en-US" dirty="0"/>
-              <a:t>Do all tests pass?</a:t>
-            </a:r>
-          </a:p>
-          <a:p>
-            <a:pPr lvl="1">
-              <a:defRPr/>
-            </a:pPr>
-            <a:r>
-              <a:rPr lang="en-US" altLang="en-US" dirty="0"/>
-              <a:t>Is the team’s ATDDs easy or hard to find on GitHub, discuss</a:t>
-            </a:r>
-          </a:p>
-          <a:p>
-            <a:pPr lvl="1">
-              <a:defRPr/>
-            </a:pPr>
-            <a:r>
-              <a:rPr lang="en-US" altLang="en-US" dirty="0"/>
-              <a:t>Focus/validate ATDD tests provided from Milestone 5 (simply confirm that they work)</a:t>
-            </a:r>
-          </a:p>
-          <a:p>
-            <a:pPr lvl="1">
-              <a:defRPr/>
-            </a:pPr>
-            <a:r>
-              <a:rPr lang="en-US" altLang="en-US" dirty="0"/>
-              <a:t>Were any key ATDD tests missed? (you may have to review their user story map)</a:t>
-            </a:r>
-          </a:p>
-          <a:p>
-            <a:pPr>
-              <a:defRPr/>
-            </a:pPr>
-            <a:r>
-              <a:rPr lang="en-US" altLang="en-US" dirty="0"/>
-              <a:t>Code smells</a:t>
-            </a:r>
-          </a:p>
-          <a:p>
-            <a:pPr lvl="1">
-              <a:defRPr/>
-            </a:pPr>
-            <a:r>
-              <a:rPr lang="en-US" altLang="en-US" dirty="0"/>
-              <a:t>Are there any bloaters, object-orientation/method abuser, change preventers, </a:t>
-            </a:r>
-            <a:r>
-              <a:rPr lang="en-US" altLang="en-US" dirty="0" err="1"/>
-              <a:t>dispensibles</a:t>
-            </a:r>
-            <a:r>
-              <a:rPr lang="en-US" altLang="en-US" dirty="0"/>
-              <a:t>, couplers?</a:t>
-            </a:r>
-          </a:p>
-          <a:p>
-            <a:pPr lvl="1">
-              <a:defRPr/>
-            </a:pPr>
-            <a:r>
-              <a:rPr lang="en-US" altLang="en-US" dirty="0"/>
-              <a:t>If yes to the above, what refactor methods would you use to fix things up?</a:t>
-            </a:r>
-          </a:p>
-          <a:p>
-            <a:pPr lvl="2">
-              <a:defRPr/>
-            </a:pPr>
-            <a:r>
-              <a:rPr lang="en-US" altLang="en-US" dirty="0"/>
-              <a:t>Provide code samples</a:t>
-            </a:r>
-          </a:p>
-          <a:p>
-            <a:pPr lvl="2">
-              <a:defRPr/>
-            </a:pPr>
-            <a:r>
-              <a:rPr lang="en-US" altLang="en-US" dirty="0"/>
-              <a:t>Remember what refactoring is not!</a:t>
-            </a:r>
-          </a:p>
-          <a:p>
-            <a:pPr lvl="1">
-              <a:defRPr/>
-            </a:pPr>
-            <a:r>
-              <a:rPr lang="en-US" altLang="en-US" dirty="0"/>
-              <a:t>If no to the above – what makes the code so stellar?</a:t>
-            </a:r>
-          </a:p>
-          <a:p>
-            <a:pPr lvl="2">
-              <a:defRPr/>
-            </a:pPr>
-            <a:r>
-              <a:rPr lang="en-US" altLang="en-US" dirty="0"/>
-              <a:t>Provide code samples</a:t>
-            </a:r>
-          </a:p>
-          <a:p>
-            <a:endParaRPr lang="en-CA" dirty="0"/>
+              <a:rPr lang="en-CA" dirty="0"/>
+              <a:t>ATDD templates</a:t>
+            </a:r>
+          </a:p>
+          <a:p>
+            <a:r>
+              <a:rPr lang="en-CA" dirty="0"/>
+              <a:t>In total there were 6 different tests with 16 tests cases</a:t>
+            </a:r>
+          </a:p>
+          <a:p>
+            <a:r>
+              <a:rPr lang="en-CA" dirty="0"/>
+              <a:t>Most of the tests passed/failed as intended</a:t>
+            </a:r>
+          </a:p>
+          <a:p>
+            <a:r>
+              <a:rPr lang="en-CA" dirty="0"/>
+              <a:t>All the templates are accounted for on the user story map</a:t>
+            </a:r>
+          </a:p>
+          <a:p>
+            <a:r>
+              <a:rPr lang="en-CA" dirty="0"/>
+              <a:t>Templates are accessible through the milestone 5 and 6 presentations but were not posted individually, However, they were not to difficult to find</a:t>
+            </a:r>
           </a:p>
         </p:txBody>
       </p:sp>
     </p:spTree>
     <p:extLst>
       <p:ext uri="{BB962C8B-B14F-4D97-AF65-F5344CB8AC3E}">
-        <p14:creationId xmlns:p14="http://schemas.microsoft.com/office/powerpoint/2010/main" val="111992547"/>
+        <p14:creationId xmlns:p14="http://schemas.microsoft.com/office/powerpoint/2010/main" val="791782776"/>
       </p:ext>
     </p:extLst>
   </p:cSld>
@@ -13667,7 +13990,7 @@
           <p:cNvPr id="2" name="Title 1">
             <a:extLst>
               <a:ext uri="{FF2B5EF4-FFF2-40B4-BE49-F238E27FC236}">
-                <a16:creationId xmlns:a16="http://schemas.microsoft.com/office/drawing/2014/main" id="{4A8B22DD-748E-4C64-A0F6-FC7824240AD5}"/>
+                <a16:creationId xmlns:a16="http://schemas.microsoft.com/office/drawing/2014/main" id="{9B3E30F6-8B86-4BDA-92D0-DA5C12D65DD5}"/>
               </a:ext>
             </a:extLst>
           </p:cNvPr>
@@ -13678,19 +14001,14 @@
             <p:ph type="title"/>
           </p:nvPr>
         </p:nvSpPr>
-        <p:spPr>
-          <a:xfrm>
-            <a:off x="1141412" y="547634"/>
-            <a:ext cx="9905998" cy="841687"/>
-          </a:xfrm>
-        </p:spPr>
+        <p:spPr/>
         <p:txBody>
           <a:bodyPr/>
           <a:lstStyle/>
           <a:p>
             <a:r>
               <a:rPr lang="en-CA" dirty="0"/>
-              <a:t>Refactor review</a:t>
+              <a:t>Refactor Review</a:t>
             </a:r>
           </a:p>
         </p:txBody>
@@ -13700,7 +14018,7 @@
           <p:cNvPr id="3" name="Content Placeholder 2">
             <a:extLst>
               <a:ext uri="{FF2B5EF4-FFF2-40B4-BE49-F238E27FC236}">
-                <a16:creationId xmlns:a16="http://schemas.microsoft.com/office/drawing/2014/main" id="{7E43A16F-79BF-4063-9960-798E605E0CDA}"/>
+                <a16:creationId xmlns:a16="http://schemas.microsoft.com/office/drawing/2014/main" id="{8E534B7C-3422-4611-AC2F-68F3E880529B}"/>
               </a:ext>
             </a:extLst>
           </p:cNvPr>
@@ -13713,12 +14031,14 @@
         </p:nvSpPr>
         <p:spPr>
           <a:xfrm>
-            <a:off x="1141411" y="1389320"/>
-            <a:ext cx="9905999" cy="5468680"/>
+            <a:off x="1141413" y="1717859"/>
+            <a:ext cx="10207071" cy="1478570"/>
           </a:xfrm>
         </p:spPr>
         <p:txBody>
-          <a:bodyPr/>
+          <a:bodyPr>
+            <a:noAutofit/>
+          </a:bodyPr>
           <a:lstStyle/>
           <a:p>
             <a:pPr marL="0" indent="0">
@@ -13726,60 +14046,77 @@
             </a:pPr>
             <a:r>
               <a:rPr lang="en-CA" dirty="0"/>
-              <a:t>Code</a:t>
-            </a:r>
-          </a:p>
-          <a:p>
-            <a:r>
-              <a:rPr lang="en-CA" dirty="0"/>
-              <a:t>They used HTML, CSS, JavaScript, MySQL, PHP </a:t>
-            </a:r>
-          </a:p>
-          <a:p>
-            <a:pPr marL="0" indent="0">
-              <a:buNone/>
-            </a:pPr>
+              <a:t>Code Smells</a:t>
+            </a:r>
+          </a:p>
+          <a:p>
+            <a:r>
+              <a:rPr lang="en-US" dirty="0"/>
+              <a:t>User input for variables can prove to be an insecure environment allowing users to login with any credentials using </a:t>
+            </a:r>
+            <a:r>
+              <a:rPr lang="en-US" dirty="0" err="1"/>
+              <a:t>boolean</a:t>
+            </a:r>
+            <a:r>
+              <a:rPr lang="en-US" dirty="0"/>
+              <a:t> expressions, or even dump the database.</a:t>
+            </a:r>
             <a:endParaRPr lang="en-CA" dirty="0"/>
-          </a:p>
-          <a:p>
-            <a:pPr marL="0" indent="0">
-              <a:buNone/>
-            </a:pPr>
-            <a:r>
-              <a:rPr lang="en-CA" dirty="0"/>
-              <a:t>ATDD templates</a:t>
-            </a:r>
-          </a:p>
-          <a:p>
-            <a:r>
-              <a:rPr lang="en-CA" dirty="0"/>
-              <a:t>In total there were 6 different tests with 16 tests cases</a:t>
-            </a:r>
-          </a:p>
-          <a:p>
-            <a:r>
-              <a:rPr lang="en-CA" dirty="0"/>
-              <a:t>Most of the tests passed/failed as intended</a:t>
-            </a:r>
-          </a:p>
-          <a:p>
-            <a:r>
-              <a:rPr lang="en-CA" dirty="0"/>
-              <a:t>All the templates are accounted for on the user story map</a:t>
-            </a:r>
-          </a:p>
-          <a:p>
-            <a:r>
-              <a:rPr lang="en-CA" dirty="0"/>
-              <a:t>Templates are accessible through the milestone 5 and 6 presentations but were not posted individually, However, they were not to difficult to find</a:t>
-            </a:r>
           </a:p>
         </p:txBody>
       </p:sp>
+      <p:pic>
+        <p:nvPicPr>
+          <p:cNvPr id="1026" name="Picture 2" descr="https://lh6.googleusercontent.com/yyPZBTUsiAUMmbwmgx2sRK95gzQ0P1YAk9g7cR-6za7Xp-wMUyyXu6NWsyz-6jxuSszp-5NfcG9H7cybj82uT9RyRm8XvB_Z62S3cdKmNXOL-NYPeCcMuojmR2vZcML1DAke0PJI">
+            <a:extLst>
+              <a:ext uri="{FF2B5EF4-FFF2-40B4-BE49-F238E27FC236}">
+                <a16:creationId xmlns:a16="http://schemas.microsoft.com/office/drawing/2014/main" id="{E7F93208-6BE8-4B39-A5CF-9F3563AB45F2}"/>
+              </a:ext>
+            </a:extLst>
+          </p:cNvPr>
+          <p:cNvPicPr>
+            <a:picLocks noChangeAspect="1" noChangeArrowheads="1"/>
+          </p:cNvPicPr>
+          <p:nvPr/>
+        </p:nvPicPr>
+        <p:blipFill>
+          <a:blip r:embed="rId2">
+            <a:extLst>
+              <a:ext uri="{28A0092B-C50C-407E-A947-70E740481C1C}">
+                <a14:useLocalDpi xmlns:a14="http://schemas.microsoft.com/office/drawing/2010/main" val="0"/>
+              </a:ext>
+            </a:extLst>
+          </a:blip>
+          <a:srcRect/>
+          <a:stretch>
+            <a:fillRect/>
+          </a:stretch>
+        </p:blipFill>
+        <p:spPr bwMode="auto">
+          <a:xfrm>
+            <a:off x="1978105" y="3904270"/>
+            <a:ext cx="8232613" cy="2335212"/>
+          </a:xfrm>
+          <a:prstGeom prst="rect">
+            <a:avLst/>
+          </a:prstGeom>
+          <a:noFill/>
+          <a:extLst>
+            <a:ext uri="{909E8E84-426E-40DD-AFC4-6F175D3DCCD1}">
+              <a14:hiddenFill xmlns:a14="http://schemas.microsoft.com/office/drawing/2010/main">
+                <a:solidFill>
+                  <a:srgbClr val="FFFFFF"/>
+                </a:solidFill>
+              </a14:hiddenFill>
+            </a:ext>
+          </a:extLst>
+        </p:spPr>
+      </p:pic>
     </p:spTree>
     <p:extLst>
       <p:ext uri="{BB962C8B-B14F-4D97-AF65-F5344CB8AC3E}">
-        <p14:creationId xmlns:p14="http://schemas.microsoft.com/office/powerpoint/2010/main" val="791782776"/>
+        <p14:creationId xmlns:p14="http://schemas.microsoft.com/office/powerpoint/2010/main" val="209529588"/>
       </p:ext>
     </p:extLst>
   </p:cSld>
@@ -13811,7 +14148,7 @@
           <p:cNvPr id="2" name="Title 1">
             <a:extLst>
               <a:ext uri="{FF2B5EF4-FFF2-40B4-BE49-F238E27FC236}">
-                <a16:creationId xmlns:a16="http://schemas.microsoft.com/office/drawing/2014/main" id="{6C90E832-22A3-40B8-83FC-AB571942EC7C}"/>
+                <a16:creationId xmlns:a16="http://schemas.microsoft.com/office/drawing/2014/main" id="{3833DBF8-9B50-4ECC-815E-B7E8E18369F1}"/>
               </a:ext>
             </a:extLst>
           </p:cNvPr>
@@ -13828,10 +14165,9 @@
           <a:lstStyle/>
           <a:p>
             <a:r>
-              <a:rPr lang="en-US" altLang="en-US" dirty="0"/>
-              <a:t>Design pattern discussion (High-level focus)</a:t>
-            </a:r>
-            <a:endParaRPr lang="en-CA" dirty="0"/>
+              <a:rPr lang="en-CA" dirty="0"/>
+              <a:t>Refactor review</a:t>
+            </a:r>
           </a:p>
         </p:txBody>
       </p:sp>
@@ -13840,7 +14176,7 @@
           <p:cNvPr id="3" name="Content Placeholder 2">
             <a:extLst>
               <a:ext uri="{FF2B5EF4-FFF2-40B4-BE49-F238E27FC236}">
-                <a16:creationId xmlns:a16="http://schemas.microsoft.com/office/drawing/2014/main" id="{A6CC2F4B-AFFA-426E-A93E-05769A23E634}"/>
+                <a16:creationId xmlns:a16="http://schemas.microsoft.com/office/drawing/2014/main" id="{7B005FFA-6EE5-4F41-ACE3-8800C3EE5A77}"/>
               </a:ext>
             </a:extLst>
           </p:cNvPr>
@@ -13853,85 +14189,82 @@
         </p:nvSpPr>
         <p:spPr>
           <a:xfrm>
-            <a:off x="1141412" y="2249486"/>
-            <a:ext cx="9905999" cy="3989995"/>
+            <a:off x="1141413" y="1708999"/>
+            <a:ext cx="9905999" cy="1663294"/>
           </a:xfrm>
         </p:spPr>
         <p:txBody>
           <a:bodyPr/>
           <a:lstStyle/>
           <a:p>
-            <a:pPr marL="457200" lvl="1" indent="0">
+            <a:pPr marL="0" indent="0">
               <a:buNone/>
             </a:pPr>
             <a:r>
-              <a:rPr lang="en-US" altLang="en-US" sz="2400" dirty="0"/>
-              <a:t>The design pattern they used are : </a:t>
-            </a:r>
-          </a:p>
-          <a:p>
-            <a:pPr lvl="1">
-              <a:buNone/>
-            </a:pPr>
-            <a:r>
-              <a:rPr lang="en-US" sz="2400" dirty="0"/>
-              <a:t>From the Structural design patterns.</a:t>
-            </a:r>
-          </a:p>
-          <a:p>
-            <a:pPr lvl="1">
-              <a:buNone/>
-            </a:pPr>
-            <a:r>
-              <a:rPr lang="en-US" sz="2400" dirty="0"/>
-              <a:t>- composite </a:t>
-            </a:r>
-          </a:p>
-          <a:p>
-            <a:pPr lvl="1">
-              <a:buNone/>
-            </a:pPr>
-            <a:r>
-              <a:rPr lang="en-US" sz="2400" dirty="0"/>
-              <a:t>- Façade</a:t>
-            </a:r>
-          </a:p>
-          <a:p>
-            <a:pPr lvl="1">
-              <a:buNone/>
-            </a:pPr>
-            <a:r>
-              <a:rPr lang="en-US" sz="2400" dirty="0"/>
-              <a:t>From Behavioral design patterns:</a:t>
-            </a:r>
-          </a:p>
-          <a:p>
-            <a:pPr lvl="1">
-              <a:buNone/>
-            </a:pPr>
-            <a:r>
-              <a:rPr lang="en-US" sz="2400" dirty="0"/>
-              <a:t>- Observer</a:t>
-            </a:r>
-          </a:p>
-          <a:p>
-            <a:pPr lvl="1">
-              <a:buNone/>
-            </a:pPr>
-            <a:r>
-              <a:rPr lang="en-US" sz="2400" dirty="0"/>
-              <a:t>- Strategy</a:t>
-            </a:r>
-          </a:p>
-          <a:p>
+              <a:rPr lang="en-CA" dirty="0"/>
+              <a:t>Code Smells</a:t>
+            </a:r>
+          </a:p>
+          <a:p>
+            <a:r>
+              <a:rPr lang="en-US" dirty="0"/>
+              <a:t>Not using different files for the MYSQL session, this enables a lot of code reuse.</a:t>
+            </a:r>
             <a:endParaRPr lang="en-CA" dirty="0"/>
           </a:p>
         </p:txBody>
       </p:sp>
+      <p:pic>
+        <p:nvPicPr>
+          <p:cNvPr id="2050" name="Picture 2" descr="https://lh3.googleusercontent.com/6vWfiTuoO7C4jKj0dC6GyrlmAEsRQlMvka3n5ob4_Ej4_292_C9aMUGrjMCuNiTvY-aHhWbJdaYA4Lmj1U4qBkCbx49Xc6FbvBeyh9SjcJf5-f6SET53zks8nfQrSLMnnxWoVx0U">
+            <a:extLst>
+              <a:ext uri="{FF2B5EF4-FFF2-40B4-BE49-F238E27FC236}">
+                <a16:creationId xmlns:a16="http://schemas.microsoft.com/office/drawing/2014/main" id="{7C3A6B24-ABF0-4A48-9D50-4370BC2592D2}"/>
+              </a:ext>
+            </a:extLst>
+          </p:cNvPr>
+          <p:cNvPicPr>
+            <a:picLocks noChangeAspect="1" noChangeArrowheads="1"/>
+          </p:cNvPicPr>
+          <p:nvPr/>
+        </p:nvPicPr>
+        <p:blipFill>
+          <a:blip r:embed="rId2">
+            <a:extLst>
+              <a:ext uri="{28A0092B-C50C-407E-A947-70E740481C1C}">
+                <a14:useLocalDpi xmlns:a14="http://schemas.microsoft.com/office/drawing/2010/main" val="0"/>
+              </a:ext>
+            </a:extLst>
+          </a:blip>
+          <a:srcRect/>
+          <a:stretch>
+            <a:fillRect/>
+          </a:stretch>
+        </p:blipFill>
+        <p:spPr bwMode="auto">
+          <a:xfrm>
+            <a:off x="2694652" y="3041244"/>
+            <a:ext cx="6799520" cy="3563210"/>
+          </a:xfrm>
+          <a:prstGeom prst="rect">
+            <a:avLst/>
+          </a:prstGeom>
+          <a:noFill/>
+          <a:extLst>
+            <a:ext uri="{909E8E84-426E-40DD-AFC4-6F175D3DCCD1}">
+              <a14:hiddenFill xmlns:a14="http://schemas.microsoft.com/office/drawing/2010/main">
+                <a:solidFill>
+                  <a:srgbClr val="FFFFFF"/>
+                </a:solidFill>
+              </a14:hiddenFill>
+            </a:ext>
+          </a:extLst>
+        </p:spPr>
+      </p:pic>
     </p:spTree>
     <p:extLst>
       <p:ext uri="{BB962C8B-B14F-4D97-AF65-F5344CB8AC3E}">
-        <p14:creationId xmlns:p14="http://schemas.microsoft.com/office/powerpoint/2010/main" val="740593883"/>
+        <p14:creationId xmlns:p14="http://schemas.microsoft.com/office/powerpoint/2010/main" val="202852665"/>
       </p:ext>
     </p:extLst>
   </p:cSld>

</xml_diff>